<commit_message>
TODOs for Intro to MS SQL Server slides fixed
</commit_message>
<xml_diff>
--- a/Courses/Software-Sciences/Module-3-Databases-New/03-Intro-to-MS-SQL-Server/03-Intro-to-MS-SQL-Server.pptx
+++ b/Courses/Software-Sciences/Module-3-Databases-New/03-Intro-to-MS-SQL-Server/03-Intro-to-MS-SQL-Server.pptx
@@ -10832,42 +10832,6 @@
           </a:p>
         </p:txBody>
       </p:sp>
-      <p:pic>
-        <p:nvPicPr>
-          <p:cNvPr id="1026" name="Picture 2"/>
-          <p:cNvPicPr>
-            <a:picLocks noChangeAspect="1" noChangeArrowheads="1"/>
-          </p:cNvPicPr>
-          <p:nvPr/>
-        </p:nvPicPr>
-        <p:blipFill>
-          <a:blip r:embed="rId2" cstate="print"/>
-          <a:srcRect/>
-          <a:stretch>
-            <a:fillRect/>
-          </a:stretch>
-        </p:blipFill>
-        <p:spPr bwMode="auto">
-          <a:xfrm>
-            <a:off x="3641288" y="2349000"/>
-            <a:ext cx="4909425" cy="3004506"/>
-          </a:xfrm>
-          <a:prstGeom prst="rect">
-            <a:avLst/>
-          </a:prstGeom>
-          <a:noFill/>
-          <a:ln w="9525">
-            <a:solidFill>
-              <a:schemeClr val="bg2">
-                <a:lumMod val="75000"/>
-              </a:schemeClr>
-            </a:solidFill>
-            <a:miter lim="800000"/>
-            <a:headEnd/>
-            <a:tailEnd/>
-          </a:ln>
-        </p:spPr>
-      </p:pic>
       <p:sp>
         <p:nvSpPr>
           <p:cNvPr id="5" name="Slide Number">
@@ -10910,190 +10874,43 @@
           </a:p>
         </p:txBody>
       </p:sp>
-      <p:sp>
-        <p:nvSpPr>
-          <p:cNvPr id="2" name="Rectangle: Rounded Corners 1">
+      <p:pic>
+        <p:nvPicPr>
+          <p:cNvPr id="7" name="Picture 6">
             <a:extLst>
               <a:ext uri="{FF2B5EF4-FFF2-40B4-BE49-F238E27FC236}">
-                <a16:creationId xmlns:a16="http://schemas.microsoft.com/office/drawing/2014/main" id="{C4E944A5-0F38-534D-88AF-336CD50FD598}"/>
+                <a16:creationId xmlns:a16="http://schemas.microsoft.com/office/drawing/2014/main" id="{5857B70E-5A76-2915-0460-5158B602FCCD}"/>
               </a:ext>
             </a:extLst>
           </p:cNvPr>
-          <p:cNvSpPr/>
+          <p:cNvPicPr>
+            <a:picLocks noChangeAspect="1"/>
+          </p:cNvPicPr>
           <p:nvPr/>
-        </p:nvSpPr>
-        <p:spPr bwMode="auto">
+        </p:nvPicPr>
+        <p:blipFill>
+          <a:blip r:embed="rId2"/>
+          <a:stretch>
+            <a:fillRect/>
+          </a:stretch>
+        </p:blipFill>
+        <p:spPr>
           <a:xfrm>
-            <a:off x="5248039" y="1467798"/>
-            <a:ext cx="6816432" cy="3288561"/>
+            <a:off x="3665999" y="2349000"/>
+            <a:ext cx="4912181" cy="3195000"/>
           </a:xfrm>
-          <a:prstGeom prst="roundRect">
+          <a:prstGeom prst="rect">
             <a:avLst/>
           </a:prstGeom>
-          <a:solidFill>
-            <a:schemeClr val="dk2">
-              <a:alpha val="80000"/>
-            </a:schemeClr>
-          </a:solidFill>
-          <a:ln w="19050">
+          <a:ln>
             <a:solidFill>
-              <a:schemeClr val="tx1">
-                <a:lumMod val="75000"/>
-                <a:alpha val="80000"/>
+              <a:schemeClr val="bg2">
+                <a:lumMod val="85000"/>
               </a:schemeClr>
             </a:solidFill>
           </a:ln>
-          <a:effectLst/>
         </p:spPr>
-        <p:style>
-          <a:lnRef idx="2">
-            <a:schemeClr val="accent1">
-              <a:shade val="50000"/>
-            </a:schemeClr>
-          </a:lnRef>
-          <a:fillRef idx="1001">
-            <a:schemeClr val="dk2"/>
-          </a:fillRef>
-          <a:effectRef idx="0">
-            <a:schemeClr val="accent1"/>
-          </a:effectRef>
-          <a:fontRef idx="minor">
-            <a:schemeClr val="lt1"/>
-          </a:fontRef>
-        </p:style>
-        <p:txBody>
-          <a:bodyPr rot="0" spcFirstLastPara="0" vertOverflow="overflow" horzOverflow="overflow" vert="horz" wrap="square" lIns="91440" tIns="45720" rIns="91440" bIns="45720" numCol="1" spcCol="0" rtlCol="0" fromWordArt="0" anchor="ctr" anchorCtr="0" forceAA="0" compatLnSpc="1">
-            <a:prstTxWarp prst="textNoShape">
-              <a:avLst/>
-            </a:prstTxWarp>
-            <a:noAutofit/>
-          </a:bodyPr>
-          <a:lstStyle/>
-          <a:p>
-            <a:pPr algn="ctr"/>
-            <a:r>
-              <a:rPr lang="bg-BG" sz="2800" b="1" dirty="0">
-                <a:solidFill>
-                  <a:srgbClr val="FFFFFF"/>
-                </a:solidFill>
-                <a:effectLst>
-                  <a:outerShdw blurRad="38100" dist="38100" dir="2700000" algn="tl">
-                    <a:srgbClr val="000000">
-                      <a:alpha val="43137"/>
-                    </a:srgbClr>
-                  </a:outerShdw>
-                </a:effectLst>
-              </a:rPr>
-              <a:t>Да се покаже връзка с </a:t>
-            </a:r>
-            <a:r>
-              <a:rPr lang="en-US" sz="2800" b="1" dirty="0">
-                <a:solidFill>
-                  <a:srgbClr val="FFFFFF"/>
-                </a:solidFill>
-                <a:effectLst>
-                  <a:outerShdw blurRad="38100" dist="38100" dir="2700000" algn="tl">
-                    <a:srgbClr val="000000">
-                      <a:alpha val="43137"/>
-                    </a:srgbClr>
-                  </a:outerShdw>
-                </a:effectLst>
-              </a:rPr>
-              <a:t>LocalDB:</a:t>
-            </a:r>
-          </a:p>
-          <a:p>
-            <a:pPr algn="ctr"/>
-            <a:endParaRPr lang="en-US" sz="2800" b="1" dirty="0">
-              <a:solidFill>
-                <a:srgbClr val="FFFFFF"/>
-              </a:solidFill>
-              <a:effectLst>
-                <a:outerShdw blurRad="38100" dist="38100" dir="2700000" algn="tl">
-                  <a:srgbClr val="000000">
-                    <a:alpha val="43137"/>
-                  </a:srgbClr>
-                </a:outerShdw>
-              </a:effectLst>
-            </a:endParaRPr>
-          </a:p>
-          <a:p>
-            <a:pPr algn="ctr"/>
-            <a:r>
-              <a:rPr lang="en-US" sz="4000" b="1" dirty="0">
-                <a:solidFill>
-                  <a:srgbClr val="FFFFFF"/>
-                </a:solidFill>
-                <a:effectLst>
-                  <a:outerShdw blurRad="38100" dist="38100" dir="2700000" algn="tl">
-                    <a:srgbClr val="000000">
-                      <a:alpha val="43137"/>
-                    </a:srgbClr>
-                  </a:outerShdw>
-                </a:effectLst>
-              </a:rPr>
-              <a:t>(</a:t>
-            </a:r>
-            <a:r>
-              <a:rPr lang="en-US" sz="4000" b="1" dirty="0" err="1">
-                <a:solidFill>
-                  <a:srgbClr val="FFFFFF"/>
-                </a:solidFill>
-                <a:effectLst>
-                  <a:outerShdw blurRad="38100" dist="38100" dir="2700000" algn="tl">
-                    <a:srgbClr val="000000">
-                      <a:alpha val="43137"/>
-                    </a:srgbClr>
-                  </a:outerShdw>
-                </a:effectLst>
-              </a:rPr>
-              <a:t>localdb</a:t>
-            </a:r>
-            <a:r>
-              <a:rPr lang="en-US" sz="4000" b="1" dirty="0">
-                <a:solidFill>
-                  <a:srgbClr val="FFFFFF"/>
-                </a:solidFill>
-                <a:effectLst>
-                  <a:outerShdw blurRad="38100" dist="38100" dir="2700000" algn="tl">
-                    <a:srgbClr val="000000">
-                      <a:alpha val="43137"/>
-                    </a:srgbClr>
-                  </a:outerShdw>
-                </a:effectLst>
-              </a:rPr>
-              <a:t>)\</a:t>
-            </a:r>
-            <a:r>
-              <a:rPr lang="en-US" sz="4000" b="1" dirty="0" err="1">
-                <a:solidFill>
-                  <a:srgbClr val="FFFFFF"/>
-                </a:solidFill>
-                <a:effectLst>
-                  <a:outerShdw blurRad="38100" dist="38100" dir="2700000" algn="tl">
-                    <a:srgbClr val="000000">
-                      <a:alpha val="43137"/>
-                    </a:srgbClr>
-                  </a:outerShdw>
-                </a:effectLst>
-              </a:rPr>
-              <a:t>MSSQLLocalDB</a:t>
-            </a:r>
-            <a:endParaRPr lang="en-US" sz="4000" b="1" dirty="0">
-              <a:solidFill>
-                <a:srgbClr val="FFFFFF"/>
-              </a:solidFill>
-              <a:effectLst>
-                <a:outerShdw blurRad="38100" dist="38100" dir="2700000" algn="tl">
-                  <a:srgbClr val="000000">
-                    <a:alpha val="43137"/>
-                  </a:srgbClr>
-                </a:outerShdw>
-              </a:effectLst>
-            </a:endParaRPr>
-          </a:p>
-        </p:txBody>
-      </p:sp>
+      </p:pic>
     </p:spTree>
     <p:extLst>
       <p:ext uri="{BB962C8B-B14F-4D97-AF65-F5344CB8AC3E}">

</xml_diff>

<commit_message>
Fixes on MS SQL Server slides
</commit_message>
<xml_diff>
--- a/Courses/Software-Sciences/Module-3-Databases-New/03-Intro-to-MS-SQL-Server/03-Intro-to-MS-SQL-Server.pptx
+++ b/Courses/Software-Sciences/Module-3-Databases-New/03-Intro-to-MS-SQL-Server/03-Intro-to-MS-SQL-Server.pptx
@@ -405,7 +405,7 @@
           <a:p>
             <a:fld id="{4E087215-0C8F-4762-A664-737A353EC9A4}" type="datetimeFigureOut">
               <a:rPr lang="bg-BG" smtClean="0"/>
-              <a:t>23.10.2023 г.</a:t>
+              <a:t>25.11.2023 г.</a:t>
             </a:fld>
             <a:endParaRPr lang="bg-BG"/>
           </a:p>
@@ -601,7 +601,7 @@
           <a:p>
             <a:fld id="{72D84649-876A-46C9-8472-14CB09C070D8}" type="datetimeFigureOut">
               <a:rPr lang="en-US" smtClean="0"/>
-              <a:t>10/23/2023</a:t>
+              <a:t>11/25/2023</a:t>
             </a:fld>
             <a:endParaRPr lang="en-US"/>
           </a:p>
@@ -18991,7 +18991,7 @@
         <p:grpSpPr>
           <a:xfrm>
             <a:off x="191942" y="1419750"/>
-            <a:ext cx="8632995" cy="5300339"/>
+            <a:ext cx="9302704" cy="5300339"/>
             <a:chOff x="472011" y="1508786"/>
             <a:chExt cx="3799787" cy="4865561"/>
           </a:xfrm>
@@ -19278,8 +19278,8 @@
         </p:blipFill>
         <p:spPr>
           <a:xfrm flipH="1">
-            <a:off x="8824937" y="3276641"/>
-            <a:ext cx="2882677" cy="3119781"/>
+            <a:off x="9634833" y="4105075"/>
+            <a:ext cx="2118197" cy="2292422"/>
           </a:xfrm>
           <a:prstGeom prst="rect">
             <a:avLst/>
@@ -19525,8 +19525,8 @@
         </p:nvSpPr>
         <p:spPr>
           <a:xfrm>
-            <a:off x="699284" y="1559724"/>
-            <a:ext cx="8000490" cy="5694444"/>
+            <a:off x="561000" y="1719000"/>
+            <a:ext cx="8795363" cy="4689425"/>
           </a:xfrm>
           <a:prstGeom prst="rect">
             <a:avLst/>
@@ -19552,8 +19552,8 @@
               <a:rPr lang="bg-BG" sz="3400" b="1" dirty="0">
                 <a:solidFill>
                   <a:schemeClr val="bg1">
-                    <a:lumMod val="60000"/>
-                    <a:lumOff val="40000"/>
+                    <a:lumMod val="40000"/>
+                    <a:lumOff val="60000"/>
                   </a:schemeClr>
                 </a:solidFill>
               </a:rPr>
@@ -19563,8 +19563,8 @@
               <a:rPr lang="en-US" sz="3400" b="1" dirty="0">
                 <a:solidFill>
                   <a:schemeClr val="bg1">
-                    <a:lumMod val="60000"/>
-                    <a:lumOff val="40000"/>
+                    <a:lumMod val="40000"/>
+                    <a:lumOff val="60000"/>
                   </a:schemeClr>
                 </a:solidFill>
               </a:rPr>
@@ -19574,36 +19574,20 @@
               <a:rPr lang="en-US" sz="3400" dirty="0">
                 <a:solidFill>
                   <a:schemeClr val="bg1">
-                    <a:lumMod val="60000"/>
-                    <a:lumOff val="40000"/>
+                    <a:lumMod val="40000"/>
+                    <a:lumOff val="60000"/>
                   </a:schemeClr>
                 </a:solidFill>
               </a:rPr>
-              <a:t> ==</a:t>
-            </a:r>
-            <a:r>
-              <a:rPr lang="en-US" sz="3400" dirty="0">
+              <a:t> == </a:t>
+            </a:r>
+            <a:r>
+              <a:rPr lang="bg-BG" sz="3400" dirty="0">
                 <a:solidFill>
                   <a:schemeClr val="bg2"/>
                 </a:solidFill>
               </a:rPr>
-              <a:t> </a:t>
-            </a:r>
-            <a:r>
-              <a:rPr lang="bg-BG" sz="3400" dirty="0">
-                <a:solidFill>
-                  <a:schemeClr val="bg2"/>
-                </a:solidFill>
-              </a:rPr>
-              <a:t>система </a:t>
-            </a:r>
-            <a:r>
-              <a:rPr lang="bg-BG" sz="3600" dirty="0">
-                <a:solidFill>
-                  <a:schemeClr val="bg2"/>
-                </a:solidFill>
-              </a:rPr>
-              <a:t>за управление на големи обеми от данни</a:t>
+              <a:t>система за управление на големи обеми от данни</a:t>
             </a:r>
           </a:p>
           <a:p>
@@ -19618,40 +19602,35 @@
               <a:buChar char="§"/>
             </a:pPr>
             <a:r>
-              <a:rPr lang="en-US" sz="3200" b="1" dirty="0">
+              <a:rPr lang="en-US" sz="3400" b="1" dirty="0">
                 <a:solidFill>
                   <a:schemeClr val="bg1">
-                    <a:lumMod val="60000"/>
-                    <a:lumOff val="40000"/>
+                    <a:lumMod val="40000"/>
+                    <a:lumOff val="60000"/>
                   </a:schemeClr>
                 </a:solidFill>
               </a:rPr>
               <a:t>SQL Server Express LocalDB</a:t>
             </a:r>
             <a:r>
-              <a:rPr lang="bg-BG" sz="3200" b="1" dirty="0">
+              <a:rPr lang="bg-BG" sz="3400" b="1" dirty="0">
                 <a:solidFill>
                   <a:schemeClr val="bg1">
-                    <a:lumMod val="60000"/>
-                    <a:lumOff val="40000"/>
+                    <a:lumMod val="40000"/>
+                    <a:lumOff val="60000"/>
                   </a:schemeClr>
                 </a:solidFill>
               </a:rPr>
-              <a:t> ==</a:t>
-            </a:r>
-            <a:r>
-              <a:rPr lang="bg-BG" sz="3200" dirty="0">
+              <a:t> == </a:t>
+            </a:r>
+            <a:r>
+              <a:rPr lang="bg-BG" sz="3400" dirty="0">
                 <a:solidFill>
                   <a:schemeClr val="bg2"/>
                 </a:solidFill>
               </a:rPr>
-              <a:t> опростена версия на Microsoft SQL Server</a:t>
-            </a:r>
-            <a:endParaRPr lang="bg-BG" sz="3400" dirty="0">
-              <a:solidFill>
-                <a:schemeClr val="bg2"/>
-              </a:solidFill>
-            </a:endParaRPr>
+              <a:t>опростена версия на Microsoft SQL Server</a:t>
+            </a:r>
           </a:p>
           <a:p>
             <a:pPr marL="457200" indent="-457200">
@@ -19692,8 +19671,8 @@
               <a:rPr lang="bg-BG" sz="3400" b="1" dirty="0">
                 <a:solidFill>
                   <a:schemeClr val="bg1">
-                    <a:lumMod val="60000"/>
-                    <a:lumOff val="40000"/>
+                    <a:lumMod val="40000"/>
+                    <a:lumOff val="60000"/>
                   </a:schemeClr>
                 </a:solidFill>
               </a:rPr>
@@ -19711,8 +19690,8 @@
               <a:rPr lang="bg-BG" sz="3400" b="1" dirty="0">
                 <a:solidFill>
                   <a:schemeClr val="bg1">
-                    <a:lumMod val="60000"/>
-                    <a:lumOff val="40000"/>
+                    <a:lumMod val="40000"/>
+                    <a:lumOff val="60000"/>
                   </a:schemeClr>
                 </a:solidFill>
               </a:rPr>
@@ -19730,8 +19709,8 @@
               <a:rPr lang="bg-BG" sz="3400" b="1" dirty="0">
                 <a:solidFill>
                   <a:schemeClr val="bg1">
-                    <a:lumMod val="60000"/>
-                    <a:lumOff val="40000"/>
+                    <a:lumMod val="40000"/>
+                    <a:lumOff val="60000"/>
                   </a:schemeClr>
                 </a:solidFill>
               </a:rPr>
@@ -19759,7 +19738,7 @@
               <a:buFont typeface="Wingdings" panose="05000000000000000000" pitchFamily="2" charset="2"/>
               <a:buChar char="§"/>
             </a:pPr>
-            <a:endParaRPr lang="en-US" sz="3200" dirty="0">
+            <a:endParaRPr lang="en-US" sz="3400" dirty="0">
               <a:solidFill>
                 <a:schemeClr val="bg2"/>
               </a:solidFill>
@@ -19773,7 +19752,7 @@
               <a:buFont typeface="Wingdings" panose="05000000000000000000" pitchFamily="2" charset="2"/>
               <a:buChar char="§"/>
             </a:pPr>
-            <a:endParaRPr lang="en-US" sz="3200" b="1" dirty="0">
+            <a:endParaRPr lang="en-US" sz="3400" b="1" dirty="0">
               <a:solidFill>
                 <a:schemeClr val="bg2"/>
               </a:solidFill>

</xml_diff>

<commit_message>
Updating slides for Intro to MS SQL Server
</commit_message>
<xml_diff>
--- a/Courses/Software-Sciences/Module-3-Databases-New/03-Intro-to-MS-SQL-Server/03-Intro-to-MS-SQL-Server.pptx
+++ b/Courses/Software-Sciences/Module-3-Databases-New/03-Intro-to-MS-SQL-Server/03-Intro-to-MS-SQL-Server.pptx
@@ -405,7 +405,7 @@
           <a:p>
             <a:fld id="{4E087215-0C8F-4762-A664-737A353EC9A4}" type="datetimeFigureOut">
               <a:rPr lang="bg-BG" smtClean="0"/>
-              <a:t>25.11.2023 г.</a:t>
+              <a:t>28.11.2023 г.</a:t>
             </a:fld>
             <a:endParaRPr lang="bg-BG"/>
           </a:p>
@@ -601,7 +601,7 @@
           <a:p>
             <a:fld id="{72D84649-876A-46C9-8472-14CB09C070D8}" type="datetimeFigureOut">
               <a:rPr lang="en-US" smtClean="0"/>
-              <a:t>11/25/2023</a:t>
+              <a:t>11/28/2023</a:t>
             </a:fld>
             <a:endParaRPr lang="en-US"/>
           </a:p>
@@ -24436,56 +24436,39 @@
       </p:sp>
       <p:pic>
         <p:nvPicPr>
-          <p:cNvPr id="3074" name="Picture 2" descr="Express Edition download - success">
+          <p:cNvPr id="6" name="Picture 5">
             <a:extLst>
               <a:ext uri="{FF2B5EF4-FFF2-40B4-BE49-F238E27FC236}">
-                <a16:creationId xmlns:a16="http://schemas.microsoft.com/office/drawing/2014/main" id="{AF8DE7F6-1735-8D39-4623-B7DA35ECFDD3}"/>
+                <a16:creationId xmlns:a16="http://schemas.microsoft.com/office/drawing/2014/main" id="{BABA3E35-F2A1-B98C-1D02-E38E316675F7}"/>
               </a:ext>
             </a:extLst>
           </p:cNvPr>
           <p:cNvPicPr>
-            <a:picLocks noChangeAspect="1" noChangeArrowheads="1"/>
+            <a:picLocks noChangeAspect="1"/>
           </p:cNvPicPr>
           <p:nvPr/>
         </p:nvPicPr>
         <p:blipFill>
-          <a:blip r:embed="rId2">
-            <a:extLst>
-              <a:ext uri="{28A0092B-C50C-407E-A947-70E740481C1C}">
-                <a14:useLocalDpi xmlns:a14="http://schemas.microsoft.com/office/drawing/2010/main" val="0"/>
-              </a:ext>
-            </a:extLst>
-          </a:blip>
-          <a:srcRect/>
+          <a:blip r:embed="rId2"/>
           <a:stretch>
             <a:fillRect/>
           </a:stretch>
         </p:blipFill>
-        <p:spPr bwMode="auto">
+        <p:spPr>
           <a:xfrm>
-            <a:off x="3931500" y="3219015"/>
-            <a:ext cx="4329000" cy="3427125"/>
+            <a:off x="3128548" y="3744000"/>
+            <a:ext cx="5934903" cy="2286319"/>
           </a:xfrm>
           <a:prstGeom prst="rect">
             <a:avLst/>
           </a:prstGeom>
-          <a:noFill/>
           <a:ln>
             <a:solidFill>
               <a:schemeClr val="bg2">
-                <a:lumMod val="85000"/>
+                <a:lumMod val="75000"/>
               </a:schemeClr>
             </a:solidFill>
           </a:ln>
-          <a:extLst>
-            <a:ext uri="{909E8E84-426E-40DD-AFC4-6F175D3DCCD1}">
-              <a14:hiddenFill xmlns:a14="http://schemas.microsoft.com/office/drawing/2010/main">
-                <a:solidFill>
-                  <a:srgbClr val="FFFFFF"/>
-                </a:solidFill>
-              </a14:hiddenFill>
-            </a:ext>
-          </a:extLst>
         </p:spPr>
       </p:pic>
     </p:spTree>
@@ -24545,33 +24528,6 @@
                                               <p:pRg st="1" end="1"/>
                                             </p:txEl>
                                           </p:spTgt>
-                                        </p:tgtEl>
-                                        <p:attrNameLst>
-                                          <p:attrName>style.visibility</p:attrName>
-                                        </p:attrNameLst>
-                                      </p:cBhvr>
-                                      <p:to>
-                                        <p:strVal val="visible"/>
-                                      </p:to>
-                                    </p:set>
-                                  </p:childTnLst>
-                                </p:cTn>
-                              </p:par>
-                              <p:par>
-                                <p:cTn id="7" presetID="1" presetClass="entr" presetSubtype="0" fill="hold" nodeType="withEffect">
-                                  <p:stCondLst>
-                                    <p:cond delay="0"/>
-                                  </p:stCondLst>
-                                  <p:childTnLst>
-                                    <p:set>
-                                      <p:cBhvr>
-                                        <p:cTn id="8" dur="1" fill="hold">
-                                          <p:stCondLst>
-                                            <p:cond delay="0"/>
-                                          </p:stCondLst>
-                                        </p:cTn>
-                                        <p:tgtEl>
-                                          <p:spTgt spid="3074"/>
                                         </p:tgtEl>
                                         <p:attrNameLst>
                                           <p:attrName>style.visibility</p:attrName>

</xml_diff>

<commit_message>
Updates slides for topics for Intro to MS SQL Server and Intro to SQL
</commit_message>
<xml_diff>
--- a/Courses/Software-Sciences/Module-3-Databases-New/03-Intro-to-MS-SQL-Server/03-Intro-to-MS-SQL-Server.pptx
+++ b/Courses/Software-Sciences/Module-3-Databases-New/03-Intro-to-MS-SQL-Server/03-Intro-to-MS-SQL-Server.pptx
@@ -5,10 +5,10 @@
     <p:sldMasterId id="2147483675" r:id="rId1"/>
   </p:sldMasterIdLst>
   <p:notesMasterIdLst>
-    <p:notesMasterId r:id="rId34"/>
+    <p:notesMasterId r:id="rId35"/>
   </p:notesMasterIdLst>
   <p:handoutMasterIdLst>
-    <p:handoutMasterId r:id="rId35"/>
+    <p:handoutMasterId r:id="rId36"/>
   </p:handoutMasterIdLst>
   <p:sldIdLst>
     <p:sldId id="1176" r:id="rId2"/>
@@ -35,14 +35,15 @@
     <p:sldId id="1199" r:id="rId23"/>
     <p:sldId id="1200" r:id="rId24"/>
     <p:sldId id="1201" r:id="rId25"/>
-    <p:sldId id="1205" r:id="rId26"/>
-    <p:sldId id="1208" r:id="rId27"/>
-    <p:sldId id="1206" r:id="rId28"/>
-    <p:sldId id="1207" r:id="rId29"/>
-    <p:sldId id="1209" r:id="rId30"/>
-    <p:sldId id="1127" r:id="rId31"/>
-    <p:sldId id="504" r:id="rId32"/>
-    <p:sldId id="505" r:id="rId33"/>
+    <p:sldId id="1223" r:id="rId26"/>
+    <p:sldId id="1205" r:id="rId27"/>
+    <p:sldId id="1208" r:id="rId28"/>
+    <p:sldId id="1206" r:id="rId29"/>
+    <p:sldId id="1207" r:id="rId30"/>
+    <p:sldId id="1209" r:id="rId31"/>
+    <p:sldId id="1127" r:id="rId32"/>
+    <p:sldId id="504" r:id="rId33"/>
+    <p:sldId id="505" r:id="rId34"/>
   </p:sldIdLst>
   <p:sldSz cx="12192000" cy="6858000"/>
   <p:notesSz cx="6858000" cy="9144000"/>
@@ -186,6 +187,7 @@
             <p14:sldId id="1199"/>
             <p14:sldId id="1200"/>
             <p14:sldId id="1201"/>
+            <p14:sldId id="1223"/>
           </p14:sldIdLst>
         </p14:section>
         <p14:section name="Изпълнение на SQL заявки" id="{494F2331-F217-4B29-9E1F-E939E8D45303}">
@@ -405,7 +407,7 @@
           <a:p>
             <a:fld id="{4E087215-0C8F-4762-A664-737A353EC9A4}" type="datetimeFigureOut">
               <a:rPr lang="bg-BG" smtClean="0"/>
-              <a:t>28.11.2023 г.</a:t>
+              <a:t>25.2.2024 г.</a:t>
             </a:fld>
             <a:endParaRPr lang="bg-BG"/>
           </a:p>
@@ -601,7 +603,7 @@
           <a:p>
             <a:fld id="{72D84649-876A-46C9-8472-14CB09C070D8}" type="datetimeFigureOut">
               <a:rPr lang="en-US" smtClean="0"/>
-              <a:t>11/28/2023</a:t>
+              <a:t>2/25/2024</a:t>
             </a:fld>
             <a:endParaRPr lang="en-US"/>
           </a:p>
@@ -1145,7 +1147,7 @@
                 <a:tabLst/>
                 <a:defRPr/>
               </a:pPr>
-              <a:t>30</a:t>
+              <a:t>31</a:t>
             </a:fld>
             <a:endParaRPr kumimoji="0" lang="en-US" sz="1200" b="0" i="0" u="none" strike="noStrike" kern="1200" cap="none" spc="0" normalizeH="0" baseline="0" noProof="0" dirty="0">
               <a:ln>
@@ -1404,7 +1406,7 @@
             <a:fld id="{3EBA5BD7-F043-4D1B-AA17-CD412FC534DE}" type="slidenum">
               <a:rPr lang="en-US" smtClean="0"/>
               <a:pPr/>
-              <a:t>31</a:t>
+              <a:t>32</a:t>
             </a:fld>
             <a:endParaRPr lang="en-US" dirty="0"/>
           </a:p>
@@ -1650,7 +1652,7 @@
             <a:fld id="{3EBA5BD7-F043-4D1B-AA17-CD412FC534DE}" type="slidenum">
               <a:rPr lang="en-US" smtClean="0"/>
               <a:pPr/>
-              <a:t>32</a:t>
+              <a:t>33</a:t>
             </a:fld>
             <a:endParaRPr lang="en-US" dirty="0"/>
           </a:p>
@@ -2757,7 +2759,7 @@
             <a:fld id="{2BF067CD-8E6B-4360-9AA8-C5DF2A48A6D1}" type="slidenum">
               <a:rPr lang="en-US" smtClean="0"/>
               <a:pPr/>
-              <a:t>29</a:t>
+              <a:t>30</a:t>
             </a:fld>
             <a:endParaRPr lang="en-US" dirty="0"/>
           </a:p>
@@ -14271,7 +14273,15 @@
             </a:r>
             <a:r>
               <a:rPr lang="bg-BG" dirty="0"/>
-              <a:t>записи чрез</a:t>
+              <a:t>записи</a:t>
+            </a:r>
+            <a:r>
+              <a:rPr lang="en-US" dirty="0"/>
+              <a:t> </a:t>
+            </a:r>
+            <a:r>
+              <a:rPr lang="bg-BG" dirty="0"/>
+              <a:t>(кортежи) чрез</a:t>
             </a:r>
             <a:r>
               <a:rPr lang="en-US" dirty="0"/>
@@ -15002,8 +15012,8 @@
         </p:blipFill>
         <p:spPr>
           <a:xfrm>
-            <a:off x="784271" y="2261901"/>
-            <a:ext cx="3645590" cy="3026350"/>
+            <a:off x="1101000" y="2441901"/>
+            <a:ext cx="3194761" cy="2652099"/>
           </a:xfrm>
           <a:prstGeom prst="rect">
             <a:avLst/>
@@ -15025,8 +15035,8 @@
         </p:nvSpPr>
         <p:spPr>
           <a:xfrm>
-            <a:off x="4548702" y="3567114"/>
-            <a:ext cx="668643" cy="526584"/>
+            <a:off x="4865431" y="3747114"/>
+            <a:ext cx="571361" cy="461464"/>
           </a:xfrm>
           <a:prstGeom prst="rightArrow">
             <a:avLst/>
@@ -15080,8 +15090,8 @@
         </p:blipFill>
         <p:spPr>
           <a:xfrm>
-            <a:off x="5336187" y="2261901"/>
-            <a:ext cx="6155366" cy="3026350"/>
+            <a:off x="5652916" y="2441901"/>
+            <a:ext cx="5394168" cy="2652099"/>
           </a:xfrm>
           <a:prstGeom prst="rect">
             <a:avLst/>
@@ -15134,6 +15144,174 @@
               <a:t>23</a:t>
             </a:fld>
             <a:endParaRPr lang="en-US" noProof="0" dirty="0"/>
+          </a:p>
+        </p:txBody>
+      </p:sp>
+      <p:sp>
+        <p:nvSpPr>
+          <p:cNvPr id="3" name="AutoShape 5">
+            <a:extLst>
+              <a:ext uri="{FF2B5EF4-FFF2-40B4-BE49-F238E27FC236}">
+                <a16:creationId xmlns:a16="http://schemas.microsoft.com/office/drawing/2014/main" id="{E8D96921-8577-4EA1-2F1C-9111D3A4C7F6}"/>
+              </a:ext>
+            </a:extLst>
+          </p:cNvPr>
+          <p:cNvSpPr>
+            <a:spLocks noChangeArrowheads="1"/>
+          </p:cNvSpPr>
+          <p:nvPr/>
+        </p:nvSpPr>
+        <p:spPr bwMode="auto">
+          <a:xfrm>
+            <a:off x="4746000" y="1682949"/>
+            <a:ext cx="3032298" cy="546231"/>
+          </a:xfrm>
+          <a:prstGeom prst="wedgeRoundRectCallout">
+            <a:avLst>
+              <a:gd name="adj1" fmla="val 36301"/>
+              <a:gd name="adj2" fmla="val 91122"/>
+              <a:gd name="adj3" fmla="val 16667"/>
+            </a:avLst>
+          </a:prstGeom>
+          <a:solidFill>
+            <a:schemeClr val="tx1">
+              <a:alpha val="80000"/>
+            </a:schemeClr>
+          </a:solidFill>
+          <a:ln w="19050">
+            <a:solidFill>
+              <a:schemeClr val="tx1">
+                <a:alpha val="80000"/>
+              </a:schemeClr>
+            </a:solidFill>
+          </a:ln>
+          <a:effectLst/>
+        </p:spPr>
+        <p:style>
+          <a:lnRef idx="2">
+            <a:schemeClr val="accent1">
+              <a:shade val="50000"/>
+            </a:schemeClr>
+          </a:lnRef>
+          <a:fillRef idx="1001">
+            <a:schemeClr val="dk2"/>
+          </a:fillRef>
+          <a:effectRef idx="0">
+            <a:schemeClr val="accent1"/>
+          </a:effectRef>
+          <a:fontRef idx="minor">
+            <a:schemeClr val="lt1"/>
+          </a:fontRef>
+        </p:style>
+        <p:txBody>
+          <a:bodyPr rot="0" spcFirstLastPara="0" vertOverflow="overflow" horzOverflow="overflow" vert="horz" wrap="square" lIns="91440" tIns="45720" rIns="91440" bIns="45720" numCol="1" spcCol="0" rtlCol="0" fromWordArt="0" anchor="ctr" anchorCtr="0" forceAA="0" compatLnSpc="1">
+            <a:prstTxWarp prst="textNoShape">
+              <a:avLst/>
+            </a:prstTxWarp>
+            <a:noAutofit/>
+          </a:bodyPr>
+          <a:lstStyle/>
+          <a:p>
+            <a:pPr algn="ctr"/>
+            <a:r>
+              <a:rPr lang="bg-BG" sz="2400" b="1" dirty="0">
+                <a:solidFill>
+                  <a:srgbClr val="FFFFFF"/>
+                </a:solidFill>
+                <a:effectLst>
+                  <a:outerShdw blurRad="38100" dist="38100" dir="2700000" algn="tl">
+                    <a:srgbClr val="000000">
+                      <a:alpha val="43137"/>
+                    </a:srgbClr>
+                  </a:outerShdw>
+                </a:effectLst>
+              </a:rPr>
+              <a:t>Домейн на атрибут</a:t>
+            </a:r>
+          </a:p>
+        </p:txBody>
+      </p:sp>
+      <p:sp>
+        <p:nvSpPr>
+          <p:cNvPr id="9" name="AutoShape 5">
+            <a:extLst>
+              <a:ext uri="{FF2B5EF4-FFF2-40B4-BE49-F238E27FC236}">
+                <a16:creationId xmlns:a16="http://schemas.microsoft.com/office/drawing/2014/main" id="{D9A96FD2-6885-9B4E-4DC3-D42B576665A3}"/>
+              </a:ext>
+            </a:extLst>
+          </p:cNvPr>
+          <p:cNvSpPr>
+            <a:spLocks noChangeArrowheads="1"/>
+          </p:cNvSpPr>
+          <p:nvPr/>
+        </p:nvSpPr>
+        <p:spPr bwMode="auto">
+          <a:xfrm>
+            <a:off x="3531000" y="5192949"/>
+            <a:ext cx="4320000" cy="441051"/>
+          </a:xfrm>
+          <a:prstGeom prst="wedgeRoundRectCallout">
+            <a:avLst>
+              <a:gd name="adj1" fmla="val 7270"/>
+              <a:gd name="adj2" fmla="val -80557"/>
+              <a:gd name="adj3" fmla="val 16667"/>
+            </a:avLst>
+          </a:prstGeom>
+          <a:solidFill>
+            <a:schemeClr val="tx1">
+              <a:alpha val="80000"/>
+            </a:schemeClr>
+          </a:solidFill>
+          <a:ln w="19050">
+            <a:solidFill>
+              <a:schemeClr val="tx1">
+                <a:alpha val="80000"/>
+              </a:schemeClr>
+            </a:solidFill>
+          </a:ln>
+          <a:effectLst/>
+        </p:spPr>
+        <p:style>
+          <a:lnRef idx="2">
+            <a:schemeClr val="accent1">
+              <a:shade val="50000"/>
+            </a:schemeClr>
+          </a:lnRef>
+          <a:fillRef idx="1001">
+            <a:schemeClr val="dk2"/>
+          </a:fillRef>
+          <a:effectRef idx="0">
+            <a:schemeClr val="accent1"/>
+          </a:effectRef>
+          <a:fontRef idx="minor">
+            <a:schemeClr val="lt1"/>
+          </a:fontRef>
+        </p:style>
+        <p:txBody>
+          <a:bodyPr rot="0" spcFirstLastPara="0" vertOverflow="overflow" horzOverflow="overflow" vert="horz" wrap="square" lIns="91440" tIns="45720" rIns="91440" bIns="45720" numCol="1" spcCol="0" rtlCol="0" fromWordArt="0" anchor="ctr" anchorCtr="0" forceAA="0" compatLnSpc="1">
+            <a:prstTxWarp prst="textNoShape">
+              <a:avLst/>
+            </a:prstTxWarp>
+            <a:noAutofit/>
+          </a:bodyPr>
+          <a:lstStyle/>
+          <a:p>
+            <a:pPr algn="ctr"/>
+            <a:r>
+              <a:rPr lang="bg-BG" sz="2400" b="1" dirty="0">
+                <a:solidFill>
+                  <a:srgbClr val="FFFFFF"/>
+                </a:solidFill>
+                <a:effectLst>
+                  <a:outerShdw blurRad="38100" dist="38100" dir="2700000" algn="tl">
+                    <a:srgbClr val="000000">
+                      <a:alpha val="43137"/>
+                    </a:srgbClr>
+                  </a:outerShdw>
+                </a:effectLst>
+              </a:rPr>
+              <a:t>Мощност (броя на кортежите)</a:t>
+            </a:r>
           </a:p>
         </p:txBody>
       </p:sp>
@@ -15293,7 +15471,7 @@
                             </p:stCondLst>
                             <p:childTnLst>
                               <p:par>
-                                <p:cTn id="15" presetID="1" presetClass="entr" presetSubtype="0" fill="hold" nodeType="clickEffect">
+                                <p:cTn id="15" presetID="1" presetClass="entr" presetSubtype="0" fill="hold" grpId="0" nodeType="clickEffect">
                                   <p:stCondLst>
                                     <p:cond delay="0"/>
                                   </p:stCondLst>
@@ -15301,6 +15479,96 @@
                                     <p:set>
                                       <p:cBhvr>
                                         <p:cTn id="16" dur="1" fill="hold">
+                                          <p:stCondLst>
+                                            <p:cond delay="0"/>
+                                          </p:stCondLst>
+                                        </p:cTn>
+                                        <p:tgtEl>
+                                          <p:spTgt spid="3"/>
+                                        </p:tgtEl>
+                                        <p:attrNameLst>
+                                          <p:attrName>style.visibility</p:attrName>
+                                        </p:attrNameLst>
+                                      </p:cBhvr>
+                                      <p:to>
+                                        <p:strVal val="visible"/>
+                                      </p:to>
+                                    </p:set>
+                                  </p:childTnLst>
+                                </p:cTn>
+                              </p:par>
+                            </p:childTnLst>
+                          </p:cTn>
+                        </p:par>
+                      </p:childTnLst>
+                    </p:cTn>
+                  </p:par>
+                  <p:par>
+                    <p:cTn id="17" fill="hold">
+                      <p:stCondLst>
+                        <p:cond delay="indefinite"/>
+                      </p:stCondLst>
+                      <p:childTnLst>
+                        <p:par>
+                          <p:cTn id="18" fill="hold">
+                            <p:stCondLst>
+                              <p:cond delay="0"/>
+                            </p:stCondLst>
+                            <p:childTnLst>
+                              <p:par>
+                                <p:cTn id="19" presetID="1" presetClass="entr" presetSubtype="0" fill="hold" grpId="0" nodeType="clickEffect">
+                                  <p:stCondLst>
+                                    <p:cond delay="0"/>
+                                  </p:stCondLst>
+                                  <p:childTnLst>
+                                    <p:set>
+                                      <p:cBhvr>
+                                        <p:cTn id="20" dur="1" fill="hold">
+                                          <p:stCondLst>
+                                            <p:cond delay="0"/>
+                                          </p:stCondLst>
+                                        </p:cTn>
+                                        <p:tgtEl>
+                                          <p:spTgt spid="9"/>
+                                        </p:tgtEl>
+                                        <p:attrNameLst>
+                                          <p:attrName>style.visibility</p:attrName>
+                                        </p:attrNameLst>
+                                      </p:cBhvr>
+                                      <p:to>
+                                        <p:strVal val="visible"/>
+                                      </p:to>
+                                    </p:set>
+                                  </p:childTnLst>
+                                </p:cTn>
+                              </p:par>
+                            </p:childTnLst>
+                          </p:cTn>
+                        </p:par>
+                      </p:childTnLst>
+                    </p:cTn>
+                  </p:par>
+                  <p:par>
+                    <p:cTn id="21" fill="hold">
+                      <p:stCondLst>
+                        <p:cond delay="indefinite"/>
+                      </p:stCondLst>
+                      <p:childTnLst>
+                        <p:par>
+                          <p:cTn id="22" fill="hold">
+                            <p:stCondLst>
+                              <p:cond delay="0"/>
+                            </p:stCondLst>
+                            <p:childTnLst>
+                              <p:par>
+                                <p:cTn id="23" presetID="1" presetClass="entr" presetSubtype="0" fill="hold" nodeType="clickEffect">
+                                  <p:stCondLst>
+                                    <p:cond delay="0"/>
+                                  </p:stCondLst>
+                                  <p:childTnLst>
+                                    <p:set>
+                                      <p:cBhvr>
+                                        <p:cTn id="24" dur="1" fill="hold">
                                           <p:stCondLst>
                                             <p:cond delay="0"/>
                                           </p:stCondLst>
@@ -15352,6 +15620,8 @@
     </p:tnLst>
     <p:bldLst>
       <p:bldP spid="6" grpId="0" animBg="1"/>
+      <p:bldP spid="3" grpId="0" animBg="1"/>
+      <p:bldP spid="9" grpId="0" animBg="1"/>
     </p:bldLst>
   </p:timing>
 </p:sld>
@@ -15999,6 +16269,914 @@
           <a:chExt cx="0" cy="0"/>
         </a:xfrm>
       </p:grpSpPr>
+      <p:sp>
+        <p:nvSpPr>
+          <p:cNvPr id="2" name="Slide Number Placeholder 1">
+            <a:extLst>
+              <a:ext uri="{FF2B5EF4-FFF2-40B4-BE49-F238E27FC236}">
+                <a16:creationId xmlns:a16="http://schemas.microsoft.com/office/drawing/2014/main" id="{8366C95C-6E33-3A5F-9974-C2292926D43C}"/>
+              </a:ext>
+            </a:extLst>
+          </p:cNvPr>
+          <p:cNvSpPr>
+            <a:spLocks noGrp="1"/>
+          </p:cNvSpPr>
+          <p:nvPr>
+            <p:ph type="sldNum" sz="quarter" idx="5"/>
+          </p:nvPr>
+        </p:nvSpPr>
+        <p:spPr/>
+        <p:txBody>
+          <a:bodyPr/>
+          <a:lstStyle/>
+          <a:p>
+            <a:fld id="{2BF067CD-8E6B-4360-9AA8-C5DF2A48A6D1}" type="slidenum">
+              <a:rPr lang="en-US" noProof="0" smtClean="0"/>
+              <a:pPr/>
+              <a:t>25</a:t>
+            </a:fld>
+            <a:endParaRPr lang="en-US" noProof="0" dirty="0"/>
+          </a:p>
+        </p:txBody>
+      </p:sp>
+      <p:sp>
+        <p:nvSpPr>
+          <p:cNvPr id="3" name="Text Placeholder 2">
+            <a:extLst>
+              <a:ext uri="{FF2B5EF4-FFF2-40B4-BE49-F238E27FC236}">
+                <a16:creationId xmlns:a16="http://schemas.microsoft.com/office/drawing/2014/main" id="{C0BFA449-0363-9E19-6C87-E4BEE71DB229}"/>
+              </a:ext>
+            </a:extLst>
+          </p:cNvPr>
+          <p:cNvSpPr>
+            <a:spLocks noGrp="1"/>
+          </p:cNvSpPr>
+          <p:nvPr>
+            <p:ph type="body" sz="quarter" idx="10"/>
+          </p:nvPr>
+        </p:nvSpPr>
+        <p:spPr/>
+        <p:txBody>
+          <a:bodyPr/>
+          <a:lstStyle/>
+          <a:p>
+            <a:pPr>
+              <a:buClr>
+                <a:schemeClr val="tx1"/>
+              </a:buClr>
+            </a:pPr>
+            <a:r>
+              <a:rPr lang="ru-RU" b="1" dirty="0">
+                <a:solidFill>
+                  <a:schemeClr val="bg1"/>
+                </a:solidFill>
+              </a:rPr>
+              <a:t>Броя</a:t>
+            </a:r>
+            <a:r>
+              <a:rPr lang="ru-RU" dirty="0"/>
+              <a:t> на атрибутите (или </a:t>
+            </a:r>
+            <a:r>
+              <a:rPr lang="ru-RU" b="1" dirty="0">
+                <a:solidFill>
+                  <a:schemeClr val="bg1"/>
+                </a:solidFill>
+              </a:rPr>
+              <a:t>колоните</a:t>
+            </a:r>
+            <a:r>
+              <a:rPr lang="ru-RU" dirty="0"/>
+              <a:t>) в таблицата</a:t>
+            </a:r>
+            <a:endParaRPr lang="en-US" dirty="0"/>
+          </a:p>
+        </p:txBody>
+      </p:sp>
+      <p:sp>
+        <p:nvSpPr>
+          <p:cNvPr id="4" name="Title 3">
+            <a:extLst>
+              <a:ext uri="{FF2B5EF4-FFF2-40B4-BE49-F238E27FC236}">
+                <a16:creationId xmlns:a16="http://schemas.microsoft.com/office/drawing/2014/main" id="{50D3A186-E82E-E742-C8BB-43AD4CABFEF4}"/>
+              </a:ext>
+            </a:extLst>
+          </p:cNvPr>
+          <p:cNvSpPr>
+            <a:spLocks noGrp="1"/>
+          </p:cNvSpPr>
+          <p:nvPr>
+            <p:ph type="title"/>
+          </p:nvPr>
+        </p:nvSpPr>
+        <p:spPr/>
+        <p:txBody>
+          <a:bodyPr/>
+          <a:lstStyle/>
+          <a:p>
+            <a:r>
+              <a:rPr lang="bg-BG" dirty="0"/>
+              <a:t>Степен на отношение</a:t>
+            </a:r>
+            <a:endParaRPr lang="en-US" dirty="0"/>
+          </a:p>
+        </p:txBody>
+      </p:sp>
+      <p:pic>
+        <p:nvPicPr>
+          <p:cNvPr id="5" name="Picture 4">
+            <a:extLst>
+              <a:ext uri="{FF2B5EF4-FFF2-40B4-BE49-F238E27FC236}">
+                <a16:creationId xmlns:a16="http://schemas.microsoft.com/office/drawing/2014/main" id="{427722D6-68B6-3C95-10C0-B1059B9FDC52}"/>
+              </a:ext>
+            </a:extLst>
+          </p:cNvPr>
+          <p:cNvPicPr>
+            <a:picLocks noChangeAspect="1"/>
+          </p:cNvPicPr>
+          <p:nvPr/>
+        </p:nvPicPr>
+        <p:blipFill rotWithShape="1">
+          <a:blip r:embed="rId2" cstate="print"/>
+          <a:srcRect r="36628"/>
+          <a:stretch/>
+        </p:blipFill>
+        <p:spPr>
+          <a:xfrm>
+            <a:off x="2764982" y="2664000"/>
+            <a:ext cx="6662035" cy="3275459"/>
+          </a:xfrm>
+          <a:prstGeom prst="rect">
+            <a:avLst/>
+          </a:prstGeom>
+          <a:ln>
+            <a:solidFill>
+              <a:schemeClr val="bg2">
+                <a:lumMod val="75000"/>
+              </a:schemeClr>
+            </a:solidFill>
+          </a:ln>
+        </p:spPr>
+      </p:pic>
+      <p:sp>
+        <p:nvSpPr>
+          <p:cNvPr id="6" name="AutoShape 5">
+            <a:extLst>
+              <a:ext uri="{FF2B5EF4-FFF2-40B4-BE49-F238E27FC236}">
+                <a16:creationId xmlns:a16="http://schemas.microsoft.com/office/drawing/2014/main" id="{6641D2A8-C0C8-D355-2D59-327FA54B9D85}"/>
+              </a:ext>
+            </a:extLst>
+          </p:cNvPr>
+          <p:cNvSpPr>
+            <a:spLocks noChangeArrowheads="1"/>
+          </p:cNvSpPr>
+          <p:nvPr/>
+        </p:nvSpPr>
+        <p:spPr bwMode="auto">
+          <a:xfrm>
+            <a:off x="6754157" y="2027682"/>
+            <a:ext cx="5013321" cy="441051"/>
+          </a:xfrm>
+          <a:prstGeom prst="wedgeRoundRectCallout">
+            <a:avLst>
+              <a:gd name="adj1" fmla="val 3075"/>
+              <a:gd name="adj2" fmla="val 126766"/>
+              <a:gd name="adj3" fmla="val 16667"/>
+            </a:avLst>
+          </a:prstGeom>
+          <a:solidFill>
+            <a:schemeClr val="tx1">
+              <a:alpha val="80000"/>
+            </a:schemeClr>
+          </a:solidFill>
+          <a:ln w="19050">
+            <a:solidFill>
+              <a:schemeClr val="tx1">
+                <a:alpha val="80000"/>
+              </a:schemeClr>
+            </a:solidFill>
+          </a:ln>
+          <a:effectLst/>
+        </p:spPr>
+        <p:style>
+          <a:lnRef idx="2">
+            <a:schemeClr val="accent1">
+              <a:shade val="50000"/>
+            </a:schemeClr>
+          </a:lnRef>
+          <a:fillRef idx="1001">
+            <a:schemeClr val="dk2"/>
+          </a:fillRef>
+          <a:effectRef idx="0">
+            <a:schemeClr val="accent1"/>
+          </a:effectRef>
+          <a:fontRef idx="minor">
+            <a:schemeClr val="lt1"/>
+          </a:fontRef>
+        </p:style>
+        <p:txBody>
+          <a:bodyPr rot="0" spcFirstLastPara="0" vertOverflow="overflow" horzOverflow="overflow" vert="horz" wrap="square" lIns="91440" tIns="45720" rIns="91440" bIns="45720" numCol="1" spcCol="0" rtlCol="0" fromWordArt="0" anchor="ctr" anchorCtr="0" forceAA="0" compatLnSpc="1">
+            <a:prstTxWarp prst="textNoShape">
+              <a:avLst/>
+            </a:prstTxWarp>
+            <a:noAutofit/>
+          </a:bodyPr>
+          <a:lstStyle/>
+          <a:p>
+            <a:pPr algn="ctr"/>
+            <a:r>
+              <a:rPr lang="bg-BG" sz="2400" b="1" dirty="0">
+                <a:solidFill>
+                  <a:srgbClr val="FFFFFF"/>
+                </a:solidFill>
+                <a:effectLst>
+                  <a:outerShdw blurRad="38100" dist="38100" dir="2700000" algn="tl">
+                    <a:srgbClr val="000000">
+                      <a:alpha val="43137"/>
+                    </a:srgbClr>
+                  </a:outerShdw>
+                </a:effectLst>
+              </a:rPr>
+              <a:t>Степента на отношение в случая е </a:t>
+            </a:r>
+            <a:r>
+              <a:rPr lang="bg-BG" sz="2400" b="1" dirty="0">
+                <a:solidFill>
+                  <a:schemeClr val="bg1">
+                    <a:lumMod val="60000"/>
+                    <a:lumOff val="40000"/>
+                  </a:schemeClr>
+                </a:solidFill>
+                <a:effectLst>
+                  <a:outerShdw blurRad="38100" dist="38100" dir="2700000" algn="tl">
+                    <a:srgbClr val="000000">
+                      <a:alpha val="43137"/>
+                    </a:srgbClr>
+                  </a:outerShdw>
+                </a:effectLst>
+              </a:rPr>
+              <a:t>5</a:t>
+            </a:r>
+          </a:p>
+        </p:txBody>
+      </p:sp>
+      <p:sp>
+        <p:nvSpPr>
+          <p:cNvPr id="7" name="Rectangle: Rounded Corners 17">
+            <a:extLst>
+              <a:ext uri="{FF2B5EF4-FFF2-40B4-BE49-F238E27FC236}">
+                <a16:creationId xmlns:a16="http://schemas.microsoft.com/office/drawing/2014/main" id="{4D015DF9-A8D5-8D53-0CF5-057CDEB6D980}"/>
+              </a:ext>
+            </a:extLst>
+          </p:cNvPr>
+          <p:cNvSpPr/>
+          <p:nvPr/>
+        </p:nvSpPr>
+        <p:spPr>
+          <a:xfrm>
+            <a:off x="3306000" y="2681454"/>
+            <a:ext cx="668472" cy="252546"/>
+          </a:xfrm>
+          <a:prstGeom prst="roundRect">
+            <a:avLst>
+              <a:gd name="adj" fmla="val 5385"/>
+            </a:avLst>
+          </a:prstGeom>
+          <a:noFill/>
+          <a:ln w="57150">
+            <a:solidFill>
+              <a:schemeClr val="tx1"/>
+            </a:solidFill>
+            <a:prstDash val="solid"/>
+          </a:ln>
+        </p:spPr>
+        <p:style>
+          <a:lnRef idx="2">
+            <a:schemeClr val="accent1">
+              <a:shade val="50000"/>
+            </a:schemeClr>
+          </a:lnRef>
+          <a:fillRef idx="1">
+            <a:schemeClr val="accent1"/>
+          </a:fillRef>
+          <a:effectRef idx="0">
+            <a:schemeClr val="accent1"/>
+          </a:effectRef>
+          <a:fontRef idx="minor">
+            <a:schemeClr val="lt1"/>
+          </a:fontRef>
+        </p:style>
+        <p:txBody>
+          <a:bodyPr rtlCol="0" anchor="t"/>
+          <a:lstStyle/>
+          <a:p>
+            <a:pPr algn="ctr"/>
+            <a:endParaRPr lang="en-US" sz="2799" b="1" dirty="0">
+              <a:solidFill>
+                <a:srgbClr val="FBEEDC"/>
+              </a:solidFill>
+              <a:effectLst>
+                <a:outerShdw blurRad="38100" dist="38100" dir="2700000" algn="tl">
+                  <a:srgbClr val="000000">
+                    <a:alpha val="43137"/>
+                  </a:srgbClr>
+                </a:outerShdw>
+              </a:effectLst>
+              <a:latin typeface="Consolas" panose="020B0609020204030204" pitchFamily="49" charset="0"/>
+            </a:endParaRPr>
+          </a:p>
+        </p:txBody>
+      </p:sp>
+      <p:sp>
+        <p:nvSpPr>
+          <p:cNvPr id="8" name="Rectangle: Rounded Corners 17">
+            <a:extLst>
+              <a:ext uri="{FF2B5EF4-FFF2-40B4-BE49-F238E27FC236}">
+                <a16:creationId xmlns:a16="http://schemas.microsoft.com/office/drawing/2014/main" id="{E77A8F07-50B9-2229-2EDC-87CB0958531D}"/>
+              </a:ext>
+            </a:extLst>
+          </p:cNvPr>
+          <p:cNvSpPr/>
+          <p:nvPr/>
+        </p:nvSpPr>
+        <p:spPr>
+          <a:xfrm>
+            <a:off x="4071000" y="2681454"/>
+            <a:ext cx="810000" cy="252546"/>
+          </a:xfrm>
+          <a:prstGeom prst="roundRect">
+            <a:avLst>
+              <a:gd name="adj" fmla="val 5385"/>
+            </a:avLst>
+          </a:prstGeom>
+          <a:noFill/>
+          <a:ln w="57150">
+            <a:solidFill>
+              <a:schemeClr val="tx1"/>
+            </a:solidFill>
+            <a:prstDash val="solid"/>
+          </a:ln>
+        </p:spPr>
+        <p:style>
+          <a:lnRef idx="2">
+            <a:schemeClr val="accent1">
+              <a:shade val="50000"/>
+            </a:schemeClr>
+          </a:lnRef>
+          <a:fillRef idx="1">
+            <a:schemeClr val="accent1"/>
+          </a:fillRef>
+          <a:effectRef idx="0">
+            <a:schemeClr val="accent1"/>
+          </a:effectRef>
+          <a:fontRef idx="minor">
+            <a:schemeClr val="lt1"/>
+          </a:fontRef>
+        </p:style>
+        <p:txBody>
+          <a:bodyPr rtlCol="0" anchor="t"/>
+          <a:lstStyle/>
+          <a:p>
+            <a:pPr algn="ctr"/>
+            <a:endParaRPr lang="en-US" sz="2799" b="1" dirty="0">
+              <a:solidFill>
+                <a:srgbClr val="FBEEDC"/>
+              </a:solidFill>
+              <a:effectLst>
+                <a:outerShdw blurRad="38100" dist="38100" dir="2700000" algn="tl">
+                  <a:srgbClr val="000000">
+                    <a:alpha val="43137"/>
+                  </a:srgbClr>
+                </a:outerShdw>
+              </a:effectLst>
+              <a:latin typeface="Consolas" panose="020B0609020204030204" pitchFamily="49" charset="0"/>
+            </a:endParaRPr>
+          </a:p>
+        </p:txBody>
+      </p:sp>
+      <p:sp>
+        <p:nvSpPr>
+          <p:cNvPr id="9" name="Rectangle: Rounded Corners 17">
+            <a:extLst>
+              <a:ext uri="{FF2B5EF4-FFF2-40B4-BE49-F238E27FC236}">
+                <a16:creationId xmlns:a16="http://schemas.microsoft.com/office/drawing/2014/main" id="{EAF50803-F2A8-099B-678E-6A27CBE3AC57}"/>
+              </a:ext>
+            </a:extLst>
+          </p:cNvPr>
+          <p:cNvSpPr/>
+          <p:nvPr/>
+        </p:nvSpPr>
+        <p:spPr>
+          <a:xfrm>
+            <a:off x="4977528" y="2664000"/>
+            <a:ext cx="1658472" cy="270000"/>
+          </a:xfrm>
+          <a:prstGeom prst="roundRect">
+            <a:avLst>
+              <a:gd name="adj" fmla="val 5385"/>
+            </a:avLst>
+          </a:prstGeom>
+          <a:noFill/>
+          <a:ln w="57150">
+            <a:solidFill>
+              <a:schemeClr val="tx1"/>
+            </a:solidFill>
+            <a:prstDash val="solid"/>
+          </a:ln>
+        </p:spPr>
+        <p:style>
+          <a:lnRef idx="2">
+            <a:schemeClr val="accent1">
+              <a:shade val="50000"/>
+            </a:schemeClr>
+          </a:lnRef>
+          <a:fillRef idx="1">
+            <a:schemeClr val="accent1"/>
+          </a:fillRef>
+          <a:effectRef idx="0">
+            <a:schemeClr val="accent1"/>
+          </a:effectRef>
+          <a:fontRef idx="minor">
+            <a:schemeClr val="lt1"/>
+          </a:fontRef>
+        </p:style>
+        <p:txBody>
+          <a:bodyPr rtlCol="0" anchor="t"/>
+          <a:lstStyle/>
+          <a:p>
+            <a:pPr algn="ctr"/>
+            <a:endParaRPr lang="en-US" sz="2799" b="1" dirty="0">
+              <a:solidFill>
+                <a:srgbClr val="FBEEDC"/>
+              </a:solidFill>
+              <a:effectLst>
+                <a:outerShdw blurRad="38100" dist="38100" dir="2700000" algn="tl">
+                  <a:srgbClr val="000000">
+                    <a:alpha val="43137"/>
+                  </a:srgbClr>
+                </a:outerShdw>
+              </a:effectLst>
+              <a:latin typeface="Consolas" panose="020B0609020204030204" pitchFamily="49" charset="0"/>
+            </a:endParaRPr>
+          </a:p>
+        </p:txBody>
+      </p:sp>
+      <p:sp>
+        <p:nvSpPr>
+          <p:cNvPr id="10" name="Rectangle: Rounded Corners 17">
+            <a:extLst>
+              <a:ext uri="{FF2B5EF4-FFF2-40B4-BE49-F238E27FC236}">
+                <a16:creationId xmlns:a16="http://schemas.microsoft.com/office/drawing/2014/main" id="{E6A9D699-200E-C471-8BFB-6057F8C8D8C4}"/>
+              </a:ext>
+            </a:extLst>
+          </p:cNvPr>
+          <p:cNvSpPr/>
+          <p:nvPr/>
+        </p:nvSpPr>
+        <p:spPr>
+          <a:xfrm>
+            <a:off x="6732528" y="2664000"/>
+            <a:ext cx="1658472" cy="270000"/>
+          </a:xfrm>
+          <a:prstGeom prst="roundRect">
+            <a:avLst>
+              <a:gd name="adj" fmla="val 5385"/>
+            </a:avLst>
+          </a:prstGeom>
+          <a:noFill/>
+          <a:ln w="57150">
+            <a:solidFill>
+              <a:schemeClr val="tx1"/>
+            </a:solidFill>
+            <a:prstDash val="solid"/>
+          </a:ln>
+        </p:spPr>
+        <p:style>
+          <a:lnRef idx="2">
+            <a:schemeClr val="accent1">
+              <a:shade val="50000"/>
+            </a:schemeClr>
+          </a:lnRef>
+          <a:fillRef idx="1">
+            <a:schemeClr val="accent1"/>
+          </a:fillRef>
+          <a:effectRef idx="0">
+            <a:schemeClr val="accent1"/>
+          </a:effectRef>
+          <a:fontRef idx="minor">
+            <a:schemeClr val="lt1"/>
+          </a:fontRef>
+        </p:style>
+        <p:txBody>
+          <a:bodyPr rtlCol="0" anchor="t"/>
+          <a:lstStyle/>
+          <a:p>
+            <a:pPr algn="ctr"/>
+            <a:endParaRPr lang="en-US" sz="2799" b="1" dirty="0">
+              <a:solidFill>
+                <a:srgbClr val="FBEEDC"/>
+              </a:solidFill>
+              <a:effectLst>
+                <a:outerShdw blurRad="38100" dist="38100" dir="2700000" algn="tl">
+                  <a:srgbClr val="000000">
+                    <a:alpha val="43137"/>
+                  </a:srgbClr>
+                </a:outerShdw>
+              </a:effectLst>
+              <a:latin typeface="Consolas" panose="020B0609020204030204" pitchFamily="49" charset="0"/>
+            </a:endParaRPr>
+          </a:p>
+        </p:txBody>
+      </p:sp>
+      <p:sp>
+        <p:nvSpPr>
+          <p:cNvPr id="11" name="Rectangle: Rounded Corners 17">
+            <a:extLst>
+              <a:ext uri="{FF2B5EF4-FFF2-40B4-BE49-F238E27FC236}">
+                <a16:creationId xmlns:a16="http://schemas.microsoft.com/office/drawing/2014/main" id="{229704F4-BB54-4FDD-4D67-3EB2FD3A5C15}"/>
+              </a:ext>
+            </a:extLst>
+          </p:cNvPr>
+          <p:cNvSpPr/>
+          <p:nvPr/>
+        </p:nvSpPr>
+        <p:spPr>
+          <a:xfrm>
+            <a:off x="8499960" y="2681454"/>
+            <a:ext cx="836040" cy="252546"/>
+          </a:xfrm>
+          <a:prstGeom prst="roundRect">
+            <a:avLst>
+              <a:gd name="adj" fmla="val 5385"/>
+            </a:avLst>
+          </a:prstGeom>
+          <a:noFill/>
+          <a:ln w="57150">
+            <a:solidFill>
+              <a:schemeClr val="tx1"/>
+            </a:solidFill>
+            <a:prstDash val="solid"/>
+          </a:ln>
+        </p:spPr>
+        <p:style>
+          <a:lnRef idx="2">
+            <a:schemeClr val="accent1">
+              <a:shade val="50000"/>
+            </a:schemeClr>
+          </a:lnRef>
+          <a:fillRef idx="1">
+            <a:schemeClr val="accent1"/>
+          </a:fillRef>
+          <a:effectRef idx="0">
+            <a:schemeClr val="accent1"/>
+          </a:effectRef>
+          <a:fontRef idx="minor">
+            <a:schemeClr val="lt1"/>
+          </a:fontRef>
+        </p:style>
+        <p:txBody>
+          <a:bodyPr rtlCol="0" anchor="t"/>
+          <a:lstStyle/>
+          <a:p>
+            <a:pPr algn="ctr"/>
+            <a:endParaRPr lang="en-US" sz="2799" b="1" dirty="0">
+              <a:solidFill>
+                <a:srgbClr val="FBEEDC"/>
+              </a:solidFill>
+              <a:effectLst>
+                <a:outerShdw blurRad="38100" dist="38100" dir="2700000" algn="tl">
+                  <a:srgbClr val="000000">
+                    <a:alpha val="43137"/>
+                  </a:srgbClr>
+                </a:outerShdw>
+              </a:effectLst>
+              <a:latin typeface="Consolas" panose="020B0609020204030204" pitchFamily="49" charset="0"/>
+            </a:endParaRPr>
+          </a:p>
+        </p:txBody>
+      </p:sp>
+    </p:spTree>
+    <p:extLst>
+      <p:ext uri="{BB962C8B-B14F-4D97-AF65-F5344CB8AC3E}">
+        <p14:creationId xmlns:p14="http://schemas.microsoft.com/office/powerpoint/2010/main" val="1322271051"/>
+      </p:ext>
+    </p:extLst>
+  </p:cSld>
+  <p:clrMapOvr>
+    <a:masterClrMapping/>
+  </p:clrMapOvr>
+  <mc:AlternateContent xmlns:mc="http://schemas.openxmlformats.org/markup-compatibility/2006" xmlns:p14="http://schemas.microsoft.com/office/powerpoint/2010/main">
+    <mc:Choice Requires="p14">
+      <p:transition spd="slow" p14:dur="2000" advClick="0" advTm="5000"/>
+    </mc:Choice>
+    <mc:Fallback xmlns="">
+      <p:transition spd="slow" advClick="0" advTm="5000"/>
+    </mc:Fallback>
+  </mc:AlternateContent>
+  <p:timing>
+    <p:tnLst>
+      <p:par>
+        <p:cTn id="1" dur="indefinite" restart="never" nodeType="tmRoot">
+          <p:childTnLst>
+            <p:seq concurrent="1" nextAc="seek">
+              <p:cTn id="2" dur="indefinite" nodeType="mainSeq">
+                <p:childTnLst>
+                  <p:par>
+                    <p:cTn id="3" fill="hold">
+                      <p:stCondLst>
+                        <p:cond delay="indefinite"/>
+                        <p:cond evt="onBegin" delay="0">
+                          <p:tn val="2"/>
+                        </p:cond>
+                      </p:stCondLst>
+                      <p:childTnLst>
+                        <p:par>
+                          <p:cTn id="4" fill="hold">
+                            <p:stCondLst>
+                              <p:cond delay="0"/>
+                            </p:stCondLst>
+                            <p:childTnLst>
+                              <p:par>
+                                <p:cTn id="5" presetID="1" presetClass="entr" presetSubtype="0" fill="hold" nodeType="withEffect">
+                                  <p:stCondLst>
+                                    <p:cond delay="0"/>
+                                  </p:stCondLst>
+                                  <p:childTnLst>
+                                    <p:set>
+                                      <p:cBhvr>
+                                        <p:cTn id="6" dur="1" fill="hold">
+                                          <p:stCondLst>
+                                            <p:cond delay="0"/>
+                                          </p:stCondLst>
+                                        </p:cTn>
+                                        <p:tgtEl>
+                                          <p:spTgt spid="5"/>
+                                        </p:tgtEl>
+                                        <p:attrNameLst>
+                                          <p:attrName>style.visibility</p:attrName>
+                                        </p:attrNameLst>
+                                      </p:cBhvr>
+                                      <p:to>
+                                        <p:strVal val="visible"/>
+                                      </p:to>
+                                    </p:set>
+                                  </p:childTnLst>
+                                </p:cTn>
+                              </p:par>
+                            </p:childTnLst>
+                          </p:cTn>
+                        </p:par>
+                      </p:childTnLst>
+                    </p:cTn>
+                  </p:par>
+                  <p:par>
+                    <p:cTn id="7" fill="hold">
+                      <p:stCondLst>
+                        <p:cond delay="indefinite"/>
+                      </p:stCondLst>
+                      <p:childTnLst>
+                        <p:par>
+                          <p:cTn id="8" fill="hold">
+                            <p:stCondLst>
+                              <p:cond delay="0"/>
+                            </p:stCondLst>
+                            <p:childTnLst>
+                              <p:par>
+                                <p:cTn id="9" presetID="1" presetClass="entr" presetSubtype="0" fill="hold" grpId="0" nodeType="clickEffect">
+                                  <p:stCondLst>
+                                    <p:cond delay="0"/>
+                                  </p:stCondLst>
+                                  <p:childTnLst>
+                                    <p:set>
+                                      <p:cBhvr>
+                                        <p:cTn id="10" dur="1" fill="hold">
+                                          <p:stCondLst>
+                                            <p:cond delay="0"/>
+                                          </p:stCondLst>
+                                        </p:cTn>
+                                        <p:tgtEl>
+                                          <p:spTgt spid="7"/>
+                                        </p:tgtEl>
+                                        <p:attrNameLst>
+                                          <p:attrName>style.visibility</p:attrName>
+                                        </p:attrNameLst>
+                                      </p:cBhvr>
+                                      <p:to>
+                                        <p:strVal val="visible"/>
+                                      </p:to>
+                                    </p:set>
+                                  </p:childTnLst>
+                                </p:cTn>
+                              </p:par>
+                              <p:par>
+                                <p:cTn id="11" presetID="1" presetClass="entr" presetSubtype="0" fill="hold" grpId="0" nodeType="withEffect">
+                                  <p:stCondLst>
+                                    <p:cond delay="0"/>
+                                  </p:stCondLst>
+                                  <p:childTnLst>
+                                    <p:set>
+                                      <p:cBhvr>
+                                        <p:cTn id="12" dur="1" fill="hold">
+                                          <p:stCondLst>
+                                            <p:cond delay="0"/>
+                                          </p:stCondLst>
+                                        </p:cTn>
+                                        <p:tgtEl>
+                                          <p:spTgt spid="8"/>
+                                        </p:tgtEl>
+                                        <p:attrNameLst>
+                                          <p:attrName>style.visibility</p:attrName>
+                                        </p:attrNameLst>
+                                      </p:cBhvr>
+                                      <p:to>
+                                        <p:strVal val="visible"/>
+                                      </p:to>
+                                    </p:set>
+                                  </p:childTnLst>
+                                </p:cTn>
+                              </p:par>
+                              <p:par>
+                                <p:cTn id="13" presetID="1" presetClass="entr" presetSubtype="0" fill="hold" grpId="0" nodeType="withEffect">
+                                  <p:stCondLst>
+                                    <p:cond delay="0"/>
+                                  </p:stCondLst>
+                                  <p:childTnLst>
+                                    <p:set>
+                                      <p:cBhvr>
+                                        <p:cTn id="14" dur="1" fill="hold">
+                                          <p:stCondLst>
+                                            <p:cond delay="0"/>
+                                          </p:stCondLst>
+                                        </p:cTn>
+                                        <p:tgtEl>
+                                          <p:spTgt spid="9"/>
+                                        </p:tgtEl>
+                                        <p:attrNameLst>
+                                          <p:attrName>style.visibility</p:attrName>
+                                        </p:attrNameLst>
+                                      </p:cBhvr>
+                                      <p:to>
+                                        <p:strVal val="visible"/>
+                                      </p:to>
+                                    </p:set>
+                                  </p:childTnLst>
+                                </p:cTn>
+                              </p:par>
+                              <p:par>
+                                <p:cTn id="15" presetID="1" presetClass="entr" presetSubtype="0" fill="hold" grpId="0" nodeType="withEffect">
+                                  <p:stCondLst>
+                                    <p:cond delay="0"/>
+                                  </p:stCondLst>
+                                  <p:childTnLst>
+                                    <p:set>
+                                      <p:cBhvr>
+                                        <p:cTn id="16" dur="1" fill="hold">
+                                          <p:stCondLst>
+                                            <p:cond delay="0"/>
+                                          </p:stCondLst>
+                                        </p:cTn>
+                                        <p:tgtEl>
+                                          <p:spTgt spid="10"/>
+                                        </p:tgtEl>
+                                        <p:attrNameLst>
+                                          <p:attrName>style.visibility</p:attrName>
+                                        </p:attrNameLst>
+                                      </p:cBhvr>
+                                      <p:to>
+                                        <p:strVal val="visible"/>
+                                      </p:to>
+                                    </p:set>
+                                  </p:childTnLst>
+                                </p:cTn>
+                              </p:par>
+                              <p:par>
+                                <p:cTn id="17" presetID="1" presetClass="entr" presetSubtype="0" fill="hold" grpId="0" nodeType="withEffect">
+                                  <p:stCondLst>
+                                    <p:cond delay="0"/>
+                                  </p:stCondLst>
+                                  <p:childTnLst>
+                                    <p:set>
+                                      <p:cBhvr>
+                                        <p:cTn id="18" dur="1" fill="hold">
+                                          <p:stCondLst>
+                                            <p:cond delay="0"/>
+                                          </p:stCondLst>
+                                        </p:cTn>
+                                        <p:tgtEl>
+                                          <p:spTgt spid="11"/>
+                                        </p:tgtEl>
+                                        <p:attrNameLst>
+                                          <p:attrName>style.visibility</p:attrName>
+                                        </p:attrNameLst>
+                                      </p:cBhvr>
+                                      <p:to>
+                                        <p:strVal val="visible"/>
+                                      </p:to>
+                                    </p:set>
+                                  </p:childTnLst>
+                                </p:cTn>
+                              </p:par>
+                            </p:childTnLst>
+                          </p:cTn>
+                        </p:par>
+                      </p:childTnLst>
+                    </p:cTn>
+                  </p:par>
+                  <p:par>
+                    <p:cTn id="19" fill="hold">
+                      <p:stCondLst>
+                        <p:cond delay="indefinite"/>
+                      </p:stCondLst>
+                      <p:childTnLst>
+                        <p:par>
+                          <p:cTn id="20" fill="hold">
+                            <p:stCondLst>
+                              <p:cond delay="0"/>
+                            </p:stCondLst>
+                            <p:childTnLst>
+                              <p:par>
+                                <p:cTn id="21" presetID="1" presetClass="entr" presetSubtype="0" fill="hold" grpId="0" nodeType="clickEffect">
+                                  <p:stCondLst>
+                                    <p:cond delay="0"/>
+                                  </p:stCondLst>
+                                  <p:childTnLst>
+                                    <p:set>
+                                      <p:cBhvr>
+                                        <p:cTn id="22" dur="1" fill="hold">
+                                          <p:stCondLst>
+                                            <p:cond delay="0"/>
+                                          </p:stCondLst>
+                                        </p:cTn>
+                                        <p:tgtEl>
+                                          <p:spTgt spid="6"/>
+                                        </p:tgtEl>
+                                        <p:attrNameLst>
+                                          <p:attrName>style.visibility</p:attrName>
+                                        </p:attrNameLst>
+                                      </p:cBhvr>
+                                      <p:to>
+                                        <p:strVal val="visible"/>
+                                      </p:to>
+                                    </p:set>
+                                  </p:childTnLst>
+                                </p:cTn>
+                              </p:par>
+                            </p:childTnLst>
+                          </p:cTn>
+                        </p:par>
+                      </p:childTnLst>
+                    </p:cTn>
+                  </p:par>
+                </p:childTnLst>
+              </p:cTn>
+              <p:prevCondLst>
+                <p:cond evt="onPrev" delay="0">
+                  <p:tgtEl>
+                    <p:sldTgt/>
+                  </p:tgtEl>
+                </p:cond>
+              </p:prevCondLst>
+              <p:nextCondLst>
+                <p:cond evt="onNext" delay="0">
+                  <p:tgtEl>
+                    <p:sldTgt/>
+                  </p:tgtEl>
+                </p:cond>
+              </p:nextCondLst>
+            </p:seq>
+          </p:childTnLst>
+        </p:cTn>
+      </p:par>
+    </p:tnLst>
+    <p:bldLst>
+      <p:bldP spid="6" grpId="0" animBg="1"/>
+      <p:bldP spid="7" grpId="0" animBg="1"/>
+      <p:bldP spid="8" grpId="0" animBg="1"/>
+      <p:bldP spid="9" grpId="0" animBg="1"/>
+      <p:bldP spid="10" grpId="0" animBg="1"/>
+      <p:bldP spid="11" grpId="0" animBg="1"/>
+    </p:bldLst>
+  </p:timing>
+</p:sld>
+</file>
+
+<file path=ppt/slides/slide26.xml><?xml version="1.0" encoding="utf-8"?>
+<p:sld xmlns:a="http://schemas.openxmlformats.org/drawingml/2006/main" xmlns:r="http://schemas.openxmlformats.org/officeDocument/2006/relationships" xmlns:p="http://schemas.openxmlformats.org/presentationml/2006/main">
+  <p:cSld>
+    <p:spTree>
+      <p:nvGrpSpPr>
+        <p:cNvPr id="1" name=""/>
+        <p:cNvGrpSpPr/>
+        <p:nvPr/>
+      </p:nvGrpSpPr>
+      <p:grpSpPr>
+        <a:xfrm>
+          <a:off x="0" y="0"/>
+          <a:ext cx="0" cy="0"/>
+          <a:chOff x="0" y="0"/>
+          <a:chExt cx="0" cy="0"/>
+        </a:xfrm>
+      </p:grpSpPr>
       <p:pic>
         <p:nvPicPr>
           <p:cNvPr id="3074" name="Picture 2" descr="The Best Way to Learn SQL - Learn to code in 30 Days!"/>
@@ -16111,7 +17289,7 @@
 </p:sld>
 </file>
 
-<file path=ppt/slides/slide26.xml><?xml version="1.0" encoding="utf-8"?>
+<file path=ppt/slides/slide27.xml><?xml version="1.0" encoding="utf-8"?>
 <p:sld xmlns:a="http://schemas.openxmlformats.org/drawingml/2006/main" xmlns:r="http://schemas.openxmlformats.org/officeDocument/2006/relationships" xmlns:p="http://schemas.openxmlformats.org/presentationml/2006/main">
   <p:cSld>
     <p:spTree>
@@ -16595,7 +17773,7 @@
             <a:fld id="{2BF067CD-8E6B-4360-9AA8-C5DF2A48A6D1}" type="slidenum">
               <a:rPr lang="en-US" noProof="0" smtClean="0"/>
               <a:pPr/>
-              <a:t>26</a:t>
+              <a:t>27</a:t>
             </a:fld>
             <a:endParaRPr lang="en-US" noProof="0" dirty="0"/>
           </a:p>
@@ -16875,7 +18053,7 @@
 </p:sld>
 </file>
 
-<file path=ppt/slides/slide27.xml><?xml version="1.0" encoding="utf-8"?>
+<file path=ppt/slides/slide28.xml><?xml version="1.0" encoding="utf-8"?>
 <p:sld xmlns:a="http://schemas.openxmlformats.org/drawingml/2006/main" xmlns:r="http://schemas.openxmlformats.org/officeDocument/2006/relationships" xmlns:p="http://schemas.openxmlformats.org/presentationml/2006/main">
   <p:cSld>
     <p:spTree>
@@ -17466,7 +18644,7 @@
             <a:fld id="{2BF067CD-8E6B-4360-9AA8-C5DF2A48A6D1}" type="slidenum">
               <a:rPr lang="en-US" noProof="0" smtClean="0"/>
               <a:pPr/>
-              <a:t>27</a:t>
+              <a:t>28</a:t>
             </a:fld>
             <a:endParaRPr lang="en-US" noProof="0" dirty="0"/>
           </a:p>
@@ -17833,7 +19011,7 @@
 </p:sld>
 </file>
 
-<file path=ppt/slides/slide28.xml><?xml version="1.0" encoding="utf-8"?>
+<file path=ppt/slides/slide29.xml><?xml version="1.0" encoding="utf-8"?>
 <p:sld xmlns:a="http://schemas.openxmlformats.org/drawingml/2006/main" xmlns:r="http://schemas.openxmlformats.org/officeDocument/2006/relationships" xmlns:p="http://schemas.openxmlformats.org/presentationml/2006/main">
   <p:cSld>
     <p:spTree>
@@ -18046,7 +19224,7 @@
             <a:fld id="{2BF067CD-8E6B-4360-9AA8-C5DF2A48A6D1}" type="slidenum">
               <a:rPr lang="en-US" noProof="0" smtClean="0"/>
               <a:pPr/>
-              <a:t>28</a:t>
+              <a:t>29</a:t>
             </a:fld>
             <a:endParaRPr lang="en-US" noProof="0" dirty="0"/>
           </a:p>
@@ -18250,7 +19428,153 @@
 </p:sld>
 </file>
 
-<file path=ppt/slides/slide29.xml><?xml version="1.0" encoding="utf-8"?>
+<file path=ppt/slides/slide3.xml><?xml version="1.0" encoding="utf-8"?>
+<p:sld xmlns:a="http://schemas.openxmlformats.org/drawingml/2006/main" xmlns:r="http://schemas.openxmlformats.org/officeDocument/2006/relationships" xmlns:p="http://schemas.openxmlformats.org/presentationml/2006/main">
+  <p:cSld>
+    <p:spTree>
+      <p:nvGrpSpPr>
+        <p:cNvPr id="1" name=""/>
+        <p:cNvGrpSpPr/>
+        <p:nvPr/>
+      </p:nvGrpSpPr>
+      <p:grpSpPr>
+        <a:xfrm>
+          <a:off x="0" y="0"/>
+          <a:ext cx="0" cy="0"/>
+          <a:chOff x="0" y="0"/>
+          <a:chExt cx="0" cy="0"/>
+        </a:xfrm>
+      </p:grpSpPr>
+      <p:pic>
+        <p:nvPicPr>
+          <p:cNvPr id="6" name="Picture 4" descr="Ð ÐµÐ·ÑÐ»ÑÐ°Ñ Ñ Ð¸Ð·Ð¾Ð±ÑÐ°Ð¶ÐµÐ½Ð¸Ðµ Ð·Ð° sql server express png">
+            <a:extLst>
+              <a:ext uri="{FF2B5EF4-FFF2-40B4-BE49-F238E27FC236}">
+                <a16:creationId xmlns:a16="http://schemas.microsoft.com/office/drawing/2014/main" id="{ABA81264-79EA-4C61-B859-F609E78C6876}"/>
+              </a:ext>
+            </a:extLst>
+          </p:cNvPr>
+          <p:cNvPicPr>
+            <a:picLocks noChangeAspect="1" noChangeArrowheads="1"/>
+          </p:cNvPicPr>
+          <p:nvPr/>
+        </p:nvPicPr>
+        <p:blipFill>
+          <a:blip r:embed="rId2" cstate="print">
+            <a:extLst>
+              <a:ext uri="{28A0092B-C50C-407E-A947-70E740481C1C}">
+                <a14:useLocalDpi xmlns:a14="http://schemas.microsoft.com/office/drawing/2010/main" val="0"/>
+              </a:ext>
+            </a:extLst>
+          </a:blip>
+          <a:srcRect/>
+          <a:stretch>
+            <a:fillRect/>
+          </a:stretch>
+        </p:blipFill>
+        <p:spPr bwMode="auto">
+          <a:xfrm>
+            <a:off x="4675658" y="1384495"/>
+            <a:ext cx="2840683" cy="2305483"/>
+          </a:xfrm>
+          <a:prstGeom prst="rect">
+            <a:avLst/>
+          </a:prstGeom>
+          <a:noFill/>
+          <a:extLst>
+            <a:ext uri="{909E8E84-426E-40DD-AFC4-6F175D3DCCD1}">
+              <a14:hiddenFill xmlns:a14="http://schemas.microsoft.com/office/drawing/2010/main">
+                <a:solidFill>
+                  <a:srgbClr val="FFFFFF"/>
+                </a:solidFill>
+              </a14:hiddenFill>
+            </a:ext>
+          </a:extLst>
+        </p:spPr>
+      </p:pic>
+      <p:sp>
+        <p:nvSpPr>
+          <p:cNvPr id="5" name="Подзаглавие 4">
+            <a:extLst>
+              <a:ext uri="{FF2B5EF4-FFF2-40B4-BE49-F238E27FC236}">
+                <a16:creationId xmlns:a16="http://schemas.microsoft.com/office/drawing/2014/main" id="{8AE6A1FD-951B-BB4F-EC39-C1D0F100F2CE}"/>
+              </a:ext>
+            </a:extLst>
+          </p:cNvPr>
+          <p:cNvSpPr>
+            <a:spLocks noGrp="1"/>
+          </p:cNvSpPr>
+          <p:nvPr>
+            <p:ph type="subTitle" sz="quarter" idx="11"/>
+          </p:nvPr>
+        </p:nvSpPr>
+        <p:spPr/>
+        <p:txBody>
+          <a:bodyPr/>
+          <a:lstStyle/>
+          <a:p>
+            <a:r>
+              <a:rPr lang="bg-BG"/>
+              <a:t>Запознаване с </a:t>
+            </a:r>
+            <a:r>
+              <a:rPr lang="en-US"/>
+              <a:t>SQL Server </a:t>
+            </a:r>
+            <a:endParaRPr lang="bg-BG"/>
+          </a:p>
+        </p:txBody>
+      </p:sp>
+      <p:sp>
+        <p:nvSpPr>
+          <p:cNvPr id="8" name="Заглавие 7">
+            <a:extLst>
+              <a:ext uri="{FF2B5EF4-FFF2-40B4-BE49-F238E27FC236}">
+                <a16:creationId xmlns:a16="http://schemas.microsoft.com/office/drawing/2014/main" id="{28CC101B-D563-EFCE-ADE9-2241D6CCD10D}"/>
+              </a:ext>
+            </a:extLst>
+          </p:cNvPr>
+          <p:cNvSpPr>
+            <a:spLocks noGrp="1"/>
+          </p:cNvSpPr>
+          <p:nvPr>
+            <p:ph type="title" sz="quarter" idx="10"/>
+          </p:nvPr>
+        </p:nvSpPr>
+        <p:spPr/>
+        <p:txBody>
+          <a:bodyPr/>
+          <a:lstStyle/>
+          <a:p>
+            <a:r>
+              <a:rPr lang="bg-BG"/>
+              <a:t>Същност и архитектура</a:t>
+            </a:r>
+          </a:p>
+        </p:txBody>
+      </p:sp>
+    </p:spTree>
+    <p:extLst>
+      <p:ext uri="{BB962C8B-B14F-4D97-AF65-F5344CB8AC3E}">
+        <p14:creationId xmlns:p14="http://schemas.microsoft.com/office/powerpoint/2010/main" val="1198903873"/>
+      </p:ext>
+    </p:extLst>
+  </p:cSld>
+  <p:clrMapOvr>
+    <a:masterClrMapping/>
+  </p:clrMapOvr>
+  <mc:AlternateContent xmlns:mc="http://schemas.openxmlformats.org/markup-compatibility/2006" xmlns:p14="http://schemas.microsoft.com/office/powerpoint/2010/main">
+    <mc:Choice Requires="p14">
+      <p:transition spd="slow" p14:dur="2000" advClick="0" advTm="5000"/>
+    </mc:Choice>
+    <mc:Fallback xmlns="">
+      <p:transition spd="slow" advClick="0" advTm="5000"/>
+    </mc:Fallback>
+  </mc:AlternateContent>
+</p:sld>
+</file>
+
+<file path=ppt/slides/slide30.xml><?xml version="1.0" encoding="utf-8"?>
 <p:sld xmlns:a="http://schemas.openxmlformats.org/drawingml/2006/main" xmlns:r="http://schemas.openxmlformats.org/officeDocument/2006/relationships" xmlns:p="http://schemas.openxmlformats.org/presentationml/2006/main">
   <p:cSld>
     <p:spTree>
@@ -18582,7 +19906,7 @@
             <a:fld id="{2BF067CD-8E6B-4360-9AA8-C5DF2A48A6D1}" type="slidenum">
               <a:rPr lang="en-US" noProof="0" smtClean="0"/>
               <a:pPr/>
-              <a:t>29</a:t>
+              <a:t>30</a:t>
             </a:fld>
             <a:endParaRPr lang="en-US" noProof="0" dirty="0"/>
           </a:p>
@@ -18688,153 +20012,7 @@
 </p:sld>
 </file>
 
-<file path=ppt/slides/slide3.xml><?xml version="1.0" encoding="utf-8"?>
-<p:sld xmlns:a="http://schemas.openxmlformats.org/drawingml/2006/main" xmlns:r="http://schemas.openxmlformats.org/officeDocument/2006/relationships" xmlns:p="http://schemas.openxmlformats.org/presentationml/2006/main">
-  <p:cSld>
-    <p:spTree>
-      <p:nvGrpSpPr>
-        <p:cNvPr id="1" name=""/>
-        <p:cNvGrpSpPr/>
-        <p:nvPr/>
-      </p:nvGrpSpPr>
-      <p:grpSpPr>
-        <a:xfrm>
-          <a:off x="0" y="0"/>
-          <a:ext cx="0" cy="0"/>
-          <a:chOff x="0" y="0"/>
-          <a:chExt cx="0" cy="0"/>
-        </a:xfrm>
-      </p:grpSpPr>
-      <p:pic>
-        <p:nvPicPr>
-          <p:cNvPr id="6" name="Picture 4" descr="Ð ÐµÐ·ÑÐ»ÑÐ°Ñ Ñ Ð¸Ð·Ð¾Ð±ÑÐ°Ð¶ÐµÐ½Ð¸Ðµ Ð·Ð° sql server express png">
-            <a:extLst>
-              <a:ext uri="{FF2B5EF4-FFF2-40B4-BE49-F238E27FC236}">
-                <a16:creationId xmlns:a16="http://schemas.microsoft.com/office/drawing/2014/main" id="{ABA81264-79EA-4C61-B859-F609E78C6876}"/>
-              </a:ext>
-            </a:extLst>
-          </p:cNvPr>
-          <p:cNvPicPr>
-            <a:picLocks noChangeAspect="1" noChangeArrowheads="1"/>
-          </p:cNvPicPr>
-          <p:nvPr/>
-        </p:nvPicPr>
-        <p:blipFill>
-          <a:blip r:embed="rId2" cstate="print">
-            <a:extLst>
-              <a:ext uri="{28A0092B-C50C-407E-A947-70E740481C1C}">
-                <a14:useLocalDpi xmlns:a14="http://schemas.microsoft.com/office/drawing/2010/main" val="0"/>
-              </a:ext>
-            </a:extLst>
-          </a:blip>
-          <a:srcRect/>
-          <a:stretch>
-            <a:fillRect/>
-          </a:stretch>
-        </p:blipFill>
-        <p:spPr bwMode="auto">
-          <a:xfrm>
-            <a:off x="4675658" y="1384495"/>
-            <a:ext cx="2840683" cy="2305483"/>
-          </a:xfrm>
-          <a:prstGeom prst="rect">
-            <a:avLst/>
-          </a:prstGeom>
-          <a:noFill/>
-          <a:extLst>
-            <a:ext uri="{909E8E84-426E-40DD-AFC4-6F175D3DCCD1}">
-              <a14:hiddenFill xmlns:a14="http://schemas.microsoft.com/office/drawing/2010/main">
-                <a:solidFill>
-                  <a:srgbClr val="FFFFFF"/>
-                </a:solidFill>
-              </a14:hiddenFill>
-            </a:ext>
-          </a:extLst>
-        </p:spPr>
-      </p:pic>
-      <p:sp>
-        <p:nvSpPr>
-          <p:cNvPr id="5" name="Подзаглавие 4">
-            <a:extLst>
-              <a:ext uri="{FF2B5EF4-FFF2-40B4-BE49-F238E27FC236}">
-                <a16:creationId xmlns:a16="http://schemas.microsoft.com/office/drawing/2014/main" id="{8AE6A1FD-951B-BB4F-EC39-C1D0F100F2CE}"/>
-              </a:ext>
-            </a:extLst>
-          </p:cNvPr>
-          <p:cNvSpPr>
-            <a:spLocks noGrp="1"/>
-          </p:cNvSpPr>
-          <p:nvPr>
-            <p:ph type="subTitle" sz="quarter" idx="11"/>
-          </p:nvPr>
-        </p:nvSpPr>
-        <p:spPr/>
-        <p:txBody>
-          <a:bodyPr/>
-          <a:lstStyle/>
-          <a:p>
-            <a:r>
-              <a:rPr lang="bg-BG"/>
-              <a:t>Запознаване с </a:t>
-            </a:r>
-            <a:r>
-              <a:rPr lang="en-US"/>
-              <a:t>SQL Server </a:t>
-            </a:r>
-            <a:endParaRPr lang="bg-BG"/>
-          </a:p>
-        </p:txBody>
-      </p:sp>
-      <p:sp>
-        <p:nvSpPr>
-          <p:cNvPr id="8" name="Заглавие 7">
-            <a:extLst>
-              <a:ext uri="{FF2B5EF4-FFF2-40B4-BE49-F238E27FC236}">
-                <a16:creationId xmlns:a16="http://schemas.microsoft.com/office/drawing/2014/main" id="{28CC101B-D563-EFCE-ADE9-2241D6CCD10D}"/>
-              </a:ext>
-            </a:extLst>
-          </p:cNvPr>
-          <p:cNvSpPr>
-            <a:spLocks noGrp="1"/>
-          </p:cNvSpPr>
-          <p:nvPr>
-            <p:ph type="title" sz="quarter" idx="10"/>
-          </p:nvPr>
-        </p:nvSpPr>
-        <p:spPr/>
-        <p:txBody>
-          <a:bodyPr/>
-          <a:lstStyle/>
-          <a:p>
-            <a:r>
-              <a:rPr lang="bg-BG"/>
-              <a:t>Същност и архитектура</a:t>
-            </a:r>
-          </a:p>
-        </p:txBody>
-      </p:sp>
-    </p:spTree>
-    <p:extLst>
-      <p:ext uri="{BB962C8B-B14F-4D97-AF65-F5344CB8AC3E}">
-        <p14:creationId xmlns:p14="http://schemas.microsoft.com/office/powerpoint/2010/main" val="1198903873"/>
-      </p:ext>
-    </p:extLst>
-  </p:cSld>
-  <p:clrMapOvr>
-    <a:masterClrMapping/>
-  </p:clrMapOvr>
-  <mc:AlternateContent xmlns:mc="http://schemas.openxmlformats.org/markup-compatibility/2006" xmlns:p14="http://schemas.microsoft.com/office/powerpoint/2010/main">
-    <mc:Choice Requires="p14">
-      <p:transition spd="slow" p14:dur="2000" advClick="0" advTm="5000"/>
-    </mc:Choice>
-    <mc:Fallback xmlns="">
-      <p:transition spd="slow" advClick="0" advTm="5000"/>
-    </mc:Fallback>
-  </mc:AlternateContent>
-</p:sld>
-</file>
-
-<file path=ppt/slides/slide30.xml><?xml version="1.0" encoding="utf-8"?>
+<file path=ppt/slides/slide31.xml><?xml version="1.0" encoding="utf-8"?>
 <p:sld xmlns:a="http://schemas.openxmlformats.org/drawingml/2006/main" xmlns:r="http://schemas.openxmlformats.org/officeDocument/2006/relationships" xmlns:p="http://schemas.openxmlformats.org/presentationml/2006/main">
   <p:cSld>
     <p:spTree>
@@ -19796,7 +20974,7 @@
             <a:fld id="{2BF067CD-8E6B-4360-9AA8-C5DF2A48A6D1}" type="slidenum">
               <a:rPr lang="en-US" noProof="0" smtClean="0"/>
               <a:pPr/>
-              <a:t>30</a:t>
+              <a:t>31</a:t>
             </a:fld>
             <a:endParaRPr lang="en-US" noProof="0" dirty="0"/>
           </a:p>
@@ -19951,7 +21129,7 @@
 </p:sld>
 </file>
 
-<file path=ppt/slides/slide31.xml><?xml version="1.0" encoding="utf-8"?>
+<file path=ppt/slides/slide32.xml><?xml version="1.0" encoding="utf-8"?>
 <p:sld xmlns:a="http://schemas.openxmlformats.org/drawingml/2006/main" xmlns:r="http://schemas.openxmlformats.org/officeDocument/2006/relationships" xmlns:p="http://schemas.openxmlformats.org/presentationml/2006/main">
   <p:cSld>
     <p:spTree>
@@ -20141,7 +21319,7 @@
 </p:sld>
 </file>
 
-<file path=ppt/slides/slide32.xml><?xml version="1.0" encoding="utf-8"?>
+<file path=ppt/slides/slide33.xml><?xml version="1.0" encoding="utf-8"?>
 <p:sld xmlns:a="http://schemas.openxmlformats.org/drawingml/2006/main" xmlns:r="http://schemas.openxmlformats.org/officeDocument/2006/relationships" xmlns:p="http://schemas.openxmlformats.org/presentationml/2006/main">
   <p:cSld>
     <p:spTree>
@@ -20497,7 +21675,7 @@
             <a:fld id="{2BF067CD-8E6B-4360-9AA8-C5DF2A48A6D1}" type="slidenum">
               <a:rPr lang="en-US" noProof="0" smtClean="0"/>
               <a:pPr/>
-              <a:t>32</a:t>
+              <a:t>33</a:t>
             </a:fld>
             <a:endParaRPr lang="en-US" noProof="0" dirty="0"/>
           </a:p>

</xml_diff>

<commit_message>
Updates on Intro to MS SQL Server
</commit_message>
<xml_diff>
--- a/Courses/Software-Sciences/Module-3-Databases-New/03-Intro-to-MS-SQL-Server/03-Intro-to-MS-SQL-Server.pptx
+++ b/Courses/Software-Sciences/Module-3-Databases-New/03-Intro-to-MS-SQL-Server/03-Intro-to-MS-SQL-Server.pptx
@@ -5,10 +5,10 @@
     <p:sldMasterId id="2147483675" r:id="rId1"/>
   </p:sldMasterIdLst>
   <p:notesMasterIdLst>
-    <p:notesMasterId r:id="rId37"/>
+    <p:notesMasterId r:id="rId40"/>
   </p:notesMasterIdLst>
   <p:handoutMasterIdLst>
-    <p:handoutMasterId r:id="rId38"/>
+    <p:handoutMasterId r:id="rId41"/>
   </p:handoutMasterIdLst>
   <p:sldIdLst>
     <p:sldId id="1176" r:id="rId2"/>
@@ -28,24 +28,27 @@
     <p:sldId id="1211" r:id="rId16"/>
     <p:sldId id="1224" r:id="rId17"/>
     <p:sldId id="1225" r:id="rId18"/>
-    <p:sldId id="1212" r:id="rId19"/>
-    <p:sldId id="1193" r:id="rId20"/>
-    <p:sldId id="1226" r:id="rId21"/>
-    <p:sldId id="1227" r:id="rId22"/>
-    <p:sldId id="1199" r:id="rId23"/>
-    <p:sldId id="1200" r:id="rId24"/>
-    <p:sldId id="1201" r:id="rId25"/>
-    <p:sldId id="1223" r:id="rId26"/>
-    <p:sldId id="1205" r:id="rId27"/>
-    <p:sldId id="1191" r:id="rId28"/>
-    <p:sldId id="1192" r:id="rId29"/>
-    <p:sldId id="1208" r:id="rId30"/>
-    <p:sldId id="1206" r:id="rId31"/>
-    <p:sldId id="1207" r:id="rId32"/>
-    <p:sldId id="1209" r:id="rId33"/>
-    <p:sldId id="1127" r:id="rId34"/>
-    <p:sldId id="504" r:id="rId35"/>
-    <p:sldId id="505" r:id="rId36"/>
+    <p:sldId id="1228" r:id="rId19"/>
+    <p:sldId id="1212" r:id="rId20"/>
+    <p:sldId id="1193" r:id="rId21"/>
+    <p:sldId id="1226" r:id="rId22"/>
+    <p:sldId id="1229" r:id="rId23"/>
+    <p:sldId id="1227" r:id="rId24"/>
+    <p:sldId id="1230" r:id="rId25"/>
+    <p:sldId id="1199" r:id="rId26"/>
+    <p:sldId id="1200" r:id="rId27"/>
+    <p:sldId id="1201" r:id="rId28"/>
+    <p:sldId id="1223" r:id="rId29"/>
+    <p:sldId id="1205" r:id="rId30"/>
+    <p:sldId id="1191" r:id="rId31"/>
+    <p:sldId id="1192" r:id="rId32"/>
+    <p:sldId id="1208" r:id="rId33"/>
+    <p:sldId id="1206" r:id="rId34"/>
+    <p:sldId id="1207" r:id="rId35"/>
+    <p:sldId id="1209" r:id="rId36"/>
+    <p:sldId id="1127" r:id="rId37"/>
+    <p:sldId id="504" r:id="rId38"/>
+    <p:sldId id="505" r:id="rId39"/>
   </p:sldIdLst>
   <p:sldSz cx="12192000" cy="6858000"/>
   <p:notesSz cx="6858000" cy="9144000"/>
@@ -174,6 +177,7 @@
             <p14:sldId id="1211"/>
             <p14:sldId id="1224"/>
             <p14:sldId id="1225"/>
+            <p14:sldId id="1228"/>
             <p14:sldId id="1212"/>
           </p14:sldIdLst>
         </p14:section>
@@ -181,7 +185,9 @@
           <p14:sldIdLst>
             <p14:sldId id="1193"/>
             <p14:sldId id="1226"/>
+            <p14:sldId id="1229"/>
             <p14:sldId id="1227"/>
+            <p14:sldId id="1230"/>
             <p14:sldId id="1199"/>
             <p14:sldId id="1200"/>
             <p14:sldId id="1201"/>
@@ -407,7 +413,7 @@
           <a:p>
             <a:fld id="{4E087215-0C8F-4762-A664-737A353EC9A4}" type="datetimeFigureOut">
               <a:rPr lang="bg-BG" smtClean="0"/>
-              <a:t>13.07.24 г.</a:t>
+              <a:t>14.7.2024 г.</a:t>
             </a:fld>
             <a:endParaRPr lang="bg-BG"/>
           </a:p>
@@ -603,7 +609,7 @@
           <a:p>
             <a:fld id="{72D84649-876A-46C9-8472-14CB09C070D8}" type="datetimeFigureOut">
               <a:rPr lang="en-US" smtClean="0"/>
-              <a:t>7/13/24</a:t>
+              <a:t>7/14/2024</a:t>
             </a:fld>
             <a:endParaRPr lang="en-US"/>
           </a:p>
@@ -1076,7 +1082,9 @@
         </p:nvSpPr>
         <p:spPr/>
         <p:txBody>
-          <a:bodyPr/>
+          <a:bodyPr>
+            <a:normAutofit/>
+          </a:bodyPr>
           <a:lstStyle/>
           <a:p>
             <a:endParaRPr lang="en-US" dirty="0"/>
@@ -1085,129 +1093,23 @@
       </p:sp>
       <p:sp>
         <p:nvSpPr>
-          <p:cNvPr id="7" name="Slide Number Placeholder 5">
-            <a:extLst>
-              <a:ext uri="{FF2B5EF4-FFF2-40B4-BE49-F238E27FC236}">
-                <a16:creationId xmlns:a16="http://schemas.microsoft.com/office/drawing/2014/main" id="{5049B984-F964-47FF-8179-0A3007CE21CD}"/>
-              </a:ext>
-            </a:extLst>
-          </p:cNvPr>
-          <p:cNvSpPr txBox="1">
-            <a:spLocks/>
+          <p:cNvPr id="4" name="Slide Number Placeholder 3"/>
+          <p:cNvSpPr>
+            <a:spLocks noGrp="1"/>
           </p:cNvSpPr>
-          <p:nvPr/>
+          <p:nvPr>
+            <p:ph type="sldNum" sz="quarter" idx="10"/>
+          </p:nvPr>
         </p:nvSpPr>
-        <p:spPr>
-          <a:xfrm>
-            <a:off x="6488999" y="8847000"/>
-            <a:ext cx="367414" cy="297000"/>
-          </a:xfrm>
-          <a:prstGeom prst="rect">
-            <a:avLst/>
-          </a:prstGeom>
-        </p:spPr>
+        <p:spPr/>
         <p:txBody>
-          <a:bodyPr vert="horz" lIns="91440" tIns="45720" rIns="91440" bIns="45720" rtlCol="0" anchor="b"/>
-          <a:lstStyle>
-            <a:defPPr>
-              <a:defRPr lang="en-US"/>
-            </a:defPPr>
-            <a:lvl1pPr marL="0" algn="r" defTabSz="914400" rtl="0" eaLnBrk="1" latinLnBrk="0" hangingPunct="1">
-              <a:defRPr sz="1200" kern="1200">
-                <a:solidFill>
-                  <a:schemeClr val="tx1"/>
-                </a:solidFill>
-                <a:latin typeface="+mn-lt"/>
-                <a:ea typeface="+mn-ea"/>
-                <a:cs typeface="+mn-cs"/>
-              </a:defRPr>
-            </a:lvl1pPr>
-            <a:lvl2pPr marL="457200" algn="l" defTabSz="914400" rtl="0" eaLnBrk="1" latinLnBrk="0" hangingPunct="1">
-              <a:defRPr sz="1800" kern="1200">
-                <a:solidFill>
-                  <a:schemeClr val="tx1"/>
-                </a:solidFill>
-                <a:latin typeface="+mn-lt"/>
-                <a:ea typeface="+mn-ea"/>
-                <a:cs typeface="+mn-cs"/>
-              </a:defRPr>
-            </a:lvl2pPr>
-            <a:lvl3pPr marL="914400" algn="l" defTabSz="914400" rtl="0" eaLnBrk="1" latinLnBrk="0" hangingPunct="1">
-              <a:defRPr sz="1800" kern="1200">
-                <a:solidFill>
-                  <a:schemeClr val="tx1"/>
-                </a:solidFill>
-                <a:latin typeface="+mn-lt"/>
-                <a:ea typeface="+mn-ea"/>
-                <a:cs typeface="+mn-cs"/>
-              </a:defRPr>
-            </a:lvl3pPr>
-            <a:lvl4pPr marL="1371600" algn="l" defTabSz="914400" rtl="0" eaLnBrk="1" latinLnBrk="0" hangingPunct="1">
-              <a:defRPr sz="1800" kern="1200">
-                <a:solidFill>
-                  <a:schemeClr val="tx1"/>
-                </a:solidFill>
-                <a:latin typeface="+mn-lt"/>
-                <a:ea typeface="+mn-ea"/>
-                <a:cs typeface="+mn-cs"/>
-              </a:defRPr>
-            </a:lvl4pPr>
-            <a:lvl5pPr marL="1828800" algn="l" defTabSz="914400" rtl="0" eaLnBrk="1" latinLnBrk="0" hangingPunct="1">
-              <a:defRPr sz="1800" kern="1200">
-                <a:solidFill>
-                  <a:schemeClr val="tx1"/>
-                </a:solidFill>
-                <a:latin typeface="+mn-lt"/>
-                <a:ea typeface="+mn-ea"/>
-                <a:cs typeface="+mn-cs"/>
-              </a:defRPr>
-            </a:lvl5pPr>
-            <a:lvl6pPr marL="2286000" algn="l" defTabSz="914400" rtl="0" eaLnBrk="1" latinLnBrk="0" hangingPunct="1">
-              <a:defRPr sz="1800" kern="1200">
-                <a:solidFill>
-                  <a:schemeClr val="tx1"/>
-                </a:solidFill>
-                <a:latin typeface="+mn-lt"/>
-                <a:ea typeface="+mn-ea"/>
-                <a:cs typeface="+mn-cs"/>
-              </a:defRPr>
-            </a:lvl6pPr>
-            <a:lvl7pPr marL="2743200" algn="l" defTabSz="914400" rtl="0" eaLnBrk="1" latinLnBrk="0" hangingPunct="1">
-              <a:defRPr sz="1800" kern="1200">
-                <a:solidFill>
-                  <a:schemeClr val="tx1"/>
-                </a:solidFill>
-                <a:latin typeface="+mn-lt"/>
-                <a:ea typeface="+mn-ea"/>
-                <a:cs typeface="+mn-cs"/>
-              </a:defRPr>
-            </a:lvl7pPr>
-            <a:lvl8pPr marL="3200400" algn="l" defTabSz="914400" rtl="0" eaLnBrk="1" latinLnBrk="0" hangingPunct="1">
-              <a:defRPr sz="1800" kern="1200">
-                <a:solidFill>
-                  <a:schemeClr val="tx1"/>
-                </a:solidFill>
-                <a:latin typeface="+mn-lt"/>
-                <a:ea typeface="+mn-ea"/>
-                <a:cs typeface="+mn-cs"/>
-              </a:defRPr>
-            </a:lvl8pPr>
-            <a:lvl9pPr marL="3657600" algn="l" defTabSz="914400" rtl="0" eaLnBrk="1" latinLnBrk="0" hangingPunct="1">
-              <a:defRPr sz="1800" kern="1200">
-                <a:solidFill>
-                  <a:schemeClr val="tx1"/>
-                </a:solidFill>
-                <a:latin typeface="+mn-lt"/>
-                <a:ea typeface="+mn-ea"/>
-                <a:cs typeface="+mn-cs"/>
-              </a:defRPr>
-            </a:lvl9pPr>
-          </a:lstStyle>
-          <a:p>
-            <a:fld id="{3EBA5BD7-F043-4D1B-AA17-CD412FC534DE}" type="slidenum">
+          <a:bodyPr/>
+          <a:lstStyle/>
+          <a:p>
+            <a:fld id="{2BF067CD-8E6B-4360-9AA8-C5DF2A48A6D1}" type="slidenum">
               <a:rPr lang="en-US" smtClean="0"/>
               <a:pPr/>
-              <a:t>34</a:t>
+              <a:t>35</a:t>
             </a:fld>
             <a:endParaRPr lang="en-US" dirty="0"/>
           </a:p>
@@ -1215,10 +1117,10 @@
       </p:sp>
       <p:sp>
         <p:nvSpPr>
-          <p:cNvPr id="5" name="Footer Placeholder 7">
+          <p:cNvPr id="6" name="Footer Placeholder 7">
             <a:extLst>
               <a:ext uri="{FF2B5EF4-FFF2-40B4-BE49-F238E27FC236}">
-                <a16:creationId xmlns:a16="http://schemas.microsoft.com/office/drawing/2014/main" id="{53BF3A64-C1CC-0123-3F1A-73764E2490F0}"/>
+                <a16:creationId xmlns:a16="http://schemas.microsoft.com/office/drawing/2014/main" id="{F78D82EE-0FE6-AAC9-2B93-1693CD587F12}"/>
               </a:ext>
             </a:extLst>
           </p:cNvPr>
@@ -1271,7 +1173,7 @@
     </p:spTree>
     <p:extLst>
       <p:ext uri="{BB962C8B-B14F-4D97-AF65-F5344CB8AC3E}">
-        <p14:creationId xmlns:p14="http://schemas.microsoft.com/office/powerpoint/2010/main" val="1440974784"/>
+        <p14:creationId xmlns:p14="http://schemas.microsoft.com/office/powerpoint/2010/main" val="2466887280"/>
       </p:ext>
     </p:extLst>
   </p:cSld>
@@ -1325,6 +1227,451 @@
           <a:bodyPr/>
           <a:lstStyle/>
           <a:p>
+            <a:endParaRPr lang="en-US" dirty="0"/>
+          </a:p>
+        </p:txBody>
+      </p:sp>
+      <p:sp>
+        <p:nvSpPr>
+          <p:cNvPr id="5" name="Slide Number Placeholder 4"/>
+          <p:cNvSpPr>
+            <a:spLocks noGrp="1"/>
+          </p:cNvSpPr>
+          <p:nvPr>
+            <p:ph type="sldNum" sz="quarter" idx="11"/>
+          </p:nvPr>
+        </p:nvSpPr>
+        <p:spPr/>
+        <p:txBody>
+          <a:bodyPr/>
+          <a:lstStyle/>
+          <a:p>
+            <a:pPr marL="0" marR="0" lvl="0" indent="0" algn="r" defTabSz="914400" rtl="0" eaLnBrk="1" fontAlgn="auto" latinLnBrk="0" hangingPunct="1">
+              <a:lnSpc>
+                <a:spcPct val="100000"/>
+              </a:lnSpc>
+              <a:spcBef>
+                <a:spcPts val="0"/>
+              </a:spcBef>
+              <a:spcAft>
+                <a:spcPts val="0"/>
+              </a:spcAft>
+              <a:buClrTx/>
+              <a:buSzTx/>
+              <a:buFontTx/>
+              <a:buNone/>
+              <a:tabLst/>
+              <a:defRPr/>
+            </a:pPr>
+            <a:fld id="{3EBA5BD7-F043-4D1B-AA17-CD412FC534DE}" type="slidenum">
+              <a:rPr kumimoji="0" lang="en-US" sz="1200" b="0" i="0" u="none" strike="noStrike" kern="1200" cap="none" spc="0" normalizeH="0" baseline="0" noProof="0" smtClean="0">
+                <a:ln>
+                  <a:noFill/>
+                </a:ln>
+                <a:solidFill>
+                  <a:prstClr val="black"/>
+                </a:solidFill>
+                <a:effectLst/>
+                <a:uLnTx/>
+                <a:uFillTx/>
+                <a:latin typeface="Calibri" panose="020F0502020204030204"/>
+                <a:ea typeface="+mn-ea"/>
+                <a:cs typeface="+mn-cs"/>
+              </a:rPr>
+              <a:pPr marL="0" marR="0" lvl="0" indent="0" algn="r" defTabSz="914400" rtl="0" eaLnBrk="1" fontAlgn="auto" latinLnBrk="0" hangingPunct="1">
+                <a:lnSpc>
+                  <a:spcPct val="100000"/>
+                </a:lnSpc>
+                <a:spcBef>
+                  <a:spcPts val="0"/>
+                </a:spcBef>
+                <a:spcAft>
+                  <a:spcPts val="0"/>
+                </a:spcAft>
+                <a:buClrTx/>
+                <a:buSzTx/>
+                <a:buFontTx/>
+                <a:buNone/>
+                <a:tabLst/>
+                <a:defRPr/>
+              </a:pPr>
+              <a:t>36</a:t>
+            </a:fld>
+            <a:endParaRPr kumimoji="0" lang="en-US" sz="1200" b="0" i="0" u="none" strike="noStrike" kern="1200" cap="none" spc="0" normalizeH="0" baseline="0" noProof="0" dirty="0">
+              <a:ln>
+                <a:noFill/>
+              </a:ln>
+              <a:solidFill>
+                <a:prstClr val="black"/>
+              </a:solidFill>
+              <a:effectLst/>
+              <a:uLnTx/>
+              <a:uFillTx/>
+              <a:latin typeface="Calibri" panose="020F0502020204030204"/>
+              <a:ea typeface="+mn-ea"/>
+              <a:cs typeface="+mn-cs"/>
+            </a:endParaRPr>
+          </a:p>
+        </p:txBody>
+      </p:sp>
+      <p:sp>
+        <p:nvSpPr>
+          <p:cNvPr id="4" name="Footer Placeholder 7">
+            <a:extLst>
+              <a:ext uri="{FF2B5EF4-FFF2-40B4-BE49-F238E27FC236}">
+                <a16:creationId xmlns:a16="http://schemas.microsoft.com/office/drawing/2014/main" id="{5FCFC7B7-1C24-6ED3-2477-34E7AF4BC0C3}"/>
+              </a:ext>
+            </a:extLst>
+          </p:cNvPr>
+          <p:cNvSpPr>
+            <a:spLocks noGrp="1"/>
+          </p:cNvSpPr>
+          <p:nvPr>
+            <p:ph type="ftr" sz="quarter" idx="4"/>
+          </p:nvPr>
+        </p:nvSpPr>
+        <p:spPr>
+          <a:xfrm>
+            <a:off x="-1" y="8892000"/>
+            <a:ext cx="6488999" cy="252000"/>
+          </a:xfrm>
+          <a:prstGeom prst="rect">
+            <a:avLst/>
+          </a:prstGeom>
+        </p:spPr>
+        <p:txBody>
+          <a:bodyPr vert="horz" lIns="91440" tIns="45720" rIns="91440" bIns="45720" rtlCol="0" anchor="b"/>
+          <a:lstStyle>
+            <a:lvl1pPr algn="l">
+              <a:defRPr sz="1100"/>
+            </a:lvl1pPr>
+          </a:lstStyle>
+          <a:p>
+            <a:r>
+              <a:rPr lang="bg-BG" sz="1100" dirty="0"/>
+              <a:t>Работна група </a:t>
+            </a:r>
+            <a:r>
+              <a:rPr lang="bg-BG" dirty="0"/>
+              <a:t>"Образование по програмиране и ИТ"</a:t>
+            </a:r>
+            <a:r>
+              <a:rPr lang="bg-BG" sz="1100" dirty="0"/>
+              <a:t>, с подкрепата на </a:t>
+            </a:r>
+            <a:r>
+              <a:rPr lang="en-US" sz="1100" dirty="0">
+                <a:hlinkClick r:id="rId3"/>
+              </a:rPr>
+              <a:t>SoftUni</a:t>
+            </a:r>
+            <a:endParaRPr lang="en-US" sz="1100" dirty="0"/>
+          </a:p>
+        </p:txBody>
+      </p:sp>
+    </p:spTree>
+    <p:extLst>
+      <p:ext uri="{BB962C8B-B14F-4D97-AF65-F5344CB8AC3E}">
+        <p14:creationId xmlns:p14="http://schemas.microsoft.com/office/powerpoint/2010/main" val="1949888808"/>
+      </p:ext>
+    </p:extLst>
+  </p:cSld>
+  <p:clrMapOvr>
+    <a:masterClrMapping/>
+  </p:clrMapOvr>
+</p:notes>
+</file>
+
+<file path=ppt/notesSlides/notesSlide12.xml><?xml version="1.0" encoding="utf-8"?>
+<p:notes xmlns:a="http://schemas.openxmlformats.org/drawingml/2006/main" xmlns:r="http://schemas.openxmlformats.org/officeDocument/2006/relationships" xmlns:p="http://schemas.openxmlformats.org/presentationml/2006/main">
+  <p:cSld>
+    <p:spTree>
+      <p:nvGrpSpPr>
+        <p:cNvPr id="1" name=""/>
+        <p:cNvGrpSpPr/>
+        <p:nvPr/>
+      </p:nvGrpSpPr>
+      <p:grpSpPr>
+        <a:xfrm>
+          <a:off x="0" y="0"/>
+          <a:ext cx="0" cy="0"/>
+          <a:chOff x="0" y="0"/>
+          <a:chExt cx="0" cy="0"/>
+        </a:xfrm>
+      </p:grpSpPr>
+      <p:sp>
+        <p:nvSpPr>
+          <p:cNvPr id="2" name="Slide Image Placeholder 1"/>
+          <p:cNvSpPr>
+            <a:spLocks noGrp="1" noRot="1" noChangeAspect="1"/>
+          </p:cNvSpPr>
+          <p:nvPr>
+            <p:ph type="sldImg"/>
+          </p:nvPr>
+        </p:nvSpPr>
+        <p:spPr/>
+      </p:sp>
+      <p:sp>
+        <p:nvSpPr>
+          <p:cNvPr id="3" name="Notes Placeholder 2"/>
+          <p:cNvSpPr>
+            <a:spLocks noGrp="1"/>
+          </p:cNvSpPr>
+          <p:nvPr>
+            <p:ph type="body" idx="1"/>
+          </p:nvPr>
+        </p:nvSpPr>
+        <p:spPr/>
+        <p:txBody>
+          <a:bodyPr/>
+          <a:lstStyle/>
+          <a:p>
+            <a:endParaRPr lang="en-US" dirty="0"/>
+          </a:p>
+        </p:txBody>
+      </p:sp>
+      <p:sp>
+        <p:nvSpPr>
+          <p:cNvPr id="7" name="Slide Number Placeholder 5">
+            <a:extLst>
+              <a:ext uri="{FF2B5EF4-FFF2-40B4-BE49-F238E27FC236}">
+                <a16:creationId xmlns:a16="http://schemas.microsoft.com/office/drawing/2014/main" id="{5049B984-F964-47FF-8179-0A3007CE21CD}"/>
+              </a:ext>
+            </a:extLst>
+          </p:cNvPr>
+          <p:cNvSpPr txBox="1">
+            <a:spLocks/>
+          </p:cNvSpPr>
+          <p:nvPr/>
+        </p:nvSpPr>
+        <p:spPr>
+          <a:xfrm>
+            <a:off x="6488999" y="8847000"/>
+            <a:ext cx="367414" cy="297000"/>
+          </a:xfrm>
+          <a:prstGeom prst="rect">
+            <a:avLst/>
+          </a:prstGeom>
+        </p:spPr>
+        <p:txBody>
+          <a:bodyPr vert="horz" lIns="91440" tIns="45720" rIns="91440" bIns="45720" rtlCol="0" anchor="b"/>
+          <a:lstStyle>
+            <a:defPPr>
+              <a:defRPr lang="en-US"/>
+            </a:defPPr>
+            <a:lvl1pPr marL="0" algn="r" defTabSz="914400" rtl="0" eaLnBrk="1" latinLnBrk="0" hangingPunct="1">
+              <a:defRPr sz="1200" kern="1200">
+                <a:solidFill>
+                  <a:schemeClr val="tx1"/>
+                </a:solidFill>
+                <a:latin typeface="+mn-lt"/>
+                <a:ea typeface="+mn-ea"/>
+                <a:cs typeface="+mn-cs"/>
+              </a:defRPr>
+            </a:lvl1pPr>
+            <a:lvl2pPr marL="457200" algn="l" defTabSz="914400" rtl="0" eaLnBrk="1" latinLnBrk="0" hangingPunct="1">
+              <a:defRPr sz="1800" kern="1200">
+                <a:solidFill>
+                  <a:schemeClr val="tx1"/>
+                </a:solidFill>
+                <a:latin typeface="+mn-lt"/>
+                <a:ea typeface="+mn-ea"/>
+                <a:cs typeface="+mn-cs"/>
+              </a:defRPr>
+            </a:lvl2pPr>
+            <a:lvl3pPr marL="914400" algn="l" defTabSz="914400" rtl="0" eaLnBrk="1" latinLnBrk="0" hangingPunct="1">
+              <a:defRPr sz="1800" kern="1200">
+                <a:solidFill>
+                  <a:schemeClr val="tx1"/>
+                </a:solidFill>
+                <a:latin typeface="+mn-lt"/>
+                <a:ea typeface="+mn-ea"/>
+                <a:cs typeface="+mn-cs"/>
+              </a:defRPr>
+            </a:lvl3pPr>
+            <a:lvl4pPr marL="1371600" algn="l" defTabSz="914400" rtl="0" eaLnBrk="1" latinLnBrk="0" hangingPunct="1">
+              <a:defRPr sz="1800" kern="1200">
+                <a:solidFill>
+                  <a:schemeClr val="tx1"/>
+                </a:solidFill>
+                <a:latin typeface="+mn-lt"/>
+                <a:ea typeface="+mn-ea"/>
+                <a:cs typeface="+mn-cs"/>
+              </a:defRPr>
+            </a:lvl4pPr>
+            <a:lvl5pPr marL="1828800" algn="l" defTabSz="914400" rtl="0" eaLnBrk="1" latinLnBrk="0" hangingPunct="1">
+              <a:defRPr sz="1800" kern="1200">
+                <a:solidFill>
+                  <a:schemeClr val="tx1"/>
+                </a:solidFill>
+                <a:latin typeface="+mn-lt"/>
+                <a:ea typeface="+mn-ea"/>
+                <a:cs typeface="+mn-cs"/>
+              </a:defRPr>
+            </a:lvl5pPr>
+            <a:lvl6pPr marL="2286000" algn="l" defTabSz="914400" rtl="0" eaLnBrk="1" latinLnBrk="0" hangingPunct="1">
+              <a:defRPr sz="1800" kern="1200">
+                <a:solidFill>
+                  <a:schemeClr val="tx1"/>
+                </a:solidFill>
+                <a:latin typeface="+mn-lt"/>
+                <a:ea typeface="+mn-ea"/>
+                <a:cs typeface="+mn-cs"/>
+              </a:defRPr>
+            </a:lvl6pPr>
+            <a:lvl7pPr marL="2743200" algn="l" defTabSz="914400" rtl="0" eaLnBrk="1" latinLnBrk="0" hangingPunct="1">
+              <a:defRPr sz="1800" kern="1200">
+                <a:solidFill>
+                  <a:schemeClr val="tx1"/>
+                </a:solidFill>
+                <a:latin typeface="+mn-lt"/>
+                <a:ea typeface="+mn-ea"/>
+                <a:cs typeface="+mn-cs"/>
+              </a:defRPr>
+            </a:lvl7pPr>
+            <a:lvl8pPr marL="3200400" algn="l" defTabSz="914400" rtl="0" eaLnBrk="1" latinLnBrk="0" hangingPunct="1">
+              <a:defRPr sz="1800" kern="1200">
+                <a:solidFill>
+                  <a:schemeClr val="tx1"/>
+                </a:solidFill>
+                <a:latin typeface="+mn-lt"/>
+                <a:ea typeface="+mn-ea"/>
+                <a:cs typeface="+mn-cs"/>
+              </a:defRPr>
+            </a:lvl8pPr>
+            <a:lvl9pPr marL="3657600" algn="l" defTabSz="914400" rtl="0" eaLnBrk="1" latinLnBrk="0" hangingPunct="1">
+              <a:defRPr sz="1800" kern="1200">
+                <a:solidFill>
+                  <a:schemeClr val="tx1"/>
+                </a:solidFill>
+                <a:latin typeface="+mn-lt"/>
+                <a:ea typeface="+mn-ea"/>
+                <a:cs typeface="+mn-cs"/>
+              </a:defRPr>
+            </a:lvl9pPr>
+          </a:lstStyle>
+          <a:p>
+            <a:fld id="{3EBA5BD7-F043-4D1B-AA17-CD412FC534DE}" type="slidenum">
+              <a:rPr lang="en-US" smtClean="0"/>
+              <a:pPr/>
+              <a:t>37</a:t>
+            </a:fld>
+            <a:endParaRPr lang="en-US" dirty="0"/>
+          </a:p>
+        </p:txBody>
+      </p:sp>
+      <p:sp>
+        <p:nvSpPr>
+          <p:cNvPr id="5" name="Footer Placeholder 7">
+            <a:extLst>
+              <a:ext uri="{FF2B5EF4-FFF2-40B4-BE49-F238E27FC236}">
+                <a16:creationId xmlns:a16="http://schemas.microsoft.com/office/drawing/2014/main" id="{53BF3A64-C1CC-0123-3F1A-73764E2490F0}"/>
+              </a:ext>
+            </a:extLst>
+          </p:cNvPr>
+          <p:cNvSpPr>
+            <a:spLocks noGrp="1"/>
+          </p:cNvSpPr>
+          <p:nvPr>
+            <p:ph type="ftr" sz="quarter" idx="4"/>
+          </p:nvPr>
+        </p:nvSpPr>
+        <p:spPr>
+          <a:xfrm>
+            <a:off x="-1" y="8892000"/>
+            <a:ext cx="6488999" cy="252000"/>
+          </a:xfrm>
+          <a:prstGeom prst="rect">
+            <a:avLst/>
+          </a:prstGeom>
+        </p:spPr>
+        <p:txBody>
+          <a:bodyPr vert="horz" lIns="91440" tIns="45720" rIns="91440" bIns="45720" rtlCol="0" anchor="b"/>
+          <a:lstStyle>
+            <a:lvl1pPr algn="l">
+              <a:defRPr sz="1100"/>
+            </a:lvl1pPr>
+          </a:lstStyle>
+          <a:p>
+            <a:r>
+              <a:rPr lang="bg-BG" sz="1100" dirty="0"/>
+              <a:t>Работна група </a:t>
+            </a:r>
+            <a:r>
+              <a:rPr lang="bg-BG" dirty="0"/>
+              <a:t>"Образование по програмиране и ИТ"</a:t>
+            </a:r>
+            <a:r>
+              <a:rPr lang="bg-BG" sz="1100" dirty="0"/>
+              <a:t>, с подкрепата на </a:t>
+            </a:r>
+            <a:r>
+              <a:rPr lang="en-US" sz="1100" dirty="0">
+                <a:hlinkClick r:id="rId3"/>
+              </a:rPr>
+              <a:t>SoftUni</a:t>
+            </a:r>
+            <a:endParaRPr lang="en-US" sz="1100" dirty="0"/>
+          </a:p>
+        </p:txBody>
+      </p:sp>
+    </p:spTree>
+    <p:extLst>
+      <p:ext uri="{BB962C8B-B14F-4D97-AF65-F5344CB8AC3E}">
+        <p14:creationId xmlns:p14="http://schemas.microsoft.com/office/powerpoint/2010/main" val="1440974784"/>
+      </p:ext>
+    </p:extLst>
+  </p:cSld>
+  <p:clrMapOvr>
+    <a:masterClrMapping/>
+  </p:clrMapOvr>
+</p:notes>
+</file>
+
+<file path=ppt/notesSlides/notesSlide13.xml><?xml version="1.0" encoding="utf-8"?>
+<p:notes xmlns:a="http://schemas.openxmlformats.org/drawingml/2006/main" xmlns:r="http://schemas.openxmlformats.org/officeDocument/2006/relationships" xmlns:p="http://schemas.openxmlformats.org/presentationml/2006/main">
+  <p:cSld>
+    <p:spTree>
+      <p:nvGrpSpPr>
+        <p:cNvPr id="1" name=""/>
+        <p:cNvGrpSpPr/>
+        <p:nvPr/>
+      </p:nvGrpSpPr>
+      <p:grpSpPr>
+        <a:xfrm>
+          <a:off x="0" y="0"/>
+          <a:ext cx="0" cy="0"/>
+          <a:chOff x="0" y="0"/>
+          <a:chExt cx="0" cy="0"/>
+        </a:xfrm>
+      </p:grpSpPr>
+      <p:sp>
+        <p:nvSpPr>
+          <p:cNvPr id="2" name="Slide Image Placeholder 1"/>
+          <p:cNvSpPr>
+            <a:spLocks noGrp="1" noRot="1" noChangeAspect="1"/>
+          </p:cNvSpPr>
+          <p:nvPr>
+            <p:ph type="sldImg"/>
+          </p:nvPr>
+        </p:nvSpPr>
+        <p:spPr/>
+      </p:sp>
+      <p:sp>
+        <p:nvSpPr>
+          <p:cNvPr id="3" name="Notes Placeholder 2"/>
+          <p:cNvSpPr>
+            <a:spLocks noGrp="1"/>
+          </p:cNvSpPr>
+          <p:nvPr>
+            <p:ph type="body" idx="1"/>
+          </p:nvPr>
+        </p:nvSpPr>
+        <p:spPr/>
+        <p:txBody>
+          <a:bodyPr/>
+          <a:lstStyle/>
+          <a:p>
             <a:endParaRPr lang="en-US"/>
           </a:p>
         </p:txBody>
@@ -1453,7 +1800,7 @@
             <a:fld id="{3EBA5BD7-F043-4D1B-AA17-CD412FC534DE}" type="slidenum">
               <a:rPr lang="en-US" smtClean="0"/>
               <a:pPr/>
-              <a:t>35</a:t>
+              <a:t>38</a:t>
             </a:fld>
             <a:endParaRPr lang="en-US" dirty="0"/>
           </a:p>
@@ -2256,7 +2603,7 @@
           <a:bodyPr/>
           <a:lstStyle/>
           <a:p>
-            <a:endParaRPr lang="x-none" dirty="0"/>
+            <a:endParaRPr lang="en-US" dirty="0"/>
           </a:p>
         </p:txBody>
       </p:sp>
@@ -2277,8 +2624,7 @@
           <a:p>
             <a:fld id="{2BF067CD-8E6B-4360-9AA8-C5DF2A48A6D1}" type="slidenum">
               <a:rPr lang="en-US" smtClean="0"/>
-              <a:pPr/>
-              <a:t>28</a:t>
+              <a:t>18</a:t>
             </a:fld>
             <a:endParaRPr lang="en-US" dirty="0"/>
           </a:p>
@@ -2286,13 +2632,7 @@
       </p:sp>
       <p:sp>
         <p:nvSpPr>
-          <p:cNvPr id="6" name="Footer Placeholder 7">
-            <a:extLst>
-              <a:ext uri="{FF2B5EF4-FFF2-40B4-BE49-F238E27FC236}">
-                <a16:creationId xmlns:a16="http://schemas.microsoft.com/office/drawing/2014/main" id="{728847A1-DB5B-FA49-DCDC-C43B39A3B724}"/>
-              </a:ext>
-            </a:extLst>
-          </p:cNvPr>
+          <p:cNvPr id="5" name="Footer Placeholder 4"/>
           <p:cNvSpPr>
             <a:spLocks noGrp="1"/>
           </p:cNvSpPr>
@@ -2300,37 +2640,25 @@
             <p:ph type="ftr" sz="quarter" idx="4"/>
           </p:nvPr>
         </p:nvSpPr>
-        <p:spPr>
-          <a:xfrm>
-            <a:off x="-1" y="8892000"/>
-            <a:ext cx="6488999" cy="252000"/>
-          </a:xfrm>
-          <a:prstGeom prst="rect">
-            <a:avLst/>
-          </a:prstGeom>
-        </p:spPr>
+        <p:spPr/>
         <p:txBody>
-          <a:bodyPr vert="horz" lIns="91440" tIns="45720" rIns="91440" bIns="45720" rtlCol="0" anchor="b"/>
-          <a:lstStyle>
-            <a:lvl1pPr algn="l">
-              <a:defRPr sz="1100"/>
-            </a:lvl1pPr>
-          </a:lstStyle>
-          <a:p>
-            <a:r>
-              <a:rPr lang="bg-BG" sz="1100" dirty="0"/>
+          <a:bodyPr/>
+          <a:lstStyle/>
+          <a:p>
+            <a:r>
+              <a:rPr lang="bg-BG" sz="1100"/>
               <a:t>Работна група </a:t>
             </a:r>
             <a:r>
-              <a:rPr lang="bg-BG" dirty="0"/>
+              <a:rPr lang="bg-BG"/>
               <a:t>"Образование по програмиране и ИТ"</a:t>
             </a:r>
             <a:r>
-              <a:rPr lang="bg-BG" sz="1100" dirty="0"/>
+              <a:rPr lang="bg-BG" sz="1100"/>
               <a:t>, с подкрепата на </a:t>
             </a:r>
             <a:r>
-              <a:rPr lang="en-US" sz="1100" dirty="0">
+              <a:rPr lang="en-US" sz="1100">
                 <a:hlinkClick r:id="rId3"/>
               </a:rPr>
               <a:t>SoftUni</a:t>
@@ -2342,7 +2670,7 @@
     </p:spTree>
     <p:extLst>
       <p:ext uri="{BB962C8B-B14F-4D97-AF65-F5344CB8AC3E}">
-        <p14:creationId xmlns:p14="http://schemas.microsoft.com/office/powerpoint/2010/main" val="3259131797"/>
+        <p14:creationId xmlns:p14="http://schemas.microsoft.com/office/powerpoint/2010/main" val="3334265265"/>
       </p:ext>
     </p:extLst>
   </p:cSld>
@@ -2393,9 +2721,7 @@
         </p:nvSpPr>
         <p:spPr/>
         <p:txBody>
-          <a:bodyPr>
-            <a:normAutofit/>
-          </a:bodyPr>
+          <a:bodyPr/>
           <a:lstStyle/>
           <a:p>
             <a:endParaRPr lang="en-US" dirty="0"/>
@@ -2409,7 +2735,7 @@
             <a:spLocks noGrp="1"/>
           </p:cNvSpPr>
           <p:nvPr>
-            <p:ph type="sldNum" sz="quarter" idx="10"/>
+            <p:ph type="sldNum" sz="quarter" idx="5"/>
           </p:nvPr>
         </p:nvSpPr>
         <p:spPr/>
@@ -2419,8 +2745,7 @@
           <a:p>
             <a:fld id="{2BF067CD-8E6B-4360-9AA8-C5DF2A48A6D1}" type="slidenum">
               <a:rPr lang="en-US" smtClean="0"/>
-              <a:pPr/>
-              <a:t>32</a:t>
+              <a:t>21</a:t>
             </a:fld>
             <a:endParaRPr lang="en-US" dirty="0"/>
           </a:p>
@@ -2428,13 +2753,7 @@
       </p:sp>
       <p:sp>
         <p:nvSpPr>
-          <p:cNvPr id="6" name="Footer Placeholder 7">
-            <a:extLst>
-              <a:ext uri="{FF2B5EF4-FFF2-40B4-BE49-F238E27FC236}">
-                <a16:creationId xmlns:a16="http://schemas.microsoft.com/office/drawing/2014/main" id="{F78D82EE-0FE6-AAC9-2B93-1693CD587F12}"/>
-              </a:ext>
-            </a:extLst>
-          </p:cNvPr>
+          <p:cNvPr id="5" name="Footer Placeholder 4"/>
           <p:cNvSpPr>
             <a:spLocks noGrp="1"/>
           </p:cNvSpPr>
@@ -2442,37 +2761,25 @@
             <p:ph type="ftr" sz="quarter" idx="4"/>
           </p:nvPr>
         </p:nvSpPr>
-        <p:spPr>
-          <a:xfrm>
-            <a:off x="-1" y="8892000"/>
-            <a:ext cx="6488999" cy="252000"/>
-          </a:xfrm>
-          <a:prstGeom prst="rect">
-            <a:avLst/>
-          </a:prstGeom>
-        </p:spPr>
+        <p:spPr/>
         <p:txBody>
-          <a:bodyPr vert="horz" lIns="91440" tIns="45720" rIns="91440" bIns="45720" rtlCol="0" anchor="b"/>
-          <a:lstStyle>
-            <a:lvl1pPr algn="l">
-              <a:defRPr sz="1100"/>
-            </a:lvl1pPr>
-          </a:lstStyle>
-          <a:p>
-            <a:r>
-              <a:rPr lang="bg-BG" sz="1100" dirty="0"/>
+          <a:bodyPr/>
+          <a:lstStyle/>
+          <a:p>
+            <a:r>
+              <a:rPr lang="bg-BG" sz="1100"/>
               <a:t>Работна група </a:t>
             </a:r>
             <a:r>
-              <a:rPr lang="bg-BG" dirty="0"/>
+              <a:rPr lang="bg-BG"/>
               <a:t>"Образование по програмиране и ИТ"</a:t>
             </a:r>
             <a:r>
-              <a:rPr lang="bg-BG" sz="1100" dirty="0"/>
+              <a:rPr lang="bg-BG" sz="1100"/>
               <a:t>, с подкрепата на </a:t>
             </a:r>
             <a:r>
-              <a:rPr lang="en-US" sz="1100" dirty="0">
+              <a:rPr lang="en-US" sz="1100">
                 <a:hlinkClick r:id="rId3"/>
               </a:rPr>
               <a:t>SoftUni</a:t>
@@ -2484,7 +2791,7 @@
     </p:spTree>
     <p:extLst>
       <p:ext uri="{BB962C8B-B14F-4D97-AF65-F5344CB8AC3E}">
-        <p14:creationId xmlns:p14="http://schemas.microsoft.com/office/powerpoint/2010/main" val="2466887280"/>
+        <p14:creationId xmlns:p14="http://schemas.microsoft.com/office/powerpoint/2010/main" val="768005882"/>
       </p:ext>
     </p:extLst>
   </p:cSld>
@@ -2538,18 +2845,18 @@
           <a:bodyPr/>
           <a:lstStyle/>
           <a:p>
-            <a:endParaRPr lang="en-US" dirty="0"/>
+            <a:endParaRPr lang="x-none" dirty="0"/>
           </a:p>
         </p:txBody>
       </p:sp>
       <p:sp>
         <p:nvSpPr>
-          <p:cNvPr id="5" name="Slide Number Placeholder 4"/>
+          <p:cNvPr id="4" name="Slide Number Placeholder 3"/>
           <p:cNvSpPr>
             <a:spLocks noGrp="1"/>
           </p:cNvSpPr>
           <p:nvPr>
-            <p:ph type="sldNum" sz="quarter" idx="11"/>
+            <p:ph type="sldNum" sz="quarter" idx="5"/>
           </p:nvPr>
         </p:nvSpPr>
         <p:spPr/>
@@ -2557,80 +2864,21 @@
           <a:bodyPr/>
           <a:lstStyle/>
           <a:p>
-            <a:pPr marL="0" marR="0" lvl="0" indent="0" algn="r" defTabSz="914400" rtl="0" eaLnBrk="1" fontAlgn="auto" latinLnBrk="0" hangingPunct="1">
-              <a:lnSpc>
-                <a:spcPct val="100000"/>
-              </a:lnSpc>
-              <a:spcBef>
-                <a:spcPts val="0"/>
-              </a:spcBef>
-              <a:spcAft>
-                <a:spcPts val="0"/>
-              </a:spcAft>
-              <a:buClrTx/>
-              <a:buSzTx/>
-              <a:buFontTx/>
-              <a:buNone/>
-              <a:tabLst/>
-              <a:defRPr/>
-            </a:pPr>
-            <a:fld id="{3EBA5BD7-F043-4D1B-AA17-CD412FC534DE}" type="slidenum">
-              <a:rPr kumimoji="0" lang="en-US" sz="1200" b="0" i="0" u="none" strike="noStrike" kern="1200" cap="none" spc="0" normalizeH="0" baseline="0" noProof="0" smtClean="0">
-                <a:ln>
-                  <a:noFill/>
-                </a:ln>
-                <a:solidFill>
-                  <a:prstClr val="black"/>
-                </a:solidFill>
-                <a:effectLst/>
-                <a:uLnTx/>
-                <a:uFillTx/>
-                <a:latin typeface="Calibri" panose="020F0502020204030204"/>
-                <a:ea typeface="+mn-ea"/>
-                <a:cs typeface="+mn-cs"/>
-              </a:rPr>
-              <a:pPr marL="0" marR="0" lvl="0" indent="0" algn="r" defTabSz="914400" rtl="0" eaLnBrk="1" fontAlgn="auto" latinLnBrk="0" hangingPunct="1">
-                <a:lnSpc>
-                  <a:spcPct val="100000"/>
-                </a:lnSpc>
-                <a:spcBef>
-                  <a:spcPts val="0"/>
-                </a:spcBef>
-                <a:spcAft>
-                  <a:spcPts val="0"/>
-                </a:spcAft>
-                <a:buClrTx/>
-                <a:buSzTx/>
-                <a:buFontTx/>
-                <a:buNone/>
-                <a:tabLst/>
-                <a:defRPr/>
-              </a:pPr>
-              <a:t>33</a:t>
+            <a:fld id="{2BF067CD-8E6B-4360-9AA8-C5DF2A48A6D1}" type="slidenum">
+              <a:rPr lang="en-US" smtClean="0"/>
+              <a:pPr/>
+              <a:t>31</a:t>
             </a:fld>
-            <a:endParaRPr kumimoji="0" lang="en-US" sz="1200" b="0" i="0" u="none" strike="noStrike" kern="1200" cap="none" spc="0" normalizeH="0" baseline="0" noProof="0" dirty="0">
-              <a:ln>
-                <a:noFill/>
-              </a:ln>
-              <a:solidFill>
-                <a:prstClr val="black"/>
-              </a:solidFill>
-              <a:effectLst/>
-              <a:uLnTx/>
-              <a:uFillTx/>
-              <a:latin typeface="Calibri" panose="020F0502020204030204"/>
-              <a:ea typeface="+mn-ea"/>
-              <a:cs typeface="+mn-cs"/>
-            </a:endParaRPr>
+            <a:endParaRPr lang="en-US" dirty="0"/>
           </a:p>
         </p:txBody>
       </p:sp>
       <p:sp>
         <p:nvSpPr>
-          <p:cNvPr id="4" name="Footer Placeholder 7">
+          <p:cNvPr id="6" name="Footer Placeholder 7">
             <a:extLst>
               <a:ext uri="{FF2B5EF4-FFF2-40B4-BE49-F238E27FC236}">
-                <a16:creationId xmlns:a16="http://schemas.microsoft.com/office/drawing/2014/main" id="{5FCFC7B7-1C24-6ED3-2477-34E7AF4BC0C3}"/>
+                <a16:creationId xmlns:a16="http://schemas.microsoft.com/office/drawing/2014/main" id="{728847A1-DB5B-FA49-DCDC-C43B39A3B724}"/>
               </a:ext>
             </a:extLst>
           </p:cNvPr>
@@ -2683,7 +2931,7 @@
     </p:spTree>
     <p:extLst>
       <p:ext uri="{BB962C8B-B14F-4D97-AF65-F5344CB8AC3E}">
-        <p14:creationId xmlns:p14="http://schemas.microsoft.com/office/powerpoint/2010/main" val="1949888808"/>
+        <p14:creationId xmlns:p14="http://schemas.microsoft.com/office/powerpoint/2010/main" val="3259131797"/>
       </p:ext>
     </p:extLst>
   </p:cSld>
@@ -9475,7 +9723,263 @@
           <a:bodyPr/>
           <a:lstStyle/>
           <a:p>
-            <a:endParaRPr lang="bg-BG"/>
+            <a:r>
+              <a:rPr lang="ru-RU" b="1" dirty="0"/>
+              <a:t>SQL Server Management Studio </a:t>
+            </a:r>
+            <a:r>
+              <a:rPr lang="ru-RU" dirty="0"/>
+              <a:t>(</a:t>
+            </a:r>
+            <a:r>
+              <a:rPr lang="ru-RU" b="1" dirty="0">
+                <a:solidFill>
+                  <a:schemeClr val="bg1"/>
+                </a:solidFill>
+              </a:rPr>
+              <a:t>SSMS</a:t>
+            </a:r>
+            <a:r>
+              <a:rPr lang="ru-RU" dirty="0"/>
+              <a:t>) е интегрирана </a:t>
+            </a:r>
+            <a:r>
+              <a:rPr lang="ru-RU" b="1" dirty="0">
+                <a:solidFill>
+                  <a:schemeClr val="bg1"/>
+                </a:solidFill>
+              </a:rPr>
+              <a:t>среда</a:t>
+            </a:r>
+            <a:r>
+              <a:rPr lang="ru-RU" dirty="0"/>
+              <a:t> за </a:t>
+            </a:r>
+            <a:r>
+              <a:rPr lang="ru-RU" b="1" dirty="0">
+                <a:solidFill>
+                  <a:schemeClr val="bg1"/>
+                </a:solidFill>
+              </a:rPr>
+              <a:t>управление</a:t>
+            </a:r>
+            <a:r>
+              <a:rPr lang="ru-RU" dirty="0"/>
+              <a:t> на </a:t>
+            </a:r>
+            <a:r>
+              <a:rPr lang="ru-RU" b="1" dirty="0"/>
+              <a:t>Microsoft SQL Server </a:t>
+            </a:r>
+            <a:r>
+              <a:rPr lang="ru-RU" dirty="0"/>
+              <a:t>инфраструктурат</a:t>
+            </a:r>
+            <a:r>
+              <a:rPr lang="bg-BG" dirty="0"/>
+              <a:t>а</a:t>
+            </a:r>
+            <a:endParaRPr lang="en-US" dirty="0"/>
+          </a:p>
+          <a:p>
+            <a:r>
+              <a:rPr lang="ru-RU" dirty="0"/>
+              <a:t>Предоставя </a:t>
+            </a:r>
+            <a:r>
+              <a:rPr lang="ru-RU" b="1" dirty="0">
+                <a:solidFill>
+                  <a:schemeClr val="bg1"/>
+                </a:solidFill>
+              </a:rPr>
+              <a:t>инструменти</a:t>
+            </a:r>
+            <a:r>
+              <a:rPr lang="ru-RU" dirty="0"/>
+              <a:t> за </a:t>
+            </a:r>
+            <a:r>
+              <a:rPr lang="ru-RU" b="1" dirty="0">
+                <a:solidFill>
+                  <a:schemeClr val="bg1"/>
+                </a:solidFill>
+              </a:rPr>
+              <a:t>конфигуриране</a:t>
+            </a:r>
+            <a:r>
+              <a:rPr lang="ru-RU" dirty="0"/>
+              <a:t>, </a:t>
+            </a:r>
+            <a:r>
+              <a:rPr lang="ru-RU" b="1" dirty="0">
+                <a:solidFill>
+                  <a:schemeClr val="bg1"/>
+                </a:solidFill>
+              </a:rPr>
+              <a:t>управление</a:t>
+            </a:r>
+            <a:r>
+              <a:rPr lang="ru-RU" dirty="0"/>
+              <a:t> и </a:t>
+            </a:r>
+            <a:r>
+              <a:rPr lang="ru-RU" b="1" dirty="0">
+                <a:solidFill>
+                  <a:schemeClr val="bg1"/>
+                </a:solidFill>
+              </a:rPr>
+              <a:t>администриране</a:t>
+            </a:r>
+            <a:r>
+              <a:rPr lang="ru-RU" dirty="0"/>
+              <a:t> на всички компоненти в SQL Server</a:t>
+            </a:r>
+          </a:p>
+          <a:p>
+            <a:r>
+              <a:rPr lang="ru-RU" dirty="0"/>
+              <a:t>Може да се използва за </a:t>
+            </a:r>
+            <a:r>
+              <a:rPr lang="ru-RU" b="1" dirty="0"/>
+              <a:t>разполагане</a:t>
+            </a:r>
+            <a:r>
+              <a:rPr lang="ru-RU" dirty="0"/>
+              <a:t> и </a:t>
+            </a:r>
+            <a:r>
+              <a:rPr lang="ru-RU" b="1" dirty="0"/>
+              <a:t>управление</a:t>
+            </a:r>
+            <a:r>
+              <a:rPr lang="ru-RU" dirty="0"/>
+              <a:t> на </a:t>
+            </a:r>
+            <a:r>
+              <a:rPr lang="ru-RU" b="1" dirty="0"/>
+              <a:t>бази</a:t>
+            </a:r>
+            <a:r>
+              <a:rPr lang="ru-RU" dirty="0"/>
+              <a:t> </a:t>
+            </a:r>
+            <a:r>
+              <a:rPr lang="ru-RU" b="1" dirty="0"/>
+              <a:t>данни</a:t>
+            </a:r>
+            <a:r>
+              <a:rPr lang="ru-RU" dirty="0"/>
+              <a:t> както на </a:t>
+            </a:r>
+            <a:r>
+              <a:rPr lang="ru-RU" b="1" dirty="0">
+                <a:solidFill>
+                  <a:schemeClr val="bg1"/>
+                </a:solidFill>
+              </a:rPr>
+              <a:t>локални машини</a:t>
+            </a:r>
+            <a:r>
+              <a:rPr lang="ru-RU" dirty="0"/>
+              <a:t>, така и в </a:t>
+            </a:r>
+            <a:r>
+              <a:rPr lang="ru-RU" b="1" dirty="0">
+                <a:solidFill>
+                  <a:schemeClr val="bg1"/>
+                </a:solidFill>
+              </a:rPr>
+              <a:t>облака</a:t>
+            </a:r>
+          </a:p>
+          <a:p>
+            <a:pPr>
+              <a:buClr>
+                <a:schemeClr val="tx1"/>
+              </a:buClr>
+            </a:pPr>
+            <a:r>
+              <a:rPr lang="ru-RU" b="1" dirty="0">
+                <a:solidFill>
+                  <a:schemeClr val="bg1"/>
+                </a:solidFill>
+              </a:rPr>
+              <a:t>Създаване</a:t>
+            </a:r>
+            <a:r>
+              <a:rPr lang="ru-RU" dirty="0"/>
+              <a:t>, </a:t>
+            </a:r>
+            <a:r>
+              <a:rPr lang="ru-RU" b="1" dirty="0">
+                <a:solidFill>
+                  <a:schemeClr val="bg1"/>
+                </a:solidFill>
+              </a:rPr>
+              <a:t>промяна</a:t>
+            </a:r>
+            <a:r>
+              <a:rPr lang="ru-RU" dirty="0"/>
+              <a:t> и </a:t>
+            </a:r>
+            <a:r>
+              <a:rPr lang="ru-RU" b="1" dirty="0">
+                <a:solidFill>
+                  <a:schemeClr val="bg1"/>
+                </a:solidFill>
+              </a:rPr>
+              <a:t>управление</a:t>
+            </a:r>
+            <a:r>
+              <a:rPr lang="ru-RU" dirty="0"/>
+              <a:t> на </a:t>
+            </a:r>
+            <a:r>
+              <a:rPr lang="ru-RU" b="1" dirty="0"/>
+              <a:t>бази данни</a:t>
+            </a:r>
+            <a:r>
+              <a:rPr lang="ru-RU" dirty="0"/>
+              <a:t>, </a:t>
+            </a:r>
+            <a:r>
+              <a:rPr lang="ru-RU" b="1" dirty="0"/>
+              <a:t>таблици</a:t>
+            </a:r>
+            <a:r>
+              <a:rPr lang="ru-RU" dirty="0"/>
+              <a:t>, </a:t>
+            </a:r>
+            <a:r>
+              <a:rPr lang="ru-RU" b="1" dirty="0"/>
+              <a:t>изгледи</a:t>
+            </a:r>
+            <a:r>
+              <a:rPr lang="ru-RU" dirty="0"/>
+              <a:t>, </a:t>
+            </a:r>
+            <a:r>
+              <a:rPr lang="ru-RU" b="1" dirty="0"/>
+              <a:t>индекси</a:t>
+            </a:r>
+            <a:r>
+              <a:rPr lang="ru-RU" dirty="0"/>
+              <a:t> и </a:t>
+            </a:r>
+            <a:r>
+              <a:rPr lang="ru-RU" b="1" dirty="0"/>
+              <a:t>други</a:t>
+            </a:r>
+            <a:r>
+              <a:rPr lang="ru-RU" dirty="0"/>
+              <a:t> обекти</a:t>
+            </a:r>
+            <a:endParaRPr lang="ru-RU" b="1" dirty="0">
+              <a:solidFill>
+                <a:schemeClr val="bg1"/>
+              </a:solidFill>
+            </a:endParaRPr>
           </a:p>
         </p:txBody>
       </p:sp>
@@ -9501,18 +10005,10 @@
           <a:lstStyle/>
           <a:p>
             <a:r>
-              <a:rPr lang="en-US" dirty="0">
-                <a:highlight>
-                  <a:srgbClr val="FFFF00"/>
-                </a:highlight>
-              </a:rPr>
-              <a:t>General slide about SSMS</a:t>
-            </a:r>
-            <a:endParaRPr lang="bg-BG" dirty="0">
-              <a:highlight>
-                <a:srgbClr val="FFFF00"/>
-              </a:highlight>
-            </a:endParaRPr>
+              <a:rPr lang="en-US" dirty="0"/>
+              <a:t>SSMS</a:t>
+            </a:r>
+            <a:endParaRPr lang="bg-BG" dirty="0"/>
           </a:p>
         </p:txBody>
       </p:sp>
@@ -9534,6 +10030,183 @@
       <p:transition spd="slow" advClick="0" advTm="5000"/>
     </mc:Fallback>
   </mc:AlternateContent>
+  <p:timing>
+    <p:tnLst>
+      <p:par>
+        <p:cTn id="1" dur="indefinite" restart="never" nodeType="tmRoot">
+          <p:childTnLst>
+            <p:seq concurrent="1" nextAc="seek">
+              <p:cTn id="2" dur="indefinite" nodeType="mainSeq">
+                <p:childTnLst>
+                  <p:par>
+                    <p:cTn id="3" fill="hold">
+                      <p:stCondLst>
+                        <p:cond delay="indefinite"/>
+                      </p:stCondLst>
+                      <p:childTnLst>
+                        <p:par>
+                          <p:cTn id="4" fill="hold">
+                            <p:stCondLst>
+                              <p:cond delay="0"/>
+                            </p:stCondLst>
+                            <p:childTnLst>
+                              <p:par>
+                                <p:cTn id="5" presetID="1" presetClass="entr" presetSubtype="0" fill="hold" nodeType="clickEffect">
+                                  <p:stCondLst>
+                                    <p:cond delay="0"/>
+                                  </p:stCondLst>
+                                  <p:childTnLst>
+                                    <p:set>
+                                      <p:cBhvr>
+                                        <p:cTn id="6" dur="1" fill="hold">
+                                          <p:stCondLst>
+                                            <p:cond delay="0"/>
+                                          </p:stCondLst>
+                                        </p:cTn>
+                                        <p:tgtEl>
+                                          <p:spTgt spid="5">
+                                            <p:txEl>
+                                              <p:pRg st="1" end="1"/>
+                                            </p:txEl>
+                                          </p:spTgt>
+                                        </p:tgtEl>
+                                        <p:attrNameLst>
+                                          <p:attrName>style.visibility</p:attrName>
+                                        </p:attrNameLst>
+                                      </p:cBhvr>
+                                      <p:to>
+                                        <p:strVal val="visible"/>
+                                      </p:to>
+                                    </p:set>
+                                  </p:childTnLst>
+                                </p:cTn>
+                              </p:par>
+                            </p:childTnLst>
+                          </p:cTn>
+                        </p:par>
+                      </p:childTnLst>
+                    </p:cTn>
+                  </p:par>
+                  <p:par>
+                    <p:cTn id="7" fill="hold">
+                      <p:stCondLst>
+                        <p:cond delay="indefinite"/>
+                      </p:stCondLst>
+                      <p:childTnLst>
+                        <p:par>
+                          <p:cTn id="8" fill="hold">
+                            <p:stCondLst>
+                              <p:cond delay="0"/>
+                            </p:stCondLst>
+                            <p:childTnLst>
+                              <p:par>
+                                <p:cTn id="9" presetID="1" presetClass="entr" presetSubtype="0" fill="hold" nodeType="clickEffect">
+                                  <p:stCondLst>
+                                    <p:cond delay="0"/>
+                                  </p:stCondLst>
+                                  <p:childTnLst>
+                                    <p:set>
+                                      <p:cBhvr>
+                                        <p:cTn id="10" dur="1" fill="hold">
+                                          <p:stCondLst>
+                                            <p:cond delay="0"/>
+                                          </p:stCondLst>
+                                        </p:cTn>
+                                        <p:tgtEl>
+                                          <p:spTgt spid="5">
+                                            <p:txEl>
+                                              <p:pRg st="2" end="2"/>
+                                            </p:txEl>
+                                          </p:spTgt>
+                                        </p:tgtEl>
+                                        <p:attrNameLst>
+                                          <p:attrName>style.visibility</p:attrName>
+                                        </p:attrNameLst>
+                                      </p:cBhvr>
+                                      <p:to>
+                                        <p:strVal val="visible"/>
+                                      </p:to>
+                                    </p:set>
+                                  </p:childTnLst>
+                                </p:cTn>
+                              </p:par>
+                            </p:childTnLst>
+                          </p:cTn>
+                        </p:par>
+                      </p:childTnLst>
+                    </p:cTn>
+                  </p:par>
+                  <p:par>
+                    <p:cTn id="11" fill="hold">
+                      <p:stCondLst>
+                        <p:cond delay="indefinite"/>
+                      </p:stCondLst>
+                      <p:childTnLst>
+                        <p:par>
+                          <p:cTn id="12" fill="hold">
+                            <p:stCondLst>
+                              <p:cond delay="0"/>
+                            </p:stCondLst>
+                            <p:childTnLst>
+                              <p:par>
+                                <p:cTn id="13" presetID="1" presetClass="entr" presetSubtype="0" fill="hold" nodeType="clickEffect">
+                                  <p:stCondLst>
+                                    <p:cond delay="0"/>
+                                  </p:stCondLst>
+                                  <p:childTnLst>
+                                    <p:set>
+                                      <p:cBhvr>
+                                        <p:cTn id="14" dur="1" fill="hold">
+                                          <p:stCondLst>
+                                            <p:cond delay="0"/>
+                                          </p:stCondLst>
+                                        </p:cTn>
+                                        <p:tgtEl>
+                                          <p:spTgt spid="5">
+                                            <p:txEl>
+                                              <p:pRg st="3" end="3"/>
+                                            </p:txEl>
+                                          </p:spTgt>
+                                        </p:tgtEl>
+                                        <p:attrNameLst>
+                                          <p:attrName>style.visibility</p:attrName>
+                                        </p:attrNameLst>
+                                      </p:cBhvr>
+                                      <p:to>
+                                        <p:strVal val="visible"/>
+                                      </p:to>
+                                    </p:set>
+                                  </p:childTnLst>
+                                </p:cTn>
+                              </p:par>
+                            </p:childTnLst>
+                          </p:cTn>
+                        </p:par>
+                      </p:childTnLst>
+                    </p:cTn>
+                  </p:par>
+                </p:childTnLst>
+              </p:cTn>
+              <p:prevCondLst>
+                <p:cond evt="onPrev" delay="0">
+                  <p:tgtEl>
+                    <p:sldTgt/>
+                  </p:tgtEl>
+                </p:cond>
+              </p:prevCondLst>
+              <p:nextCondLst>
+                <p:cond evt="onNext" delay="0">
+                  <p:tgtEl>
+                    <p:sldTgt/>
+                  </p:tgtEl>
+                </p:cond>
+              </p:nextCondLst>
+            </p:seq>
+          </p:childTnLst>
+        </p:cTn>
+      </p:par>
+    </p:tnLst>
+  </p:timing>
 </p:sld>
 </file>
 
@@ -9605,7 +10278,118 @@
           <a:bodyPr/>
           <a:lstStyle/>
           <a:p>
-            <a:endParaRPr lang="bg-BG"/>
+            <a:pPr marL="0" marR="0">
+              <a:lnSpc>
+                <a:spcPct val="115000"/>
+              </a:lnSpc>
+              <a:spcBef>
+                <a:spcPts val="400"/>
+              </a:spcBef>
+              <a:spcAft>
+                <a:spcPts val="600"/>
+              </a:spcAft>
+            </a:pPr>
+            <a:r>
+              <a:rPr lang="bg-BG" dirty="0"/>
+              <a:t>Натиснете </a:t>
+            </a:r>
+            <a:r>
+              <a:rPr lang="bg-BG" b="1" dirty="0">
+                <a:hlinkClick r:id="rId2"/>
+              </a:rPr>
+              <a:t>този линк</a:t>
+            </a:r>
+            <a:r>
+              <a:rPr lang="bg-BG" dirty="0"/>
+              <a:t>, чрез който ще инсталирате </a:t>
+            </a:r>
+            <a:r>
+              <a:rPr lang="en-US" dirty="0"/>
+              <a:t>SSMS</a:t>
+            </a:r>
+            <a:r>
+              <a:rPr lang="ru-RU" dirty="0"/>
+              <a:t> </a:t>
+            </a:r>
+          </a:p>
+          <a:p>
+            <a:pPr marR="0"/>
+            <a:r>
+              <a:rPr lang="bg-BG" dirty="0"/>
+              <a:t>Натиснете </a:t>
+            </a:r>
+            <a:r>
+              <a:rPr lang="bg-BG" b="1" dirty="0">
+                <a:solidFill>
+                  <a:schemeClr val="bg1"/>
+                </a:solidFill>
+              </a:rPr>
+              <a:t>линка</a:t>
+            </a:r>
+            <a:r>
+              <a:rPr lang="bg-BG" dirty="0"/>
+              <a:t> с </a:t>
+            </a:r>
+            <a:r>
+              <a:rPr lang="bg-BG" b="1" dirty="0">
+                <a:solidFill>
+                  <a:schemeClr val="bg1"/>
+                </a:solidFill>
+              </a:rPr>
+              <a:t>име</a:t>
+            </a:r>
+            <a:r>
+              <a:rPr lang="ru-RU" dirty="0"/>
+              <a:t> "</a:t>
+            </a:r>
+            <a:r>
+              <a:rPr lang="en-US" b="1" dirty="0"/>
+              <a:t>Free Download for SQL Server Management Studio</a:t>
+            </a:r>
+            <a:r>
+              <a:rPr lang="ru-RU" b="1" dirty="0"/>
+              <a:t> (</a:t>
+            </a:r>
+            <a:r>
+              <a:rPr lang="en-US" b="1" dirty="0"/>
+              <a:t>SSMS</a:t>
+            </a:r>
+            <a:r>
+              <a:rPr lang="ru-RU" b="1" dirty="0"/>
+              <a:t>)</a:t>
+            </a:r>
+            <a:r>
+              <a:rPr lang="ru-RU" dirty="0"/>
+              <a:t>" (трябва да е </a:t>
+            </a:r>
+            <a:r>
+              <a:rPr lang="ru-RU" b="1" dirty="0"/>
+              <a:t>под</a:t>
+            </a:r>
+            <a:r>
+              <a:rPr lang="ru-RU" dirty="0"/>
+              <a:t> заглавието </a:t>
+            </a:r>
+            <a:r>
+              <a:rPr lang="bg-BG" dirty="0"/>
+              <a:t>"</a:t>
+            </a:r>
+            <a:r>
+              <a:rPr lang="en-US" b="1" dirty="0"/>
+              <a:t>Download SSMS</a:t>
+            </a:r>
+            <a:r>
+              <a:rPr lang="bg-BG" dirty="0"/>
+              <a:t>"</a:t>
+            </a:r>
+            <a:r>
+              <a:rPr lang="ru-RU" dirty="0"/>
+              <a:t>)</a:t>
+            </a:r>
+            <a:endParaRPr lang="en-US" dirty="0"/>
+          </a:p>
+          <a:p>
+            <a:endParaRPr lang="bg-BG" dirty="0"/>
           </a:p>
         </p:txBody>
       </p:sp>
@@ -9631,21 +10415,57 @@
           <a:lstStyle/>
           <a:p>
             <a:r>
-              <a:rPr lang="en-US" dirty="0">
-                <a:highlight>
-                  <a:srgbClr val="FFFF00"/>
-                </a:highlight>
-              </a:rPr>
-              <a:t>TODO: How to install SSMS</a:t>
-            </a:r>
-            <a:endParaRPr lang="bg-BG" dirty="0">
-              <a:highlight>
-                <a:srgbClr val="FFFF00"/>
-              </a:highlight>
-            </a:endParaRPr>
+              <a:rPr lang="bg-BG" dirty="0"/>
+              <a:t>Инсталация на </a:t>
+            </a:r>
+            <a:r>
+              <a:rPr lang="en-US" dirty="0"/>
+              <a:t>SSMS</a:t>
+            </a:r>
+            <a:r>
+              <a:rPr lang="bg-BG" dirty="0"/>
+              <a:t> (1)</a:t>
+            </a:r>
           </a:p>
         </p:txBody>
       </p:sp>
+      <p:pic>
+        <p:nvPicPr>
+          <p:cNvPr id="5" name="Picture 4" descr="A screen shot of a computer&#10;&#10;Description automatically generated">
+            <a:extLst>
+              <a:ext uri="{FF2B5EF4-FFF2-40B4-BE49-F238E27FC236}">
+                <a16:creationId xmlns:a16="http://schemas.microsoft.com/office/drawing/2014/main" id="{ED344CEB-0A38-4ED8-95CE-368CFAD2F4A1}"/>
+              </a:ext>
+            </a:extLst>
+          </p:cNvPr>
+          <p:cNvPicPr>
+            <a:picLocks noChangeAspect="1"/>
+          </p:cNvPicPr>
+          <p:nvPr/>
+        </p:nvPicPr>
+        <p:blipFill>
+          <a:blip r:embed="rId3"/>
+          <a:stretch>
+            <a:fillRect/>
+          </a:stretch>
+        </p:blipFill>
+        <p:spPr>
+          <a:xfrm>
+            <a:off x="1880015" y="4329000"/>
+            <a:ext cx="8431970" cy="1754270"/>
+          </a:xfrm>
+          <a:prstGeom prst="rect">
+            <a:avLst/>
+          </a:prstGeom>
+          <a:ln>
+            <a:solidFill>
+              <a:schemeClr val="bg1">
+                <a:lumMod val="75000"/>
+              </a:schemeClr>
+            </a:solidFill>
+          </a:ln>
+        </p:spPr>
+      </p:pic>
     </p:spTree>
     <p:extLst>
       <p:ext uri="{BB962C8B-B14F-4D97-AF65-F5344CB8AC3E}">
@@ -9664,10 +10484,427 @@
       <p:transition spd="slow" advClick="0" advTm="5000"/>
     </mc:Fallback>
   </mc:AlternateContent>
+  <p:timing>
+    <p:tnLst>
+      <p:par>
+        <p:cTn id="1" dur="indefinite" restart="never" nodeType="tmRoot">
+          <p:childTnLst>
+            <p:seq concurrent="1" nextAc="seek">
+              <p:cTn id="2" dur="indefinite" nodeType="mainSeq">
+                <p:childTnLst>
+                  <p:par>
+                    <p:cTn id="3" fill="hold">
+                      <p:stCondLst>
+                        <p:cond delay="indefinite"/>
+                      </p:stCondLst>
+                      <p:childTnLst>
+                        <p:par>
+                          <p:cTn id="4" fill="hold">
+                            <p:stCondLst>
+                              <p:cond delay="0"/>
+                            </p:stCondLst>
+                            <p:childTnLst>
+                              <p:par>
+                                <p:cTn id="5" presetID="1" presetClass="entr" presetSubtype="0" fill="hold" nodeType="clickEffect">
+                                  <p:stCondLst>
+                                    <p:cond delay="0"/>
+                                  </p:stCondLst>
+                                  <p:childTnLst>
+                                    <p:set>
+                                      <p:cBhvr>
+                                        <p:cTn id="6" dur="1" fill="hold">
+                                          <p:stCondLst>
+                                            <p:cond delay="0"/>
+                                          </p:stCondLst>
+                                        </p:cTn>
+                                        <p:tgtEl>
+                                          <p:spTgt spid="3">
+                                            <p:txEl>
+                                              <p:pRg st="1" end="1"/>
+                                            </p:txEl>
+                                          </p:spTgt>
+                                        </p:tgtEl>
+                                        <p:attrNameLst>
+                                          <p:attrName>style.visibility</p:attrName>
+                                        </p:attrNameLst>
+                                      </p:cBhvr>
+                                      <p:to>
+                                        <p:strVal val="visible"/>
+                                      </p:to>
+                                    </p:set>
+                                  </p:childTnLst>
+                                </p:cTn>
+                              </p:par>
+                              <p:par>
+                                <p:cTn id="7" presetID="1" presetClass="entr" presetSubtype="0" fill="hold" nodeType="withEffect">
+                                  <p:stCondLst>
+                                    <p:cond delay="0"/>
+                                  </p:stCondLst>
+                                  <p:childTnLst>
+                                    <p:set>
+                                      <p:cBhvr>
+                                        <p:cTn id="8" dur="1" fill="hold">
+                                          <p:stCondLst>
+                                            <p:cond delay="0"/>
+                                          </p:stCondLst>
+                                        </p:cTn>
+                                        <p:tgtEl>
+                                          <p:spTgt spid="5"/>
+                                        </p:tgtEl>
+                                        <p:attrNameLst>
+                                          <p:attrName>style.visibility</p:attrName>
+                                        </p:attrNameLst>
+                                      </p:cBhvr>
+                                      <p:to>
+                                        <p:strVal val="visible"/>
+                                      </p:to>
+                                    </p:set>
+                                  </p:childTnLst>
+                                </p:cTn>
+                              </p:par>
+                            </p:childTnLst>
+                          </p:cTn>
+                        </p:par>
+                      </p:childTnLst>
+                    </p:cTn>
+                  </p:par>
+                </p:childTnLst>
+              </p:cTn>
+              <p:prevCondLst>
+                <p:cond evt="onPrev" delay="0">
+                  <p:tgtEl>
+                    <p:sldTgt/>
+                  </p:tgtEl>
+                </p:cond>
+              </p:prevCondLst>
+              <p:nextCondLst>
+                <p:cond evt="onNext" delay="0">
+                  <p:tgtEl>
+                    <p:sldTgt/>
+                  </p:tgtEl>
+                </p:cond>
+              </p:nextCondLst>
+            </p:seq>
+          </p:childTnLst>
+        </p:cTn>
+      </p:par>
+    </p:tnLst>
+  </p:timing>
 </p:sld>
 </file>
 
 <file path=ppt/slides/slide18.xml><?xml version="1.0" encoding="utf-8"?>
+<p:sld xmlns:a="http://schemas.openxmlformats.org/drawingml/2006/main" xmlns:r="http://schemas.openxmlformats.org/officeDocument/2006/relationships" xmlns:p="http://schemas.openxmlformats.org/presentationml/2006/main">
+  <p:cSld>
+    <p:spTree>
+      <p:nvGrpSpPr>
+        <p:cNvPr id="1" name=""/>
+        <p:cNvGrpSpPr/>
+        <p:nvPr/>
+      </p:nvGrpSpPr>
+      <p:grpSpPr>
+        <a:xfrm>
+          <a:off x="0" y="0"/>
+          <a:ext cx="0" cy="0"/>
+          <a:chOff x="0" y="0"/>
+          <a:chExt cx="0" cy="0"/>
+        </a:xfrm>
+      </p:grpSpPr>
+      <p:sp>
+        <p:nvSpPr>
+          <p:cNvPr id="2" name="Slide Number Placeholder 1">
+            <a:extLst>
+              <a:ext uri="{FF2B5EF4-FFF2-40B4-BE49-F238E27FC236}">
+                <a16:creationId xmlns:a16="http://schemas.microsoft.com/office/drawing/2014/main" id="{3C3AA1D6-B2D9-CE68-6008-754F0EC34ADC}"/>
+              </a:ext>
+            </a:extLst>
+          </p:cNvPr>
+          <p:cNvSpPr>
+            <a:spLocks noGrp="1"/>
+          </p:cNvSpPr>
+          <p:nvPr>
+            <p:ph type="sldNum" sz="quarter" idx="5"/>
+          </p:nvPr>
+        </p:nvSpPr>
+        <p:spPr/>
+        <p:txBody>
+          <a:bodyPr/>
+          <a:lstStyle/>
+          <a:p>
+            <a:fld id="{2BF067CD-8E6B-4360-9AA8-C5DF2A48A6D1}" type="slidenum">
+              <a:rPr lang="en-US" noProof="0" smtClean="0"/>
+              <a:pPr/>
+              <a:t>18</a:t>
+            </a:fld>
+            <a:endParaRPr lang="en-US" noProof="0" dirty="0"/>
+          </a:p>
+        </p:txBody>
+      </p:sp>
+      <p:sp>
+        <p:nvSpPr>
+          <p:cNvPr id="3" name="Text Placeholder 2">
+            <a:extLst>
+              <a:ext uri="{FF2B5EF4-FFF2-40B4-BE49-F238E27FC236}">
+                <a16:creationId xmlns:a16="http://schemas.microsoft.com/office/drawing/2014/main" id="{23E2F6E2-5B0D-74BA-F46C-ED827719559B}"/>
+              </a:ext>
+            </a:extLst>
+          </p:cNvPr>
+          <p:cNvSpPr>
+            <a:spLocks noGrp="1"/>
+          </p:cNvSpPr>
+          <p:nvPr>
+            <p:ph type="body" sz="quarter" idx="10"/>
+          </p:nvPr>
+        </p:nvSpPr>
+        <p:spPr/>
+        <p:txBody>
+          <a:bodyPr/>
+          <a:lstStyle/>
+          <a:p>
+            <a:r>
+              <a:rPr lang="ru-RU" dirty="0"/>
+              <a:t>Отворете </a:t>
+            </a:r>
+            <a:r>
+              <a:rPr lang="ru-RU" b="1" dirty="0"/>
+              <a:t>изтегления</a:t>
+            </a:r>
+            <a:r>
+              <a:rPr lang="ru-RU" dirty="0"/>
+              <a:t> файл</a:t>
+            </a:r>
+            <a:r>
+              <a:rPr lang="en-US" dirty="0"/>
+              <a:t>. </a:t>
+            </a:r>
+            <a:r>
+              <a:rPr lang="en-US" dirty="0" err="1"/>
+              <a:t>Сега</a:t>
+            </a:r>
+            <a:r>
+              <a:rPr lang="en-US" dirty="0"/>
+              <a:t> </a:t>
+            </a:r>
+            <a:r>
+              <a:rPr lang="en-US" dirty="0" err="1"/>
+              <a:t>трябва</a:t>
+            </a:r>
+            <a:r>
+              <a:rPr lang="en-US" dirty="0"/>
+              <a:t> </a:t>
+            </a:r>
+            <a:r>
+              <a:rPr lang="en-US" dirty="0" err="1"/>
+              <a:t>да</a:t>
+            </a:r>
+            <a:r>
+              <a:rPr lang="en-US" dirty="0"/>
+              <a:t> </a:t>
+            </a:r>
+            <a:r>
+              <a:rPr lang="en-US" dirty="0" err="1"/>
+              <a:t>видите</a:t>
+            </a:r>
+            <a:r>
+              <a:rPr lang="en-US" dirty="0"/>
+              <a:t> </a:t>
+            </a:r>
+            <a:r>
+              <a:rPr lang="en-US" b="1" dirty="0" err="1">
+                <a:solidFill>
+                  <a:schemeClr val="bg1"/>
+                </a:solidFill>
+              </a:rPr>
+              <a:t>екрана</a:t>
+            </a:r>
+            <a:r>
+              <a:rPr lang="en-US" dirty="0"/>
+              <a:t> </a:t>
+            </a:r>
+            <a:r>
+              <a:rPr lang="en-US" dirty="0" err="1"/>
+              <a:t>за</a:t>
+            </a:r>
+            <a:r>
+              <a:rPr lang="en-US" dirty="0"/>
+              <a:t> </a:t>
+            </a:r>
+            <a:r>
+              <a:rPr lang="en-US" b="1" dirty="0" err="1">
+                <a:solidFill>
+                  <a:schemeClr val="bg1"/>
+                </a:solidFill>
+              </a:rPr>
+              <a:t>инсталиране</a:t>
+            </a:r>
+            <a:r>
+              <a:rPr lang="en-US" dirty="0"/>
+              <a:t> </a:t>
+            </a:r>
+            <a:r>
+              <a:rPr lang="en-US" dirty="0" err="1"/>
+              <a:t>на</a:t>
+            </a:r>
+            <a:r>
+              <a:rPr lang="en-US" dirty="0"/>
+              <a:t> </a:t>
+            </a:r>
+            <a:r>
+              <a:rPr lang="en-US" b="1" dirty="0"/>
+              <a:t>Microsoft SQL Server Management Studio</a:t>
+            </a:r>
+            <a:r>
+              <a:rPr lang="en-US" dirty="0"/>
+              <a:t> </a:t>
+            </a:r>
+            <a:r>
+              <a:rPr lang="en-US" b="1" dirty="0"/>
+              <a:t>with</a:t>
+            </a:r>
+            <a:r>
+              <a:rPr lang="en-US" dirty="0"/>
+              <a:t> </a:t>
+            </a:r>
+            <a:r>
+              <a:rPr lang="en-US" b="1" dirty="0"/>
+              <a:t>Azure Data Studio</a:t>
+            </a:r>
+            <a:r>
+              <a:rPr lang="en-US" dirty="0"/>
+              <a:t>:</a:t>
+            </a:r>
+            <a:endParaRPr lang="bg-BG" dirty="0"/>
+          </a:p>
+          <a:p>
+            <a:r>
+              <a:rPr lang="bg-BG" dirty="0"/>
+              <a:t>Натиснете </a:t>
+            </a:r>
+            <a:r>
+              <a:rPr lang="en-US" dirty="0"/>
+              <a:t>[</a:t>
+            </a:r>
+            <a:r>
+              <a:rPr lang="en-US" b="1" dirty="0"/>
+              <a:t>Install</a:t>
+            </a:r>
+            <a:r>
+              <a:rPr lang="en-US" dirty="0"/>
+              <a:t>]</a:t>
+            </a:r>
+          </a:p>
+          <a:p>
+            <a:endParaRPr lang="en-US" dirty="0"/>
+          </a:p>
+          <a:p>
+            <a:endParaRPr lang="en-US" dirty="0"/>
+          </a:p>
+        </p:txBody>
+      </p:sp>
+      <p:sp>
+        <p:nvSpPr>
+          <p:cNvPr id="4" name="Title 3">
+            <a:extLst>
+              <a:ext uri="{FF2B5EF4-FFF2-40B4-BE49-F238E27FC236}">
+                <a16:creationId xmlns:a16="http://schemas.microsoft.com/office/drawing/2014/main" id="{151EEFF8-2B22-740E-2639-6BC40813D177}"/>
+              </a:ext>
+            </a:extLst>
+          </p:cNvPr>
+          <p:cNvSpPr>
+            <a:spLocks noGrp="1"/>
+          </p:cNvSpPr>
+          <p:nvPr>
+            <p:ph type="title"/>
+          </p:nvPr>
+        </p:nvSpPr>
+        <p:spPr/>
+        <p:txBody>
+          <a:bodyPr/>
+          <a:lstStyle/>
+          <a:p>
+            <a:r>
+              <a:rPr lang="bg-BG" dirty="0"/>
+              <a:t>Инсталация на </a:t>
+            </a:r>
+            <a:r>
+              <a:rPr lang="en-US" dirty="0"/>
+              <a:t>SSMS</a:t>
+            </a:r>
+            <a:r>
+              <a:rPr lang="bg-BG" dirty="0"/>
+              <a:t> (2)</a:t>
+            </a:r>
+            <a:endParaRPr lang="en-US" dirty="0"/>
+          </a:p>
+        </p:txBody>
+      </p:sp>
+      <p:pic>
+        <p:nvPicPr>
+          <p:cNvPr id="5" name="Picture 4" descr="A screenshot of a computer&#10;&#10;Description automatically generated">
+            <a:extLst>
+              <a:ext uri="{FF2B5EF4-FFF2-40B4-BE49-F238E27FC236}">
+                <a16:creationId xmlns:a16="http://schemas.microsoft.com/office/drawing/2014/main" id="{1D1C6808-368C-B822-3020-DF8D77011B49}"/>
+              </a:ext>
+            </a:extLst>
+          </p:cNvPr>
+          <p:cNvPicPr>
+            <a:picLocks noChangeAspect="1"/>
+          </p:cNvPicPr>
+          <p:nvPr/>
+        </p:nvPicPr>
+        <p:blipFill>
+          <a:blip r:embed="rId3" cstate="print">
+            <a:extLst>
+              <a:ext uri="{28A0092B-C50C-407E-A947-70E740481C1C}">
+                <a14:useLocalDpi xmlns:a14="http://schemas.microsoft.com/office/drawing/2010/main" val="0"/>
+              </a:ext>
+            </a:extLst>
+          </a:blip>
+          <a:srcRect/>
+          <a:stretch>
+            <a:fillRect/>
+          </a:stretch>
+        </p:blipFill>
+        <p:spPr bwMode="auto">
+          <a:xfrm>
+            <a:off x="5969328" y="2620879"/>
+            <a:ext cx="4500000" cy="3886121"/>
+          </a:xfrm>
+          <a:prstGeom prst="rect">
+            <a:avLst/>
+          </a:prstGeom>
+          <a:noFill/>
+          <a:ln>
+            <a:solidFill>
+              <a:schemeClr val="bg1">
+                <a:lumMod val="75000"/>
+              </a:schemeClr>
+            </a:solidFill>
+          </a:ln>
+        </p:spPr>
+      </p:pic>
+    </p:spTree>
+    <p:extLst>
+      <p:ext uri="{BB962C8B-B14F-4D97-AF65-F5344CB8AC3E}">
+        <p14:creationId xmlns:p14="http://schemas.microsoft.com/office/powerpoint/2010/main" val="2782550842"/>
+      </p:ext>
+    </p:extLst>
+  </p:cSld>
+  <p:clrMapOvr>
+    <a:masterClrMapping/>
+  </p:clrMapOvr>
+  <mc:AlternateContent xmlns:mc="http://schemas.openxmlformats.org/markup-compatibility/2006" xmlns:p14="http://schemas.microsoft.com/office/powerpoint/2010/main">
+    <mc:Choice Requires="p14">
+      <p:transition spd="slow" p14:dur="2000" advClick="0" advTm="5000"/>
+    </mc:Choice>
+    <mc:Fallback xmlns="">
+      <p:transition spd="slow" advClick="0" advTm="5000"/>
+    </mc:Fallback>
+  </mc:AlternateContent>
+</p:sld>
+</file>
+
+<file path=ppt/slides/slide19.xml><?xml version="1.0" encoding="utf-8"?>
 <p:sld xmlns:a="http://schemas.openxmlformats.org/drawingml/2006/main" xmlns:r="http://schemas.openxmlformats.org/officeDocument/2006/relationships" xmlns:p="http://schemas.openxmlformats.org/presentationml/2006/main">
   <p:cSld>
     <p:spTree>
@@ -9814,7 +11051,7 @@
             <a:fld id="{2BF067CD-8E6B-4360-9AA8-C5DF2A48A6D1}" type="slidenum">
               <a:rPr lang="en-US" noProof="0" smtClean="0"/>
               <a:pPr/>
-              <a:t>18</a:t>
+              <a:t>19</a:t>
             </a:fld>
             <a:endParaRPr lang="en-US" noProof="0" dirty="0"/>
           </a:p>
@@ -9954,161 +11191,6 @@
       </p:par>
     </p:tnLst>
   </p:timing>
-</p:sld>
-</file>
-
-<file path=ppt/slides/slide19.xml><?xml version="1.0" encoding="utf-8"?>
-<p:sld xmlns:a="http://schemas.openxmlformats.org/drawingml/2006/main" xmlns:r="http://schemas.openxmlformats.org/officeDocument/2006/relationships" xmlns:p="http://schemas.openxmlformats.org/presentationml/2006/main">
-  <p:cSld>
-    <p:spTree>
-      <p:nvGrpSpPr>
-        <p:cNvPr id="1" name=""/>
-        <p:cNvGrpSpPr/>
-        <p:nvPr/>
-      </p:nvGrpSpPr>
-      <p:grpSpPr>
-        <a:xfrm>
-          <a:off x="0" y="0"/>
-          <a:ext cx="0" cy="0"/>
-          <a:chOff x="0" y="0"/>
-          <a:chExt cx="0" cy="0"/>
-        </a:xfrm>
-      </p:grpSpPr>
-      <p:pic>
-        <p:nvPicPr>
-          <p:cNvPr id="10242" name="Picture 2" descr="Ð¡Ð²ÑÑÐ·Ð°Ð½Ð¾ Ð¸Ð·Ð¾Ð±ÑÐ°Ð¶ÐµÐ½Ð¸Ðµ">
-            <a:extLst>
-              <a:ext uri="{FF2B5EF4-FFF2-40B4-BE49-F238E27FC236}">
-                <a16:creationId xmlns:a16="http://schemas.microsoft.com/office/drawing/2014/main" id="{46988513-1D55-4D43-8BD2-8B974E29494B}"/>
-              </a:ext>
-            </a:extLst>
-          </p:cNvPr>
-          <p:cNvPicPr>
-            <a:picLocks noChangeAspect="1" noChangeArrowheads="1"/>
-          </p:cNvPicPr>
-          <p:nvPr/>
-        </p:nvPicPr>
-        <p:blipFill>
-          <a:blip r:embed="rId2" cstate="print">
-            <a:extLst>
-              <a:ext uri="{28A0092B-C50C-407E-A947-70E740481C1C}">
-                <a14:useLocalDpi xmlns:a14="http://schemas.microsoft.com/office/drawing/2010/main" val="0"/>
-              </a:ext>
-            </a:extLst>
-          </a:blip>
-          <a:srcRect/>
-          <a:stretch>
-            <a:fillRect/>
-          </a:stretch>
-        </p:blipFill>
-        <p:spPr bwMode="auto">
-          <a:xfrm>
-            <a:off x="4670771" y="1428629"/>
-            <a:ext cx="3248025" cy="2438400"/>
-          </a:xfrm>
-          <a:prstGeom prst="rect">
-            <a:avLst/>
-          </a:prstGeom>
-          <a:noFill/>
-          <a:extLst>
-            <a:ext uri="{909E8E84-426E-40DD-AFC4-6F175D3DCCD1}">
-              <a14:hiddenFill xmlns:a14="http://schemas.microsoft.com/office/drawing/2010/main">
-                <a:solidFill>
-                  <a:srgbClr val="FFFFFF"/>
-                </a:solidFill>
-              </a14:hiddenFill>
-            </a:ext>
-          </a:extLst>
-        </p:spPr>
-      </p:pic>
-      <p:sp>
-        <p:nvSpPr>
-          <p:cNvPr id="3" name="Заглавие 2">
-            <a:extLst>
-              <a:ext uri="{FF2B5EF4-FFF2-40B4-BE49-F238E27FC236}">
-                <a16:creationId xmlns:a16="http://schemas.microsoft.com/office/drawing/2014/main" id="{9C446E2D-1FF1-C4E3-130A-59AAA669FD5E}"/>
-              </a:ext>
-            </a:extLst>
-          </p:cNvPr>
-          <p:cNvSpPr>
-            <a:spLocks noGrp="1"/>
-          </p:cNvSpPr>
-          <p:nvPr>
-            <p:ph type="title" sz="quarter" idx="10"/>
-          </p:nvPr>
-        </p:nvSpPr>
-        <p:spPr>
-          <a:xfrm>
-            <a:off x="381000" y="4704825"/>
-            <a:ext cx="11520000" cy="768084"/>
-          </a:xfrm>
-        </p:spPr>
-        <p:txBody>
-          <a:bodyPr/>
-          <a:lstStyle/>
-          <a:p>
-            <a:r>
-              <a:rPr lang="ru-RU" sz="4500" dirty="0"/>
-              <a:t>Работа с </a:t>
-            </a:r>
-            <a:r>
-              <a:rPr lang="bg-BG" sz="4500" dirty="0"/>
-              <a:t>таблици и </a:t>
-            </a:r>
-            <a:r>
-              <a:rPr lang="ru-RU" sz="4500" dirty="0"/>
-              <a:t>данни в MS SQL Server</a:t>
-            </a:r>
-            <a:endParaRPr lang="bg-BG" sz="4500" dirty="0"/>
-          </a:p>
-        </p:txBody>
-      </p:sp>
-      <p:sp>
-        <p:nvSpPr>
-          <p:cNvPr id="6" name="Подзаглавие 5">
-            <a:extLst>
-              <a:ext uri="{FF2B5EF4-FFF2-40B4-BE49-F238E27FC236}">
-                <a16:creationId xmlns:a16="http://schemas.microsoft.com/office/drawing/2014/main" id="{4FEEF286-3CA8-D1D2-713C-0C36FE833DBA}"/>
-              </a:ext>
-            </a:extLst>
-          </p:cNvPr>
-          <p:cNvSpPr>
-            <a:spLocks noGrp="1"/>
-          </p:cNvSpPr>
-          <p:nvPr>
-            <p:ph type="subTitle" sz="quarter" idx="11"/>
-          </p:nvPr>
-        </p:nvSpPr>
-        <p:spPr/>
-        <p:txBody>
-          <a:bodyPr/>
-          <a:lstStyle/>
-          <a:p>
-            <a:r>
-              <a:rPr lang="bg-BG" dirty="0"/>
-              <a:t>Добавяне, разглеждане и редактиране на данни</a:t>
-            </a:r>
-          </a:p>
-        </p:txBody>
-      </p:sp>
-    </p:spTree>
-    <p:extLst>
-      <p:ext uri="{BB962C8B-B14F-4D97-AF65-F5344CB8AC3E}">
-        <p14:creationId xmlns:p14="http://schemas.microsoft.com/office/powerpoint/2010/main" val="1807864910"/>
-      </p:ext>
-    </p:extLst>
-  </p:cSld>
-  <p:clrMapOvr>
-    <a:masterClrMapping/>
-  </p:clrMapOvr>
-  <mc:AlternateContent xmlns:mc="http://schemas.openxmlformats.org/markup-compatibility/2006" xmlns:p14="http://schemas.microsoft.com/office/powerpoint/2010/main">
-    <mc:Choice Requires="p14">
-      <p:transition spd="slow" p14:dur="2000" advClick="0" advTm="5000"/>
-    </mc:Choice>
-    <mc:Fallback xmlns="">
-      <p:transition spd="slow" advClick="0" advTm="5000"/>
-    </mc:Fallback>
-  </mc:AlternateContent>
 </p:sld>
 </file>
 
@@ -10605,12 +11687,59 @@
           <a:chExt cx="0" cy="0"/>
         </a:xfrm>
       </p:grpSpPr>
+      <p:pic>
+        <p:nvPicPr>
+          <p:cNvPr id="10242" name="Picture 2" descr="Ð¡Ð²ÑÑÐ·Ð°Ð½Ð¾ Ð¸Ð·Ð¾Ð±ÑÐ°Ð¶ÐµÐ½Ð¸Ðµ">
+            <a:extLst>
+              <a:ext uri="{FF2B5EF4-FFF2-40B4-BE49-F238E27FC236}">
+                <a16:creationId xmlns:a16="http://schemas.microsoft.com/office/drawing/2014/main" id="{46988513-1D55-4D43-8BD2-8B974E29494B}"/>
+              </a:ext>
+            </a:extLst>
+          </p:cNvPr>
+          <p:cNvPicPr>
+            <a:picLocks noChangeAspect="1" noChangeArrowheads="1"/>
+          </p:cNvPicPr>
+          <p:nvPr/>
+        </p:nvPicPr>
+        <p:blipFill>
+          <a:blip r:embed="rId2" cstate="print">
+            <a:extLst>
+              <a:ext uri="{28A0092B-C50C-407E-A947-70E740481C1C}">
+                <a14:useLocalDpi xmlns:a14="http://schemas.microsoft.com/office/drawing/2010/main" val="0"/>
+              </a:ext>
+            </a:extLst>
+          </a:blip>
+          <a:srcRect/>
+          <a:stretch>
+            <a:fillRect/>
+          </a:stretch>
+        </p:blipFill>
+        <p:spPr bwMode="auto">
+          <a:xfrm>
+            <a:off x="4670771" y="1428629"/>
+            <a:ext cx="3248025" cy="2438400"/>
+          </a:xfrm>
+          <a:prstGeom prst="rect">
+            <a:avLst/>
+          </a:prstGeom>
+          <a:noFill/>
+          <a:extLst>
+            <a:ext uri="{909E8E84-426E-40DD-AFC4-6F175D3DCCD1}">
+              <a14:hiddenFill xmlns:a14="http://schemas.microsoft.com/office/drawing/2010/main">
+                <a:solidFill>
+                  <a:srgbClr val="FFFFFF"/>
+                </a:solidFill>
+              </a14:hiddenFill>
+            </a:ext>
+          </a:extLst>
+        </p:spPr>
+      </p:pic>
       <p:sp>
         <p:nvSpPr>
-          <p:cNvPr id="5" name="Text Placeholder 4">
+          <p:cNvPr id="3" name="Заглавие 2">
             <a:extLst>
               <a:ext uri="{FF2B5EF4-FFF2-40B4-BE49-F238E27FC236}">
-                <a16:creationId xmlns:a16="http://schemas.microsoft.com/office/drawing/2014/main" id="{81979E28-BEDC-C6E3-40A5-B026D2838CAA}"/>
+                <a16:creationId xmlns:a16="http://schemas.microsoft.com/office/drawing/2014/main" id="{9C446E2D-1FF1-C4E3-130A-59AAA669FD5E}"/>
               </a:ext>
             </a:extLst>
           </p:cNvPr>
@@ -10618,24 +11747,41 @@
             <a:spLocks noGrp="1"/>
           </p:cNvSpPr>
           <p:nvPr>
-            <p:ph type="body" sz="quarter" idx="10"/>
+            <p:ph type="title" sz="quarter" idx="10"/>
           </p:nvPr>
         </p:nvSpPr>
-        <p:spPr/>
+        <p:spPr>
+          <a:xfrm>
+            <a:off x="381000" y="4704825"/>
+            <a:ext cx="11520000" cy="768084"/>
+          </a:xfrm>
+        </p:spPr>
         <p:txBody>
           <a:bodyPr/>
           <a:lstStyle/>
           <a:p>
-            <a:endParaRPr lang="bg-BG"/>
+            <a:r>
+              <a:rPr lang="ru-RU" sz="4500" dirty="0"/>
+              <a:t>Работа с </a:t>
+            </a:r>
+            <a:r>
+              <a:rPr lang="bg-BG" sz="4500" dirty="0"/>
+              <a:t>таблици и </a:t>
+            </a:r>
+            <a:r>
+              <a:rPr lang="ru-RU" sz="4500" dirty="0"/>
+              <a:t>данни в MS SQL Server</a:t>
+            </a:r>
+            <a:endParaRPr lang="bg-BG" sz="4500" dirty="0"/>
           </a:p>
         </p:txBody>
       </p:sp>
       <p:sp>
         <p:nvSpPr>
-          <p:cNvPr id="4" name="Title 3">
+          <p:cNvPr id="6" name="Подзаглавие 5">
             <a:extLst>
               <a:ext uri="{FF2B5EF4-FFF2-40B4-BE49-F238E27FC236}">
-                <a16:creationId xmlns:a16="http://schemas.microsoft.com/office/drawing/2014/main" id="{D64EE715-CE86-254F-40D0-54C014C32C2E}"/>
+                <a16:creationId xmlns:a16="http://schemas.microsoft.com/office/drawing/2014/main" id="{4FEEF286-3CA8-D1D2-713C-0C36FE833DBA}"/>
               </a:ext>
             </a:extLst>
           </p:cNvPr>
@@ -10643,7 +11789,7 @@
             <a:spLocks noGrp="1"/>
           </p:cNvSpPr>
           <p:nvPr>
-            <p:ph type="title"/>
+            <p:ph type="subTitle" sz="quarter" idx="11"/>
           </p:nvPr>
         </p:nvSpPr>
         <p:spPr/>
@@ -10652,25 +11798,16 @@
           <a:lstStyle/>
           <a:p>
             <a:r>
-              <a:rPr lang="en-US" dirty="0">
-                <a:highlight>
-                  <a:srgbClr val="FFFF00"/>
-                </a:highlight>
-              </a:rPr>
-              <a:t>TODO: How to create a DB through SSMS</a:t>
-            </a:r>
-            <a:endParaRPr lang="bg-BG" dirty="0">
-              <a:highlight>
-                <a:srgbClr val="FFFF00"/>
-              </a:highlight>
-            </a:endParaRPr>
+              <a:rPr lang="bg-BG" dirty="0"/>
+              <a:t>Добавяне, разглеждане и редактиране на данни</a:t>
+            </a:r>
           </a:p>
         </p:txBody>
       </p:sp>
     </p:spTree>
     <p:extLst>
       <p:ext uri="{BB962C8B-B14F-4D97-AF65-F5344CB8AC3E}">
-        <p14:creationId xmlns:p14="http://schemas.microsoft.com/office/powerpoint/2010/main" val="1009419672"/>
+        <p14:creationId xmlns:p14="http://schemas.microsoft.com/office/powerpoint/2010/main" val="1807864910"/>
       </p:ext>
     </p:extLst>
   </p:cSld>
@@ -10726,7 +11863,72 @@
           <a:bodyPr/>
           <a:lstStyle/>
           <a:p>
-            <a:endParaRPr lang="bg-BG"/>
+            <a:r>
+              <a:rPr lang="bg-BG" dirty="0"/>
+              <a:t>Натиснете </a:t>
+            </a:r>
+            <a:r>
+              <a:rPr lang="bg-BG" b="1" dirty="0"/>
+              <a:t>десен</a:t>
+            </a:r>
+            <a:r>
+              <a:rPr lang="bg-BG" dirty="0"/>
+              <a:t> </a:t>
+            </a:r>
+            <a:r>
+              <a:rPr lang="bg-BG" b="1" dirty="0"/>
+              <a:t>бутон</a:t>
+            </a:r>
+            <a:r>
+              <a:rPr lang="bg-BG" dirty="0"/>
+              <a:t> върху </a:t>
+            </a:r>
+            <a:r>
+              <a:rPr lang="en-US" b="1" dirty="0">
+                <a:latin typeface="Consolas" panose="020B0609020204030204" pitchFamily="49" charset="0"/>
+              </a:rPr>
+              <a:t>Databases</a:t>
+            </a:r>
+            <a:r>
+              <a:rPr lang="en-US" dirty="0"/>
+              <a:t> </a:t>
+            </a:r>
+            <a:r>
+              <a:rPr lang="bg-BG" dirty="0"/>
+              <a:t>и изберете </a:t>
+            </a:r>
+            <a:r>
+              <a:rPr lang="en-US" dirty="0"/>
+              <a:t>[</a:t>
+            </a:r>
+            <a:r>
+              <a:rPr lang="en-US" b="1" dirty="0">
+                <a:latin typeface="Consolas" panose="020B0609020204030204" pitchFamily="49" charset="0"/>
+              </a:rPr>
+              <a:t>New Database…</a:t>
+            </a:r>
+            <a:r>
+              <a:rPr lang="en-US" dirty="0"/>
+              <a:t>]</a:t>
+            </a:r>
+          </a:p>
+          <a:p>
+            <a:endParaRPr lang="en-US" dirty="0"/>
+          </a:p>
+          <a:p>
+            <a:endParaRPr lang="en-US" dirty="0"/>
+          </a:p>
+          <a:p>
+            <a:endParaRPr lang="en-US" dirty="0"/>
+          </a:p>
+          <a:p>
+            <a:endParaRPr lang="en-US" dirty="0"/>
+          </a:p>
+          <a:p>
+            <a:endParaRPr lang="en-US" dirty="0"/>
+          </a:p>
+          <a:p>
+            <a:endParaRPr lang="bg-BG" dirty="0"/>
           </a:p>
         </p:txBody>
       </p:sp>
@@ -10752,21 +11954,499 @@
           <a:lstStyle/>
           <a:p>
             <a:r>
-              <a:rPr lang="en-US" dirty="0">
-                <a:highlight>
-                  <a:srgbClr val="FFFF00"/>
-                </a:highlight>
-              </a:rPr>
-              <a:t>TODO: How to create a table through SSMS</a:t>
-            </a:r>
-            <a:endParaRPr lang="bg-BG" dirty="0">
-              <a:highlight>
-                <a:srgbClr val="FFFF00"/>
-              </a:highlight>
-            </a:endParaRPr>
+              <a:rPr lang="bg-BG" dirty="0"/>
+              <a:t>Създаване на база данни</a:t>
+            </a:r>
+            <a:r>
+              <a:rPr lang="en-US" dirty="0"/>
+              <a:t> (1)</a:t>
+            </a:r>
+            <a:endParaRPr lang="bg-BG" dirty="0"/>
           </a:p>
         </p:txBody>
       </p:sp>
+      <p:pic>
+        <p:nvPicPr>
+          <p:cNvPr id="2" name="Picture 1" descr="Graphical user interface, text, application&#10;&#10;Description automatically generated">
+            <a:extLst>
+              <a:ext uri="{FF2B5EF4-FFF2-40B4-BE49-F238E27FC236}">
+                <a16:creationId xmlns:a16="http://schemas.microsoft.com/office/drawing/2014/main" id="{FE4F9540-A48F-F86B-3D99-CEB4CED769E5}"/>
+              </a:ext>
+            </a:extLst>
+          </p:cNvPr>
+          <p:cNvPicPr>
+            <a:picLocks noChangeAspect="1"/>
+          </p:cNvPicPr>
+          <p:nvPr/>
+        </p:nvPicPr>
+        <p:blipFill>
+          <a:blip r:embed="rId3" cstate="print">
+            <a:extLst>
+              <a:ext uri="{28A0092B-C50C-407E-A947-70E740481C1C}">
+                <a14:useLocalDpi xmlns:a14="http://schemas.microsoft.com/office/drawing/2010/main" val="0"/>
+              </a:ext>
+            </a:extLst>
+          </a:blip>
+          <a:srcRect/>
+          <a:stretch>
+            <a:fillRect/>
+          </a:stretch>
+        </p:blipFill>
+        <p:spPr bwMode="auto">
+          <a:xfrm>
+            <a:off x="3701958" y="2889000"/>
+            <a:ext cx="4788084" cy="3105000"/>
+          </a:xfrm>
+          <a:prstGeom prst="rect">
+            <a:avLst/>
+          </a:prstGeom>
+          <a:noFill/>
+          <a:ln>
+            <a:solidFill>
+              <a:schemeClr val="bg1">
+                <a:lumMod val="75000"/>
+              </a:schemeClr>
+            </a:solidFill>
+          </a:ln>
+        </p:spPr>
+      </p:pic>
+    </p:spTree>
+    <p:extLst>
+      <p:ext uri="{BB962C8B-B14F-4D97-AF65-F5344CB8AC3E}">
+        <p14:creationId xmlns:p14="http://schemas.microsoft.com/office/powerpoint/2010/main" val="1009419672"/>
+      </p:ext>
+    </p:extLst>
+  </p:cSld>
+  <p:clrMapOvr>
+    <a:masterClrMapping/>
+  </p:clrMapOvr>
+  <mc:AlternateContent xmlns:mc="http://schemas.openxmlformats.org/markup-compatibility/2006" xmlns:p14="http://schemas.microsoft.com/office/powerpoint/2010/main">
+    <mc:Choice Requires="p14">
+      <p:transition spd="slow" p14:dur="2000" advClick="0" advTm="5000"/>
+    </mc:Choice>
+    <mc:Fallback xmlns="">
+      <p:transition spd="slow" advClick="0" advTm="5000"/>
+    </mc:Fallback>
+  </mc:AlternateContent>
+</p:sld>
+</file>
+
+<file path=ppt/slides/slide22.xml><?xml version="1.0" encoding="utf-8"?>
+<p:sld xmlns:a="http://schemas.openxmlformats.org/drawingml/2006/main" xmlns:r="http://schemas.openxmlformats.org/officeDocument/2006/relationships" xmlns:p="http://schemas.openxmlformats.org/presentationml/2006/main">
+  <p:cSld>
+    <p:spTree>
+      <p:nvGrpSpPr>
+        <p:cNvPr id="1" name=""/>
+        <p:cNvGrpSpPr/>
+        <p:nvPr/>
+      </p:nvGrpSpPr>
+      <p:grpSpPr>
+        <a:xfrm>
+          <a:off x="0" y="0"/>
+          <a:ext cx="0" cy="0"/>
+          <a:chOff x="0" y="0"/>
+          <a:chExt cx="0" cy="0"/>
+        </a:xfrm>
+      </p:grpSpPr>
+      <p:sp>
+        <p:nvSpPr>
+          <p:cNvPr id="2" name="Slide Number Placeholder 1">
+            <a:extLst>
+              <a:ext uri="{FF2B5EF4-FFF2-40B4-BE49-F238E27FC236}">
+                <a16:creationId xmlns:a16="http://schemas.microsoft.com/office/drawing/2014/main" id="{12EA5908-B60E-CCA7-20F7-64DF23E62B03}"/>
+              </a:ext>
+            </a:extLst>
+          </p:cNvPr>
+          <p:cNvSpPr>
+            <a:spLocks noGrp="1"/>
+          </p:cNvSpPr>
+          <p:nvPr>
+            <p:ph type="sldNum" sz="quarter" idx="5"/>
+          </p:nvPr>
+        </p:nvSpPr>
+        <p:spPr/>
+        <p:txBody>
+          <a:bodyPr/>
+          <a:lstStyle/>
+          <a:p>
+            <a:fld id="{2BF067CD-8E6B-4360-9AA8-C5DF2A48A6D1}" type="slidenum">
+              <a:rPr lang="en-US" noProof="0" smtClean="0"/>
+              <a:pPr/>
+              <a:t>22</a:t>
+            </a:fld>
+            <a:endParaRPr lang="en-US" noProof="0" dirty="0"/>
+          </a:p>
+        </p:txBody>
+      </p:sp>
+      <p:sp>
+        <p:nvSpPr>
+          <p:cNvPr id="3" name="Text Placeholder 2">
+            <a:extLst>
+              <a:ext uri="{FF2B5EF4-FFF2-40B4-BE49-F238E27FC236}">
+                <a16:creationId xmlns:a16="http://schemas.microsoft.com/office/drawing/2014/main" id="{E5C804C4-C482-0DC8-4690-993986072712}"/>
+              </a:ext>
+            </a:extLst>
+          </p:cNvPr>
+          <p:cNvSpPr>
+            <a:spLocks noGrp="1"/>
+          </p:cNvSpPr>
+          <p:nvPr>
+            <p:ph type="body" sz="quarter" idx="10"/>
+          </p:nvPr>
+        </p:nvSpPr>
+        <p:spPr/>
+        <p:txBody>
+          <a:bodyPr/>
+          <a:lstStyle/>
+          <a:p>
+            <a:r>
+              <a:rPr lang="bg-BG" dirty="0"/>
+              <a:t>Въведете </a:t>
+            </a:r>
+            <a:r>
+              <a:rPr lang="bg-BG" b="1" dirty="0"/>
+              <a:t>името</a:t>
+            </a:r>
+            <a:r>
+              <a:rPr lang="bg-BG" dirty="0"/>
+              <a:t> на базата данни и натиснете </a:t>
+            </a:r>
+            <a:r>
+              <a:rPr lang="ru-RU" dirty="0"/>
+              <a:t>[</a:t>
+            </a:r>
+            <a:r>
+              <a:rPr lang="bg-BG" b="1" dirty="0">
+                <a:latin typeface="Consolas" panose="020B0609020204030204" pitchFamily="49" charset="0"/>
+              </a:rPr>
+              <a:t>OK</a:t>
+            </a:r>
+            <a:r>
+              <a:rPr lang="ru-RU" dirty="0"/>
+              <a:t>]</a:t>
+            </a:r>
+            <a:r>
+              <a:rPr lang="bg-BG" dirty="0"/>
+              <a:t>. Това ще </a:t>
+            </a:r>
+            <a:r>
+              <a:rPr lang="bg-BG" b="1" dirty="0">
+                <a:solidFill>
+                  <a:schemeClr val="bg1"/>
+                </a:solidFill>
+              </a:rPr>
+              <a:t>създаде</a:t>
+            </a:r>
+            <a:r>
+              <a:rPr lang="bg-BG" dirty="0"/>
+              <a:t> вашата </a:t>
+            </a:r>
+            <a:r>
+              <a:rPr lang="bg-BG" b="1" dirty="0">
+                <a:solidFill>
+                  <a:schemeClr val="bg1"/>
+                </a:solidFill>
+              </a:rPr>
+              <a:t>база данни</a:t>
+            </a:r>
+            <a:endParaRPr lang="en-US" b="1" dirty="0">
+              <a:solidFill>
+                <a:schemeClr val="bg1"/>
+              </a:solidFill>
+            </a:endParaRPr>
+          </a:p>
+          <a:p>
+            <a:endParaRPr lang="en-US" dirty="0"/>
+          </a:p>
+        </p:txBody>
+      </p:sp>
+      <p:sp>
+        <p:nvSpPr>
+          <p:cNvPr id="4" name="Title 3">
+            <a:extLst>
+              <a:ext uri="{FF2B5EF4-FFF2-40B4-BE49-F238E27FC236}">
+                <a16:creationId xmlns:a16="http://schemas.microsoft.com/office/drawing/2014/main" id="{AAEA84F1-B32E-11CD-F7C4-3C4F0F63FA18}"/>
+              </a:ext>
+            </a:extLst>
+          </p:cNvPr>
+          <p:cNvSpPr>
+            <a:spLocks noGrp="1"/>
+          </p:cNvSpPr>
+          <p:nvPr>
+            <p:ph type="title"/>
+          </p:nvPr>
+        </p:nvSpPr>
+        <p:spPr/>
+        <p:txBody>
+          <a:bodyPr/>
+          <a:lstStyle/>
+          <a:p>
+            <a:r>
+              <a:rPr lang="bg-BG" dirty="0"/>
+              <a:t>Създаване на база данни</a:t>
+            </a:r>
+            <a:r>
+              <a:rPr lang="en-US" dirty="0"/>
+              <a:t> (2)</a:t>
+            </a:r>
+          </a:p>
+        </p:txBody>
+      </p:sp>
+      <p:pic>
+        <p:nvPicPr>
+          <p:cNvPr id="5" name="Picture 4">
+            <a:extLst>
+              <a:ext uri="{FF2B5EF4-FFF2-40B4-BE49-F238E27FC236}">
+                <a16:creationId xmlns:a16="http://schemas.microsoft.com/office/drawing/2014/main" id="{B2DCC8E3-2484-196A-C7AB-E4B12A0A021F}"/>
+              </a:ext>
+            </a:extLst>
+          </p:cNvPr>
+          <p:cNvPicPr>
+            <a:picLocks noChangeAspect="1"/>
+          </p:cNvPicPr>
+          <p:nvPr/>
+        </p:nvPicPr>
+        <p:blipFill>
+          <a:blip r:embed="rId2" cstate="print">
+            <a:extLst>
+              <a:ext uri="{28A0092B-C50C-407E-A947-70E740481C1C}">
+                <a14:useLocalDpi xmlns:a14="http://schemas.microsoft.com/office/drawing/2010/main" val="0"/>
+              </a:ext>
+            </a:extLst>
+          </a:blip>
+          <a:srcRect/>
+          <a:stretch>
+            <a:fillRect/>
+          </a:stretch>
+        </p:blipFill>
+        <p:spPr bwMode="auto">
+          <a:xfrm>
+            <a:off x="3828525" y="2439306"/>
+            <a:ext cx="4534950" cy="4083144"/>
+          </a:xfrm>
+          <a:prstGeom prst="rect">
+            <a:avLst/>
+          </a:prstGeom>
+          <a:noFill/>
+          <a:ln>
+            <a:solidFill>
+              <a:schemeClr val="bg2">
+                <a:lumMod val="75000"/>
+              </a:schemeClr>
+            </a:solidFill>
+          </a:ln>
+        </p:spPr>
+      </p:pic>
+    </p:spTree>
+    <p:extLst>
+      <p:ext uri="{BB962C8B-B14F-4D97-AF65-F5344CB8AC3E}">
+        <p14:creationId xmlns:p14="http://schemas.microsoft.com/office/powerpoint/2010/main" val="3387155494"/>
+      </p:ext>
+    </p:extLst>
+  </p:cSld>
+  <p:clrMapOvr>
+    <a:masterClrMapping/>
+  </p:clrMapOvr>
+  <mc:AlternateContent xmlns:mc="http://schemas.openxmlformats.org/markup-compatibility/2006" xmlns:p14="http://schemas.microsoft.com/office/powerpoint/2010/main">
+    <mc:Choice Requires="p14">
+      <p:transition spd="slow" p14:dur="2000" advClick="0" advTm="5000"/>
+    </mc:Choice>
+    <mc:Fallback xmlns="">
+      <p:transition spd="slow" advClick="0" advTm="5000"/>
+    </mc:Fallback>
+  </mc:AlternateContent>
+</p:sld>
+</file>
+
+<file path=ppt/slides/slide23.xml><?xml version="1.0" encoding="utf-8"?>
+<p:sld xmlns:a="http://schemas.openxmlformats.org/drawingml/2006/main" xmlns:r="http://schemas.openxmlformats.org/officeDocument/2006/relationships" xmlns:p="http://schemas.openxmlformats.org/presentationml/2006/main">
+  <p:cSld>
+    <p:spTree>
+      <p:nvGrpSpPr>
+        <p:cNvPr id="1" name=""/>
+        <p:cNvGrpSpPr/>
+        <p:nvPr/>
+      </p:nvGrpSpPr>
+      <p:grpSpPr>
+        <a:xfrm>
+          <a:off x="0" y="0"/>
+          <a:ext cx="0" cy="0"/>
+          <a:chOff x="0" y="0"/>
+          <a:chExt cx="0" cy="0"/>
+        </a:xfrm>
+      </p:grpSpPr>
+      <p:sp>
+        <p:nvSpPr>
+          <p:cNvPr id="5" name="Text Placeholder 4">
+            <a:extLst>
+              <a:ext uri="{FF2B5EF4-FFF2-40B4-BE49-F238E27FC236}">
+                <a16:creationId xmlns:a16="http://schemas.microsoft.com/office/drawing/2014/main" id="{81979E28-BEDC-C6E3-40A5-B026D2838CAA}"/>
+              </a:ext>
+            </a:extLst>
+          </p:cNvPr>
+          <p:cNvSpPr>
+            <a:spLocks noGrp="1"/>
+          </p:cNvSpPr>
+          <p:nvPr>
+            <p:ph type="body" sz="quarter" idx="10"/>
+          </p:nvPr>
+        </p:nvSpPr>
+        <p:spPr/>
+        <p:txBody>
+          <a:bodyPr/>
+          <a:lstStyle/>
+          <a:p>
+            <a:r>
+              <a:rPr lang="bg-BG" dirty="0"/>
+              <a:t>Натиснете върху </a:t>
+            </a:r>
+            <a:r>
+              <a:rPr lang="en-US" dirty="0"/>
+              <a:t>[</a:t>
+            </a:r>
+            <a:r>
+              <a:rPr lang="en-US" b="1" dirty="0">
+                <a:latin typeface="Consolas" panose="020B0609020204030204" pitchFamily="49" charset="0"/>
+              </a:rPr>
+              <a:t>+</a:t>
+            </a:r>
+            <a:r>
+              <a:rPr lang="en-US" dirty="0"/>
+              <a:t>] </a:t>
+            </a:r>
+            <a:r>
+              <a:rPr lang="bg-BG" dirty="0"/>
+              <a:t>до името на базата данни, която се визуализира в листа с бази данни</a:t>
+            </a:r>
+            <a:endParaRPr lang="en-US" dirty="0"/>
+          </a:p>
+          <a:p>
+            <a:r>
+              <a:rPr lang="bg-BG" dirty="0"/>
+              <a:t>Натиснете с </a:t>
+            </a:r>
+            <a:r>
+              <a:rPr lang="bg-BG" b="1" dirty="0"/>
+              <a:t>десен бутон </a:t>
+            </a:r>
+            <a:r>
+              <a:rPr lang="bg-BG" dirty="0"/>
+              <a:t>върху </a:t>
+            </a:r>
+            <a:r>
+              <a:rPr lang="en-US" dirty="0"/>
+              <a:t>Tables </a:t>
+            </a:r>
+            <a:r>
+              <a:rPr lang="bg-BG" dirty="0"/>
+              <a:t>и изберете</a:t>
+            </a:r>
+            <a:r>
+              <a:rPr lang="en-US" dirty="0"/>
+              <a:t> [</a:t>
+            </a:r>
+            <a:r>
+              <a:rPr lang="en-US" b="1" dirty="0">
+                <a:latin typeface="Consolas" panose="020B0609020204030204" pitchFamily="49" charset="0"/>
+              </a:rPr>
+              <a:t>New</a:t>
+            </a:r>
+            <a:r>
+              <a:rPr lang="en-US" dirty="0"/>
+              <a:t>] -&gt;</a:t>
+            </a:r>
+            <a:r>
+              <a:rPr lang="bg-BG" dirty="0"/>
+              <a:t> </a:t>
+            </a:r>
+            <a:r>
+              <a:rPr lang="en-US" dirty="0"/>
+              <a:t>[</a:t>
+            </a:r>
+            <a:r>
+              <a:rPr lang="en-US" b="1" dirty="0">
+                <a:latin typeface="Consolas" panose="020B0609020204030204" pitchFamily="49" charset="0"/>
+              </a:rPr>
+              <a:t>Table…</a:t>
+            </a:r>
+            <a:r>
+              <a:rPr lang="en-US" dirty="0"/>
+              <a:t>]</a:t>
+            </a:r>
+            <a:endParaRPr lang="bg-BG" dirty="0"/>
+          </a:p>
+        </p:txBody>
+      </p:sp>
+      <p:sp>
+        <p:nvSpPr>
+          <p:cNvPr id="4" name="Title 3">
+            <a:extLst>
+              <a:ext uri="{FF2B5EF4-FFF2-40B4-BE49-F238E27FC236}">
+                <a16:creationId xmlns:a16="http://schemas.microsoft.com/office/drawing/2014/main" id="{D64EE715-CE86-254F-40D0-54C014C32C2E}"/>
+              </a:ext>
+            </a:extLst>
+          </p:cNvPr>
+          <p:cNvSpPr>
+            <a:spLocks noGrp="1"/>
+          </p:cNvSpPr>
+          <p:nvPr>
+            <p:ph type="title"/>
+          </p:nvPr>
+        </p:nvSpPr>
+        <p:spPr/>
+        <p:txBody>
+          <a:bodyPr/>
+          <a:lstStyle/>
+          <a:p>
+            <a:r>
+              <a:rPr lang="bg-BG" dirty="0"/>
+              <a:t>Създаване на таблица</a:t>
+            </a:r>
+            <a:r>
+              <a:rPr lang="en-US" dirty="0"/>
+              <a:t> (1)</a:t>
+            </a:r>
+            <a:endParaRPr lang="bg-BG" dirty="0"/>
+          </a:p>
+        </p:txBody>
+      </p:sp>
+      <p:pic>
+        <p:nvPicPr>
+          <p:cNvPr id="6" name="Picture 5">
+            <a:extLst>
+              <a:ext uri="{FF2B5EF4-FFF2-40B4-BE49-F238E27FC236}">
+                <a16:creationId xmlns:a16="http://schemas.microsoft.com/office/drawing/2014/main" id="{9183BBCB-CB93-6695-9D6F-47E99FCB0357}"/>
+              </a:ext>
+            </a:extLst>
+          </p:cNvPr>
+          <p:cNvPicPr>
+            <a:picLocks noChangeAspect="1"/>
+          </p:cNvPicPr>
+          <p:nvPr/>
+        </p:nvPicPr>
+        <p:blipFill>
+          <a:blip r:embed="rId2"/>
+          <a:stretch>
+            <a:fillRect/>
+          </a:stretch>
+        </p:blipFill>
+        <p:spPr>
+          <a:xfrm>
+            <a:off x="3531000" y="3807746"/>
+            <a:ext cx="4486901" cy="1867161"/>
+          </a:xfrm>
+          <a:prstGeom prst="rect">
+            <a:avLst/>
+          </a:prstGeom>
+          <a:ln>
+            <a:solidFill>
+              <a:schemeClr val="bg2">
+                <a:lumMod val="75000"/>
+              </a:schemeClr>
+            </a:solidFill>
+          </a:ln>
+        </p:spPr>
+      </p:pic>
     </p:spTree>
     <p:extLst>
       <p:ext uri="{BB962C8B-B14F-4D97-AF65-F5344CB8AC3E}">
@@ -10777,18 +12457,551 @@
   <p:clrMapOvr>
     <a:masterClrMapping/>
   </p:clrMapOvr>
-  <mc:AlternateContent xmlns:mc="http://schemas.openxmlformats.org/markup-compatibility/2006">
-    <mc:Choice xmlns:p14="http://schemas.microsoft.com/office/powerpoint/2010/main" Requires="p14">
+  <mc:AlternateContent xmlns:mc="http://schemas.openxmlformats.org/markup-compatibility/2006" xmlns:p14="http://schemas.microsoft.com/office/powerpoint/2010/main">
+    <mc:Choice Requires="p14">
       <p:transition spd="slow" p14:dur="2000" advClick="0" advTm="5000"/>
     </mc:Choice>
-    <mc:Fallback>
+    <mc:Fallback xmlns="">
       <p:transition spd="slow" advClick="0" advTm="5000"/>
     </mc:Fallback>
   </mc:AlternateContent>
+  <p:timing>
+    <p:tnLst>
+      <p:par>
+        <p:cTn id="1" dur="indefinite" restart="never" nodeType="tmRoot">
+          <p:childTnLst>
+            <p:seq concurrent="1" nextAc="seek">
+              <p:cTn id="2" dur="indefinite" nodeType="mainSeq">
+                <p:childTnLst>
+                  <p:par>
+                    <p:cTn id="3" fill="hold">
+                      <p:stCondLst>
+                        <p:cond delay="indefinite"/>
+                      </p:stCondLst>
+                      <p:childTnLst>
+                        <p:par>
+                          <p:cTn id="4" fill="hold">
+                            <p:stCondLst>
+                              <p:cond delay="0"/>
+                            </p:stCondLst>
+                            <p:childTnLst>
+                              <p:par>
+                                <p:cTn id="5" presetID="1" presetClass="entr" presetSubtype="0" fill="hold" nodeType="clickEffect">
+                                  <p:stCondLst>
+                                    <p:cond delay="0"/>
+                                  </p:stCondLst>
+                                  <p:childTnLst>
+                                    <p:set>
+                                      <p:cBhvr>
+                                        <p:cTn id="6" dur="1" fill="hold">
+                                          <p:stCondLst>
+                                            <p:cond delay="0"/>
+                                          </p:stCondLst>
+                                        </p:cTn>
+                                        <p:tgtEl>
+                                          <p:spTgt spid="5">
+                                            <p:txEl>
+                                              <p:pRg st="1" end="1"/>
+                                            </p:txEl>
+                                          </p:spTgt>
+                                        </p:tgtEl>
+                                        <p:attrNameLst>
+                                          <p:attrName>style.visibility</p:attrName>
+                                        </p:attrNameLst>
+                                      </p:cBhvr>
+                                      <p:to>
+                                        <p:strVal val="visible"/>
+                                      </p:to>
+                                    </p:set>
+                                  </p:childTnLst>
+                                </p:cTn>
+                              </p:par>
+                              <p:par>
+                                <p:cTn id="7" presetID="1" presetClass="entr" presetSubtype="0" fill="hold" nodeType="withEffect">
+                                  <p:stCondLst>
+                                    <p:cond delay="0"/>
+                                  </p:stCondLst>
+                                  <p:childTnLst>
+                                    <p:set>
+                                      <p:cBhvr>
+                                        <p:cTn id="8" dur="1" fill="hold">
+                                          <p:stCondLst>
+                                            <p:cond delay="0"/>
+                                          </p:stCondLst>
+                                        </p:cTn>
+                                        <p:tgtEl>
+                                          <p:spTgt spid="6"/>
+                                        </p:tgtEl>
+                                        <p:attrNameLst>
+                                          <p:attrName>style.visibility</p:attrName>
+                                        </p:attrNameLst>
+                                      </p:cBhvr>
+                                      <p:to>
+                                        <p:strVal val="visible"/>
+                                      </p:to>
+                                    </p:set>
+                                  </p:childTnLst>
+                                </p:cTn>
+                              </p:par>
+                            </p:childTnLst>
+                          </p:cTn>
+                        </p:par>
+                      </p:childTnLst>
+                    </p:cTn>
+                  </p:par>
+                </p:childTnLst>
+              </p:cTn>
+              <p:prevCondLst>
+                <p:cond evt="onPrev" delay="0">
+                  <p:tgtEl>
+                    <p:sldTgt/>
+                  </p:tgtEl>
+                </p:cond>
+              </p:prevCondLst>
+              <p:nextCondLst>
+                <p:cond evt="onNext" delay="0">
+                  <p:tgtEl>
+                    <p:sldTgt/>
+                  </p:tgtEl>
+                </p:cond>
+              </p:nextCondLst>
+            </p:seq>
+          </p:childTnLst>
+        </p:cTn>
+      </p:par>
+    </p:tnLst>
+  </p:timing>
 </p:sld>
 </file>
 
-<file path=ppt/slides/slide22.xml><?xml version="1.0" encoding="utf-8"?>
+<file path=ppt/slides/slide24.xml><?xml version="1.0" encoding="utf-8"?>
+<p:sld xmlns:a="http://schemas.openxmlformats.org/drawingml/2006/main" xmlns:r="http://schemas.openxmlformats.org/officeDocument/2006/relationships" xmlns:p="http://schemas.openxmlformats.org/presentationml/2006/main">
+  <p:cSld>
+    <p:spTree>
+      <p:nvGrpSpPr>
+        <p:cNvPr id="1" name=""/>
+        <p:cNvGrpSpPr/>
+        <p:nvPr/>
+      </p:nvGrpSpPr>
+      <p:grpSpPr>
+        <a:xfrm>
+          <a:off x="0" y="0"/>
+          <a:ext cx="0" cy="0"/>
+          <a:chOff x="0" y="0"/>
+          <a:chExt cx="0" cy="0"/>
+        </a:xfrm>
+      </p:grpSpPr>
+      <p:sp>
+        <p:nvSpPr>
+          <p:cNvPr id="2" name="Slide Number Placeholder 1">
+            <a:extLst>
+              <a:ext uri="{FF2B5EF4-FFF2-40B4-BE49-F238E27FC236}">
+                <a16:creationId xmlns:a16="http://schemas.microsoft.com/office/drawing/2014/main" id="{E1E6F4EC-680B-E0A2-7C9C-EBCC0873ED75}"/>
+              </a:ext>
+            </a:extLst>
+          </p:cNvPr>
+          <p:cNvSpPr>
+            <a:spLocks noGrp="1"/>
+          </p:cNvSpPr>
+          <p:nvPr>
+            <p:ph type="sldNum" sz="quarter" idx="5"/>
+          </p:nvPr>
+        </p:nvSpPr>
+        <p:spPr/>
+        <p:txBody>
+          <a:bodyPr/>
+          <a:lstStyle/>
+          <a:p>
+            <a:fld id="{2BF067CD-8E6B-4360-9AA8-C5DF2A48A6D1}" type="slidenum">
+              <a:rPr lang="en-US" noProof="0" smtClean="0"/>
+              <a:pPr/>
+              <a:t>24</a:t>
+            </a:fld>
+            <a:endParaRPr lang="en-US" noProof="0" dirty="0"/>
+          </a:p>
+        </p:txBody>
+      </p:sp>
+      <p:sp>
+        <p:nvSpPr>
+          <p:cNvPr id="3" name="Text Placeholder 2">
+            <a:extLst>
+              <a:ext uri="{FF2B5EF4-FFF2-40B4-BE49-F238E27FC236}">
+                <a16:creationId xmlns:a16="http://schemas.microsoft.com/office/drawing/2014/main" id="{A9CEF402-8C74-A96D-47A1-63147DE41021}"/>
+              </a:ext>
+            </a:extLst>
+          </p:cNvPr>
+          <p:cNvSpPr>
+            <a:spLocks noGrp="1"/>
+          </p:cNvSpPr>
+          <p:nvPr>
+            <p:ph type="body" sz="quarter" idx="10"/>
+          </p:nvPr>
+        </p:nvSpPr>
+        <p:spPr/>
+        <p:txBody>
+          <a:bodyPr/>
+          <a:lstStyle/>
+          <a:p>
+            <a:r>
+              <a:rPr lang="bg-BG" dirty="0"/>
+              <a:t>Създайте </a:t>
+            </a:r>
+            <a:r>
+              <a:rPr lang="bg-BG" b="1" dirty="0">
+                <a:solidFill>
+                  <a:schemeClr val="bg1"/>
+                </a:solidFill>
+              </a:rPr>
+              <a:t>колони</a:t>
+            </a:r>
+            <a:r>
+              <a:rPr lang="bg-BG" dirty="0"/>
+              <a:t> и им задайте </a:t>
+            </a:r>
+            <a:r>
+              <a:rPr lang="bg-BG" b="1" dirty="0">
+                <a:solidFill>
+                  <a:schemeClr val="bg1"/>
+                </a:solidFill>
+              </a:rPr>
+              <a:t>тип</a:t>
+            </a:r>
+            <a:r>
+              <a:rPr lang="bg-BG" dirty="0"/>
+              <a:t> на </a:t>
+            </a:r>
+            <a:r>
+              <a:rPr lang="bg-BG" b="1" dirty="0">
+                <a:solidFill>
+                  <a:schemeClr val="bg1"/>
+                </a:solidFill>
+              </a:rPr>
+              <a:t>данните</a:t>
+            </a:r>
+            <a:endParaRPr lang="en-US" b="1" dirty="0">
+              <a:solidFill>
+                <a:schemeClr val="bg1"/>
+              </a:solidFill>
+            </a:endParaRPr>
+          </a:p>
+          <a:p>
+            <a:endParaRPr lang="en-US" b="1" dirty="0">
+              <a:solidFill>
+                <a:schemeClr val="bg1"/>
+              </a:solidFill>
+            </a:endParaRPr>
+          </a:p>
+          <a:p>
+            <a:endParaRPr lang="en-US" b="1" dirty="0">
+              <a:solidFill>
+                <a:schemeClr val="bg1"/>
+              </a:solidFill>
+            </a:endParaRPr>
+          </a:p>
+          <a:p>
+            <a:endParaRPr lang="en-US" b="1" dirty="0">
+              <a:solidFill>
+                <a:schemeClr val="bg1"/>
+              </a:solidFill>
+            </a:endParaRPr>
+          </a:p>
+          <a:p>
+            <a:pPr>
+              <a:buClr>
+                <a:schemeClr val="tx1"/>
+              </a:buClr>
+            </a:pPr>
+            <a:r>
+              <a:rPr lang="bg-BG" dirty="0"/>
+              <a:t>Натиснете </a:t>
+            </a:r>
+            <a:r>
+              <a:rPr lang="en-US" b="1" dirty="0"/>
+              <a:t>Ctrl</a:t>
+            </a:r>
+            <a:r>
+              <a:rPr lang="ru-RU" b="1" dirty="0"/>
+              <a:t> + </a:t>
+            </a:r>
+            <a:r>
+              <a:rPr lang="en-US" b="1" dirty="0"/>
+              <a:t>S </a:t>
+            </a:r>
+            <a:r>
+              <a:rPr lang="bg-BG" dirty="0"/>
+              <a:t>и задайте име на таблицата. Натиснете </a:t>
+            </a:r>
+            <a:r>
+              <a:rPr lang="en-US" dirty="0"/>
+              <a:t>[</a:t>
+            </a:r>
+            <a:r>
+              <a:rPr lang="en-US" b="1" dirty="0">
+                <a:latin typeface="Consolas" panose="020B0609020204030204" pitchFamily="49" charset="0"/>
+              </a:rPr>
+              <a:t>OK</a:t>
+            </a:r>
+            <a:r>
+              <a:rPr lang="en-US" dirty="0"/>
+              <a:t>]</a:t>
+            </a:r>
+          </a:p>
+          <a:p>
+            <a:pPr>
+              <a:buClr>
+                <a:schemeClr val="tx1"/>
+              </a:buClr>
+            </a:pPr>
+            <a:endParaRPr lang="en-US" b="1" dirty="0">
+              <a:solidFill>
+                <a:schemeClr val="bg1"/>
+              </a:solidFill>
+            </a:endParaRPr>
+          </a:p>
+        </p:txBody>
+      </p:sp>
+      <p:sp>
+        <p:nvSpPr>
+          <p:cNvPr id="4" name="Title 3">
+            <a:extLst>
+              <a:ext uri="{FF2B5EF4-FFF2-40B4-BE49-F238E27FC236}">
+                <a16:creationId xmlns:a16="http://schemas.microsoft.com/office/drawing/2014/main" id="{0EEFD29A-ED48-09DF-CBB6-101521CEE227}"/>
+              </a:ext>
+            </a:extLst>
+          </p:cNvPr>
+          <p:cNvSpPr>
+            <a:spLocks noGrp="1"/>
+          </p:cNvSpPr>
+          <p:nvPr>
+            <p:ph type="title"/>
+          </p:nvPr>
+        </p:nvSpPr>
+        <p:spPr/>
+        <p:txBody>
+          <a:bodyPr/>
+          <a:lstStyle/>
+          <a:p>
+            <a:r>
+              <a:rPr lang="bg-BG" dirty="0"/>
+              <a:t>Създаване на таблица</a:t>
+            </a:r>
+            <a:r>
+              <a:rPr lang="en-US" dirty="0"/>
+              <a:t> (2)</a:t>
+            </a:r>
+          </a:p>
+        </p:txBody>
+      </p:sp>
+      <p:pic>
+        <p:nvPicPr>
+          <p:cNvPr id="5" name="Picture 4" descr="Graphical user interface, table&#10;&#10;Description automatically generated">
+            <a:extLst>
+              <a:ext uri="{FF2B5EF4-FFF2-40B4-BE49-F238E27FC236}">
+                <a16:creationId xmlns:a16="http://schemas.microsoft.com/office/drawing/2014/main" id="{225EA626-1E9D-3B38-C4F2-7EEF6BB149D3}"/>
+              </a:ext>
+            </a:extLst>
+          </p:cNvPr>
+          <p:cNvPicPr>
+            <a:picLocks noChangeAspect="1"/>
+          </p:cNvPicPr>
+          <p:nvPr/>
+        </p:nvPicPr>
+        <p:blipFill>
+          <a:blip r:embed="rId2" cstate="print">
+            <a:extLst>
+              <a:ext uri="{28A0092B-C50C-407E-A947-70E740481C1C}">
+                <a14:useLocalDpi xmlns:a14="http://schemas.microsoft.com/office/drawing/2010/main" val="0"/>
+              </a:ext>
+            </a:extLst>
+          </a:blip>
+          <a:srcRect/>
+          <a:stretch>
+            <a:fillRect/>
+          </a:stretch>
+        </p:blipFill>
+        <p:spPr bwMode="auto">
+          <a:xfrm>
+            <a:off x="3823500" y="2214000"/>
+            <a:ext cx="4545000" cy="1665000"/>
+          </a:xfrm>
+          <a:prstGeom prst="rect">
+            <a:avLst/>
+          </a:prstGeom>
+          <a:noFill/>
+          <a:ln>
+            <a:solidFill>
+              <a:schemeClr val="bg2">
+                <a:lumMod val="75000"/>
+              </a:schemeClr>
+            </a:solidFill>
+          </a:ln>
+        </p:spPr>
+      </p:pic>
+      <p:pic>
+        <p:nvPicPr>
+          <p:cNvPr id="8" name="Picture 7" descr="A screenshot of a computer&#10;&#10;Description automatically generated">
+            <a:extLst>
+              <a:ext uri="{FF2B5EF4-FFF2-40B4-BE49-F238E27FC236}">
+                <a16:creationId xmlns:a16="http://schemas.microsoft.com/office/drawing/2014/main" id="{49E1BE6E-1D59-F1EE-784E-19D63543F954}"/>
+              </a:ext>
+            </a:extLst>
+          </p:cNvPr>
+          <p:cNvPicPr>
+            <a:picLocks noChangeAspect="1"/>
+          </p:cNvPicPr>
+          <p:nvPr/>
+        </p:nvPicPr>
+        <p:blipFill>
+          <a:blip r:embed="rId3"/>
+          <a:stretch>
+            <a:fillRect/>
+          </a:stretch>
+        </p:blipFill>
+        <p:spPr>
+          <a:xfrm>
+            <a:off x="4848823" y="4896875"/>
+            <a:ext cx="2494354" cy="1502125"/>
+          </a:xfrm>
+          <a:prstGeom prst="rect">
+            <a:avLst/>
+          </a:prstGeom>
+          <a:ln>
+            <a:solidFill>
+              <a:schemeClr val="bg2">
+                <a:lumMod val="75000"/>
+              </a:schemeClr>
+            </a:solidFill>
+          </a:ln>
+        </p:spPr>
+      </p:pic>
+    </p:spTree>
+    <p:extLst>
+      <p:ext uri="{BB962C8B-B14F-4D97-AF65-F5344CB8AC3E}">
+        <p14:creationId xmlns:p14="http://schemas.microsoft.com/office/powerpoint/2010/main" val="828165436"/>
+      </p:ext>
+    </p:extLst>
+  </p:cSld>
+  <p:clrMapOvr>
+    <a:masterClrMapping/>
+  </p:clrMapOvr>
+  <mc:AlternateContent xmlns:mc="http://schemas.openxmlformats.org/markup-compatibility/2006" xmlns:p14="http://schemas.microsoft.com/office/powerpoint/2010/main">
+    <mc:Choice Requires="p14">
+      <p:transition spd="slow" p14:dur="2000" advClick="0" advTm="5000"/>
+    </mc:Choice>
+    <mc:Fallback xmlns="">
+      <p:transition spd="slow" advClick="0" advTm="5000"/>
+    </mc:Fallback>
+  </mc:AlternateContent>
+  <p:timing>
+    <p:tnLst>
+      <p:par>
+        <p:cTn id="1" dur="indefinite" restart="never" nodeType="tmRoot">
+          <p:childTnLst>
+            <p:seq concurrent="1" nextAc="seek">
+              <p:cTn id="2" dur="indefinite" nodeType="mainSeq">
+                <p:childTnLst>
+                  <p:par>
+                    <p:cTn id="3" fill="hold">
+                      <p:stCondLst>
+                        <p:cond delay="indefinite"/>
+                      </p:stCondLst>
+                      <p:childTnLst>
+                        <p:par>
+                          <p:cTn id="4" fill="hold">
+                            <p:stCondLst>
+                              <p:cond delay="0"/>
+                            </p:stCondLst>
+                            <p:childTnLst>
+                              <p:par>
+                                <p:cTn id="5" presetID="1" presetClass="entr" presetSubtype="0" fill="hold" nodeType="clickEffect">
+                                  <p:stCondLst>
+                                    <p:cond delay="0"/>
+                                  </p:stCondLst>
+                                  <p:childTnLst>
+                                    <p:set>
+                                      <p:cBhvr>
+                                        <p:cTn id="6" dur="1" fill="hold">
+                                          <p:stCondLst>
+                                            <p:cond delay="0"/>
+                                          </p:stCondLst>
+                                        </p:cTn>
+                                        <p:tgtEl>
+                                          <p:spTgt spid="3">
+                                            <p:txEl>
+                                              <p:pRg st="4" end="4"/>
+                                            </p:txEl>
+                                          </p:spTgt>
+                                        </p:tgtEl>
+                                        <p:attrNameLst>
+                                          <p:attrName>style.visibility</p:attrName>
+                                        </p:attrNameLst>
+                                      </p:cBhvr>
+                                      <p:to>
+                                        <p:strVal val="visible"/>
+                                      </p:to>
+                                    </p:set>
+                                  </p:childTnLst>
+                                </p:cTn>
+                              </p:par>
+                              <p:par>
+                                <p:cTn id="7" presetID="1" presetClass="entr" presetSubtype="0" fill="hold" nodeType="withEffect">
+                                  <p:stCondLst>
+                                    <p:cond delay="0"/>
+                                  </p:stCondLst>
+                                  <p:childTnLst>
+                                    <p:set>
+                                      <p:cBhvr>
+                                        <p:cTn id="8" dur="1" fill="hold">
+                                          <p:stCondLst>
+                                            <p:cond delay="0"/>
+                                          </p:stCondLst>
+                                        </p:cTn>
+                                        <p:tgtEl>
+                                          <p:spTgt spid="8"/>
+                                        </p:tgtEl>
+                                        <p:attrNameLst>
+                                          <p:attrName>style.visibility</p:attrName>
+                                        </p:attrNameLst>
+                                      </p:cBhvr>
+                                      <p:to>
+                                        <p:strVal val="visible"/>
+                                      </p:to>
+                                    </p:set>
+                                  </p:childTnLst>
+                                </p:cTn>
+                              </p:par>
+                            </p:childTnLst>
+                          </p:cTn>
+                        </p:par>
+                      </p:childTnLst>
+                    </p:cTn>
+                  </p:par>
+                </p:childTnLst>
+              </p:cTn>
+              <p:prevCondLst>
+                <p:cond evt="onPrev" delay="0">
+                  <p:tgtEl>
+                    <p:sldTgt/>
+                  </p:tgtEl>
+                </p:cond>
+              </p:prevCondLst>
+              <p:nextCondLst>
+                <p:cond evt="onNext" delay="0">
+                  <p:tgtEl>
+                    <p:sldTgt/>
+                  </p:tgtEl>
+                </p:cond>
+              </p:nextCondLst>
+            </p:seq>
+          </p:childTnLst>
+        </p:cTn>
+      </p:par>
+    </p:tnLst>
+  </p:timing>
+</p:sld>
+</file>
+
+<file path=ppt/slides/slide25.xml><?xml version="1.0" encoding="utf-8"?>
 <p:sld xmlns:a="http://schemas.openxmlformats.org/drawingml/2006/main" xmlns:r="http://schemas.openxmlformats.org/officeDocument/2006/relationships" xmlns:p="http://schemas.openxmlformats.org/presentationml/2006/main">
   <p:cSld>
     <p:spTree>
@@ -11176,7 +13389,7 @@
             <a:fld id="{2BF067CD-8E6B-4360-9AA8-C5DF2A48A6D1}" type="slidenum">
               <a:rPr lang="en-US" noProof="0" smtClean="0"/>
               <a:pPr/>
-              <a:t>22</a:t>
+              <a:t>25</a:t>
             </a:fld>
             <a:endParaRPr lang="en-US" noProof="0" dirty="0"/>
           </a:p>
@@ -11448,7 +13661,7 @@
 </p:sld>
 </file>
 
-<file path=ppt/slides/slide23.xml><?xml version="1.0" encoding="utf-8"?>
+<file path=ppt/slides/slide26.xml><?xml version="1.0" encoding="utf-8"?>
 <p:sld xmlns:a="http://schemas.openxmlformats.org/drawingml/2006/main" xmlns:r="http://schemas.openxmlformats.org/officeDocument/2006/relationships" xmlns:p="http://schemas.openxmlformats.org/presentationml/2006/main">
   <p:cSld>
     <p:spTree>
@@ -11747,7 +13960,7 @@
             <a:fld id="{2BF067CD-8E6B-4360-9AA8-C5DF2A48A6D1}" type="slidenum">
               <a:rPr lang="en-US" noProof="0" smtClean="0"/>
               <a:pPr/>
-              <a:t>23</a:t>
+              <a:t>26</a:t>
             </a:fld>
             <a:endParaRPr lang="en-US" noProof="0" dirty="0"/>
           </a:p>
@@ -12233,7 +14446,7 @@
 </p:sld>
 </file>
 
-<file path=ppt/slides/slide24.xml><?xml version="1.0" encoding="utf-8"?>
+<file path=ppt/slides/slide27.xml><?xml version="1.0" encoding="utf-8"?>
 <p:sld xmlns:a="http://schemas.openxmlformats.org/drawingml/2006/main" xmlns:r="http://schemas.openxmlformats.org/officeDocument/2006/relationships" xmlns:p="http://schemas.openxmlformats.org/presentationml/2006/main">
   <p:cSld>
     <p:spTree>
@@ -12604,7 +14817,7 @@
             <a:fld id="{2BF067CD-8E6B-4360-9AA8-C5DF2A48A6D1}" type="slidenum">
               <a:rPr lang="en-US" noProof="0" smtClean="0"/>
               <a:pPr/>
-              <a:t>24</a:t>
+              <a:t>27</a:t>
             </a:fld>
             <a:endParaRPr lang="en-US" noProof="0" dirty="0"/>
           </a:p>
@@ -12858,7 +15071,7 @@
 </p:sld>
 </file>
 
-<file path=ppt/slides/slide25.xml><?xml version="1.0" encoding="utf-8"?>
+<file path=ppt/slides/slide28.xml><?xml version="1.0" encoding="utf-8"?>
 <p:sld xmlns:a="http://schemas.openxmlformats.org/drawingml/2006/main" xmlns:r="http://schemas.openxmlformats.org/officeDocument/2006/relationships" xmlns:p="http://schemas.openxmlformats.org/presentationml/2006/main">
   <p:cSld>
     <p:spTree>
@@ -12899,7 +15112,7 @@
             <a:fld id="{2BF067CD-8E6B-4360-9AA8-C5DF2A48A6D1}" type="slidenum">
               <a:rPr lang="en-US" noProof="0" smtClean="0"/>
               <a:pPr/>
-              <a:t>25</a:t>
+              <a:t>28</a:t>
             </a:fld>
             <a:endParaRPr lang="en-US" noProof="0" dirty="0"/>
           </a:p>
@@ -13766,7 +15979,7 @@
 </p:sld>
 </file>
 
-<file path=ppt/slides/slide26.xml><?xml version="1.0" encoding="utf-8"?>
+<file path=ppt/slides/slide29.xml><?xml version="1.0" encoding="utf-8"?>
 <p:sld xmlns:a="http://schemas.openxmlformats.org/drawingml/2006/main" xmlns:r="http://schemas.openxmlformats.org/officeDocument/2006/relationships" xmlns:p="http://schemas.openxmlformats.org/presentationml/2006/main">
   <p:cSld>
     <p:spTree>
@@ -13895,7 +16108,166 @@
 </p:sld>
 </file>
 
-<file path=ppt/slides/slide27.xml><?xml version="1.0" encoding="utf-8"?>
+<file path=ppt/slides/slide3.xml><?xml version="1.0" encoding="utf-8"?>
+<p:sld xmlns:a="http://schemas.openxmlformats.org/drawingml/2006/main" xmlns:r="http://schemas.openxmlformats.org/officeDocument/2006/relationships" xmlns:p="http://schemas.openxmlformats.org/presentationml/2006/main">
+  <p:cSld>
+    <p:spTree>
+      <p:nvGrpSpPr>
+        <p:cNvPr id="1" name=""/>
+        <p:cNvGrpSpPr/>
+        <p:nvPr/>
+      </p:nvGrpSpPr>
+      <p:grpSpPr>
+        <a:xfrm>
+          <a:off x="0" y="0"/>
+          <a:ext cx="0" cy="0"/>
+          <a:chOff x="0" y="0"/>
+          <a:chExt cx="0" cy="0"/>
+        </a:xfrm>
+      </p:grpSpPr>
+      <p:pic>
+        <p:nvPicPr>
+          <p:cNvPr id="6" name="Picture 4" descr="Ð ÐµÐ·ÑÐ»ÑÐ°Ñ Ñ Ð¸Ð·Ð¾Ð±ÑÐ°Ð¶ÐµÐ½Ð¸Ðµ Ð·Ð° sql server express png">
+            <a:extLst>
+              <a:ext uri="{FF2B5EF4-FFF2-40B4-BE49-F238E27FC236}">
+                <a16:creationId xmlns:a16="http://schemas.microsoft.com/office/drawing/2014/main" id="{ABA81264-79EA-4C61-B859-F609E78C6876}"/>
+              </a:ext>
+            </a:extLst>
+          </p:cNvPr>
+          <p:cNvPicPr>
+            <a:picLocks noChangeAspect="1" noChangeArrowheads="1"/>
+          </p:cNvPicPr>
+          <p:nvPr/>
+        </p:nvPicPr>
+        <p:blipFill>
+          <a:blip r:embed="rId2" cstate="print">
+            <a:extLst>
+              <a:ext uri="{28A0092B-C50C-407E-A947-70E740481C1C}">
+                <a14:useLocalDpi xmlns:a14="http://schemas.microsoft.com/office/drawing/2010/main" val="0"/>
+              </a:ext>
+            </a:extLst>
+          </a:blip>
+          <a:srcRect/>
+          <a:stretch>
+            <a:fillRect/>
+          </a:stretch>
+        </p:blipFill>
+        <p:spPr bwMode="auto">
+          <a:xfrm>
+            <a:off x="4675658" y="1384495"/>
+            <a:ext cx="2840683" cy="2305483"/>
+          </a:xfrm>
+          <a:prstGeom prst="rect">
+            <a:avLst/>
+          </a:prstGeom>
+          <a:noFill/>
+          <a:extLst>
+            <a:ext uri="{909E8E84-426E-40DD-AFC4-6F175D3DCCD1}">
+              <a14:hiddenFill xmlns:a14="http://schemas.microsoft.com/office/drawing/2010/main">
+                <a:solidFill>
+                  <a:srgbClr val="FFFFFF"/>
+                </a:solidFill>
+              </a14:hiddenFill>
+            </a:ext>
+          </a:extLst>
+        </p:spPr>
+      </p:pic>
+      <p:sp>
+        <p:nvSpPr>
+          <p:cNvPr id="5" name="Подзаглавие 4">
+            <a:extLst>
+              <a:ext uri="{FF2B5EF4-FFF2-40B4-BE49-F238E27FC236}">
+                <a16:creationId xmlns:a16="http://schemas.microsoft.com/office/drawing/2014/main" id="{8AE6A1FD-951B-BB4F-EC39-C1D0F100F2CE}"/>
+              </a:ext>
+            </a:extLst>
+          </p:cNvPr>
+          <p:cNvSpPr>
+            <a:spLocks noGrp="1"/>
+          </p:cNvSpPr>
+          <p:nvPr>
+            <p:ph type="subTitle" sz="quarter" idx="11"/>
+          </p:nvPr>
+        </p:nvSpPr>
+        <p:spPr/>
+        <p:txBody>
+          <a:bodyPr/>
+          <a:lstStyle/>
+          <a:p>
+            <a:r>
+              <a:rPr lang="bg-BG" dirty="0"/>
+              <a:t>Същност и архитектура</a:t>
+            </a:r>
+          </a:p>
+        </p:txBody>
+      </p:sp>
+      <p:sp>
+        <p:nvSpPr>
+          <p:cNvPr id="8" name="Заглавие 7">
+            <a:extLst>
+              <a:ext uri="{FF2B5EF4-FFF2-40B4-BE49-F238E27FC236}">
+                <a16:creationId xmlns:a16="http://schemas.microsoft.com/office/drawing/2014/main" id="{28CC101B-D563-EFCE-ADE9-2241D6CCD10D}"/>
+              </a:ext>
+            </a:extLst>
+          </p:cNvPr>
+          <p:cNvSpPr>
+            <a:spLocks noGrp="1"/>
+          </p:cNvSpPr>
+          <p:nvPr>
+            <p:ph type="title" sz="quarter" idx="10"/>
+          </p:nvPr>
+        </p:nvSpPr>
+        <p:spPr>
+          <a:xfrm>
+            <a:off x="615109" y="4730916"/>
+            <a:ext cx="10961783" cy="768084"/>
+          </a:xfrm>
+        </p:spPr>
+        <p:txBody>
+          <a:bodyPr/>
+          <a:lstStyle/>
+          <a:p>
+            <a:r>
+              <a:rPr lang="bg-BG" dirty="0"/>
+              <a:t>Запознаване с </a:t>
+            </a:r>
+            <a:r>
+              <a:rPr lang="en-US" dirty="0"/>
+              <a:t>SQL Server</a:t>
+            </a:r>
+            <a:r>
+              <a:rPr lang="bg-BG" dirty="0"/>
+              <a:t> и</a:t>
+            </a:r>
+            <a:r>
+              <a:rPr lang="en-US" dirty="0"/>
+              <a:t> LocalDB</a:t>
+            </a:r>
+            <a:endParaRPr lang="bg-BG" dirty="0"/>
+          </a:p>
+        </p:txBody>
+      </p:sp>
+    </p:spTree>
+    <p:extLst>
+      <p:ext uri="{BB962C8B-B14F-4D97-AF65-F5344CB8AC3E}">
+        <p14:creationId xmlns:p14="http://schemas.microsoft.com/office/powerpoint/2010/main" val="1198903873"/>
+      </p:ext>
+    </p:extLst>
+  </p:cSld>
+  <p:clrMapOvr>
+    <a:masterClrMapping/>
+  </p:clrMapOvr>
+  <mc:AlternateContent xmlns:mc="http://schemas.openxmlformats.org/markup-compatibility/2006" xmlns:p14="http://schemas.microsoft.com/office/powerpoint/2010/main">
+    <mc:Choice Requires="p14">
+      <p:transition spd="slow" p14:dur="2000" advClick="0" advTm="5000"/>
+    </mc:Choice>
+    <mc:Fallback xmlns="">
+      <p:transition spd="slow" advClick="0" advTm="5000"/>
+    </mc:Fallback>
+  </mc:AlternateContent>
+</p:sld>
+</file>
+
+<file path=ppt/slides/slide30.xml><?xml version="1.0" encoding="utf-8"?>
 <p:sld xmlns:a="http://schemas.openxmlformats.org/drawingml/2006/main" xmlns:r="http://schemas.openxmlformats.org/officeDocument/2006/relationships" xmlns:p="http://schemas.openxmlformats.org/presentationml/2006/main">
   <p:cSld>
     <p:spTree>
@@ -14152,7 +16524,7 @@
             <a:fld id="{2BF067CD-8E6B-4360-9AA8-C5DF2A48A6D1}" type="slidenum">
               <a:rPr lang="en-US" noProof="0" smtClean="0"/>
               <a:pPr/>
-              <a:t>27</a:t>
+              <a:t>30</a:t>
             </a:fld>
             <a:endParaRPr lang="en-US" noProof="0" dirty="0"/>
           </a:p>
@@ -14356,7 +16728,7 @@
 </p:sld>
 </file>
 
-<file path=ppt/slides/slide28.xml><?xml version="1.0" encoding="utf-8"?>
+<file path=ppt/slides/slide31.xml><?xml version="1.0" encoding="utf-8"?>
 <p:sld xmlns:a="http://schemas.openxmlformats.org/drawingml/2006/main" xmlns:r="http://schemas.openxmlformats.org/officeDocument/2006/relationships" xmlns:p="http://schemas.openxmlformats.org/presentationml/2006/main">
   <p:cSld>
     <p:spTree>
@@ -15593,7 +17965,7 @@
             <a:fld id="{2BF067CD-8E6B-4360-9AA8-C5DF2A48A6D1}" type="slidenum">
               <a:rPr lang="en-US" noProof="0" smtClean="0"/>
               <a:pPr/>
-              <a:t>28</a:t>
+              <a:t>31</a:t>
             </a:fld>
             <a:endParaRPr lang="en-US" noProof="0" dirty="0"/>
           </a:p>
@@ -16290,7 +18662,7 @@
 </p:sld>
 </file>
 
-<file path=ppt/slides/slide29.xml><?xml version="1.0" encoding="utf-8"?>
+<file path=ppt/slides/slide32.xml><?xml version="1.0" encoding="utf-8"?>
 <p:sld xmlns:a="http://schemas.openxmlformats.org/drawingml/2006/main" xmlns:r="http://schemas.openxmlformats.org/officeDocument/2006/relationships" xmlns:p="http://schemas.openxmlformats.org/presentationml/2006/main">
   <p:cSld>
     <p:spTree>
@@ -16774,7 +19146,7 @@
             <a:fld id="{2BF067CD-8E6B-4360-9AA8-C5DF2A48A6D1}" type="slidenum">
               <a:rPr lang="en-US" noProof="0" smtClean="0"/>
               <a:pPr/>
-              <a:t>29</a:t>
+              <a:t>32</a:t>
             </a:fld>
             <a:endParaRPr lang="en-US" noProof="0" dirty="0"/>
           </a:p>
@@ -17054,166 +19426,7 @@
 </p:sld>
 </file>
 
-<file path=ppt/slides/slide3.xml><?xml version="1.0" encoding="utf-8"?>
-<p:sld xmlns:a="http://schemas.openxmlformats.org/drawingml/2006/main" xmlns:r="http://schemas.openxmlformats.org/officeDocument/2006/relationships" xmlns:p="http://schemas.openxmlformats.org/presentationml/2006/main">
-  <p:cSld>
-    <p:spTree>
-      <p:nvGrpSpPr>
-        <p:cNvPr id="1" name=""/>
-        <p:cNvGrpSpPr/>
-        <p:nvPr/>
-      </p:nvGrpSpPr>
-      <p:grpSpPr>
-        <a:xfrm>
-          <a:off x="0" y="0"/>
-          <a:ext cx="0" cy="0"/>
-          <a:chOff x="0" y="0"/>
-          <a:chExt cx="0" cy="0"/>
-        </a:xfrm>
-      </p:grpSpPr>
-      <p:pic>
-        <p:nvPicPr>
-          <p:cNvPr id="6" name="Picture 4" descr="Ð ÐµÐ·ÑÐ»ÑÐ°Ñ Ñ Ð¸Ð·Ð¾Ð±ÑÐ°Ð¶ÐµÐ½Ð¸Ðµ Ð·Ð° sql server express png">
-            <a:extLst>
-              <a:ext uri="{FF2B5EF4-FFF2-40B4-BE49-F238E27FC236}">
-                <a16:creationId xmlns:a16="http://schemas.microsoft.com/office/drawing/2014/main" id="{ABA81264-79EA-4C61-B859-F609E78C6876}"/>
-              </a:ext>
-            </a:extLst>
-          </p:cNvPr>
-          <p:cNvPicPr>
-            <a:picLocks noChangeAspect="1" noChangeArrowheads="1"/>
-          </p:cNvPicPr>
-          <p:nvPr/>
-        </p:nvPicPr>
-        <p:blipFill>
-          <a:blip r:embed="rId2" cstate="print">
-            <a:extLst>
-              <a:ext uri="{28A0092B-C50C-407E-A947-70E740481C1C}">
-                <a14:useLocalDpi xmlns:a14="http://schemas.microsoft.com/office/drawing/2010/main" val="0"/>
-              </a:ext>
-            </a:extLst>
-          </a:blip>
-          <a:srcRect/>
-          <a:stretch>
-            <a:fillRect/>
-          </a:stretch>
-        </p:blipFill>
-        <p:spPr bwMode="auto">
-          <a:xfrm>
-            <a:off x="4675658" y="1384495"/>
-            <a:ext cx="2840683" cy="2305483"/>
-          </a:xfrm>
-          <a:prstGeom prst="rect">
-            <a:avLst/>
-          </a:prstGeom>
-          <a:noFill/>
-          <a:extLst>
-            <a:ext uri="{909E8E84-426E-40DD-AFC4-6F175D3DCCD1}">
-              <a14:hiddenFill xmlns:a14="http://schemas.microsoft.com/office/drawing/2010/main">
-                <a:solidFill>
-                  <a:srgbClr val="FFFFFF"/>
-                </a:solidFill>
-              </a14:hiddenFill>
-            </a:ext>
-          </a:extLst>
-        </p:spPr>
-      </p:pic>
-      <p:sp>
-        <p:nvSpPr>
-          <p:cNvPr id="5" name="Подзаглавие 4">
-            <a:extLst>
-              <a:ext uri="{FF2B5EF4-FFF2-40B4-BE49-F238E27FC236}">
-                <a16:creationId xmlns:a16="http://schemas.microsoft.com/office/drawing/2014/main" id="{8AE6A1FD-951B-BB4F-EC39-C1D0F100F2CE}"/>
-              </a:ext>
-            </a:extLst>
-          </p:cNvPr>
-          <p:cNvSpPr>
-            <a:spLocks noGrp="1"/>
-          </p:cNvSpPr>
-          <p:nvPr>
-            <p:ph type="subTitle" sz="quarter" idx="11"/>
-          </p:nvPr>
-        </p:nvSpPr>
-        <p:spPr/>
-        <p:txBody>
-          <a:bodyPr/>
-          <a:lstStyle/>
-          <a:p>
-            <a:r>
-              <a:rPr lang="bg-BG" dirty="0"/>
-              <a:t>Същност и архитектура</a:t>
-            </a:r>
-          </a:p>
-        </p:txBody>
-      </p:sp>
-      <p:sp>
-        <p:nvSpPr>
-          <p:cNvPr id="8" name="Заглавие 7">
-            <a:extLst>
-              <a:ext uri="{FF2B5EF4-FFF2-40B4-BE49-F238E27FC236}">
-                <a16:creationId xmlns:a16="http://schemas.microsoft.com/office/drawing/2014/main" id="{28CC101B-D563-EFCE-ADE9-2241D6CCD10D}"/>
-              </a:ext>
-            </a:extLst>
-          </p:cNvPr>
-          <p:cNvSpPr>
-            <a:spLocks noGrp="1"/>
-          </p:cNvSpPr>
-          <p:nvPr>
-            <p:ph type="title" sz="quarter" idx="10"/>
-          </p:nvPr>
-        </p:nvSpPr>
-        <p:spPr>
-          <a:xfrm>
-            <a:off x="615109" y="4730916"/>
-            <a:ext cx="10961783" cy="768084"/>
-          </a:xfrm>
-        </p:spPr>
-        <p:txBody>
-          <a:bodyPr/>
-          <a:lstStyle/>
-          <a:p>
-            <a:r>
-              <a:rPr lang="bg-BG" dirty="0"/>
-              <a:t>Запознаване с </a:t>
-            </a:r>
-            <a:r>
-              <a:rPr lang="en-US" dirty="0"/>
-              <a:t>SQL Server</a:t>
-            </a:r>
-            <a:r>
-              <a:rPr lang="bg-BG" dirty="0"/>
-              <a:t> и</a:t>
-            </a:r>
-            <a:r>
-              <a:rPr lang="en-US" dirty="0"/>
-              <a:t> LocalDB</a:t>
-            </a:r>
-            <a:endParaRPr lang="bg-BG" dirty="0"/>
-          </a:p>
-        </p:txBody>
-      </p:sp>
-    </p:spTree>
-    <p:extLst>
-      <p:ext uri="{BB962C8B-B14F-4D97-AF65-F5344CB8AC3E}">
-        <p14:creationId xmlns:p14="http://schemas.microsoft.com/office/powerpoint/2010/main" val="1198903873"/>
-      </p:ext>
-    </p:extLst>
-  </p:cSld>
-  <p:clrMapOvr>
-    <a:masterClrMapping/>
-  </p:clrMapOvr>
-  <mc:AlternateContent xmlns:mc="http://schemas.openxmlformats.org/markup-compatibility/2006" xmlns:p14="http://schemas.microsoft.com/office/powerpoint/2010/main">
-    <mc:Choice Requires="p14">
-      <p:transition spd="slow" p14:dur="2000" advClick="0" advTm="5000"/>
-    </mc:Choice>
-    <mc:Fallback xmlns="">
-      <p:transition spd="slow" advClick="0" advTm="5000"/>
-    </mc:Fallback>
-  </mc:AlternateContent>
-</p:sld>
-</file>
-
-<file path=ppt/slides/slide30.xml><?xml version="1.0" encoding="utf-8"?>
+<file path=ppt/slides/slide33.xml><?xml version="1.0" encoding="utf-8"?>
 <p:sld xmlns:a="http://schemas.openxmlformats.org/drawingml/2006/main" xmlns:r="http://schemas.openxmlformats.org/officeDocument/2006/relationships" xmlns:p="http://schemas.openxmlformats.org/presentationml/2006/main">
   <p:cSld>
     <p:spTree>
@@ -17804,7 +20017,7 @@
             <a:fld id="{2BF067CD-8E6B-4360-9AA8-C5DF2A48A6D1}" type="slidenum">
               <a:rPr lang="en-US" noProof="0" smtClean="0"/>
               <a:pPr/>
-              <a:t>30</a:t>
+              <a:t>33</a:t>
             </a:fld>
             <a:endParaRPr lang="en-US" noProof="0" dirty="0"/>
           </a:p>
@@ -18171,7 +20384,7 @@
 </p:sld>
 </file>
 
-<file path=ppt/slides/slide31.xml><?xml version="1.0" encoding="utf-8"?>
+<file path=ppt/slides/slide34.xml><?xml version="1.0" encoding="utf-8"?>
 <p:sld xmlns:a="http://schemas.openxmlformats.org/drawingml/2006/main" xmlns:r="http://schemas.openxmlformats.org/officeDocument/2006/relationships" xmlns:p="http://schemas.openxmlformats.org/presentationml/2006/main">
   <p:cSld>
     <p:spTree>
@@ -18384,7 +20597,7 @@
             <a:fld id="{2BF067CD-8E6B-4360-9AA8-C5DF2A48A6D1}" type="slidenum">
               <a:rPr lang="en-US" noProof="0" smtClean="0"/>
               <a:pPr/>
-              <a:t>31</a:t>
+              <a:t>34</a:t>
             </a:fld>
             <a:endParaRPr lang="en-US" noProof="0" dirty="0"/>
           </a:p>
@@ -18588,7 +20801,7 @@
 </p:sld>
 </file>
 
-<file path=ppt/slides/slide32.xml><?xml version="1.0" encoding="utf-8"?>
+<file path=ppt/slides/slide35.xml><?xml version="1.0" encoding="utf-8"?>
 <p:sld xmlns:a="http://schemas.openxmlformats.org/drawingml/2006/main" xmlns:r="http://schemas.openxmlformats.org/officeDocument/2006/relationships" xmlns:p="http://schemas.openxmlformats.org/presentationml/2006/main">
   <p:cSld>
     <p:spTree>
@@ -18920,7 +21133,7 @@
             <a:fld id="{2BF067CD-8E6B-4360-9AA8-C5DF2A48A6D1}" type="slidenum">
               <a:rPr lang="en-US" noProof="0" smtClean="0"/>
               <a:pPr/>
-              <a:t>32</a:t>
+              <a:t>35</a:t>
             </a:fld>
             <a:endParaRPr lang="en-US" noProof="0" dirty="0"/>
           </a:p>
@@ -19026,7 +21239,7 @@
 </p:sld>
 </file>
 
-<file path=ppt/slides/slide33.xml><?xml version="1.0" encoding="utf-8"?>
+<file path=ppt/slides/slide36.xml><?xml version="1.0" encoding="utf-8"?>
 <p:sld xmlns:a="http://schemas.openxmlformats.org/drawingml/2006/main" xmlns:r="http://schemas.openxmlformats.org/officeDocument/2006/relationships" xmlns:p="http://schemas.openxmlformats.org/presentationml/2006/main">
   <p:cSld>
     <p:spTree>
@@ -19988,7 +22201,7 @@
             <a:fld id="{2BF067CD-8E6B-4360-9AA8-C5DF2A48A6D1}" type="slidenum">
               <a:rPr lang="en-US" noProof="0" smtClean="0"/>
               <a:pPr/>
-              <a:t>33</a:t>
+              <a:t>36</a:t>
             </a:fld>
             <a:endParaRPr lang="en-US" noProof="0" dirty="0"/>
           </a:p>
@@ -20143,7 +22356,7 @@
 </p:sld>
 </file>
 
-<file path=ppt/slides/slide34.xml><?xml version="1.0" encoding="utf-8"?>
+<file path=ppt/slides/slide37.xml><?xml version="1.0" encoding="utf-8"?>
 <p:sld xmlns:a="http://schemas.openxmlformats.org/drawingml/2006/main" xmlns:r="http://schemas.openxmlformats.org/officeDocument/2006/relationships" xmlns:p="http://schemas.openxmlformats.org/presentationml/2006/main">
   <p:cSld>
     <p:spTree>
@@ -20333,7 +22546,7 @@
 </p:sld>
 </file>
 
-<file path=ppt/slides/slide35.xml><?xml version="1.0" encoding="utf-8"?>
+<file path=ppt/slides/slide38.xml><?xml version="1.0" encoding="utf-8"?>
 <p:sld xmlns:a="http://schemas.openxmlformats.org/drawingml/2006/main" xmlns:r="http://schemas.openxmlformats.org/officeDocument/2006/relationships" xmlns:p="http://schemas.openxmlformats.org/presentationml/2006/main" show="0">
   <p:cSld>
     <p:spTree>
@@ -20689,7 +22902,7 @@
             <a:fld id="{2BF067CD-8E6B-4360-9AA8-C5DF2A48A6D1}" type="slidenum">
               <a:rPr lang="en-US" noProof="0" smtClean="0"/>
               <a:pPr/>
-              <a:t>35</a:t>
+              <a:t>38</a:t>
             </a:fld>
             <a:endParaRPr lang="en-US" noProof="0" dirty="0"/>
           </a:p>

</xml_diff>

<commit_message>
Fixes and additions to SQL intro
</commit_message>
<xml_diff>
--- a/Courses/Software-Sciences/Module-3-Databases-New/03-Intro-to-MS-SQL-Server/03-Intro-to-MS-SQL-Server.pptx
+++ b/Courses/Software-Sciences/Module-3-Databases-New/03-Intro-to-MS-SQL-Server/03-Intro-to-MS-SQL-Server.pptx
@@ -413,7 +413,7 @@
           <a:p>
             <a:fld id="{4E087215-0C8F-4762-A664-737A353EC9A4}" type="datetimeFigureOut">
               <a:rPr lang="bg-BG" smtClean="0"/>
-              <a:t>14.7.2024 г.</a:t>
+              <a:t>15.07.24 г.</a:t>
             </a:fld>
             <a:endParaRPr lang="bg-BG"/>
           </a:p>
@@ -609,7 +609,7 @@
           <a:p>
             <a:fld id="{72D84649-876A-46C9-8472-14CB09C070D8}" type="datetimeFigureOut">
               <a:rPr lang="en-US" smtClean="0"/>
-              <a:t>7/14/2024</a:t>
+              <a:t>7/15/24</a:t>
             </a:fld>
             <a:endParaRPr lang="en-US"/>
           </a:p>
@@ -9115,6 +9115,55 @@
                                           </p:stCondLst>
                                         </p:cTn>
                                         <p:tgtEl>
+                                          <p:spTgt spid="3">
+                                            <p:txEl>
+                                              <p:pRg st="1" end="1"/>
+                                            </p:txEl>
+                                          </p:spTgt>
+                                        </p:tgtEl>
+                                        <p:attrNameLst>
+                                          <p:attrName>style.visibility</p:attrName>
+                                        </p:attrNameLst>
+                                      </p:cBhvr>
+                                      <p:to>
+                                        <p:strVal val="visible"/>
+                                      </p:to>
+                                    </p:set>
+                                  </p:childTnLst>
+                                </p:cTn>
+                              </p:par>
+                            </p:childTnLst>
+                          </p:cTn>
+                        </p:par>
+                      </p:childTnLst>
+                    </p:cTn>
+                  </p:par>
+                  <p:par>
+                    <p:cTn id="7" fill="hold">
+                      <p:stCondLst>
+                        <p:cond delay="indefinite"/>
+                      </p:stCondLst>
+                      <p:childTnLst>
+                        <p:par>
+                          <p:cTn id="8" fill="hold">
+                            <p:stCondLst>
+                              <p:cond delay="0"/>
+                            </p:stCondLst>
+                            <p:childTnLst>
+                              <p:par>
+                                <p:cTn id="9" presetID="1" presetClass="entr" presetSubtype="0" fill="hold" nodeType="clickEffect">
+                                  <p:stCondLst>
+                                    <p:cond delay="0"/>
+                                  </p:stCondLst>
+                                  <p:childTnLst>
+                                    <p:set>
+                                      <p:cBhvr>
+                                        <p:cTn id="10" dur="1" fill="hold">
+                                          <p:stCondLst>
+                                            <p:cond delay="0"/>
+                                          </p:stCondLst>
+                                        </p:cTn>
+                                        <p:tgtEl>
                                           <p:spTgt spid="4098"/>
                                         </p:tgtEl>
                                         <p:attrNameLst>
@@ -10677,95 +10726,53 @@
               <a:rPr lang="en-US" dirty="0"/>
               <a:t>. </a:t>
             </a:r>
-            <a:r>
-              <a:rPr lang="en-US" dirty="0" err="1"/>
-              <a:t>Сега</a:t>
+          </a:p>
+          <a:p>
+            <a:r>
+              <a:rPr lang="en-US" dirty="0"/>
+              <a:t>Сега трябва да видите </a:t>
+            </a:r>
+            <a:r>
+              <a:rPr lang="en-US" b="1" dirty="0">
+                <a:solidFill>
+                  <a:schemeClr val="bg1"/>
+                </a:solidFill>
+              </a:rPr>
+              <a:t>екрана</a:t>
+            </a:r>
+            <a:r>
+              <a:rPr lang="en-US" dirty="0"/>
+              <a:t> за </a:t>
+            </a:r>
+            <a:r>
+              <a:rPr lang="en-US" b="1" dirty="0">
+                <a:solidFill>
+                  <a:schemeClr val="bg1"/>
+                </a:solidFill>
+              </a:rPr>
+              <a:t>инсталиране</a:t>
+            </a:r>
+            <a:r>
+              <a:rPr lang="en-US" dirty="0"/>
+              <a:t> на </a:t>
+            </a:r>
+            <a:r>
+              <a:rPr lang="en-US" b="1" dirty="0"/>
+              <a:t>Microsoft SQL Server Management Studio</a:t>
             </a:r>
             <a:r>
               <a:rPr lang="en-US" dirty="0"/>
               <a:t> </a:t>
             </a:r>
             <a:r>
-              <a:rPr lang="en-US" dirty="0" err="1"/>
-              <a:t>трябва</a:t>
+              <a:rPr lang="en-US" b="1" dirty="0"/>
+              <a:t>with</a:t>
             </a:r>
             <a:r>
               <a:rPr lang="en-US" dirty="0"/>
               <a:t> </a:t>
             </a:r>
             <a:r>
-              <a:rPr lang="en-US" dirty="0" err="1"/>
-              <a:t>да</a:t>
-            </a:r>
-            <a:r>
-              <a:rPr lang="en-US" dirty="0"/>
-              <a:t> </a:t>
-            </a:r>
-            <a:r>
-              <a:rPr lang="en-US" dirty="0" err="1"/>
-              <a:t>видите</a:t>
-            </a:r>
-            <a:r>
-              <a:rPr lang="en-US" dirty="0"/>
-              <a:t> </a:t>
-            </a:r>
-            <a:r>
-              <a:rPr lang="en-US" b="1" dirty="0" err="1">
-                <a:solidFill>
-                  <a:schemeClr val="bg1"/>
-                </a:solidFill>
-              </a:rPr>
-              <a:t>екрана</a:t>
-            </a:r>
-            <a:r>
-              <a:rPr lang="en-US" dirty="0"/>
-              <a:t> </a:t>
-            </a:r>
-            <a:r>
-              <a:rPr lang="en-US" dirty="0" err="1"/>
-              <a:t>за</a:t>
-            </a:r>
-            <a:r>
-              <a:rPr lang="en-US" dirty="0"/>
-              <a:t> </a:t>
-            </a:r>
-            <a:r>
-              <a:rPr lang="en-US" b="1" dirty="0" err="1">
-                <a:solidFill>
-                  <a:schemeClr val="bg1"/>
-                </a:solidFill>
-              </a:rPr>
-              <a:t>инсталиране</a:t>
-            </a:r>
-            <a:r>
-              <a:rPr lang="en-US" dirty="0"/>
-              <a:t> </a:t>
-            </a:r>
-            <a:r>
-              <a:rPr lang="en-US" dirty="0" err="1"/>
-              <a:t>на</a:t>
-            </a:r>
-            <a:r>
-              <a:rPr lang="en-US" dirty="0"/>
-              <a:t> </a:t>
-            </a:r>
-            <a:r>
-              <a:rPr lang="en-US" b="1" dirty="0"/>
-              <a:t>Microsoft SQL Server Management Studio</a:t>
-            </a:r>
-            <a:r>
-              <a:rPr lang="en-US" dirty="0"/>
-              <a:t> </a:t>
-            </a:r>
-            <a:r>
-              <a:rPr lang="en-US" b="1" dirty="0"/>
-              <a:t>with</a:t>
-            </a:r>
-            <a:r>
-              <a:rPr lang="en-US" dirty="0"/>
-              <a:t> </a:t>
-            </a:r>
-            <a:r>
               <a:rPr lang="en-US" b="1" dirty="0"/>
               <a:t>Azure Data Studio</a:t>
             </a:r>
@@ -10792,9 +10799,6 @@
               <a:rPr lang="en-US" dirty="0"/>
               <a:t>]</a:t>
             </a:r>
-          </a:p>
-          <a:p>
-            <a:endParaRPr lang="en-US" dirty="0"/>
           </a:p>
           <a:p>
             <a:endParaRPr lang="en-US" dirty="0"/>
@@ -10852,7 +10856,7 @@
           </p:cNvPicPr>
           <p:nvPr/>
         </p:nvPicPr>
-        <p:blipFill>
+        <p:blipFill rotWithShape="1">
           <a:blip r:embed="rId3" cstate="print">
             <a:extLst>
               <a:ext uri="{28A0092B-C50C-407E-A947-70E740481C1C}">
@@ -10860,15 +10864,13 @@
               </a:ext>
             </a:extLst>
           </a:blip>
-          <a:srcRect/>
-          <a:stretch>
-            <a:fillRect/>
-          </a:stretch>
+          <a:srcRect t="11763"/>
+          <a:stretch/>
         </p:blipFill>
         <p:spPr bwMode="auto">
           <a:xfrm>
-            <a:off x="5969328" y="2620879"/>
-            <a:ext cx="4500000" cy="3886121"/>
+            <a:off x="6726000" y="3159000"/>
+            <a:ext cx="4500000" cy="3429000"/>
           </a:xfrm>
           <a:prstGeom prst="rect">
             <a:avLst/>
@@ -10901,6 +10903,134 @@
       <p:transition spd="slow" advClick="0" advTm="5000"/>
     </mc:Fallback>
   </mc:AlternateContent>
+  <p:timing>
+    <p:tnLst>
+      <p:par>
+        <p:cTn id="1" dur="indefinite" restart="never" nodeType="tmRoot">
+          <p:childTnLst>
+            <p:seq concurrent="1" nextAc="seek">
+              <p:cTn id="2" dur="indefinite" nodeType="mainSeq">
+                <p:childTnLst>
+                  <p:par>
+                    <p:cTn id="3" fill="hold">
+                      <p:stCondLst>
+                        <p:cond delay="indefinite"/>
+                      </p:stCondLst>
+                      <p:childTnLst>
+                        <p:par>
+                          <p:cTn id="4" fill="hold">
+                            <p:stCondLst>
+                              <p:cond delay="0"/>
+                            </p:stCondLst>
+                            <p:childTnLst>
+                              <p:par>
+                                <p:cTn id="5" presetID="1" presetClass="entr" presetSubtype="0" fill="hold" nodeType="clickEffect">
+                                  <p:stCondLst>
+                                    <p:cond delay="0"/>
+                                  </p:stCondLst>
+                                  <p:childTnLst>
+                                    <p:set>
+                                      <p:cBhvr>
+                                        <p:cTn id="6" dur="1" fill="hold">
+                                          <p:stCondLst>
+                                            <p:cond delay="0"/>
+                                          </p:stCondLst>
+                                        </p:cTn>
+                                        <p:tgtEl>
+                                          <p:spTgt spid="3">
+                                            <p:txEl>
+                                              <p:pRg st="1" end="1"/>
+                                            </p:txEl>
+                                          </p:spTgt>
+                                        </p:tgtEl>
+                                        <p:attrNameLst>
+                                          <p:attrName>style.visibility</p:attrName>
+                                        </p:attrNameLst>
+                                      </p:cBhvr>
+                                      <p:to>
+                                        <p:strVal val="visible"/>
+                                      </p:to>
+                                    </p:set>
+                                  </p:childTnLst>
+                                </p:cTn>
+                              </p:par>
+                            </p:childTnLst>
+                          </p:cTn>
+                        </p:par>
+                      </p:childTnLst>
+                    </p:cTn>
+                  </p:par>
+                  <p:par>
+                    <p:cTn id="7" fill="hold">
+                      <p:stCondLst>
+                        <p:cond delay="indefinite"/>
+                      </p:stCondLst>
+                      <p:childTnLst>
+                        <p:par>
+                          <p:cTn id="8" fill="hold">
+                            <p:stCondLst>
+                              <p:cond delay="0"/>
+                            </p:stCondLst>
+                            <p:childTnLst>
+                              <p:par>
+                                <p:cTn id="9" presetID="1" presetClass="entr" presetSubtype="0" fill="hold" nodeType="clickEffect">
+                                  <p:stCondLst>
+                                    <p:cond delay="0"/>
+                                  </p:stCondLst>
+                                  <p:childTnLst>
+                                    <p:set>
+                                      <p:cBhvr>
+                                        <p:cTn id="10" dur="1" fill="hold">
+                                          <p:stCondLst>
+                                            <p:cond delay="0"/>
+                                          </p:stCondLst>
+                                        </p:cTn>
+                                        <p:tgtEl>
+                                          <p:spTgt spid="3">
+                                            <p:txEl>
+                                              <p:pRg st="2" end="2"/>
+                                            </p:txEl>
+                                          </p:spTgt>
+                                        </p:tgtEl>
+                                        <p:attrNameLst>
+                                          <p:attrName>style.visibility</p:attrName>
+                                        </p:attrNameLst>
+                                      </p:cBhvr>
+                                      <p:to>
+                                        <p:strVal val="visible"/>
+                                      </p:to>
+                                    </p:set>
+                                  </p:childTnLst>
+                                </p:cTn>
+                              </p:par>
+                            </p:childTnLst>
+                          </p:cTn>
+                        </p:par>
+                      </p:childTnLst>
+                    </p:cTn>
+                  </p:par>
+                </p:childTnLst>
+              </p:cTn>
+              <p:prevCondLst>
+                <p:cond evt="onPrev" delay="0">
+                  <p:tgtEl>
+                    <p:sldTgt/>
+                  </p:tgtEl>
+                </p:cond>
+              </p:prevCondLst>
+              <p:nextCondLst>
+                <p:cond evt="onNext" delay="0">
+                  <p:tgtEl>
+                    <p:sldTgt/>
+                  </p:tgtEl>
+                </p:cond>
+              </p:nextCondLst>
+            </p:seq>
+          </p:childTnLst>
+        </p:cTn>
+      </p:par>
+    </p:tnLst>
+  </p:timing>
 </p:sld>
 </file>
 
@@ -10982,6 +11112,10 @@
               <a:t>Натиснете </a:t>
             </a:r>
             <a:r>
+              <a:rPr lang="en-US" dirty="0"/>
+              <a:t>[</a:t>
+            </a:r>
+            <a:r>
               <a:rPr lang="en-US" b="1" dirty="0">
                 <a:solidFill>
                   <a:schemeClr val="bg1"/>
@@ -10989,6 +11123,15 @@
               </a:rPr>
               <a:t>Connect</a:t>
             </a:r>
+            <a:r>
+              <a:rPr lang="en-US" dirty="0"/>
+              <a:t>]</a:t>
+            </a:r>
+            <a:endParaRPr lang="en-US" b="1" dirty="0">
+              <a:solidFill>
+                <a:schemeClr val="bg1"/>
+              </a:solidFill>
+            </a:endParaRPr>
           </a:p>
         </p:txBody>
       </p:sp>
@@ -12316,7 +12459,7 @@
             </a:r>
             <a:r>
               <a:rPr lang="bg-BG" dirty="0"/>
-              <a:t>до името на базата данни, която се визуализира в листа с бази данни</a:t>
+              <a:t>до името на базата данни, която се визуализира в списъка с бази данни</a:t>
             </a:r>
             <a:endParaRPr lang="en-US" dirty="0"/>
           </a:p>
@@ -12343,7 +12486,7 @@
             </a:r>
             <a:r>
               <a:rPr lang="en-US" dirty="0"/>
-              <a:t> [</a:t>
+              <a:t> </a:t>
             </a:r>
             <a:r>
               <a:rPr lang="en-US" b="1" dirty="0">
@@ -12353,7 +12496,7 @@
             </a:r>
             <a:r>
               <a:rPr lang="en-US" dirty="0"/>
-              <a:t>] -&gt;</a:t>
+              <a:t> -&gt;</a:t>
             </a:r>
             <a:r>
               <a:rPr lang="bg-BG" dirty="0"/>
@@ -12432,8 +12575,8 @@
         </p:blipFill>
         <p:spPr>
           <a:xfrm>
-            <a:off x="3531000" y="3807746"/>
-            <a:ext cx="4486901" cy="1867161"/>
+            <a:off x="3216000" y="3413891"/>
+            <a:ext cx="6865501" cy="2856982"/>
           </a:xfrm>
           <a:prstGeom prst="rect">
             <a:avLst/>
@@ -12821,8 +12964,8 @@
         </p:blipFill>
         <p:spPr bwMode="auto">
           <a:xfrm>
-            <a:off x="3823500" y="2214000"/>
-            <a:ext cx="4545000" cy="1665000"/>
+            <a:off x="3407250" y="1907511"/>
+            <a:ext cx="5377500" cy="1969975"/>
           </a:xfrm>
           <a:prstGeom prst="rect">
             <a:avLst/>
@@ -12859,8 +13002,8 @@
         </p:blipFill>
         <p:spPr>
           <a:xfrm>
-            <a:off x="4848823" y="4896875"/>
-            <a:ext cx="2494354" cy="1502125"/>
+            <a:off x="4459911" y="4588872"/>
+            <a:ext cx="3272177" cy="1970538"/>
           </a:xfrm>
           <a:prstGeom prst="rect">
             <a:avLst/>
@@ -13831,8 +13974,8 @@
         </p:blipFill>
         <p:spPr>
           <a:xfrm>
-            <a:off x="1101000" y="2441901"/>
-            <a:ext cx="3194761" cy="2652099"/>
+            <a:off x="750536" y="2229180"/>
+            <a:ext cx="3554761" cy="2950949"/>
           </a:xfrm>
           <a:prstGeom prst="rect">
             <a:avLst/>
@@ -13854,7 +13997,7 @@
         </p:nvSpPr>
         <p:spPr>
           <a:xfrm>
-            <a:off x="4865431" y="3747114"/>
+            <a:off x="4693426" y="3537218"/>
             <a:ext cx="571361" cy="461464"/>
           </a:xfrm>
           <a:prstGeom prst="rightArrow">
@@ -14066,7 +14209,7 @@
         </p:nvSpPr>
         <p:spPr bwMode="auto">
           <a:xfrm>
-            <a:off x="3531000" y="5192949"/>
+            <a:off x="3531000" y="5222769"/>
             <a:ext cx="4320000" cy="546231"/>
           </a:xfrm>
           <a:prstGeom prst="wedgeRoundRectCallout">

</xml_diff>

<commit_message>
Add section for creating DB using SQL script
</commit_message>
<xml_diff>
--- a/Courses/Software-Sciences/Module-3-Databases-New/03-Intro-to-MS-SQL-Server/03-Intro-to-MS-SQL-Server.pptx
+++ b/Courses/Software-Sciences/Module-3-Databases-New/03-Intro-to-MS-SQL-Server/03-Intro-to-MS-SQL-Server.pptx
@@ -5,10 +5,10 @@
     <p:sldMasterId id="2147483675" r:id="rId1"/>
   </p:sldMasterIdLst>
   <p:notesMasterIdLst>
-    <p:notesMasterId r:id="rId40"/>
+    <p:notesMasterId r:id="rId42"/>
   </p:notesMasterIdLst>
   <p:handoutMasterIdLst>
-    <p:handoutMasterId r:id="rId41"/>
+    <p:handoutMasterId r:id="rId43"/>
   </p:handoutMasterIdLst>
   <p:sldIdLst>
     <p:sldId id="1176" r:id="rId2"/>
@@ -30,25 +30,27 @@
     <p:sldId id="1225" r:id="rId18"/>
     <p:sldId id="1228" r:id="rId19"/>
     <p:sldId id="1212" r:id="rId20"/>
-    <p:sldId id="1193" r:id="rId21"/>
-    <p:sldId id="1226" r:id="rId22"/>
-    <p:sldId id="1229" r:id="rId23"/>
-    <p:sldId id="1227" r:id="rId24"/>
-    <p:sldId id="1230" r:id="rId25"/>
-    <p:sldId id="1199" r:id="rId26"/>
-    <p:sldId id="1200" r:id="rId27"/>
-    <p:sldId id="1201" r:id="rId28"/>
-    <p:sldId id="1223" r:id="rId29"/>
-    <p:sldId id="1205" r:id="rId30"/>
-    <p:sldId id="1191" r:id="rId31"/>
-    <p:sldId id="1192" r:id="rId32"/>
-    <p:sldId id="1208" r:id="rId33"/>
-    <p:sldId id="1206" r:id="rId34"/>
-    <p:sldId id="1207" r:id="rId35"/>
-    <p:sldId id="1209" r:id="rId36"/>
-    <p:sldId id="1127" r:id="rId37"/>
-    <p:sldId id="504" r:id="rId38"/>
-    <p:sldId id="505" r:id="rId39"/>
+    <p:sldId id="1231" r:id="rId21"/>
+    <p:sldId id="1232" r:id="rId22"/>
+    <p:sldId id="1193" r:id="rId23"/>
+    <p:sldId id="1226" r:id="rId24"/>
+    <p:sldId id="1229" r:id="rId25"/>
+    <p:sldId id="1227" r:id="rId26"/>
+    <p:sldId id="1230" r:id="rId27"/>
+    <p:sldId id="1199" r:id="rId28"/>
+    <p:sldId id="1200" r:id="rId29"/>
+    <p:sldId id="1201" r:id="rId30"/>
+    <p:sldId id="1223" r:id="rId31"/>
+    <p:sldId id="1205" r:id="rId32"/>
+    <p:sldId id="1191" r:id="rId33"/>
+    <p:sldId id="1192" r:id="rId34"/>
+    <p:sldId id="1208" r:id="rId35"/>
+    <p:sldId id="1206" r:id="rId36"/>
+    <p:sldId id="1207" r:id="rId37"/>
+    <p:sldId id="1209" r:id="rId38"/>
+    <p:sldId id="1127" r:id="rId39"/>
+    <p:sldId id="504" r:id="rId40"/>
+    <p:sldId id="505" r:id="rId41"/>
   </p:sldIdLst>
   <p:sldSz cx="12192000" cy="6858000"/>
   <p:notesSz cx="6858000" cy="9144000"/>
@@ -179,6 +181,12 @@
             <p14:sldId id="1225"/>
             <p14:sldId id="1228"/>
             <p14:sldId id="1212"/>
+          </p14:sldIdLst>
+        </p14:section>
+        <p14:section name="База данни от SQL скрипт" id="{2765B4D4-0E2C-426A-ACBD-1C7BBCA0BC7B}">
+          <p14:sldIdLst>
+            <p14:sldId id="1231"/>
+            <p14:sldId id="1232"/>
           </p14:sldIdLst>
         </p14:section>
         <p14:section name="Разглеждане и редактиране на данни" id="{DBA90160-B823-4EFE-B4A9-27949C4FDFFF}">
@@ -413,7 +421,7 @@
           <a:p>
             <a:fld id="{4E087215-0C8F-4762-A664-737A353EC9A4}" type="datetimeFigureOut">
               <a:rPr lang="bg-BG" smtClean="0"/>
-              <a:t>15.07.24 г.</a:t>
+              <a:t>15.7.2024 г.</a:t>
             </a:fld>
             <a:endParaRPr lang="bg-BG"/>
           </a:p>
@@ -609,7 +617,7 @@
           <a:p>
             <a:fld id="{72D84649-876A-46C9-8472-14CB09C070D8}" type="datetimeFigureOut">
               <a:rPr lang="en-US" smtClean="0"/>
-              <a:t>7/15/24</a:t>
+              <a:t>7/15/2024</a:t>
             </a:fld>
             <a:endParaRPr lang="en-US"/>
           </a:p>
@@ -1109,7 +1117,7 @@
             <a:fld id="{2BF067CD-8E6B-4360-9AA8-C5DF2A48A6D1}" type="slidenum">
               <a:rPr lang="en-US" smtClean="0"/>
               <a:pPr/>
-              <a:t>35</a:t>
+              <a:t>37</a:t>
             </a:fld>
             <a:endParaRPr lang="en-US" dirty="0"/>
           </a:p>
@@ -1295,7 +1303,7 @@
                 <a:tabLst/>
                 <a:defRPr/>
               </a:pPr>
-              <a:t>36</a:t>
+              <a:t>38</a:t>
             </a:fld>
             <a:endParaRPr kumimoji="0" lang="en-US" sz="1200" b="0" i="0" u="none" strike="noStrike" kern="1200" cap="none" spc="0" normalizeH="0" baseline="0" noProof="0" dirty="0">
               <a:ln>
@@ -1554,7 +1562,7 @@
             <a:fld id="{3EBA5BD7-F043-4D1B-AA17-CD412FC534DE}" type="slidenum">
               <a:rPr lang="en-US" smtClean="0"/>
               <a:pPr/>
-              <a:t>37</a:t>
+              <a:t>39</a:t>
             </a:fld>
             <a:endParaRPr lang="en-US" dirty="0"/>
           </a:p>
@@ -1800,7 +1808,7 @@
             <a:fld id="{3EBA5BD7-F043-4D1B-AA17-CD412FC534DE}" type="slidenum">
               <a:rPr lang="en-US" smtClean="0"/>
               <a:pPr/>
-              <a:t>38</a:t>
+              <a:t>40</a:t>
             </a:fld>
             <a:endParaRPr lang="en-US" dirty="0"/>
           </a:p>
@@ -2745,7 +2753,7 @@
           <a:p>
             <a:fld id="{2BF067CD-8E6B-4360-9AA8-C5DF2A48A6D1}" type="slidenum">
               <a:rPr lang="en-US" smtClean="0"/>
-              <a:t>21</a:t>
+              <a:t>23</a:t>
             </a:fld>
             <a:endParaRPr lang="en-US" dirty="0"/>
           </a:p>
@@ -2867,7 +2875,7 @@
             <a:fld id="{2BF067CD-8E6B-4360-9AA8-C5DF2A48A6D1}" type="slidenum">
               <a:rPr lang="en-US" smtClean="0"/>
               <a:pPr/>
-              <a:t>31</a:t>
+              <a:t>33</a:t>
             </a:fld>
             <a:endParaRPr lang="en-US" dirty="0"/>
           </a:p>
@@ -9115,55 +9123,6 @@
                                           </p:stCondLst>
                                         </p:cTn>
                                         <p:tgtEl>
-                                          <p:spTgt spid="3">
-                                            <p:txEl>
-                                              <p:pRg st="1" end="1"/>
-                                            </p:txEl>
-                                          </p:spTgt>
-                                        </p:tgtEl>
-                                        <p:attrNameLst>
-                                          <p:attrName>style.visibility</p:attrName>
-                                        </p:attrNameLst>
-                                      </p:cBhvr>
-                                      <p:to>
-                                        <p:strVal val="visible"/>
-                                      </p:to>
-                                    </p:set>
-                                  </p:childTnLst>
-                                </p:cTn>
-                              </p:par>
-                            </p:childTnLst>
-                          </p:cTn>
-                        </p:par>
-                      </p:childTnLst>
-                    </p:cTn>
-                  </p:par>
-                  <p:par>
-                    <p:cTn id="7" fill="hold">
-                      <p:stCondLst>
-                        <p:cond delay="indefinite"/>
-                      </p:stCondLst>
-                      <p:childTnLst>
-                        <p:par>
-                          <p:cTn id="8" fill="hold">
-                            <p:stCondLst>
-                              <p:cond delay="0"/>
-                            </p:stCondLst>
-                            <p:childTnLst>
-                              <p:par>
-                                <p:cTn id="9" presetID="1" presetClass="entr" presetSubtype="0" fill="hold" nodeType="clickEffect">
-                                  <p:stCondLst>
-                                    <p:cond delay="0"/>
-                                  </p:stCondLst>
-                                  <p:childTnLst>
-                                    <p:set>
-                                      <p:cBhvr>
-                                        <p:cTn id="10" dur="1" fill="hold">
-                                          <p:stCondLst>
-                                            <p:cond delay="0"/>
-                                          </p:stCondLst>
-                                        </p:cTn>
-                                        <p:tgtEl>
                                           <p:spTgt spid="4098"/>
                                         </p:tgtEl>
                                         <p:attrNameLst>
@@ -10726,14 +10685,40 @@
               <a:rPr lang="en-US" dirty="0"/>
               <a:t>. </a:t>
             </a:r>
-          </a:p>
-          <a:p>
+            <a:r>
+              <a:rPr lang="en-US" dirty="0" err="1"/>
+              <a:t>Сега</a:t>
+            </a:r>
             <a:r>
               <a:rPr lang="en-US" dirty="0"/>
-              <a:t>Сега трябва да видите </a:t>
-            </a:r>
-            <a:r>
-              <a:rPr lang="en-US" b="1" dirty="0">
+              <a:t> </a:t>
+            </a:r>
+            <a:r>
+              <a:rPr lang="en-US" dirty="0" err="1"/>
+              <a:t>трябва</a:t>
+            </a:r>
+            <a:r>
+              <a:rPr lang="en-US" dirty="0"/>
+              <a:t> </a:t>
+            </a:r>
+            <a:r>
+              <a:rPr lang="en-US" dirty="0" err="1"/>
+              <a:t>да</a:t>
+            </a:r>
+            <a:r>
+              <a:rPr lang="en-US" dirty="0"/>
+              <a:t> </a:t>
+            </a:r>
+            <a:r>
+              <a:rPr lang="en-US" dirty="0" err="1"/>
+              <a:t>видите</a:t>
+            </a:r>
+            <a:r>
+              <a:rPr lang="en-US" dirty="0"/>
+              <a:t> </a:t>
+            </a:r>
+            <a:r>
+              <a:rPr lang="en-US" b="1" dirty="0" err="1">
                 <a:solidFill>
                   <a:schemeClr val="bg1"/>
                 </a:solidFill>
@@ -10742,10 +10727,18 @@
             </a:r>
             <a:r>
               <a:rPr lang="en-US" dirty="0"/>
-              <a:t> за </a:t>
-            </a:r>
-            <a:r>
-              <a:rPr lang="en-US" b="1" dirty="0">
+              <a:t> </a:t>
+            </a:r>
+            <a:r>
+              <a:rPr lang="en-US" dirty="0" err="1"/>
+              <a:t>за</a:t>
+            </a:r>
+            <a:r>
+              <a:rPr lang="en-US" dirty="0"/>
+              <a:t> </a:t>
+            </a:r>
+            <a:r>
+              <a:rPr lang="en-US" b="1" dirty="0" err="1">
                 <a:solidFill>
                   <a:schemeClr val="bg1"/>
                 </a:solidFill>
@@ -10754,7 +10747,15 @@
             </a:r>
             <a:r>
               <a:rPr lang="en-US" dirty="0"/>
-              <a:t> на </a:t>
+              <a:t> </a:t>
+            </a:r>
+            <a:r>
+              <a:rPr lang="en-US" dirty="0" err="1"/>
+              <a:t>на</a:t>
+            </a:r>
+            <a:r>
+              <a:rPr lang="en-US" dirty="0"/>
+              <a:t> </a:t>
             </a:r>
             <a:r>
               <a:rPr lang="en-US" b="1" dirty="0"/>
@@ -10799,6 +10800,9 @@
               <a:rPr lang="en-US" dirty="0"/>
               <a:t>]</a:t>
             </a:r>
+          </a:p>
+          <a:p>
+            <a:endParaRPr lang="en-US" dirty="0"/>
           </a:p>
           <a:p>
             <a:endParaRPr lang="en-US" dirty="0"/>
@@ -10856,7 +10860,7 @@
           </p:cNvPicPr>
           <p:nvPr/>
         </p:nvPicPr>
-        <p:blipFill rotWithShape="1">
+        <p:blipFill>
           <a:blip r:embed="rId3" cstate="print">
             <a:extLst>
               <a:ext uri="{28A0092B-C50C-407E-A947-70E740481C1C}">
@@ -10864,13 +10868,15 @@
               </a:ext>
             </a:extLst>
           </a:blip>
-          <a:srcRect t="11763"/>
-          <a:stretch/>
+          <a:srcRect/>
+          <a:stretch>
+            <a:fillRect/>
+          </a:stretch>
         </p:blipFill>
         <p:spPr bwMode="auto">
           <a:xfrm>
-            <a:off x="6726000" y="3159000"/>
-            <a:ext cx="4500000" cy="3429000"/>
+            <a:off x="5969328" y="2620879"/>
+            <a:ext cx="4500000" cy="3886121"/>
           </a:xfrm>
           <a:prstGeom prst="rect">
             <a:avLst/>
@@ -10903,134 +10909,6 @@
       <p:transition spd="slow" advClick="0" advTm="5000"/>
     </mc:Fallback>
   </mc:AlternateContent>
-  <p:timing>
-    <p:tnLst>
-      <p:par>
-        <p:cTn id="1" dur="indefinite" restart="never" nodeType="tmRoot">
-          <p:childTnLst>
-            <p:seq concurrent="1" nextAc="seek">
-              <p:cTn id="2" dur="indefinite" nodeType="mainSeq">
-                <p:childTnLst>
-                  <p:par>
-                    <p:cTn id="3" fill="hold">
-                      <p:stCondLst>
-                        <p:cond delay="indefinite"/>
-                      </p:stCondLst>
-                      <p:childTnLst>
-                        <p:par>
-                          <p:cTn id="4" fill="hold">
-                            <p:stCondLst>
-                              <p:cond delay="0"/>
-                            </p:stCondLst>
-                            <p:childTnLst>
-                              <p:par>
-                                <p:cTn id="5" presetID="1" presetClass="entr" presetSubtype="0" fill="hold" nodeType="clickEffect">
-                                  <p:stCondLst>
-                                    <p:cond delay="0"/>
-                                  </p:stCondLst>
-                                  <p:childTnLst>
-                                    <p:set>
-                                      <p:cBhvr>
-                                        <p:cTn id="6" dur="1" fill="hold">
-                                          <p:stCondLst>
-                                            <p:cond delay="0"/>
-                                          </p:stCondLst>
-                                        </p:cTn>
-                                        <p:tgtEl>
-                                          <p:spTgt spid="3">
-                                            <p:txEl>
-                                              <p:pRg st="1" end="1"/>
-                                            </p:txEl>
-                                          </p:spTgt>
-                                        </p:tgtEl>
-                                        <p:attrNameLst>
-                                          <p:attrName>style.visibility</p:attrName>
-                                        </p:attrNameLst>
-                                      </p:cBhvr>
-                                      <p:to>
-                                        <p:strVal val="visible"/>
-                                      </p:to>
-                                    </p:set>
-                                  </p:childTnLst>
-                                </p:cTn>
-                              </p:par>
-                            </p:childTnLst>
-                          </p:cTn>
-                        </p:par>
-                      </p:childTnLst>
-                    </p:cTn>
-                  </p:par>
-                  <p:par>
-                    <p:cTn id="7" fill="hold">
-                      <p:stCondLst>
-                        <p:cond delay="indefinite"/>
-                      </p:stCondLst>
-                      <p:childTnLst>
-                        <p:par>
-                          <p:cTn id="8" fill="hold">
-                            <p:stCondLst>
-                              <p:cond delay="0"/>
-                            </p:stCondLst>
-                            <p:childTnLst>
-                              <p:par>
-                                <p:cTn id="9" presetID="1" presetClass="entr" presetSubtype="0" fill="hold" nodeType="clickEffect">
-                                  <p:stCondLst>
-                                    <p:cond delay="0"/>
-                                  </p:stCondLst>
-                                  <p:childTnLst>
-                                    <p:set>
-                                      <p:cBhvr>
-                                        <p:cTn id="10" dur="1" fill="hold">
-                                          <p:stCondLst>
-                                            <p:cond delay="0"/>
-                                          </p:stCondLst>
-                                        </p:cTn>
-                                        <p:tgtEl>
-                                          <p:spTgt spid="3">
-                                            <p:txEl>
-                                              <p:pRg st="2" end="2"/>
-                                            </p:txEl>
-                                          </p:spTgt>
-                                        </p:tgtEl>
-                                        <p:attrNameLst>
-                                          <p:attrName>style.visibility</p:attrName>
-                                        </p:attrNameLst>
-                                      </p:cBhvr>
-                                      <p:to>
-                                        <p:strVal val="visible"/>
-                                      </p:to>
-                                    </p:set>
-                                  </p:childTnLst>
-                                </p:cTn>
-                              </p:par>
-                            </p:childTnLst>
-                          </p:cTn>
-                        </p:par>
-                      </p:childTnLst>
-                    </p:cTn>
-                  </p:par>
-                </p:childTnLst>
-              </p:cTn>
-              <p:prevCondLst>
-                <p:cond evt="onPrev" delay="0">
-                  <p:tgtEl>
-                    <p:sldTgt/>
-                  </p:tgtEl>
-                </p:cond>
-              </p:prevCondLst>
-              <p:nextCondLst>
-                <p:cond evt="onNext" delay="0">
-                  <p:tgtEl>
-                    <p:sldTgt/>
-                  </p:tgtEl>
-                </p:cond>
-              </p:nextCondLst>
-            </p:seq>
-          </p:childTnLst>
-        </p:cTn>
-      </p:par>
-    </p:tnLst>
-  </p:timing>
 </p:sld>
 </file>
 
@@ -11112,10 +10990,6 @@
               <a:t>Натиснете </a:t>
             </a:r>
             <a:r>
-              <a:rPr lang="en-US" dirty="0"/>
-              <a:t>[</a:t>
-            </a:r>
-            <a:r>
               <a:rPr lang="en-US" b="1" dirty="0">
                 <a:solidFill>
                   <a:schemeClr val="bg1"/>
@@ -11123,15 +10997,6 @@
               </a:rPr>
               <a:t>Connect</a:t>
             </a:r>
-            <a:r>
-              <a:rPr lang="en-US" dirty="0"/>
-              <a:t>]</a:t>
-            </a:r>
-            <a:endParaRPr lang="en-US" b="1" dirty="0">
-              <a:solidFill>
-                <a:schemeClr val="bg1"/>
-              </a:solidFill>
-            </a:endParaRPr>
           </a:p>
         </p:txBody>
       </p:sp>
@@ -11832,6 +11697,1015 @@
       </p:grpSpPr>
       <p:pic>
         <p:nvPicPr>
+          <p:cNvPr id="1026" name="Picture 2" descr="Connect, connect to database, data plugin, database connection, database  plugin, plugin icon - Download on Iconfinder"/>
+          <p:cNvPicPr>
+            <a:picLocks noChangeAspect="1" noChangeArrowheads="1"/>
+          </p:cNvPicPr>
+          <p:nvPr/>
+        </p:nvPicPr>
+        <p:blipFill>
+          <a:blip r:embed="rId2" cstate="print">
+            <a:duotone>
+              <a:prstClr val="black"/>
+              <a:schemeClr val="bg2">
+                <a:tint val="45000"/>
+                <a:satMod val="400000"/>
+              </a:schemeClr>
+            </a:duotone>
+            <a:extLst>
+              <a:ext uri="{BEBA8EAE-BF5A-486C-A8C5-ECC9F3942E4B}">
+                <a14:imgProps xmlns:a14="http://schemas.microsoft.com/office/drawing/2010/main">
+                  <a14:imgLayer r:embed="rId3">
+                    <a14:imgEffect>
+                      <a14:brightnessContrast bright="100000"/>
+                    </a14:imgEffect>
+                  </a14:imgLayer>
+                </a14:imgProps>
+              </a:ext>
+            </a:extLst>
+          </a:blip>
+          <a:srcRect/>
+          <a:stretch>
+            <a:fillRect/>
+          </a:stretch>
+        </p:blipFill>
+        <p:spPr bwMode="auto">
+          <a:xfrm>
+            <a:off x="5061000" y="1494000"/>
+            <a:ext cx="2266800" cy="2266801"/>
+          </a:xfrm>
+          <a:prstGeom prst="rect">
+            <a:avLst/>
+          </a:prstGeom>
+          <a:noFill/>
+        </p:spPr>
+      </p:pic>
+      <p:sp>
+        <p:nvSpPr>
+          <p:cNvPr id="3" name="Subtitle 2">
+            <a:extLst>
+              <a:ext uri="{FF2B5EF4-FFF2-40B4-BE49-F238E27FC236}">
+                <a16:creationId xmlns:a16="http://schemas.microsoft.com/office/drawing/2014/main" id="{5B2D393E-A98F-8BFF-B779-0A47671F389F}"/>
+              </a:ext>
+            </a:extLst>
+          </p:cNvPr>
+          <p:cNvSpPr>
+            <a:spLocks noGrp="1"/>
+          </p:cNvSpPr>
+          <p:nvPr>
+            <p:ph type="subTitle" sz="quarter" idx="11"/>
+          </p:nvPr>
+        </p:nvSpPr>
+        <p:spPr/>
+        <p:txBody>
+          <a:bodyPr/>
+          <a:lstStyle/>
+          <a:p>
+            <a:r>
+              <a:rPr lang="bg-BG" dirty="0"/>
+              <a:t>Писане на скрипт</a:t>
+            </a:r>
+            <a:endParaRPr lang="en-US" dirty="0"/>
+          </a:p>
+        </p:txBody>
+      </p:sp>
+      <p:sp>
+        <p:nvSpPr>
+          <p:cNvPr id="4" name="Заглавие 3">
+            <a:extLst>
+              <a:ext uri="{FF2B5EF4-FFF2-40B4-BE49-F238E27FC236}">
+                <a16:creationId xmlns:a16="http://schemas.microsoft.com/office/drawing/2014/main" id="{FD052661-2CA9-EC6A-3130-1D23E7EB7138}"/>
+              </a:ext>
+            </a:extLst>
+          </p:cNvPr>
+          <p:cNvSpPr>
+            <a:spLocks noGrp="1"/>
+          </p:cNvSpPr>
+          <p:nvPr>
+            <p:ph type="title" sz="quarter" idx="10"/>
+          </p:nvPr>
+        </p:nvSpPr>
+        <p:spPr>
+          <a:xfrm>
+            <a:off x="615109" y="4704825"/>
+            <a:ext cx="10961783" cy="768084"/>
+          </a:xfrm>
+        </p:spPr>
+        <p:txBody>
+          <a:bodyPr/>
+          <a:lstStyle/>
+          <a:p>
+            <a:r>
+              <a:rPr lang="bg-BG" dirty="0"/>
+              <a:t>Създаване на база данни чрез </a:t>
+            </a:r>
+            <a:r>
+              <a:rPr lang="en-US" dirty="0"/>
+              <a:t>SQL</a:t>
+            </a:r>
+            <a:endParaRPr lang="bg-BG" dirty="0"/>
+          </a:p>
+        </p:txBody>
+      </p:sp>
+    </p:spTree>
+    <p:extLst>
+      <p:ext uri="{BB962C8B-B14F-4D97-AF65-F5344CB8AC3E}">
+        <p14:creationId xmlns:p14="http://schemas.microsoft.com/office/powerpoint/2010/main" val="3375183721"/>
+      </p:ext>
+    </p:extLst>
+  </p:cSld>
+  <p:clrMapOvr>
+    <a:masterClrMapping/>
+  </p:clrMapOvr>
+  <mc:AlternateContent xmlns:mc="http://schemas.openxmlformats.org/markup-compatibility/2006" xmlns:p14="http://schemas.microsoft.com/office/powerpoint/2010/main">
+    <mc:Choice Requires="p14">
+      <p:transition spd="slow" p14:dur="2000" advClick="0" advTm="5000"/>
+    </mc:Choice>
+    <mc:Fallback xmlns="">
+      <p:transition spd="slow" advClick="0" advTm="5000"/>
+    </mc:Fallback>
+  </mc:AlternateContent>
+</p:sld>
+</file>
+
+<file path=ppt/slides/slide21.xml><?xml version="1.0" encoding="utf-8"?>
+<p:sld xmlns:a="http://schemas.openxmlformats.org/drawingml/2006/main" xmlns:r="http://schemas.openxmlformats.org/officeDocument/2006/relationships" xmlns:p="http://schemas.openxmlformats.org/presentationml/2006/main">
+  <p:cSld>
+    <p:spTree>
+      <p:nvGrpSpPr>
+        <p:cNvPr id="1" name=""/>
+        <p:cNvGrpSpPr/>
+        <p:nvPr/>
+      </p:nvGrpSpPr>
+      <p:grpSpPr>
+        <a:xfrm>
+          <a:off x="0" y="0"/>
+          <a:ext cx="0" cy="0"/>
+          <a:chOff x="0" y="0"/>
+          <a:chExt cx="0" cy="0"/>
+        </a:xfrm>
+      </p:grpSpPr>
+      <p:sp>
+        <p:nvSpPr>
+          <p:cNvPr id="3" name="Text Placeholder 2"/>
+          <p:cNvSpPr>
+            <a:spLocks noGrp="1"/>
+          </p:cNvSpPr>
+          <p:nvPr>
+            <p:ph type="body" sz="quarter" idx="10"/>
+          </p:nvPr>
+        </p:nvSpPr>
+        <p:spPr/>
+        <p:txBody>
+          <a:bodyPr/>
+          <a:lstStyle/>
+          <a:p>
+            <a:pPr>
+              <a:spcAft>
+                <a:spcPts val="25200"/>
+              </a:spcAft>
+            </a:pPr>
+            <a:r>
+              <a:rPr lang="bg-BG" dirty="0"/>
+              <a:t>За да се </a:t>
+            </a:r>
+            <a:r>
+              <a:rPr lang="bg-BG" b="1" dirty="0">
+                <a:solidFill>
+                  <a:schemeClr val="bg1"/>
+                </a:solidFill>
+              </a:rPr>
+              <a:t>създаде</a:t>
+            </a:r>
+            <a:r>
+              <a:rPr lang="bg-BG" dirty="0"/>
+              <a:t> една </a:t>
+            </a:r>
+            <a:r>
+              <a:rPr lang="bg-BG" b="1" dirty="0"/>
+              <a:t>база данни </a:t>
+            </a:r>
+            <a:r>
+              <a:rPr lang="bg-BG" dirty="0"/>
+              <a:t>чрез </a:t>
+            </a:r>
+            <a:r>
+              <a:rPr lang="en-US" b="1" dirty="0">
+                <a:solidFill>
+                  <a:schemeClr val="bg1"/>
+                </a:solidFill>
+              </a:rPr>
+              <a:t>SQL</a:t>
+            </a:r>
+            <a:r>
+              <a:rPr lang="en-US" dirty="0"/>
+              <a:t> </a:t>
+            </a:r>
+            <a:r>
+              <a:rPr lang="bg-BG" dirty="0"/>
+              <a:t>скрипт е необходимо той да бъде </a:t>
+            </a:r>
+            <a:r>
+              <a:rPr lang="bg-BG" b="1" dirty="0"/>
+              <a:t>структуриран</a:t>
+            </a:r>
+            <a:r>
+              <a:rPr lang="bg-BG" dirty="0"/>
+              <a:t> по следния начин:</a:t>
+            </a:r>
+            <a:br>
+              <a:rPr lang="bg-BG" dirty="0"/>
+            </a:br>
+            <a:br>
+              <a:rPr lang="bg-BG" dirty="0"/>
+            </a:br>
+            <a:endParaRPr lang="en-US" b="1" dirty="0">
+              <a:solidFill>
+                <a:schemeClr val="bg1"/>
+              </a:solidFill>
+            </a:endParaRPr>
+          </a:p>
+        </p:txBody>
+      </p:sp>
+      <p:sp>
+        <p:nvSpPr>
+          <p:cNvPr id="4" name="Title 3"/>
+          <p:cNvSpPr>
+            <a:spLocks noGrp="1"/>
+          </p:cNvSpPr>
+          <p:nvPr>
+            <p:ph type="title"/>
+          </p:nvPr>
+        </p:nvSpPr>
+        <p:spPr/>
+        <p:txBody>
+          <a:bodyPr/>
+          <a:lstStyle/>
+          <a:p>
+            <a:r>
+              <a:rPr lang="en-US" dirty="0"/>
+              <a:t>SQL </a:t>
+            </a:r>
+            <a:r>
+              <a:rPr lang="bg-BG" dirty="0"/>
+              <a:t>скрипт</a:t>
+            </a:r>
+            <a:endParaRPr lang="en-US" dirty="0"/>
+          </a:p>
+        </p:txBody>
+      </p:sp>
+      <p:sp>
+        <p:nvSpPr>
+          <p:cNvPr id="5" name="Slide Number">
+            <a:extLst>
+              <a:ext uri="{FF2B5EF4-FFF2-40B4-BE49-F238E27FC236}">
+                <a16:creationId xmlns:a16="http://schemas.microsoft.com/office/drawing/2014/main" id="{F94DA94C-7474-9E47-A544-0AE72CBC0B18}"/>
+              </a:ext>
+            </a:extLst>
+          </p:cNvPr>
+          <p:cNvSpPr>
+            <a:spLocks noGrp="1"/>
+          </p:cNvSpPr>
+          <p:nvPr>
+            <p:ph type="sldNum" sz="quarter" idx="5"/>
+          </p:nvPr>
+        </p:nvSpPr>
+        <p:spPr>
+          <a:xfrm>
+            <a:off x="11753030" y="6507000"/>
+            <a:ext cx="367414" cy="297000"/>
+          </a:xfrm>
+          <a:prstGeom prst="rect">
+            <a:avLst/>
+          </a:prstGeom>
+        </p:spPr>
+        <p:txBody>
+          <a:bodyPr vert="horz" lIns="91440" tIns="45720" rIns="91440" bIns="45720" rtlCol="0" anchor="b"/>
+          <a:lstStyle>
+            <a:lvl1pPr algn="r">
+              <a:defRPr sz="1000"/>
+            </a:lvl1pPr>
+          </a:lstStyle>
+          <a:p>
+            <a:fld id="{2BF067CD-8E6B-4360-9AA8-C5DF2A48A6D1}" type="slidenum">
+              <a:rPr lang="en-US" noProof="0" smtClean="0"/>
+              <a:pPr/>
+              <a:t>21</a:t>
+            </a:fld>
+            <a:endParaRPr lang="en-US" noProof="0" dirty="0"/>
+          </a:p>
+        </p:txBody>
+      </p:sp>
+      <p:sp>
+        <p:nvSpPr>
+          <p:cNvPr id="6" name="Rectangle 5">
+            <a:hlinkClick r:id="rId2"/>
+            <a:extLst>
+              <a:ext uri="{FF2B5EF4-FFF2-40B4-BE49-F238E27FC236}">
+                <a16:creationId xmlns:a16="http://schemas.microsoft.com/office/drawing/2014/main" id="{FCFFBFB8-3759-ED51-D833-ED782D0B77AE}"/>
+              </a:ext>
+            </a:extLst>
+          </p:cNvPr>
+          <p:cNvSpPr>
+            <a:spLocks noChangeArrowheads="1"/>
+          </p:cNvSpPr>
+          <p:nvPr/>
+        </p:nvSpPr>
+        <p:spPr bwMode="auto">
+          <a:xfrm>
+            <a:off x="2153203" y="2815990"/>
+            <a:ext cx="6345000" cy="3691010"/>
+          </a:xfrm>
+          <a:prstGeom prst="rect">
+            <a:avLst/>
+          </a:prstGeom>
+          <a:solidFill>
+            <a:schemeClr val="accent5">
+              <a:lumMod val="40000"/>
+              <a:lumOff val="60000"/>
+              <a:alpha val="20000"/>
+            </a:schemeClr>
+          </a:solidFill>
+          <a:ln w="12700">
+            <a:solidFill>
+              <a:schemeClr val="accent5">
+                <a:lumMod val="60000"/>
+                <a:lumOff val="40000"/>
+              </a:schemeClr>
+            </a:solidFill>
+          </a:ln>
+        </p:spPr>
+        <p:txBody>
+          <a:bodyPr wrap="square">
+            <a:spAutoFit/>
+          </a:bodyPr>
+          <a:lstStyle/>
+          <a:p>
+            <a:pPr>
+              <a:lnSpc>
+                <a:spcPct val="105000"/>
+              </a:lnSpc>
+            </a:pPr>
+            <a:r>
+              <a:rPr lang="en-US" sz="2800" b="1" noProof="1">
+                <a:solidFill>
+                  <a:schemeClr val="bg1"/>
+                </a:solidFill>
+                <a:latin typeface="Consolas" panose="020B0609020204030204" pitchFamily="49" charset="0"/>
+                <a:cs typeface="Arial" panose="020B0604020202020204" pitchFamily="34" charset="0"/>
+              </a:rPr>
+              <a:t>CREATE DATABASE </a:t>
+            </a:r>
+            <a:r>
+              <a:rPr lang="en-US" sz="2800" b="1" noProof="1">
+                <a:latin typeface="Consolas" panose="020B0609020204030204" pitchFamily="49" charset="0"/>
+                <a:cs typeface="Arial" panose="020B0604020202020204" pitchFamily="34" charset="0"/>
+              </a:rPr>
+              <a:t>TravelCompany;</a:t>
+            </a:r>
+          </a:p>
+          <a:p>
+            <a:pPr>
+              <a:lnSpc>
+                <a:spcPct val="105000"/>
+              </a:lnSpc>
+            </a:pPr>
+            <a:endParaRPr lang="en-US" sz="2800" b="1" noProof="1">
+              <a:latin typeface="Consolas" panose="020B0609020204030204" pitchFamily="49" charset="0"/>
+              <a:cs typeface="Arial" panose="020B0604020202020204" pitchFamily="34" charset="0"/>
+            </a:endParaRPr>
+          </a:p>
+          <a:p>
+            <a:pPr>
+              <a:lnSpc>
+                <a:spcPct val="105000"/>
+              </a:lnSpc>
+            </a:pPr>
+            <a:r>
+              <a:rPr lang="en-US" sz="2800" b="1" noProof="1">
+                <a:solidFill>
+                  <a:schemeClr val="bg1"/>
+                </a:solidFill>
+                <a:latin typeface="Consolas" panose="020B0609020204030204" pitchFamily="49" charset="0"/>
+                <a:cs typeface="Arial" panose="020B0604020202020204" pitchFamily="34" charset="0"/>
+              </a:rPr>
+              <a:t>USE</a:t>
+            </a:r>
+            <a:r>
+              <a:rPr lang="en-US" sz="2800" b="1" noProof="1">
+                <a:latin typeface="Consolas" panose="020B0609020204030204" pitchFamily="49" charset="0"/>
+                <a:cs typeface="Arial" panose="020B0604020202020204" pitchFamily="34" charset="0"/>
+              </a:rPr>
+              <a:t> TravelCompany</a:t>
+            </a:r>
+          </a:p>
+          <a:p>
+            <a:pPr>
+              <a:lnSpc>
+                <a:spcPct val="105000"/>
+              </a:lnSpc>
+            </a:pPr>
+            <a:endParaRPr lang="en-US" sz="2800" b="1" noProof="1">
+              <a:latin typeface="Consolas" panose="020B0609020204030204" pitchFamily="49" charset="0"/>
+              <a:cs typeface="Arial" panose="020B0604020202020204" pitchFamily="34" charset="0"/>
+            </a:endParaRPr>
+          </a:p>
+          <a:p>
+            <a:pPr>
+              <a:lnSpc>
+                <a:spcPct val="105000"/>
+              </a:lnSpc>
+            </a:pPr>
+            <a:r>
+              <a:rPr lang="en-US" sz="2800" b="1" noProof="1">
+                <a:solidFill>
+                  <a:schemeClr val="bg1"/>
+                </a:solidFill>
+                <a:latin typeface="Consolas" panose="020B0609020204030204" pitchFamily="49" charset="0"/>
+                <a:cs typeface="Arial" panose="020B0604020202020204" pitchFamily="34" charset="0"/>
+              </a:rPr>
+              <a:t>CREATE TABLE </a:t>
+            </a:r>
+            <a:r>
+              <a:rPr lang="en-US" sz="2800" b="1" noProof="1">
+                <a:latin typeface="Consolas" panose="020B0609020204030204" pitchFamily="49" charset="0"/>
+                <a:cs typeface="Arial" panose="020B0604020202020204" pitchFamily="34" charset="0"/>
+              </a:rPr>
+              <a:t>Customers (</a:t>
+            </a:r>
+          </a:p>
+          <a:p>
+            <a:pPr>
+              <a:lnSpc>
+                <a:spcPct val="105000"/>
+              </a:lnSpc>
+            </a:pPr>
+            <a:r>
+              <a:rPr lang="en-US" sz="2800" b="1" noProof="1">
+                <a:latin typeface="Consolas" panose="020B0609020204030204" pitchFamily="49" charset="0"/>
+                <a:cs typeface="Arial" panose="020B0604020202020204" pitchFamily="34" charset="0"/>
+              </a:rPr>
+              <a:t>	…</a:t>
+            </a:r>
+          </a:p>
+          <a:p>
+            <a:pPr>
+              <a:lnSpc>
+                <a:spcPct val="105000"/>
+              </a:lnSpc>
+            </a:pPr>
+            <a:r>
+              <a:rPr lang="en-US" sz="2800" b="1" noProof="1">
+                <a:latin typeface="Consolas" panose="020B0609020204030204" pitchFamily="49" charset="0"/>
+                <a:cs typeface="Arial" panose="020B0604020202020204" pitchFamily="34" charset="0"/>
+              </a:rPr>
+              <a:t>);</a:t>
+            </a:r>
+          </a:p>
+          <a:p>
+            <a:pPr>
+              <a:lnSpc>
+                <a:spcPct val="105000"/>
+              </a:lnSpc>
+            </a:pPr>
+            <a:r>
+              <a:rPr lang="en-US" sz="2800" b="1" noProof="1">
+                <a:latin typeface="Consolas" panose="020B0609020204030204" pitchFamily="49" charset="0"/>
+                <a:cs typeface="Arial" panose="020B0604020202020204" pitchFamily="34" charset="0"/>
+              </a:rPr>
+              <a:t>…</a:t>
+            </a:r>
+          </a:p>
+        </p:txBody>
+      </p:sp>
+      <p:sp>
+        <p:nvSpPr>
+          <p:cNvPr id="8" name="AutoShape 5">
+            <a:extLst>
+              <a:ext uri="{FF2B5EF4-FFF2-40B4-BE49-F238E27FC236}">
+                <a16:creationId xmlns:a16="http://schemas.microsoft.com/office/drawing/2014/main" id="{5AE817D0-F70B-DA7A-07F1-C6D349E46BAC}"/>
+              </a:ext>
+            </a:extLst>
+          </p:cNvPr>
+          <p:cNvSpPr>
+            <a:spLocks noChangeArrowheads="1"/>
+          </p:cNvSpPr>
+          <p:nvPr/>
+        </p:nvSpPr>
+        <p:spPr bwMode="auto">
+          <a:xfrm>
+            <a:off x="8463797" y="2882769"/>
+            <a:ext cx="3150000" cy="546231"/>
+          </a:xfrm>
+          <a:prstGeom prst="wedgeRoundRectCallout">
+            <a:avLst>
+              <a:gd name="adj1" fmla="val -59139"/>
+              <a:gd name="adj2" fmla="val -5226"/>
+              <a:gd name="adj3" fmla="val 16667"/>
+            </a:avLst>
+          </a:prstGeom>
+          <a:solidFill>
+            <a:schemeClr val="tx1">
+              <a:alpha val="80000"/>
+            </a:schemeClr>
+          </a:solidFill>
+          <a:ln w="19050">
+            <a:solidFill>
+              <a:schemeClr val="tx1">
+                <a:alpha val="80000"/>
+              </a:schemeClr>
+            </a:solidFill>
+          </a:ln>
+          <a:effectLst/>
+        </p:spPr>
+        <p:style>
+          <a:lnRef idx="2">
+            <a:schemeClr val="accent1">
+              <a:shade val="50000"/>
+            </a:schemeClr>
+          </a:lnRef>
+          <a:fillRef idx="1001">
+            <a:schemeClr val="dk2"/>
+          </a:fillRef>
+          <a:effectRef idx="0">
+            <a:schemeClr val="accent1"/>
+          </a:effectRef>
+          <a:fontRef idx="minor">
+            <a:schemeClr val="lt1"/>
+          </a:fontRef>
+        </p:style>
+        <p:txBody>
+          <a:bodyPr rot="0" spcFirstLastPara="0" vertOverflow="overflow" horzOverflow="overflow" vert="horz" wrap="square" lIns="91440" tIns="45720" rIns="91440" bIns="45720" numCol="1" spcCol="0" rtlCol="0" fromWordArt="0" anchor="ctr" anchorCtr="0" forceAA="0" compatLnSpc="1">
+            <a:prstTxWarp prst="textNoShape">
+              <a:avLst/>
+            </a:prstTxWarp>
+            <a:noAutofit/>
+          </a:bodyPr>
+          <a:lstStyle/>
+          <a:p>
+            <a:pPr algn="ctr"/>
+            <a:r>
+              <a:rPr lang="bg-BG" sz="2400" b="1" dirty="0">
+                <a:solidFill>
+                  <a:srgbClr val="FFFFFF"/>
+                </a:solidFill>
+                <a:effectLst>
+                  <a:outerShdw blurRad="38100" dist="38100" dir="2700000" algn="tl">
+                    <a:srgbClr val="000000">
+                      <a:alpha val="43137"/>
+                    </a:srgbClr>
+                  </a:outerShdw>
+                </a:effectLst>
+              </a:rPr>
+              <a:t>Име на базата данни</a:t>
+            </a:r>
+          </a:p>
+        </p:txBody>
+      </p:sp>
+      <p:sp>
+        <p:nvSpPr>
+          <p:cNvPr id="9" name="AutoShape 5">
+            <a:extLst>
+              <a:ext uri="{FF2B5EF4-FFF2-40B4-BE49-F238E27FC236}">
+                <a16:creationId xmlns:a16="http://schemas.microsoft.com/office/drawing/2014/main" id="{0C2EBE44-DE6D-C743-8C9B-D621CDF0BF2F}"/>
+              </a:ext>
+            </a:extLst>
+          </p:cNvPr>
+          <p:cNvSpPr>
+            <a:spLocks noChangeArrowheads="1"/>
+          </p:cNvSpPr>
+          <p:nvPr/>
+        </p:nvSpPr>
+        <p:spPr bwMode="auto">
+          <a:xfrm>
+            <a:off x="5976816" y="3620841"/>
+            <a:ext cx="4500000" cy="945000"/>
+          </a:xfrm>
+          <a:prstGeom prst="wedgeRoundRectCallout">
+            <a:avLst>
+              <a:gd name="adj1" fmla="val -56817"/>
+              <a:gd name="adj2" fmla="val -15270"/>
+              <a:gd name="adj3" fmla="val 16667"/>
+            </a:avLst>
+          </a:prstGeom>
+          <a:solidFill>
+            <a:schemeClr val="tx1">
+              <a:alpha val="80000"/>
+            </a:schemeClr>
+          </a:solidFill>
+          <a:ln w="19050">
+            <a:solidFill>
+              <a:schemeClr val="tx1">
+                <a:alpha val="80000"/>
+              </a:schemeClr>
+            </a:solidFill>
+          </a:ln>
+          <a:effectLst/>
+        </p:spPr>
+        <p:style>
+          <a:lnRef idx="2">
+            <a:schemeClr val="accent1">
+              <a:shade val="50000"/>
+            </a:schemeClr>
+          </a:lnRef>
+          <a:fillRef idx="1001">
+            <a:schemeClr val="dk2"/>
+          </a:fillRef>
+          <a:effectRef idx="0">
+            <a:schemeClr val="accent1"/>
+          </a:effectRef>
+          <a:fontRef idx="minor">
+            <a:schemeClr val="lt1"/>
+          </a:fontRef>
+        </p:style>
+        <p:txBody>
+          <a:bodyPr rot="0" spcFirstLastPara="0" vertOverflow="overflow" horzOverflow="overflow" vert="horz" wrap="square" lIns="91440" tIns="45720" rIns="91440" bIns="45720" numCol="1" spcCol="0" rtlCol="0" fromWordArt="0" anchor="ctr" anchorCtr="0" forceAA="0" compatLnSpc="1">
+            <a:prstTxWarp prst="textNoShape">
+              <a:avLst/>
+            </a:prstTxWarp>
+            <a:noAutofit/>
+          </a:bodyPr>
+          <a:lstStyle/>
+          <a:p>
+            <a:pPr algn="ctr"/>
+            <a:r>
+              <a:rPr lang="bg-BG" sz="2400" b="1" dirty="0">
+                <a:solidFill>
+                  <a:srgbClr val="FFFFFF"/>
+                </a:solidFill>
+                <a:effectLst>
+                  <a:outerShdw blurRad="38100" dist="38100" dir="2700000" algn="tl">
+                    <a:srgbClr val="000000">
+                      <a:alpha val="43137"/>
+                    </a:srgbClr>
+                  </a:outerShdw>
+                </a:effectLst>
+              </a:rPr>
+              <a:t>Посочваме, че ще </a:t>
+            </a:r>
+            <a:r>
+              <a:rPr lang="bg-BG" sz="2400" b="1" dirty="0">
+                <a:solidFill>
+                  <a:schemeClr val="bg1">
+                    <a:lumMod val="60000"/>
+                    <a:lumOff val="40000"/>
+                  </a:schemeClr>
+                </a:solidFill>
+                <a:effectLst>
+                  <a:outerShdw blurRad="38100" dist="38100" dir="2700000" algn="tl">
+                    <a:srgbClr val="000000">
+                      <a:alpha val="43137"/>
+                    </a:srgbClr>
+                  </a:outerShdw>
+                </a:effectLst>
+              </a:rPr>
+              <a:t>използваме</a:t>
+            </a:r>
+            <a:r>
+              <a:rPr lang="bg-BG" sz="2400" b="1" dirty="0">
+                <a:solidFill>
+                  <a:srgbClr val="FFFFFF"/>
+                </a:solidFill>
+                <a:effectLst>
+                  <a:outerShdw blurRad="38100" dist="38100" dir="2700000" algn="tl">
+                    <a:srgbClr val="000000">
+                      <a:alpha val="43137"/>
+                    </a:srgbClr>
+                  </a:outerShdw>
+                </a:effectLst>
+              </a:rPr>
+              <a:t> </a:t>
+            </a:r>
+            <a:r>
+              <a:rPr lang="bg-BG" sz="2400" b="1" dirty="0">
+                <a:solidFill>
+                  <a:schemeClr val="bg1">
+                    <a:lumMod val="60000"/>
+                    <a:lumOff val="40000"/>
+                  </a:schemeClr>
+                </a:solidFill>
+                <a:effectLst>
+                  <a:outerShdw blurRad="38100" dist="38100" dir="2700000" algn="tl">
+                    <a:srgbClr val="000000">
+                      <a:alpha val="43137"/>
+                    </a:srgbClr>
+                  </a:outerShdw>
+                </a:effectLst>
+              </a:rPr>
+              <a:t>новосъздадената</a:t>
+            </a:r>
+            <a:r>
+              <a:rPr lang="bg-BG" sz="2400" b="1" dirty="0">
+                <a:solidFill>
+                  <a:srgbClr val="FFFFFF"/>
+                </a:solidFill>
+                <a:effectLst>
+                  <a:outerShdw blurRad="38100" dist="38100" dir="2700000" algn="tl">
+                    <a:srgbClr val="000000">
+                      <a:alpha val="43137"/>
+                    </a:srgbClr>
+                  </a:outerShdw>
+                </a:effectLst>
+              </a:rPr>
+              <a:t> база данни</a:t>
+            </a:r>
+          </a:p>
+        </p:txBody>
+      </p:sp>
+      <p:sp>
+        <p:nvSpPr>
+          <p:cNvPr id="10" name="AutoShape 5">
+            <a:extLst>
+              <a:ext uri="{FF2B5EF4-FFF2-40B4-BE49-F238E27FC236}">
+                <a16:creationId xmlns:a16="http://schemas.microsoft.com/office/drawing/2014/main" id="{8E867AC2-3131-92BE-A6D9-9C384876972C}"/>
+              </a:ext>
+            </a:extLst>
+          </p:cNvPr>
+          <p:cNvSpPr>
+            <a:spLocks noChangeArrowheads="1"/>
+          </p:cNvSpPr>
+          <p:nvPr/>
+        </p:nvSpPr>
+        <p:spPr bwMode="auto">
+          <a:xfrm>
+            <a:off x="5520701" y="5437427"/>
+            <a:ext cx="3320299" cy="556573"/>
+          </a:xfrm>
+          <a:prstGeom prst="wedgeRoundRectCallout">
+            <a:avLst>
+              <a:gd name="adj1" fmla="val -34713"/>
+              <a:gd name="adj2" fmla="val -80936"/>
+              <a:gd name="adj3" fmla="val 16667"/>
+            </a:avLst>
+          </a:prstGeom>
+          <a:solidFill>
+            <a:schemeClr val="tx1">
+              <a:alpha val="80000"/>
+            </a:schemeClr>
+          </a:solidFill>
+          <a:ln w="19050">
+            <a:solidFill>
+              <a:schemeClr val="tx1">
+                <a:alpha val="80000"/>
+              </a:schemeClr>
+            </a:solidFill>
+          </a:ln>
+          <a:effectLst/>
+        </p:spPr>
+        <p:style>
+          <a:lnRef idx="2">
+            <a:schemeClr val="accent1">
+              <a:shade val="50000"/>
+            </a:schemeClr>
+          </a:lnRef>
+          <a:fillRef idx="1001">
+            <a:schemeClr val="dk2"/>
+          </a:fillRef>
+          <a:effectRef idx="0">
+            <a:schemeClr val="accent1"/>
+          </a:effectRef>
+          <a:fontRef idx="minor">
+            <a:schemeClr val="lt1"/>
+          </a:fontRef>
+        </p:style>
+        <p:txBody>
+          <a:bodyPr rot="0" spcFirstLastPara="0" vertOverflow="overflow" horzOverflow="overflow" vert="horz" wrap="square" lIns="91440" tIns="45720" rIns="91440" bIns="45720" numCol="1" spcCol="0" rtlCol="0" fromWordArt="0" anchor="ctr" anchorCtr="0" forceAA="0" compatLnSpc="1">
+            <a:prstTxWarp prst="textNoShape">
+              <a:avLst/>
+            </a:prstTxWarp>
+            <a:noAutofit/>
+          </a:bodyPr>
+          <a:lstStyle/>
+          <a:p>
+            <a:pPr algn="ctr"/>
+            <a:r>
+              <a:rPr lang="bg-BG" sz="2400" b="1" dirty="0">
+                <a:solidFill>
+                  <a:srgbClr val="FFFFFF"/>
+                </a:solidFill>
+                <a:effectLst>
+                  <a:outerShdw blurRad="38100" dist="38100" dir="2700000" algn="tl">
+                    <a:srgbClr val="000000">
+                      <a:alpha val="43137"/>
+                    </a:srgbClr>
+                  </a:outerShdw>
+                </a:effectLst>
+              </a:rPr>
+              <a:t>Създаване на таблици</a:t>
+            </a:r>
+          </a:p>
+        </p:txBody>
+      </p:sp>
+    </p:spTree>
+    <p:extLst>
+      <p:ext uri="{BB962C8B-B14F-4D97-AF65-F5344CB8AC3E}">
+        <p14:creationId xmlns:p14="http://schemas.microsoft.com/office/powerpoint/2010/main" val="115927302"/>
+      </p:ext>
+    </p:extLst>
+  </p:cSld>
+  <p:clrMapOvr>
+    <a:masterClrMapping/>
+  </p:clrMapOvr>
+  <mc:AlternateContent xmlns:mc="http://schemas.openxmlformats.org/markup-compatibility/2006" xmlns:p14="http://schemas.microsoft.com/office/powerpoint/2010/main">
+    <mc:Choice Requires="p14">
+      <p:transition spd="slow" p14:dur="2000" advClick="0" advTm="5000"/>
+    </mc:Choice>
+    <mc:Fallback xmlns="">
+      <p:transition spd="slow" advClick="0" advTm="5000"/>
+    </mc:Fallback>
+  </mc:AlternateContent>
+  <p:timing>
+    <p:tnLst>
+      <p:par>
+        <p:cTn id="1" dur="indefinite" restart="never" nodeType="tmRoot">
+          <p:childTnLst>
+            <p:seq concurrent="1" nextAc="seek">
+              <p:cTn id="2" dur="indefinite" nodeType="mainSeq">
+                <p:childTnLst>
+                  <p:par>
+                    <p:cTn id="3" fill="hold">
+                      <p:stCondLst>
+                        <p:cond delay="indefinite"/>
+                      </p:stCondLst>
+                      <p:childTnLst>
+                        <p:par>
+                          <p:cTn id="4" fill="hold">
+                            <p:stCondLst>
+                              <p:cond delay="0"/>
+                            </p:stCondLst>
+                            <p:childTnLst>
+                              <p:par>
+                                <p:cTn id="5" presetID="1" presetClass="entr" presetSubtype="0" fill="hold" grpId="0" nodeType="clickEffect">
+                                  <p:stCondLst>
+                                    <p:cond delay="0"/>
+                                  </p:stCondLst>
+                                  <p:childTnLst>
+                                    <p:set>
+                                      <p:cBhvr>
+                                        <p:cTn id="6" dur="1" fill="hold">
+                                          <p:stCondLst>
+                                            <p:cond delay="0"/>
+                                          </p:stCondLst>
+                                        </p:cTn>
+                                        <p:tgtEl>
+                                          <p:spTgt spid="8"/>
+                                        </p:tgtEl>
+                                        <p:attrNameLst>
+                                          <p:attrName>style.visibility</p:attrName>
+                                        </p:attrNameLst>
+                                      </p:cBhvr>
+                                      <p:to>
+                                        <p:strVal val="visible"/>
+                                      </p:to>
+                                    </p:set>
+                                  </p:childTnLst>
+                                </p:cTn>
+                              </p:par>
+                            </p:childTnLst>
+                          </p:cTn>
+                        </p:par>
+                      </p:childTnLst>
+                    </p:cTn>
+                  </p:par>
+                  <p:par>
+                    <p:cTn id="7" fill="hold">
+                      <p:stCondLst>
+                        <p:cond delay="indefinite"/>
+                      </p:stCondLst>
+                      <p:childTnLst>
+                        <p:par>
+                          <p:cTn id="8" fill="hold">
+                            <p:stCondLst>
+                              <p:cond delay="0"/>
+                            </p:stCondLst>
+                            <p:childTnLst>
+                              <p:par>
+                                <p:cTn id="9" presetID="1" presetClass="entr" presetSubtype="0" fill="hold" grpId="0" nodeType="clickEffect">
+                                  <p:stCondLst>
+                                    <p:cond delay="0"/>
+                                  </p:stCondLst>
+                                  <p:childTnLst>
+                                    <p:set>
+                                      <p:cBhvr>
+                                        <p:cTn id="10" dur="1" fill="hold">
+                                          <p:stCondLst>
+                                            <p:cond delay="0"/>
+                                          </p:stCondLst>
+                                        </p:cTn>
+                                        <p:tgtEl>
+                                          <p:spTgt spid="9"/>
+                                        </p:tgtEl>
+                                        <p:attrNameLst>
+                                          <p:attrName>style.visibility</p:attrName>
+                                        </p:attrNameLst>
+                                      </p:cBhvr>
+                                      <p:to>
+                                        <p:strVal val="visible"/>
+                                      </p:to>
+                                    </p:set>
+                                  </p:childTnLst>
+                                </p:cTn>
+                              </p:par>
+                            </p:childTnLst>
+                          </p:cTn>
+                        </p:par>
+                      </p:childTnLst>
+                    </p:cTn>
+                  </p:par>
+                  <p:par>
+                    <p:cTn id="11" fill="hold">
+                      <p:stCondLst>
+                        <p:cond delay="indefinite"/>
+                      </p:stCondLst>
+                      <p:childTnLst>
+                        <p:par>
+                          <p:cTn id="12" fill="hold">
+                            <p:stCondLst>
+                              <p:cond delay="0"/>
+                            </p:stCondLst>
+                            <p:childTnLst>
+                              <p:par>
+                                <p:cTn id="13" presetID="1" presetClass="entr" presetSubtype="0" fill="hold" grpId="0" nodeType="clickEffect">
+                                  <p:stCondLst>
+                                    <p:cond delay="0"/>
+                                  </p:stCondLst>
+                                  <p:childTnLst>
+                                    <p:set>
+                                      <p:cBhvr>
+                                        <p:cTn id="14" dur="1" fill="hold">
+                                          <p:stCondLst>
+                                            <p:cond delay="0"/>
+                                          </p:stCondLst>
+                                        </p:cTn>
+                                        <p:tgtEl>
+                                          <p:spTgt spid="10"/>
+                                        </p:tgtEl>
+                                        <p:attrNameLst>
+                                          <p:attrName>style.visibility</p:attrName>
+                                        </p:attrNameLst>
+                                      </p:cBhvr>
+                                      <p:to>
+                                        <p:strVal val="visible"/>
+                                      </p:to>
+                                    </p:set>
+                                  </p:childTnLst>
+                                </p:cTn>
+                              </p:par>
+                            </p:childTnLst>
+                          </p:cTn>
+                        </p:par>
+                      </p:childTnLst>
+                    </p:cTn>
+                  </p:par>
+                </p:childTnLst>
+              </p:cTn>
+              <p:prevCondLst>
+                <p:cond evt="onPrev" delay="0">
+                  <p:tgtEl>
+                    <p:sldTgt/>
+                  </p:tgtEl>
+                </p:cond>
+              </p:prevCondLst>
+              <p:nextCondLst>
+                <p:cond evt="onNext" delay="0">
+                  <p:tgtEl>
+                    <p:sldTgt/>
+                  </p:tgtEl>
+                </p:cond>
+              </p:nextCondLst>
+            </p:seq>
+          </p:childTnLst>
+        </p:cTn>
+      </p:par>
+    </p:tnLst>
+    <p:bldLst>
+      <p:bldP spid="8" grpId="0" animBg="1"/>
+      <p:bldP spid="9" grpId="0" animBg="1"/>
+      <p:bldP spid="10" grpId="0" animBg="1"/>
+    </p:bldLst>
+  </p:timing>
+</p:sld>
+</file>
+
+<file path=ppt/slides/slide22.xml><?xml version="1.0" encoding="utf-8"?>
+<p:sld xmlns:a="http://schemas.openxmlformats.org/drawingml/2006/main" xmlns:r="http://schemas.openxmlformats.org/officeDocument/2006/relationships" xmlns:p="http://schemas.openxmlformats.org/presentationml/2006/main">
+  <p:cSld>
+    <p:spTree>
+      <p:nvGrpSpPr>
+        <p:cNvPr id="1" name=""/>
+        <p:cNvGrpSpPr/>
+        <p:nvPr/>
+      </p:nvGrpSpPr>
+      <p:grpSpPr>
+        <a:xfrm>
+          <a:off x="0" y="0"/>
+          <a:ext cx="0" cy="0"/>
+          <a:chOff x="0" y="0"/>
+          <a:chExt cx="0" cy="0"/>
+        </a:xfrm>
+      </p:grpSpPr>
+      <p:pic>
+        <p:nvPicPr>
           <p:cNvPr id="10242" name="Picture 2" descr="Ð¡Ð²ÑÑÐ·Ð°Ð½Ð¾ Ð¸Ð·Ð¾Ð±ÑÐ°Ð¶ÐµÐ½Ð¸Ðµ">
             <a:extLst>
               <a:ext uri="{FF2B5EF4-FFF2-40B4-BE49-F238E27FC236}">
@@ -11968,7 +12842,7 @@
 </p:sld>
 </file>
 
-<file path=ppt/slides/slide21.xml><?xml version="1.0" encoding="utf-8"?>
+<file path=ppt/slides/slide23.xml><?xml version="1.0" encoding="utf-8"?>
 <p:sld xmlns:a="http://schemas.openxmlformats.org/drawingml/2006/main" xmlns:r="http://schemas.openxmlformats.org/officeDocument/2006/relationships" xmlns:p="http://schemas.openxmlformats.org/presentationml/2006/main">
   <p:cSld>
     <p:spTree>
@@ -12174,7 +13048,7 @@
 </p:sld>
 </file>
 
-<file path=ppt/slides/slide22.xml><?xml version="1.0" encoding="utf-8"?>
+<file path=ppt/slides/slide24.xml><?xml version="1.0" encoding="utf-8"?>
 <p:sld xmlns:a="http://schemas.openxmlformats.org/drawingml/2006/main" xmlns:r="http://schemas.openxmlformats.org/officeDocument/2006/relationships" xmlns:p="http://schemas.openxmlformats.org/presentationml/2006/main">
   <p:cSld>
     <p:spTree>
@@ -12215,7 +13089,7 @@
             <a:fld id="{2BF067CD-8E6B-4360-9AA8-C5DF2A48A6D1}" type="slidenum">
               <a:rPr lang="en-US" noProof="0" smtClean="0"/>
               <a:pPr/>
-              <a:t>22</a:t>
+              <a:t>24</a:t>
             </a:fld>
             <a:endParaRPr lang="en-US" noProof="0" dirty="0"/>
           </a:p>
@@ -12401,7 +13275,7 @@
 </p:sld>
 </file>
 
-<file path=ppt/slides/slide23.xml><?xml version="1.0" encoding="utf-8"?>
+<file path=ppt/slides/slide25.xml><?xml version="1.0" encoding="utf-8"?>
 <p:sld xmlns:a="http://schemas.openxmlformats.org/drawingml/2006/main" xmlns:r="http://schemas.openxmlformats.org/officeDocument/2006/relationships" xmlns:p="http://schemas.openxmlformats.org/presentationml/2006/main">
   <p:cSld>
     <p:spTree>
@@ -12459,7 +13333,7 @@
             </a:r>
             <a:r>
               <a:rPr lang="bg-BG" dirty="0"/>
-              <a:t>до името на базата данни, която се визуализира в списъка с бази данни</a:t>
+              <a:t>до името на базата данни, която се визуализира в листа с бази данни</a:t>
             </a:r>
             <a:endParaRPr lang="en-US" dirty="0"/>
           </a:p>
@@ -12486,7 +13360,7 @@
             </a:r>
             <a:r>
               <a:rPr lang="en-US" dirty="0"/>
-              <a:t> </a:t>
+              <a:t> [</a:t>
             </a:r>
             <a:r>
               <a:rPr lang="en-US" b="1" dirty="0">
@@ -12496,7 +13370,7 @@
             </a:r>
             <a:r>
               <a:rPr lang="en-US" dirty="0"/>
-              <a:t> -&gt;</a:t>
+              <a:t>] -&gt;</a:t>
             </a:r>
             <a:r>
               <a:rPr lang="bg-BG" dirty="0"/>
@@ -12575,8 +13449,8 @@
         </p:blipFill>
         <p:spPr>
           <a:xfrm>
-            <a:off x="3216000" y="3413891"/>
-            <a:ext cx="6865501" cy="2856982"/>
+            <a:off x="3531000" y="3807746"/>
+            <a:ext cx="4486901" cy="1867161"/>
           </a:xfrm>
           <a:prstGeom prst="rect">
             <a:avLst/>
@@ -12717,7 +13591,7 @@
 </p:sld>
 </file>
 
-<file path=ppt/slides/slide24.xml><?xml version="1.0" encoding="utf-8"?>
+<file path=ppt/slides/slide26.xml><?xml version="1.0" encoding="utf-8"?>
 <p:sld xmlns:a="http://schemas.openxmlformats.org/drawingml/2006/main" xmlns:r="http://schemas.openxmlformats.org/officeDocument/2006/relationships" xmlns:p="http://schemas.openxmlformats.org/presentationml/2006/main">
   <p:cSld>
     <p:spTree>
@@ -12758,7 +13632,7 @@
             <a:fld id="{2BF067CD-8E6B-4360-9AA8-C5DF2A48A6D1}" type="slidenum">
               <a:rPr lang="en-US" noProof="0" smtClean="0"/>
               <a:pPr/>
-              <a:t>24</a:t>
+              <a:t>26</a:t>
             </a:fld>
             <a:endParaRPr lang="en-US" noProof="0" dirty="0"/>
           </a:p>
@@ -12964,8 +13838,8 @@
         </p:blipFill>
         <p:spPr bwMode="auto">
           <a:xfrm>
-            <a:off x="3407250" y="1907511"/>
-            <a:ext cx="5377500" cy="1969975"/>
+            <a:off x="3823500" y="2214000"/>
+            <a:ext cx="4545000" cy="1665000"/>
           </a:xfrm>
           <a:prstGeom prst="rect">
             <a:avLst/>
@@ -13002,8 +13876,8 @@
         </p:blipFill>
         <p:spPr>
           <a:xfrm>
-            <a:off x="4459911" y="4588872"/>
-            <a:ext cx="3272177" cy="1970538"/>
+            <a:off x="4848823" y="4896875"/>
+            <a:ext cx="2494354" cy="1502125"/>
           </a:xfrm>
           <a:prstGeom prst="rect">
             <a:avLst/>
@@ -13144,7 +14018,7 @@
 </p:sld>
 </file>
 
-<file path=ppt/slides/slide25.xml><?xml version="1.0" encoding="utf-8"?>
+<file path=ppt/slides/slide27.xml><?xml version="1.0" encoding="utf-8"?>
 <p:sld xmlns:a="http://schemas.openxmlformats.org/drawingml/2006/main" xmlns:r="http://schemas.openxmlformats.org/officeDocument/2006/relationships" xmlns:p="http://schemas.openxmlformats.org/presentationml/2006/main">
   <p:cSld>
     <p:spTree>
@@ -13532,7 +14406,7 @@
             <a:fld id="{2BF067CD-8E6B-4360-9AA8-C5DF2A48A6D1}" type="slidenum">
               <a:rPr lang="en-US" noProof="0" smtClean="0"/>
               <a:pPr/>
-              <a:t>25</a:t>
+              <a:t>27</a:t>
             </a:fld>
             <a:endParaRPr lang="en-US" noProof="0" dirty="0"/>
           </a:p>
@@ -13804,7 +14678,7 @@
 </p:sld>
 </file>
 
-<file path=ppt/slides/slide26.xml><?xml version="1.0" encoding="utf-8"?>
+<file path=ppt/slides/slide28.xml><?xml version="1.0" encoding="utf-8"?>
 <p:sld xmlns:a="http://schemas.openxmlformats.org/drawingml/2006/main" xmlns:r="http://schemas.openxmlformats.org/officeDocument/2006/relationships" xmlns:p="http://schemas.openxmlformats.org/presentationml/2006/main">
   <p:cSld>
     <p:spTree>
@@ -13974,8 +14848,8 @@
         </p:blipFill>
         <p:spPr>
           <a:xfrm>
-            <a:off x="750536" y="2229180"/>
-            <a:ext cx="3554761" cy="2950949"/>
+            <a:off x="1101000" y="2441901"/>
+            <a:ext cx="3194761" cy="2652099"/>
           </a:xfrm>
           <a:prstGeom prst="rect">
             <a:avLst/>
@@ -13997,7 +14871,7 @@
         </p:nvSpPr>
         <p:spPr>
           <a:xfrm>
-            <a:off x="4693426" y="3537218"/>
+            <a:off x="4865431" y="3747114"/>
             <a:ext cx="571361" cy="461464"/>
           </a:xfrm>
           <a:prstGeom prst="rightArrow">
@@ -14103,7 +14977,7 @@
             <a:fld id="{2BF067CD-8E6B-4360-9AA8-C5DF2A48A6D1}" type="slidenum">
               <a:rPr lang="en-US" noProof="0" smtClean="0"/>
               <a:pPr/>
-              <a:t>26</a:t>
+              <a:t>28</a:t>
             </a:fld>
             <a:endParaRPr lang="en-US" noProof="0" dirty="0"/>
           </a:p>
@@ -14209,7 +15083,7 @@
         </p:nvSpPr>
         <p:spPr bwMode="auto">
           <a:xfrm>
-            <a:off x="3531000" y="5222769"/>
+            <a:off x="3531000" y="5192949"/>
             <a:ext cx="4320000" cy="546231"/>
           </a:xfrm>
           <a:prstGeom prst="wedgeRoundRectCallout">
@@ -14589,7 +15463,7 @@
 </p:sld>
 </file>
 
-<file path=ppt/slides/slide27.xml><?xml version="1.0" encoding="utf-8"?>
+<file path=ppt/slides/slide29.xml><?xml version="1.0" encoding="utf-8"?>
 <p:sld xmlns:a="http://schemas.openxmlformats.org/drawingml/2006/main" xmlns:r="http://schemas.openxmlformats.org/officeDocument/2006/relationships" xmlns:p="http://schemas.openxmlformats.org/presentationml/2006/main">
   <p:cSld>
     <p:spTree>
@@ -14960,7 +15834,7 @@
             <a:fld id="{2BF067CD-8E6B-4360-9AA8-C5DF2A48A6D1}" type="slidenum">
               <a:rPr lang="en-US" noProof="0" smtClean="0"/>
               <a:pPr/>
-              <a:t>27</a:t>
+              <a:t>29</a:t>
             </a:fld>
             <a:endParaRPr lang="en-US" noProof="0" dirty="0"/>
           </a:p>
@@ -15214,7 +16088,166 @@
 </p:sld>
 </file>
 
-<file path=ppt/slides/slide28.xml><?xml version="1.0" encoding="utf-8"?>
+<file path=ppt/slides/slide3.xml><?xml version="1.0" encoding="utf-8"?>
+<p:sld xmlns:a="http://schemas.openxmlformats.org/drawingml/2006/main" xmlns:r="http://schemas.openxmlformats.org/officeDocument/2006/relationships" xmlns:p="http://schemas.openxmlformats.org/presentationml/2006/main">
+  <p:cSld>
+    <p:spTree>
+      <p:nvGrpSpPr>
+        <p:cNvPr id="1" name=""/>
+        <p:cNvGrpSpPr/>
+        <p:nvPr/>
+      </p:nvGrpSpPr>
+      <p:grpSpPr>
+        <a:xfrm>
+          <a:off x="0" y="0"/>
+          <a:ext cx="0" cy="0"/>
+          <a:chOff x="0" y="0"/>
+          <a:chExt cx="0" cy="0"/>
+        </a:xfrm>
+      </p:grpSpPr>
+      <p:pic>
+        <p:nvPicPr>
+          <p:cNvPr id="6" name="Picture 4" descr="Ð ÐµÐ·ÑÐ»ÑÐ°Ñ Ñ Ð¸Ð·Ð¾Ð±ÑÐ°Ð¶ÐµÐ½Ð¸Ðµ Ð·Ð° sql server express png">
+            <a:extLst>
+              <a:ext uri="{FF2B5EF4-FFF2-40B4-BE49-F238E27FC236}">
+                <a16:creationId xmlns:a16="http://schemas.microsoft.com/office/drawing/2014/main" id="{ABA81264-79EA-4C61-B859-F609E78C6876}"/>
+              </a:ext>
+            </a:extLst>
+          </p:cNvPr>
+          <p:cNvPicPr>
+            <a:picLocks noChangeAspect="1" noChangeArrowheads="1"/>
+          </p:cNvPicPr>
+          <p:nvPr/>
+        </p:nvPicPr>
+        <p:blipFill>
+          <a:blip r:embed="rId2" cstate="print">
+            <a:extLst>
+              <a:ext uri="{28A0092B-C50C-407E-A947-70E740481C1C}">
+                <a14:useLocalDpi xmlns:a14="http://schemas.microsoft.com/office/drawing/2010/main" val="0"/>
+              </a:ext>
+            </a:extLst>
+          </a:blip>
+          <a:srcRect/>
+          <a:stretch>
+            <a:fillRect/>
+          </a:stretch>
+        </p:blipFill>
+        <p:spPr bwMode="auto">
+          <a:xfrm>
+            <a:off x="4675658" y="1384495"/>
+            <a:ext cx="2840683" cy="2305483"/>
+          </a:xfrm>
+          <a:prstGeom prst="rect">
+            <a:avLst/>
+          </a:prstGeom>
+          <a:noFill/>
+          <a:extLst>
+            <a:ext uri="{909E8E84-426E-40DD-AFC4-6F175D3DCCD1}">
+              <a14:hiddenFill xmlns:a14="http://schemas.microsoft.com/office/drawing/2010/main">
+                <a:solidFill>
+                  <a:srgbClr val="FFFFFF"/>
+                </a:solidFill>
+              </a14:hiddenFill>
+            </a:ext>
+          </a:extLst>
+        </p:spPr>
+      </p:pic>
+      <p:sp>
+        <p:nvSpPr>
+          <p:cNvPr id="5" name="Подзаглавие 4">
+            <a:extLst>
+              <a:ext uri="{FF2B5EF4-FFF2-40B4-BE49-F238E27FC236}">
+                <a16:creationId xmlns:a16="http://schemas.microsoft.com/office/drawing/2014/main" id="{8AE6A1FD-951B-BB4F-EC39-C1D0F100F2CE}"/>
+              </a:ext>
+            </a:extLst>
+          </p:cNvPr>
+          <p:cNvSpPr>
+            <a:spLocks noGrp="1"/>
+          </p:cNvSpPr>
+          <p:nvPr>
+            <p:ph type="subTitle" sz="quarter" idx="11"/>
+          </p:nvPr>
+        </p:nvSpPr>
+        <p:spPr/>
+        <p:txBody>
+          <a:bodyPr/>
+          <a:lstStyle/>
+          <a:p>
+            <a:r>
+              <a:rPr lang="bg-BG" dirty="0"/>
+              <a:t>Същност и архитектура</a:t>
+            </a:r>
+          </a:p>
+        </p:txBody>
+      </p:sp>
+      <p:sp>
+        <p:nvSpPr>
+          <p:cNvPr id="8" name="Заглавие 7">
+            <a:extLst>
+              <a:ext uri="{FF2B5EF4-FFF2-40B4-BE49-F238E27FC236}">
+                <a16:creationId xmlns:a16="http://schemas.microsoft.com/office/drawing/2014/main" id="{28CC101B-D563-EFCE-ADE9-2241D6CCD10D}"/>
+              </a:ext>
+            </a:extLst>
+          </p:cNvPr>
+          <p:cNvSpPr>
+            <a:spLocks noGrp="1"/>
+          </p:cNvSpPr>
+          <p:nvPr>
+            <p:ph type="title" sz="quarter" idx="10"/>
+          </p:nvPr>
+        </p:nvSpPr>
+        <p:spPr>
+          <a:xfrm>
+            <a:off x="615109" y="4730916"/>
+            <a:ext cx="10961783" cy="768084"/>
+          </a:xfrm>
+        </p:spPr>
+        <p:txBody>
+          <a:bodyPr/>
+          <a:lstStyle/>
+          <a:p>
+            <a:r>
+              <a:rPr lang="bg-BG" dirty="0"/>
+              <a:t>Запознаване с </a:t>
+            </a:r>
+            <a:r>
+              <a:rPr lang="en-US" dirty="0"/>
+              <a:t>SQL Server</a:t>
+            </a:r>
+            <a:r>
+              <a:rPr lang="bg-BG" dirty="0"/>
+              <a:t> и</a:t>
+            </a:r>
+            <a:r>
+              <a:rPr lang="en-US" dirty="0"/>
+              <a:t> LocalDB</a:t>
+            </a:r>
+            <a:endParaRPr lang="bg-BG" dirty="0"/>
+          </a:p>
+        </p:txBody>
+      </p:sp>
+    </p:spTree>
+    <p:extLst>
+      <p:ext uri="{BB962C8B-B14F-4D97-AF65-F5344CB8AC3E}">
+        <p14:creationId xmlns:p14="http://schemas.microsoft.com/office/powerpoint/2010/main" val="1198903873"/>
+      </p:ext>
+    </p:extLst>
+  </p:cSld>
+  <p:clrMapOvr>
+    <a:masterClrMapping/>
+  </p:clrMapOvr>
+  <mc:AlternateContent xmlns:mc="http://schemas.openxmlformats.org/markup-compatibility/2006" xmlns:p14="http://schemas.microsoft.com/office/powerpoint/2010/main">
+    <mc:Choice Requires="p14">
+      <p:transition spd="slow" p14:dur="2000" advClick="0" advTm="5000"/>
+    </mc:Choice>
+    <mc:Fallback xmlns="">
+      <p:transition spd="slow" advClick="0" advTm="5000"/>
+    </mc:Fallback>
+  </mc:AlternateContent>
+</p:sld>
+</file>
+
+<file path=ppt/slides/slide30.xml><?xml version="1.0" encoding="utf-8"?>
 <p:sld xmlns:a="http://schemas.openxmlformats.org/drawingml/2006/main" xmlns:r="http://schemas.openxmlformats.org/officeDocument/2006/relationships" xmlns:p="http://schemas.openxmlformats.org/presentationml/2006/main">
   <p:cSld>
     <p:spTree>
@@ -15255,7 +16288,7 @@
             <a:fld id="{2BF067CD-8E6B-4360-9AA8-C5DF2A48A6D1}" type="slidenum">
               <a:rPr lang="en-US" noProof="0" smtClean="0"/>
               <a:pPr/>
-              <a:t>28</a:t>
+              <a:t>30</a:t>
             </a:fld>
             <a:endParaRPr lang="en-US" noProof="0" dirty="0"/>
           </a:p>
@@ -16122,7 +17155,7 @@
 </p:sld>
 </file>
 
-<file path=ppt/slides/slide29.xml><?xml version="1.0" encoding="utf-8"?>
+<file path=ppt/slides/slide31.xml><?xml version="1.0" encoding="utf-8"?>
 <p:sld xmlns:a="http://schemas.openxmlformats.org/drawingml/2006/main" xmlns:r="http://schemas.openxmlformats.org/officeDocument/2006/relationships" xmlns:p="http://schemas.openxmlformats.org/presentationml/2006/main">
   <p:cSld>
     <p:spTree>
@@ -16251,166 +17284,7 @@
 </p:sld>
 </file>
 
-<file path=ppt/slides/slide3.xml><?xml version="1.0" encoding="utf-8"?>
-<p:sld xmlns:a="http://schemas.openxmlformats.org/drawingml/2006/main" xmlns:r="http://schemas.openxmlformats.org/officeDocument/2006/relationships" xmlns:p="http://schemas.openxmlformats.org/presentationml/2006/main">
-  <p:cSld>
-    <p:spTree>
-      <p:nvGrpSpPr>
-        <p:cNvPr id="1" name=""/>
-        <p:cNvGrpSpPr/>
-        <p:nvPr/>
-      </p:nvGrpSpPr>
-      <p:grpSpPr>
-        <a:xfrm>
-          <a:off x="0" y="0"/>
-          <a:ext cx="0" cy="0"/>
-          <a:chOff x="0" y="0"/>
-          <a:chExt cx="0" cy="0"/>
-        </a:xfrm>
-      </p:grpSpPr>
-      <p:pic>
-        <p:nvPicPr>
-          <p:cNvPr id="6" name="Picture 4" descr="Ð ÐµÐ·ÑÐ»ÑÐ°Ñ Ñ Ð¸Ð·Ð¾Ð±ÑÐ°Ð¶ÐµÐ½Ð¸Ðµ Ð·Ð° sql server express png">
-            <a:extLst>
-              <a:ext uri="{FF2B5EF4-FFF2-40B4-BE49-F238E27FC236}">
-                <a16:creationId xmlns:a16="http://schemas.microsoft.com/office/drawing/2014/main" id="{ABA81264-79EA-4C61-B859-F609E78C6876}"/>
-              </a:ext>
-            </a:extLst>
-          </p:cNvPr>
-          <p:cNvPicPr>
-            <a:picLocks noChangeAspect="1" noChangeArrowheads="1"/>
-          </p:cNvPicPr>
-          <p:nvPr/>
-        </p:nvPicPr>
-        <p:blipFill>
-          <a:blip r:embed="rId2" cstate="print">
-            <a:extLst>
-              <a:ext uri="{28A0092B-C50C-407E-A947-70E740481C1C}">
-                <a14:useLocalDpi xmlns:a14="http://schemas.microsoft.com/office/drawing/2010/main" val="0"/>
-              </a:ext>
-            </a:extLst>
-          </a:blip>
-          <a:srcRect/>
-          <a:stretch>
-            <a:fillRect/>
-          </a:stretch>
-        </p:blipFill>
-        <p:spPr bwMode="auto">
-          <a:xfrm>
-            <a:off x="4675658" y="1384495"/>
-            <a:ext cx="2840683" cy="2305483"/>
-          </a:xfrm>
-          <a:prstGeom prst="rect">
-            <a:avLst/>
-          </a:prstGeom>
-          <a:noFill/>
-          <a:extLst>
-            <a:ext uri="{909E8E84-426E-40DD-AFC4-6F175D3DCCD1}">
-              <a14:hiddenFill xmlns:a14="http://schemas.microsoft.com/office/drawing/2010/main">
-                <a:solidFill>
-                  <a:srgbClr val="FFFFFF"/>
-                </a:solidFill>
-              </a14:hiddenFill>
-            </a:ext>
-          </a:extLst>
-        </p:spPr>
-      </p:pic>
-      <p:sp>
-        <p:nvSpPr>
-          <p:cNvPr id="5" name="Подзаглавие 4">
-            <a:extLst>
-              <a:ext uri="{FF2B5EF4-FFF2-40B4-BE49-F238E27FC236}">
-                <a16:creationId xmlns:a16="http://schemas.microsoft.com/office/drawing/2014/main" id="{8AE6A1FD-951B-BB4F-EC39-C1D0F100F2CE}"/>
-              </a:ext>
-            </a:extLst>
-          </p:cNvPr>
-          <p:cNvSpPr>
-            <a:spLocks noGrp="1"/>
-          </p:cNvSpPr>
-          <p:nvPr>
-            <p:ph type="subTitle" sz="quarter" idx="11"/>
-          </p:nvPr>
-        </p:nvSpPr>
-        <p:spPr/>
-        <p:txBody>
-          <a:bodyPr/>
-          <a:lstStyle/>
-          <a:p>
-            <a:r>
-              <a:rPr lang="bg-BG" dirty="0"/>
-              <a:t>Същност и архитектура</a:t>
-            </a:r>
-          </a:p>
-        </p:txBody>
-      </p:sp>
-      <p:sp>
-        <p:nvSpPr>
-          <p:cNvPr id="8" name="Заглавие 7">
-            <a:extLst>
-              <a:ext uri="{FF2B5EF4-FFF2-40B4-BE49-F238E27FC236}">
-                <a16:creationId xmlns:a16="http://schemas.microsoft.com/office/drawing/2014/main" id="{28CC101B-D563-EFCE-ADE9-2241D6CCD10D}"/>
-              </a:ext>
-            </a:extLst>
-          </p:cNvPr>
-          <p:cNvSpPr>
-            <a:spLocks noGrp="1"/>
-          </p:cNvSpPr>
-          <p:nvPr>
-            <p:ph type="title" sz="quarter" idx="10"/>
-          </p:nvPr>
-        </p:nvSpPr>
-        <p:spPr>
-          <a:xfrm>
-            <a:off x="615109" y="4730916"/>
-            <a:ext cx="10961783" cy="768084"/>
-          </a:xfrm>
-        </p:spPr>
-        <p:txBody>
-          <a:bodyPr/>
-          <a:lstStyle/>
-          <a:p>
-            <a:r>
-              <a:rPr lang="bg-BG" dirty="0"/>
-              <a:t>Запознаване с </a:t>
-            </a:r>
-            <a:r>
-              <a:rPr lang="en-US" dirty="0"/>
-              <a:t>SQL Server</a:t>
-            </a:r>
-            <a:r>
-              <a:rPr lang="bg-BG" dirty="0"/>
-              <a:t> и</a:t>
-            </a:r>
-            <a:r>
-              <a:rPr lang="en-US" dirty="0"/>
-              <a:t> LocalDB</a:t>
-            </a:r>
-            <a:endParaRPr lang="bg-BG" dirty="0"/>
-          </a:p>
-        </p:txBody>
-      </p:sp>
-    </p:spTree>
-    <p:extLst>
-      <p:ext uri="{BB962C8B-B14F-4D97-AF65-F5344CB8AC3E}">
-        <p14:creationId xmlns:p14="http://schemas.microsoft.com/office/powerpoint/2010/main" val="1198903873"/>
-      </p:ext>
-    </p:extLst>
-  </p:cSld>
-  <p:clrMapOvr>
-    <a:masterClrMapping/>
-  </p:clrMapOvr>
-  <mc:AlternateContent xmlns:mc="http://schemas.openxmlformats.org/markup-compatibility/2006" xmlns:p14="http://schemas.microsoft.com/office/powerpoint/2010/main">
-    <mc:Choice Requires="p14">
-      <p:transition spd="slow" p14:dur="2000" advClick="0" advTm="5000"/>
-    </mc:Choice>
-    <mc:Fallback xmlns="">
-      <p:transition spd="slow" advClick="0" advTm="5000"/>
-    </mc:Fallback>
-  </mc:AlternateContent>
-</p:sld>
-</file>
-
-<file path=ppt/slides/slide30.xml><?xml version="1.0" encoding="utf-8"?>
+<file path=ppt/slides/slide32.xml><?xml version="1.0" encoding="utf-8"?>
 <p:sld xmlns:a="http://schemas.openxmlformats.org/drawingml/2006/main" xmlns:r="http://schemas.openxmlformats.org/officeDocument/2006/relationships" xmlns:p="http://schemas.openxmlformats.org/presentationml/2006/main">
   <p:cSld>
     <p:spTree>
@@ -16667,7 +17541,7 @@
             <a:fld id="{2BF067CD-8E6B-4360-9AA8-C5DF2A48A6D1}" type="slidenum">
               <a:rPr lang="en-US" noProof="0" smtClean="0"/>
               <a:pPr/>
-              <a:t>30</a:t>
+              <a:t>32</a:t>
             </a:fld>
             <a:endParaRPr lang="en-US" noProof="0" dirty="0"/>
           </a:p>
@@ -16871,7 +17745,7 @@
 </p:sld>
 </file>
 
-<file path=ppt/slides/slide31.xml><?xml version="1.0" encoding="utf-8"?>
+<file path=ppt/slides/slide33.xml><?xml version="1.0" encoding="utf-8"?>
 <p:sld xmlns:a="http://schemas.openxmlformats.org/drawingml/2006/main" xmlns:r="http://schemas.openxmlformats.org/officeDocument/2006/relationships" xmlns:p="http://schemas.openxmlformats.org/presentationml/2006/main">
   <p:cSld>
     <p:spTree>
@@ -18108,7 +18982,7 @@
             <a:fld id="{2BF067CD-8E6B-4360-9AA8-C5DF2A48A6D1}" type="slidenum">
               <a:rPr lang="en-US" noProof="0" smtClean="0"/>
               <a:pPr/>
-              <a:t>31</a:t>
+              <a:t>33</a:t>
             </a:fld>
             <a:endParaRPr lang="en-US" noProof="0" dirty="0"/>
           </a:p>
@@ -18805,7 +19679,7 @@
 </p:sld>
 </file>
 
-<file path=ppt/slides/slide32.xml><?xml version="1.0" encoding="utf-8"?>
+<file path=ppt/slides/slide34.xml><?xml version="1.0" encoding="utf-8"?>
 <p:sld xmlns:a="http://schemas.openxmlformats.org/drawingml/2006/main" xmlns:r="http://schemas.openxmlformats.org/officeDocument/2006/relationships" xmlns:p="http://schemas.openxmlformats.org/presentationml/2006/main">
   <p:cSld>
     <p:spTree>
@@ -19289,7 +20163,7 @@
             <a:fld id="{2BF067CD-8E6B-4360-9AA8-C5DF2A48A6D1}" type="slidenum">
               <a:rPr lang="en-US" noProof="0" smtClean="0"/>
               <a:pPr/>
-              <a:t>32</a:t>
+              <a:t>34</a:t>
             </a:fld>
             <a:endParaRPr lang="en-US" noProof="0" dirty="0"/>
           </a:p>
@@ -19569,7 +20443,7 @@
 </p:sld>
 </file>
 
-<file path=ppt/slides/slide33.xml><?xml version="1.0" encoding="utf-8"?>
+<file path=ppt/slides/slide35.xml><?xml version="1.0" encoding="utf-8"?>
 <p:sld xmlns:a="http://schemas.openxmlformats.org/drawingml/2006/main" xmlns:r="http://schemas.openxmlformats.org/officeDocument/2006/relationships" xmlns:p="http://schemas.openxmlformats.org/presentationml/2006/main">
   <p:cSld>
     <p:spTree>
@@ -20160,7 +21034,7 @@
             <a:fld id="{2BF067CD-8E6B-4360-9AA8-C5DF2A48A6D1}" type="slidenum">
               <a:rPr lang="en-US" noProof="0" smtClean="0"/>
               <a:pPr/>
-              <a:t>33</a:t>
+              <a:t>35</a:t>
             </a:fld>
             <a:endParaRPr lang="en-US" noProof="0" dirty="0"/>
           </a:p>
@@ -20527,7 +21401,7 @@
 </p:sld>
 </file>
 
-<file path=ppt/slides/slide34.xml><?xml version="1.0" encoding="utf-8"?>
+<file path=ppt/slides/slide36.xml><?xml version="1.0" encoding="utf-8"?>
 <p:sld xmlns:a="http://schemas.openxmlformats.org/drawingml/2006/main" xmlns:r="http://schemas.openxmlformats.org/officeDocument/2006/relationships" xmlns:p="http://schemas.openxmlformats.org/presentationml/2006/main">
   <p:cSld>
     <p:spTree>
@@ -20740,7 +21614,7 @@
             <a:fld id="{2BF067CD-8E6B-4360-9AA8-C5DF2A48A6D1}" type="slidenum">
               <a:rPr lang="en-US" noProof="0" smtClean="0"/>
               <a:pPr/>
-              <a:t>34</a:t>
+              <a:t>36</a:t>
             </a:fld>
             <a:endParaRPr lang="en-US" noProof="0" dirty="0"/>
           </a:p>
@@ -20944,7 +21818,7 @@
 </p:sld>
 </file>
 
-<file path=ppt/slides/slide35.xml><?xml version="1.0" encoding="utf-8"?>
+<file path=ppt/slides/slide37.xml><?xml version="1.0" encoding="utf-8"?>
 <p:sld xmlns:a="http://schemas.openxmlformats.org/drawingml/2006/main" xmlns:r="http://schemas.openxmlformats.org/officeDocument/2006/relationships" xmlns:p="http://schemas.openxmlformats.org/presentationml/2006/main">
   <p:cSld>
     <p:spTree>
@@ -21276,7 +22150,7 @@
             <a:fld id="{2BF067CD-8E6B-4360-9AA8-C5DF2A48A6D1}" type="slidenum">
               <a:rPr lang="en-US" noProof="0" smtClean="0"/>
               <a:pPr/>
-              <a:t>35</a:t>
+              <a:t>37</a:t>
             </a:fld>
             <a:endParaRPr lang="en-US" noProof="0" dirty="0"/>
           </a:p>
@@ -21382,7 +22256,7 @@
 </p:sld>
 </file>
 
-<file path=ppt/slides/slide36.xml><?xml version="1.0" encoding="utf-8"?>
+<file path=ppt/slides/slide38.xml><?xml version="1.0" encoding="utf-8"?>
 <p:sld xmlns:a="http://schemas.openxmlformats.org/drawingml/2006/main" xmlns:r="http://schemas.openxmlformats.org/officeDocument/2006/relationships" xmlns:p="http://schemas.openxmlformats.org/presentationml/2006/main">
   <p:cSld>
     <p:spTree>
@@ -22344,7 +23218,7 @@
             <a:fld id="{2BF067CD-8E6B-4360-9AA8-C5DF2A48A6D1}" type="slidenum">
               <a:rPr lang="en-US" noProof="0" smtClean="0"/>
               <a:pPr/>
-              <a:t>36</a:t>
+              <a:t>38</a:t>
             </a:fld>
             <a:endParaRPr lang="en-US" noProof="0" dirty="0"/>
           </a:p>
@@ -22499,7 +23373,7 @@
 </p:sld>
 </file>
 
-<file path=ppt/slides/slide37.xml><?xml version="1.0" encoding="utf-8"?>
+<file path=ppt/slides/slide39.xml><?xml version="1.0" encoding="utf-8"?>
 <p:sld xmlns:a="http://schemas.openxmlformats.org/drawingml/2006/main" xmlns:r="http://schemas.openxmlformats.org/officeDocument/2006/relationships" xmlns:p="http://schemas.openxmlformats.org/presentationml/2006/main">
   <p:cSld>
     <p:spTree>
@@ -22672,389 +23546,6 @@
     <p:extLst>
       <p:ext uri="{BB962C8B-B14F-4D97-AF65-F5344CB8AC3E}">
         <p14:creationId xmlns:p14="http://schemas.microsoft.com/office/powerpoint/2010/main" val="3744296604"/>
-      </p:ext>
-    </p:extLst>
-  </p:cSld>
-  <p:clrMapOvr>
-    <a:masterClrMapping/>
-  </p:clrMapOvr>
-  <mc:AlternateContent xmlns:mc="http://schemas.openxmlformats.org/markup-compatibility/2006" xmlns:p14="http://schemas.microsoft.com/office/powerpoint/2010/main">
-    <mc:Choice Requires="p14">
-      <p:transition spd="slow" p14:dur="2000" advClick="0" advTm="5000"/>
-    </mc:Choice>
-    <mc:Fallback xmlns="">
-      <p:transition spd="slow" advClick="0" advTm="5000"/>
-    </mc:Fallback>
-  </mc:AlternateContent>
-</p:sld>
-</file>
-
-<file path=ppt/slides/slide38.xml><?xml version="1.0" encoding="utf-8"?>
-<p:sld xmlns:a="http://schemas.openxmlformats.org/drawingml/2006/main" xmlns:r="http://schemas.openxmlformats.org/officeDocument/2006/relationships" xmlns:p="http://schemas.openxmlformats.org/presentationml/2006/main" show="0">
-  <p:cSld>
-    <p:spTree>
-      <p:nvGrpSpPr>
-        <p:cNvPr id="1" name=""/>
-        <p:cNvGrpSpPr/>
-        <p:nvPr/>
-      </p:nvGrpSpPr>
-      <p:grpSpPr>
-        <a:xfrm>
-          <a:off x="0" y="0"/>
-          <a:ext cx="0" cy="0"/>
-          <a:chOff x="0" y="0"/>
-          <a:chExt cx="0" cy="0"/>
-        </a:xfrm>
-      </p:grpSpPr>
-      <p:sp>
-        <p:nvSpPr>
-          <p:cNvPr id="2" name="Slide Body">
-            <a:extLst>
-              <a:ext uri="{FF2B5EF4-FFF2-40B4-BE49-F238E27FC236}">
-                <a16:creationId xmlns:a16="http://schemas.microsoft.com/office/drawing/2014/main" id="{980F49B1-E4BE-4389-A747-7AB9B71AD920}"/>
-              </a:ext>
-            </a:extLst>
-          </p:cNvPr>
-          <p:cNvSpPr>
-            <a:spLocks noGrp="1"/>
-          </p:cNvSpPr>
-          <p:nvPr>
-            <p:ph type="body" sz="quarter" idx="10"/>
-          </p:nvPr>
-        </p:nvSpPr>
-        <p:spPr>
-          <a:xfrm>
-            <a:off x="190402" y="1269001"/>
-            <a:ext cx="9865598" cy="2474999"/>
-          </a:xfrm>
-        </p:spPr>
-        <p:txBody>
-          <a:bodyPr>
-            <a:normAutofit/>
-          </a:bodyPr>
-          <a:lstStyle/>
-          <a:p>
-            <a:pPr>
-              <a:lnSpc>
-                <a:spcPct val="120000"/>
-              </a:lnSpc>
-            </a:pPr>
-            <a:r>
-              <a:rPr lang="bg-BG" sz="3200" dirty="0"/>
-              <a:t>Този курс</a:t>
-            </a:r>
-            <a:r>
-              <a:rPr lang="en-US" sz="3200" dirty="0"/>
-              <a:t> (</a:t>
-            </a:r>
-            <a:r>
-              <a:rPr lang="bg-BG" sz="3200" dirty="0"/>
-              <a:t>презентации, примери, демонстрационен код, упражнения, домашни, видео и други активи</a:t>
-            </a:r>
-            <a:r>
-              <a:rPr lang="en-US" sz="3200" dirty="0"/>
-              <a:t>) </a:t>
-            </a:r>
-            <a:r>
-              <a:rPr lang="bg-BG" sz="3200" dirty="0"/>
-              <a:t>представлява</a:t>
-            </a:r>
-            <a:r>
-              <a:rPr lang="en-US" sz="3200" dirty="0"/>
-              <a:t> </a:t>
-            </a:r>
-            <a:r>
-              <a:rPr lang="bg-BG" sz="3200" b="1" dirty="0"/>
-              <a:t>свободно учебно съдържание </a:t>
-            </a:r>
-            <a:r>
-              <a:rPr lang="bg-BG" sz="3200" dirty="0"/>
-              <a:t>и се разпространява под свободен лиценз </a:t>
-            </a:r>
-            <a:r>
-              <a:rPr lang="en-US" sz="3200" b="1" dirty="0"/>
-              <a:t>CC-BY-NC-SA</a:t>
-            </a:r>
-            <a:endParaRPr lang="bg-BG" sz="3200" dirty="0"/>
-          </a:p>
-        </p:txBody>
-      </p:sp>
-      <p:pic>
-        <p:nvPicPr>
-          <p:cNvPr id="6" name="Picture License" descr="License">
-            <a:extLst>
-              <a:ext uri="{FF2B5EF4-FFF2-40B4-BE49-F238E27FC236}">
-                <a16:creationId xmlns:a16="http://schemas.microsoft.com/office/drawing/2014/main" id="{82BA520F-A037-4E01-AA18-27D9F1E930A6}"/>
-              </a:ext>
-            </a:extLst>
-          </p:cNvPr>
-          <p:cNvPicPr>
-            <a:picLocks noChangeAspect="1"/>
-          </p:cNvPicPr>
-          <p:nvPr/>
-        </p:nvPicPr>
-        <p:blipFill>
-          <a:blip r:embed="rId3">
-            <a:clrChange>
-              <a:clrFrom>
-                <a:srgbClr val="FFFFFF"/>
-              </a:clrFrom>
-              <a:clrTo>
-                <a:srgbClr val="FFFFFF">
-                  <a:alpha val="0"/>
-                </a:srgbClr>
-              </a:clrTo>
-            </a:clrChange>
-          </a:blip>
-          <a:stretch>
-            <a:fillRect/>
-          </a:stretch>
-        </p:blipFill>
-        <p:spPr>
-          <a:xfrm>
-            <a:off x="10226175" y="1440120"/>
-            <a:ext cx="1198986" cy="1268880"/>
-          </a:xfrm>
-          <a:prstGeom prst="rect">
-            <a:avLst/>
-          </a:prstGeom>
-        </p:spPr>
-      </p:pic>
-      <p:sp>
-        <p:nvSpPr>
-          <p:cNvPr id="3" name="Slide Title">
-            <a:extLst>
-              <a:ext uri="{FF2B5EF4-FFF2-40B4-BE49-F238E27FC236}">
-                <a16:creationId xmlns:a16="http://schemas.microsoft.com/office/drawing/2014/main" id="{E5F1FB41-80C3-4816-BC47-CCC50632E6E8}"/>
-              </a:ext>
-            </a:extLst>
-          </p:cNvPr>
-          <p:cNvSpPr>
-            <a:spLocks noGrp="1"/>
-          </p:cNvSpPr>
-          <p:nvPr>
-            <p:ph type="title"/>
-          </p:nvPr>
-        </p:nvSpPr>
-        <p:spPr/>
-        <p:txBody>
-          <a:bodyPr/>
-          <a:lstStyle/>
-          <a:p>
-            <a:r>
-              <a:rPr lang="bg-BG" dirty="0"/>
-              <a:t>Лиценз</a:t>
-            </a:r>
-          </a:p>
-        </p:txBody>
-      </p:sp>
-      <p:sp>
-        <p:nvSpPr>
-          <p:cNvPr id="11" name="TextBox 10">
-            <a:extLst>
-              <a:ext uri="{FF2B5EF4-FFF2-40B4-BE49-F238E27FC236}">
-                <a16:creationId xmlns:a16="http://schemas.microsoft.com/office/drawing/2014/main" id="{0C18DF19-B750-4C88-975B-661A6BF61F5E}"/>
-              </a:ext>
-            </a:extLst>
-          </p:cNvPr>
-          <p:cNvSpPr txBox="1"/>
-          <p:nvPr/>
-        </p:nvSpPr>
-        <p:spPr>
-          <a:xfrm>
-            <a:off x="190401" y="3927519"/>
-            <a:ext cx="11710599" cy="1979644"/>
-          </a:xfrm>
-          <a:prstGeom prst="rect">
-            <a:avLst/>
-          </a:prstGeom>
-          <a:noFill/>
-          <a:ln w="12700">
-            <a:noFill/>
-          </a:ln>
-        </p:spPr>
-        <p:txBody>
-          <a:bodyPr wrap="square">
-            <a:spAutoFit/>
-          </a:bodyPr>
-          <a:lstStyle/>
-          <a:p>
-            <a:pPr marL="360363" indent="-360363" defTabSz="1218438">
-              <a:lnSpc>
-                <a:spcPct val="120000"/>
-              </a:lnSpc>
-              <a:spcBef>
-                <a:spcPts val="600"/>
-              </a:spcBef>
-              <a:spcAft>
-                <a:spcPts val="600"/>
-              </a:spcAft>
-              <a:buFont typeface="Wingdings" panose="05000000000000000000" pitchFamily="2" charset="2"/>
-              <a:buChar char="§"/>
-              <a:defRPr/>
-            </a:pPr>
-            <a:r>
-              <a:rPr lang="bg-BG" sz="3200" dirty="0"/>
-              <a:t>Проект "</a:t>
-            </a:r>
-            <a:r>
-              <a:rPr lang="bg-BG" sz="3200" b="1" dirty="0"/>
-              <a:t>Отворено учебно съдържание по програмиране и ИТ</a:t>
-            </a:r>
-            <a:r>
-              <a:rPr lang="bg-BG" sz="3200" dirty="0"/>
-              <a:t>" към Фондация "Софтуерен университет"</a:t>
-            </a:r>
-            <a:r>
-              <a:rPr lang="en-US" sz="3200" dirty="0"/>
-              <a:t>:</a:t>
-            </a:r>
-            <a:endParaRPr lang="bg-BG" sz="3200" dirty="0"/>
-          </a:p>
-          <a:p>
-            <a:pPr marL="817563" lvl="1" indent="-360363" defTabSz="1218438">
-              <a:lnSpc>
-                <a:spcPct val="120000"/>
-              </a:lnSpc>
-              <a:spcBef>
-                <a:spcPts val="600"/>
-              </a:spcBef>
-              <a:spcAft>
-                <a:spcPts val="600"/>
-              </a:spcAft>
-              <a:buFont typeface="Wingdings" panose="05000000000000000000" pitchFamily="2" charset="2"/>
-              <a:buChar char="§"/>
-              <a:defRPr/>
-            </a:pPr>
-            <a:r>
-              <a:rPr kumimoji="0" lang="en-US" sz="3200" b="0" i="0" u="none" strike="noStrike" kern="1200" cap="none" spc="0" normalizeH="0" baseline="0" noProof="0" dirty="0">
-                <a:ln>
-                  <a:noFill/>
-                </a:ln>
-                <a:solidFill>
-                  <a:srgbClr val="234465"/>
-                </a:solidFill>
-                <a:effectLst/>
-                <a:uLnTx/>
-                <a:uFillTx/>
-                <a:latin typeface="Calibri"/>
-                <a:ea typeface="+mn-ea"/>
-                <a:cs typeface="+mn-cs"/>
-                <a:hlinkClick r:id="rId4"/>
-              </a:rPr>
-              <a:t>https://github.com/BG-IT-Edu</a:t>
-            </a:r>
-            <a:endParaRPr kumimoji="0" lang="bg-BG" sz="3200" b="0" i="0" u="none" strike="noStrike" kern="1200" cap="none" spc="0" normalizeH="0" baseline="0" noProof="0" dirty="0">
-              <a:ln>
-                <a:noFill/>
-              </a:ln>
-              <a:solidFill>
-                <a:srgbClr val="234465"/>
-              </a:solidFill>
-              <a:effectLst/>
-              <a:uLnTx/>
-              <a:uFillTx/>
-              <a:latin typeface="Calibri"/>
-              <a:ea typeface="+mn-ea"/>
-              <a:cs typeface="+mn-cs"/>
-            </a:endParaRPr>
-          </a:p>
-        </p:txBody>
-      </p:sp>
-      <p:pic>
-        <p:nvPicPr>
-          <p:cNvPr id="7" name="Picture 6" title="CC-BY-NC-SA License">
-            <a:hlinkClick r:id="rId5" tooltip="This work is licensed under the &quot;Creative Commons Attribution-NonCommercial-ShareAlike 4.0 International&quot; license"/>
-            <a:extLst>
-              <a:ext uri="{FF2B5EF4-FFF2-40B4-BE49-F238E27FC236}">
-                <a16:creationId xmlns:a16="http://schemas.microsoft.com/office/drawing/2014/main" id="{F6C77C47-F7D8-A176-5C69-7FDE5C7E8003}"/>
-              </a:ext>
-            </a:extLst>
-          </p:cNvPr>
-          <p:cNvPicPr>
-            <a:picLocks noChangeAspect="1" noChangeArrowheads="1"/>
-          </p:cNvPicPr>
-          <p:nvPr/>
-        </p:nvPicPr>
-        <p:blipFill>
-          <a:blip r:embed="rId6">
-            <a:extLst>
-              <a:ext uri="{28A0092B-C50C-407E-A947-70E740481C1C}">
-                <a14:useLocalDpi xmlns:a14="http://schemas.microsoft.com/office/drawing/2010/main"/>
-              </a:ext>
-            </a:extLst>
-          </a:blip>
-          <a:srcRect/>
-          <a:stretch>
-            <a:fillRect/>
-          </a:stretch>
-        </p:blipFill>
-        <p:spPr bwMode="auto">
-          <a:xfrm>
-            <a:off x="9831000" y="2908593"/>
-            <a:ext cx="1989336" cy="696022"/>
-          </a:xfrm>
-          <a:prstGeom prst="roundRect">
-            <a:avLst>
-              <a:gd name="adj" fmla="val 3940"/>
-            </a:avLst>
-          </a:prstGeom>
-          <a:solidFill>
-            <a:srgbClr val="231F20">
-              <a:alpha val="50000"/>
-            </a:srgbClr>
-          </a:solidFill>
-          <a:ln>
-            <a:noFill/>
-          </a:ln>
-        </p:spPr>
-      </p:pic>
-      <p:sp>
-        <p:nvSpPr>
-          <p:cNvPr id="4" name="Slide Number">
-            <a:extLst>
-              <a:ext uri="{FF2B5EF4-FFF2-40B4-BE49-F238E27FC236}">
-                <a16:creationId xmlns:a16="http://schemas.microsoft.com/office/drawing/2014/main" id="{2CB317F0-EC16-0294-FD1E-38391255A4A9}"/>
-              </a:ext>
-            </a:extLst>
-          </p:cNvPr>
-          <p:cNvSpPr>
-            <a:spLocks noGrp="1"/>
-          </p:cNvSpPr>
-          <p:nvPr>
-            <p:ph type="sldNum" sz="quarter" idx="5"/>
-          </p:nvPr>
-        </p:nvSpPr>
-        <p:spPr>
-          <a:xfrm>
-            <a:off x="11753030" y="6507000"/>
-            <a:ext cx="367414" cy="297000"/>
-          </a:xfrm>
-          <a:prstGeom prst="rect">
-            <a:avLst/>
-          </a:prstGeom>
-        </p:spPr>
-        <p:txBody>
-          <a:bodyPr vert="horz" lIns="91440" tIns="45720" rIns="91440" bIns="45720" rtlCol="0" anchor="b"/>
-          <a:lstStyle>
-            <a:lvl1pPr algn="r">
-              <a:defRPr sz="1000"/>
-            </a:lvl1pPr>
-          </a:lstStyle>
-          <a:p>
-            <a:fld id="{2BF067CD-8E6B-4360-9AA8-C5DF2A48A6D1}" type="slidenum">
-              <a:rPr lang="en-US" noProof="0" smtClean="0"/>
-              <a:pPr/>
-              <a:t>38</a:t>
-            </a:fld>
-            <a:endParaRPr lang="en-US" noProof="0" dirty="0"/>
-          </a:p>
-        </p:txBody>
-      </p:sp>
-    </p:spTree>
-    <p:extLst>
-      <p:ext uri="{BB962C8B-B14F-4D97-AF65-F5344CB8AC3E}">
-        <p14:creationId xmlns:p14="http://schemas.microsoft.com/office/powerpoint/2010/main" val="1219563496"/>
       </p:ext>
     </p:extLst>
   </p:cSld>
@@ -23570,6 +24061,389 @@
       </p:par>
     </p:tnLst>
   </p:timing>
+</p:sld>
+</file>
+
+<file path=ppt/slides/slide40.xml><?xml version="1.0" encoding="utf-8"?>
+<p:sld xmlns:a="http://schemas.openxmlformats.org/drawingml/2006/main" xmlns:r="http://schemas.openxmlformats.org/officeDocument/2006/relationships" xmlns:p="http://schemas.openxmlformats.org/presentationml/2006/main" show="0">
+  <p:cSld>
+    <p:spTree>
+      <p:nvGrpSpPr>
+        <p:cNvPr id="1" name=""/>
+        <p:cNvGrpSpPr/>
+        <p:nvPr/>
+      </p:nvGrpSpPr>
+      <p:grpSpPr>
+        <a:xfrm>
+          <a:off x="0" y="0"/>
+          <a:ext cx="0" cy="0"/>
+          <a:chOff x="0" y="0"/>
+          <a:chExt cx="0" cy="0"/>
+        </a:xfrm>
+      </p:grpSpPr>
+      <p:sp>
+        <p:nvSpPr>
+          <p:cNvPr id="2" name="Slide Body">
+            <a:extLst>
+              <a:ext uri="{FF2B5EF4-FFF2-40B4-BE49-F238E27FC236}">
+                <a16:creationId xmlns:a16="http://schemas.microsoft.com/office/drawing/2014/main" id="{980F49B1-E4BE-4389-A747-7AB9B71AD920}"/>
+              </a:ext>
+            </a:extLst>
+          </p:cNvPr>
+          <p:cNvSpPr>
+            <a:spLocks noGrp="1"/>
+          </p:cNvSpPr>
+          <p:nvPr>
+            <p:ph type="body" sz="quarter" idx="10"/>
+          </p:nvPr>
+        </p:nvSpPr>
+        <p:spPr>
+          <a:xfrm>
+            <a:off x="190402" y="1269001"/>
+            <a:ext cx="9865598" cy="2474999"/>
+          </a:xfrm>
+        </p:spPr>
+        <p:txBody>
+          <a:bodyPr>
+            <a:normAutofit/>
+          </a:bodyPr>
+          <a:lstStyle/>
+          <a:p>
+            <a:pPr>
+              <a:lnSpc>
+                <a:spcPct val="120000"/>
+              </a:lnSpc>
+            </a:pPr>
+            <a:r>
+              <a:rPr lang="bg-BG" sz="3200" dirty="0"/>
+              <a:t>Този курс</a:t>
+            </a:r>
+            <a:r>
+              <a:rPr lang="en-US" sz="3200" dirty="0"/>
+              <a:t> (</a:t>
+            </a:r>
+            <a:r>
+              <a:rPr lang="bg-BG" sz="3200" dirty="0"/>
+              <a:t>презентации, примери, демонстрационен код, упражнения, домашни, видео и други активи</a:t>
+            </a:r>
+            <a:r>
+              <a:rPr lang="en-US" sz="3200" dirty="0"/>
+              <a:t>) </a:t>
+            </a:r>
+            <a:r>
+              <a:rPr lang="bg-BG" sz="3200" dirty="0"/>
+              <a:t>представлява</a:t>
+            </a:r>
+            <a:r>
+              <a:rPr lang="en-US" sz="3200" dirty="0"/>
+              <a:t> </a:t>
+            </a:r>
+            <a:r>
+              <a:rPr lang="bg-BG" sz="3200" b="1" dirty="0"/>
+              <a:t>свободно учебно съдържание </a:t>
+            </a:r>
+            <a:r>
+              <a:rPr lang="bg-BG" sz="3200" dirty="0"/>
+              <a:t>и се разпространява под свободен лиценз </a:t>
+            </a:r>
+            <a:r>
+              <a:rPr lang="en-US" sz="3200" b="1" dirty="0"/>
+              <a:t>CC-BY-NC-SA</a:t>
+            </a:r>
+            <a:endParaRPr lang="bg-BG" sz="3200" dirty="0"/>
+          </a:p>
+        </p:txBody>
+      </p:sp>
+      <p:pic>
+        <p:nvPicPr>
+          <p:cNvPr id="6" name="Picture License" descr="License">
+            <a:extLst>
+              <a:ext uri="{FF2B5EF4-FFF2-40B4-BE49-F238E27FC236}">
+                <a16:creationId xmlns:a16="http://schemas.microsoft.com/office/drawing/2014/main" id="{82BA520F-A037-4E01-AA18-27D9F1E930A6}"/>
+              </a:ext>
+            </a:extLst>
+          </p:cNvPr>
+          <p:cNvPicPr>
+            <a:picLocks noChangeAspect="1"/>
+          </p:cNvPicPr>
+          <p:nvPr/>
+        </p:nvPicPr>
+        <p:blipFill>
+          <a:blip r:embed="rId3">
+            <a:clrChange>
+              <a:clrFrom>
+                <a:srgbClr val="FFFFFF"/>
+              </a:clrFrom>
+              <a:clrTo>
+                <a:srgbClr val="FFFFFF">
+                  <a:alpha val="0"/>
+                </a:srgbClr>
+              </a:clrTo>
+            </a:clrChange>
+          </a:blip>
+          <a:stretch>
+            <a:fillRect/>
+          </a:stretch>
+        </p:blipFill>
+        <p:spPr>
+          <a:xfrm>
+            <a:off x="10226175" y="1440120"/>
+            <a:ext cx="1198986" cy="1268880"/>
+          </a:xfrm>
+          <a:prstGeom prst="rect">
+            <a:avLst/>
+          </a:prstGeom>
+        </p:spPr>
+      </p:pic>
+      <p:sp>
+        <p:nvSpPr>
+          <p:cNvPr id="3" name="Slide Title">
+            <a:extLst>
+              <a:ext uri="{FF2B5EF4-FFF2-40B4-BE49-F238E27FC236}">
+                <a16:creationId xmlns:a16="http://schemas.microsoft.com/office/drawing/2014/main" id="{E5F1FB41-80C3-4816-BC47-CCC50632E6E8}"/>
+              </a:ext>
+            </a:extLst>
+          </p:cNvPr>
+          <p:cNvSpPr>
+            <a:spLocks noGrp="1"/>
+          </p:cNvSpPr>
+          <p:nvPr>
+            <p:ph type="title"/>
+          </p:nvPr>
+        </p:nvSpPr>
+        <p:spPr/>
+        <p:txBody>
+          <a:bodyPr/>
+          <a:lstStyle/>
+          <a:p>
+            <a:r>
+              <a:rPr lang="bg-BG" dirty="0"/>
+              <a:t>Лиценз</a:t>
+            </a:r>
+          </a:p>
+        </p:txBody>
+      </p:sp>
+      <p:sp>
+        <p:nvSpPr>
+          <p:cNvPr id="11" name="TextBox 10">
+            <a:extLst>
+              <a:ext uri="{FF2B5EF4-FFF2-40B4-BE49-F238E27FC236}">
+                <a16:creationId xmlns:a16="http://schemas.microsoft.com/office/drawing/2014/main" id="{0C18DF19-B750-4C88-975B-661A6BF61F5E}"/>
+              </a:ext>
+            </a:extLst>
+          </p:cNvPr>
+          <p:cNvSpPr txBox="1"/>
+          <p:nvPr/>
+        </p:nvSpPr>
+        <p:spPr>
+          <a:xfrm>
+            <a:off x="190401" y="3927519"/>
+            <a:ext cx="11710599" cy="1979644"/>
+          </a:xfrm>
+          <a:prstGeom prst="rect">
+            <a:avLst/>
+          </a:prstGeom>
+          <a:noFill/>
+          <a:ln w="12700">
+            <a:noFill/>
+          </a:ln>
+        </p:spPr>
+        <p:txBody>
+          <a:bodyPr wrap="square">
+            <a:spAutoFit/>
+          </a:bodyPr>
+          <a:lstStyle/>
+          <a:p>
+            <a:pPr marL="360363" indent="-360363" defTabSz="1218438">
+              <a:lnSpc>
+                <a:spcPct val="120000"/>
+              </a:lnSpc>
+              <a:spcBef>
+                <a:spcPts val="600"/>
+              </a:spcBef>
+              <a:spcAft>
+                <a:spcPts val="600"/>
+              </a:spcAft>
+              <a:buFont typeface="Wingdings" panose="05000000000000000000" pitchFamily="2" charset="2"/>
+              <a:buChar char="§"/>
+              <a:defRPr/>
+            </a:pPr>
+            <a:r>
+              <a:rPr lang="bg-BG" sz="3200" dirty="0"/>
+              <a:t>Проект "</a:t>
+            </a:r>
+            <a:r>
+              <a:rPr lang="bg-BG" sz="3200" b="1" dirty="0"/>
+              <a:t>Отворено учебно съдържание по програмиране и ИТ</a:t>
+            </a:r>
+            <a:r>
+              <a:rPr lang="bg-BG" sz="3200" dirty="0"/>
+              <a:t>" към Фондация "Софтуерен университет"</a:t>
+            </a:r>
+            <a:r>
+              <a:rPr lang="en-US" sz="3200" dirty="0"/>
+              <a:t>:</a:t>
+            </a:r>
+            <a:endParaRPr lang="bg-BG" sz="3200" dirty="0"/>
+          </a:p>
+          <a:p>
+            <a:pPr marL="817563" lvl="1" indent="-360363" defTabSz="1218438">
+              <a:lnSpc>
+                <a:spcPct val="120000"/>
+              </a:lnSpc>
+              <a:spcBef>
+                <a:spcPts val="600"/>
+              </a:spcBef>
+              <a:spcAft>
+                <a:spcPts val="600"/>
+              </a:spcAft>
+              <a:buFont typeface="Wingdings" panose="05000000000000000000" pitchFamily="2" charset="2"/>
+              <a:buChar char="§"/>
+              <a:defRPr/>
+            </a:pPr>
+            <a:r>
+              <a:rPr kumimoji="0" lang="en-US" sz="3200" b="0" i="0" u="none" strike="noStrike" kern="1200" cap="none" spc="0" normalizeH="0" baseline="0" noProof="0" dirty="0">
+                <a:ln>
+                  <a:noFill/>
+                </a:ln>
+                <a:solidFill>
+                  <a:srgbClr val="234465"/>
+                </a:solidFill>
+                <a:effectLst/>
+                <a:uLnTx/>
+                <a:uFillTx/>
+                <a:latin typeface="Calibri"/>
+                <a:ea typeface="+mn-ea"/>
+                <a:cs typeface="+mn-cs"/>
+                <a:hlinkClick r:id="rId4"/>
+              </a:rPr>
+              <a:t>https://github.com/BG-IT-Edu</a:t>
+            </a:r>
+            <a:endParaRPr kumimoji="0" lang="bg-BG" sz="3200" b="0" i="0" u="none" strike="noStrike" kern="1200" cap="none" spc="0" normalizeH="0" baseline="0" noProof="0" dirty="0">
+              <a:ln>
+                <a:noFill/>
+              </a:ln>
+              <a:solidFill>
+                <a:srgbClr val="234465"/>
+              </a:solidFill>
+              <a:effectLst/>
+              <a:uLnTx/>
+              <a:uFillTx/>
+              <a:latin typeface="Calibri"/>
+              <a:ea typeface="+mn-ea"/>
+              <a:cs typeface="+mn-cs"/>
+            </a:endParaRPr>
+          </a:p>
+        </p:txBody>
+      </p:sp>
+      <p:pic>
+        <p:nvPicPr>
+          <p:cNvPr id="7" name="Picture 6" title="CC-BY-NC-SA License">
+            <a:hlinkClick r:id="rId5" tooltip="This work is licensed under the &quot;Creative Commons Attribution-NonCommercial-ShareAlike 4.0 International&quot; license"/>
+            <a:extLst>
+              <a:ext uri="{FF2B5EF4-FFF2-40B4-BE49-F238E27FC236}">
+                <a16:creationId xmlns:a16="http://schemas.microsoft.com/office/drawing/2014/main" id="{F6C77C47-F7D8-A176-5C69-7FDE5C7E8003}"/>
+              </a:ext>
+            </a:extLst>
+          </p:cNvPr>
+          <p:cNvPicPr>
+            <a:picLocks noChangeAspect="1" noChangeArrowheads="1"/>
+          </p:cNvPicPr>
+          <p:nvPr/>
+        </p:nvPicPr>
+        <p:blipFill>
+          <a:blip r:embed="rId6">
+            <a:extLst>
+              <a:ext uri="{28A0092B-C50C-407E-A947-70E740481C1C}">
+                <a14:useLocalDpi xmlns:a14="http://schemas.microsoft.com/office/drawing/2010/main"/>
+              </a:ext>
+            </a:extLst>
+          </a:blip>
+          <a:srcRect/>
+          <a:stretch>
+            <a:fillRect/>
+          </a:stretch>
+        </p:blipFill>
+        <p:spPr bwMode="auto">
+          <a:xfrm>
+            <a:off x="9831000" y="2908593"/>
+            <a:ext cx="1989336" cy="696022"/>
+          </a:xfrm>
+          <a:prstGeom prst="roundRect">
+            <a:avLst>
+              <a:gd name="adj" fmla="val 3940"/>
+            </a:avLst>
+          </a:prstGeom>
+          <a:solidFill>
+            <a:srgbClr val="231F20">
+              <a:alpha val="50000"/>
+            </a:srgbClr>
+          </a:solidFill>
+          <a:ln>
+            <a:noFill/>
+          </a:ln>
+        </p:spPr>
+      </p:pic>
+      <p:sp>
+        <p:nvSpPr>
+          <p:cNvPr id="4" name="Slide Number">
+            <a:extLst>
+              <a:ext uri="{FF2B5EF4-FFF2-40B4-BE49-F238E27FC236}">
+                <a16:creationId xmlns:a16="http://schemas.microsoft.com/office/drawing/2014/main" id="{2CB317F0-EC16-0294-FD1E-38391255A4A9}"/>
+              </a:ext>
+            </a:extLst>
+          </p:cNvPr>
+          <p:cNvSpPr>
+            <a:spLocks noGrp="1"/>
+          </p:cNvSpPr>
+          <p:nvPr>
+            <p:ph type="sldNum" sz="quarter" idx="5"/>
+          </p:nvPr>
+        </p:nvSpPr>
+        <p:spPr>
+          <a:xfrm>
+            <a:off x="11753030" y="6507000"/>
+            <a:ext cx="367414" cy="297000"/>
+          </a:xfrm>
+          <a:prstGeom prst="rect">
+            <a:avLst/>
+          </a:prstGeom>
+        </p:spPr>
+        <p:txBody>
+          <a:bodyPr vert="horz" lIns="91440" tIns="45720" rIns="91440" bIns="45720" rtlCol="0" anchor="b"/>
+          <a:lstStyle>
+            <a:lvl1pPr algn="r">
+              <a:defRPr sz="1000"/>
+            </a:lvl1pPr>
+          </a:lstStyle>
+          <a:p>
+            <a:fld id="{2BF067CD-8E6B-4360-9AA8-C5DF2A48A6D1}" type="slidenum">
+              <a:rPr lang="en-US" noProof="0" smtClean="0"/>
+              <a:pPr/>
+              <a:t>40</a:t>
+            </a:fld>
+            <a:endParaRPr lang="en-US" noProof="0" dirty="0"/>
+          </a:p>
+        </p:txBody>
+      </p:sp>
+    </p:spTree>
+    <p:extLst>
+      <p:ext uri="{BB962C8B-B14F-4D97-AF65-F5344CB8AC3E}">
+        <p14:creationId xmlns:p14="http://schemas.microsoft.com/office/powerpoint/2010/main" val="1219563496"/>
+      </p:ext>
+    </p:extLst>
+  </p:cSld>
+  <p:clrMapOvr>
+    <a:masterClrMapping/>
+  </p:clrMapOvr>
+  <mc:AlternateContent xmlns:mc="http://schemas.openxmlformats.org/markup-compatibility/2006" xmlns:p14="http://schemas.microsoft.com/office/powerpoint/2010/main">
+    <mc:Choice Requires="p14">
+      <p:transition spd="slow" p14:dur="2000" advClick="0" advTm="5000"/>
+    </mc:Choice>
+    <mc:Fallback xmlns="">
+      <p:transition spd="slow" advClick="0" advTm="5000"/>
+    </mc:Fallback>
+  </mc:AlternateContent>
 </p:sld>
 </file>
 

</xml_diff>

<commit_message>
Fixes on Intro to MS SQL Server slides
</commit_message>
<xml_diff>
--- a/Courses/Software-Sciences/Module-3-Databases-New/03-Intro-to-MS-SQL-Server/03-Intro-to-MS-SQL-Server.pptx
+++ b/Courses/Software-Sciences/Module-3-Databases-New/03-Intro-to-MS-SQL-Server/03-Intro-to-MS-SQL-Server.pptx
@@ -5,10 +5,10 @@
     <p:sldMasterId id="2147483675" r:id="rId1"/>
   </p:sldMasterIdLst>
   <p:notesMasterIdLst>
-    <p:notesMasterId r:id="rId44"/>
+    <p:notesMasterId r:id="rId42"/>
   </p:notesMasterIdLst>
   <p:handoutMasterIdLst>
-    <p:handoutMasterId r:id="rId45"/>
+    <p:handoutMasterId r:id="rId43"/>
   </p:handoutMasterIdLst>
   <p:sldIdLst>
     <p:sldId id="1176" r:id="rId2"/>
@@ -43,16 +43,14 @@
     <p:sldId id="1191" r:id="rId31"/>
     <p:sldId id="1192" r:id="rId32"/>
     <p:sldId id="1208" r:id="rId33"/>
-    <p:sldId id="1206" r:id="rId34"/>
-    <p:sldId id="1207" r:id="rId35"/>
-    <p:sldId id="1209" r:id="rId36"/>
-    <p:sldId id="1231" r:id="rId37"/>
-    <p:sldId id="1232" r:id="rId38"/>
-    <p:sldId id="1233" r:id="rId39"/>
-    <p:sldId id="1234" r:id="rId40"/>
-    <p:sldId id="1127" r:id="rId41"/>
-    <p:sldId id="504" r:id="rId42"/>
-    <p:sldId id="505" r:id="rId43"/>
+    <p:sldId id="1209" r:id="rId34"/>
+    <p:sldId id="1231" r:id="rId35"/>
+    <p:sldId id="1232" r:id="rId36"/>
+    <p:sldId id="1233" r:id="rId37"/>
+    <p:sldId id="1234" r:id="rId38"/>
+    <p:sldId id="1127" r:id="rId39"/>
+    <p:sldId id="504" r:id="rId40"/>
+    <p:sldId id="505" r:id="rId41"/>
   </p:sldIdLst>
   <p:sldSz cx="12192000" cy="6858000"/>
   <p:notesSz cx="6858000" cy="9144000"/>
@@ -204,8 +202,6 @@
             <p14:sldId id="1191"/>
             <p14:sldId id="1192"/>
             <p14:sldId id="1208"/>
-            <p14:sldId id="1206"/>
-            <p14:sldId id="1207"/>
             <p14:sldId id="1209"/>
           </p14:sldIdLst>
         </p14:section>
@@ -425,7 +421,7 @@
           <a:p>
             <a:fld id="{4E087215-0C8F-4762-A664-737A353EC9A4}" type="datetimeFigureOut">
               <a:rPr lang="bg-BG" smtClean="0"/>
-              <a:t>16.07.24 г.</a:t>
+              <a:t>24.8.2024 г.</a:t>
             </a:fld>
             <a:endParaRPr lang="bg-BG"/>
           </a:p>
@@ -621,7 +617,7 @@
           <a:p>
             <a:fld id="{72D84649-876A-46C9-8472-14CB09C070D8}" type="datetimeFigureOut">
               <a:rPr lang="en-US" smtClean="0"/>
-              <a:t>7/16/24</a:t>
+              <a:t>8/24/2024</a:t>
             </a:fld>
             <a:endParaRPr lang="en-US"/>
           </a:p>
@@ -1121,7 +1117,7 @@
             <a:fld id="{2BF067CD-8E6B-4360-9AA8-C5DF2A48A6D1}" type="slidenum">
               <a:rPr lang="en-US" smtClean="0"/>
               <a:pPr/>
-              <a:t>35</a:t>
+              <a:t>33</a:t>
             </a:fld>
             <a:endParaRPr lang="en-US" dirty="0"/>
           </a:p>
@@ -1307,7 +1303,7 @@
                 <a:tabLst/>
                 <a:defRPr/>
               </a:pPr>
-              <a:t>40</a:t>
+              <a:t>38</a:t>
             </a:fld>
             <a:endParaRPr kumimoji="0" lang="en-US" sz="1200" b="0" i="0" u="none" strike="noStrike" kern="1200" cap="none" spc="0" normalizeH="0" baseline="0" noProof="0" dirty="0">
               <a:ln>
@@ -1566,7 +1562,7 @@
             <a:fld id="{3EBA5BD7-F043-4D1B-AA17-CD412FC534DE}" type="slidenum">
               <a:rPr lang="en-US" smtClean="0"/>
               <a:pPr/>
-              <a:t>41</a:t>
+              <a:t>39</a:t>
             </a:fld>
             <a:endParaRPr lang="en-US" dirty="0"/>
           </a:p>
@@ -1812,7 +1808,7 @@
             <a:fld id="{3EBA5BD7-F043-4D1B-AA17-CD412FC534DE}" type="slidenum">
               <a:rPr lang="en-US" smtClean="0"/>
               <a:pPr/>
-              <a:t>42</a:t>
+              <a:t>40</a:t>
             </a:fld>
             <a:endParaRPr lang="en-US" dirty="0"/>
           </a:p>
@@ -19465,1381 +19461,6 @@
       </p:grpSpPr>
       <p:sp>
         <p:nvSpPr>
-          <p:cNvPr id="4" name="Title 3"/>
-          <p:cNvSpPr>
-            <a:spLocks noGrp="1"/>
-          </p:cNvSpPr>
-          <p:nvPr>
-            <p:ph type="title"/>
-          </p:nvPr>
-        </p:nvSpPr>
-        <p:spPr/>
-        <p:txBody>
-          <a:bodyPr/>
-          <a:lstStyle/>
-          <a:p>
-            <a:r>
-              <a:rPr lang="bg-BG" dirty="0"/>
-              <a:t>Вмъкване на данни чрез </a:t>
-            </a:r>
-            <a:r>
-              <a:rPr lang="en-US" dirty="0"/>
-              <a:t>SQL (1)</a:t>
-            </a:r>
-            <a:endParaRPr lang="bg-BG" dirty="0"/>
-          </a:p>
-        </p:txBody>
-      </p:sp>
-      <p:sp>
-        <p:nvSpPr>
-          <p:cNvPr id="6" name="Content Placeholder 5"/>
-          <p:cNvSpPr>
-            <a:spLocks noGrp="1" noChangeArrowheads="1"/>
-          </p:cNvSpPr>
-          <p:nvPr>
-            <p:ph idx="4294967295"/>
-          </p:nvPr>
-        </p:nvSpPr>
-        <p:spPr bwMode="auto">
-          <a:xfrm>
-            <a:off x="921000" y="2079000"/>
-            <a:ext cx="10440000" cy="2690023"/>
-          </a:xfrm>
-          <a:prstGeom prst="rect">
-            <a:avLst/>
-          </a:prstGeom>
-          <a:solidFill>
-            <a:schemeClr val="accent5">
-              <a:lumMod val="40000"/>
-              <a:lumOff val="60000"/>
-              <a:alpha val="20000"/>
-            </a:schemeClr>
-          </a:solidFill>
-          <a:ln w="12700">
-            <a:solidFill>
-              <a:schemeClr val="accent5">
-                <a:lumMod val="60000"/>
-                <a:lumOff val="40000"/>
-              </a:schemeClr>
-            </a:solidFill>
-          </a:ln>
-        </p:spPr>
-        <p:txBody>
-          <a:bodyPr wrap="square">
-            <a:spAutoFit/>
-          </a:bodyPr>
-          <a:lstStyle/>
-          <a:p>
-            <a:pPr marL="0" indent="0">
-              <a:spcBef>
-                <a:spcPts val="0"/>
-              </a:spcBef>
-              <a:spcAft>
-                <a:spcPts val="0"/>
-              </a:spcAft>
-              <a:buNone/>
-            </a:pPr>
-            <a:r>
-              <a:rPr lang="en-US" sz="3200" b="1" noProof="1">
-                <a:solidFill>
-                  <a:schemeClr val="bg1"/>
-                </a:solidFill>
-                <a:latin typeface="Consolas" panose="020B0609020204030204" pitchFamily="49" charset="0"/>
-                <a:cs typeface="Arial" panose="020B0604020202020204" pitchFamily="34" charset="0"/>
-              </a:rPr>
-              <a:t>INSERT INTO </a:t>
-            </a:r>
-            <a:r>
-              <a:rPr lang="en-US" sz="3200" b="1" noProof="1">
-                <a:solidFill>
-                  <a:schemeClr val="tx2"/>
-                </a:solidFill>
-                <a:latin typeface="Consolas" panose="020B0609020204030204" pitchFamily="49" charset="0"/>
-                <a:cs typeface="Arial" panose="020B0604020202020204" pitchFamily="34" charset="0"/>
-              </a:rPr>
-              <a:t>People (</a:t>
-            </a:r>
-            <a:r>
-              <a:rPr lang="en-US" sz="3200" b="1" dirty="0"/>
-              <a:t>Id, Email, </a:t>
-            </a:r>
-            <a:r>
-              <a:rPr lang="en-US" sz="3200" b="1" dirty="0" err="1"/>
-              <a:t>FirstName</a:t>
-            </a:r>
-            <a:r>
-              <a:rPr lang="en-US" sz="3200" b="1" dirty="0"/>
-              <a:t>, </a:t>
-            </a:r>
-            <a:r>
-              <a:rPr lang="en-US" sz="3200" b="1" dirty="0" err="1"/>
-              <a:t>LastName</a:t>
-            </a:r>
-            <a:r>
-              <a:rPr lang="en-US" sz="3200" b="1" noProof="1">
-                <a:solidFill>
-                  <a:schemeClr val="tx2"/>
-                </a:solidFill>
-                <a:latin typeface="Consolas" panose="020B0609020204030204" pitchFamily="49" charset="0"/>
-                <a:cs typeface="Arial" panose="020B0604020202020204" pitchFamily="34" charset="0"/>
-              </a:rPr>
-              <a:t>)</a:t>
-            </a:r>
-          </a:p>
-          <a:p>
-            <a:pPr marL="0" indent="0">
-              <a:spcBef>
-                <a:spcPts val="0"/>
-              </a:spcBef>
-              <a:spcAft>
-                <a:spcPts val="0"/>
-              </a:spcAft>
-              <a:buNone/>
-            </a:pPr>
-            <a:r>
-              <a:rPr lang="en-US" sz="3200" b="1" noProof="1">
-                <a:solidFill>
-                  <a:schemeClr val="tx2"/>
-                </a:solidFill>
-                <a:latin typeface="Consolas" panose="020B0609020204030204" pitchFamily="49" charset="0"/>
-                <a:cs typeface="Arial" panose="020B0604020202020204" pitchFamily="34" charset="0"/>
-              </a:rPr>
-              <a:t>VALUES</a:t>
-            </a:r>
-            <a:endParaRPr lang="bg-BG" sz="3200" b="1" noProof="1">
-              <a:solidFill>
-                <a:schemeClr val="tx2"/>
-              </a:solidFill>
-              <a:latin typeface="Consolas" panose="020B0609020204030204" pitchFamily="49" charset="0"/>
-              <a:cs typeface="Arial" panose="020B0604020202020204" pitchFamily="34" charset="0"/>
-            </a:endParaRPr>
-          </a:p>
-          <a:p>
-            <a:pPr marL="0" indent="0">
-              <a:spcBef>
-                <a:spcPts val="0"/>
-              </a:spcBef>
-              <a:spcAft>
-                <a:spcPts val="0"/>
-              </a:spcAft>
-              <a:buNone/>
-            </a:pPr>
-            <a:r>
-              <a:rPr lang="bg-BG" sz="3200" b="1" noProof="1">
-                <a:solidFill>
-                  <a:schemeClr val="tx2"/>
-                </a:solidFill>
-                <a:latin typeface="Consolas" panose="020B0609020204030204" pitchFamily="49" charset="0"/>
-                <a:cs typeface="Arial" panose="020B0604020202020204" pitchFamily="34" charset="0"/>
-              </a:rPr>
-              <a:t>  </a:t>
-            </a:r>
-            <a:r>
-              <a:rPr lang="en-US" sz="3200" b="1" dirty="0"/>
-              <a:t>(1, 'john@example.com', 'John', 'Doe'),</a:t>
-            </a:r>
-            <a:endParaRPr lang="bg-BG" sz="3200" b="1" noProof="1">
-              <a:solidFill>
-                <a:schemeClr val="tx2"/>
-              </a:solidFill>
-              <a:latin typeface="Consolas" panose="020B0609020204030204" pitchFamily="49" charset="0"/>
-              <a:cs typeface="Arial" panose="020B0604020202020204" pitchFamily="34" charset="0"/>
-            </a:endParaRPr>
-          </a:p>
-          <a:p>
-            <a:pPr marL="0" indent="0">
-              <a:spcBef>
-                <a:spcPts val="0"/>
-              </a:spcBef>
-              <a:spcAft>
-                <a:spcPts val="0"/>
-              </a:spcAft>
-              <a:buNone/>
-            </a:pPr>
-            <a:r>
-              <a:rPr lang="bg-BG" sz="3200" b="1" noProof="1">
-                <a:solidFill>
-                  <a:schemeClr val="tx2"/>
-                </a:solidFill>
-                <a:latin typeface="Consolas" panose="020B0609020204030204" pitchFamily="49" charset="0"/>
-                <a:cs typeface="Arial" panose="020B0604020202020204" pitchFamily="34" charset="0"/>
-              </a:rPr>
-              <a:t>  </a:t>
-            </a:r>
-            <a:r>
-              <a:rPr lang="en-US" sz="3200" b="1" dirty="0"/>
-              <a:t>(2, 'jane@example.com', 'Jane', 'Smith'),</a:t>
-            </a:r>
-            <a:endParaRPr lang="bg-BG" sz="3200" b="1" dirty="0"/>
-          </a:p>
-          <a:p>
-            <a:pPr marL="0" indent="0">
-              <a:spcBef>
-                <a:spcPts val="0"/>
-              </a:spcBef>
-              <a:spcAft>
-                <a:spcPts val="0"/>
-              </a:spcAft>
-              <a:buNone/>
-            </a:pPr>
-            <a:r>
-              <a:rPr lang="bg-BG" sz="3200" dirty="0"/>
-              <a:t>     </a:t>
-            </a:r>
-            <a:r>
-              <a:rPr lang="en-US" sz="3200" b="1" dirty="0"/>
-              <a:t>(3, 'mike@example.com', 'Mike', 'Johnson')</a:t>
-            </a:r>
-            <a:endParaRPr lang="en-US" sz="3200" b="1" noProof="1">
-              <a:solidFill>
-                <a:schemeClr val="tx2"/>
-              </a:solidFill>
-              <a:latin typeface="Consolas" panose="020B0609020204030204" pitchFamily="49" charset="0"/>
-              <a:cs typeface="Arial" panose="020B0604020202020204" pitchFamily="34" charset="0"/>
-            </a:endParaRPr>
-          </a:p>
-        </p:txBody>
-      </p:sp>
-      <p:sp>
-        <p:nvSpPr>
-          <p:cNvPr id="20" name="AutoShape 5"/>
-          <p:cNvSpPr>
-            <a:spLocks noChangeArrowheads="1"/>
-          </p:cNvSpPr>
-          <p:nvPr/>
-        </p:nvSpPr>
-        <p:spPr bwMode="auto">
-          <a:xfrm>
-            <a:off x="9696000" y="3069000"/>
-            <a:ext cx="1861008" cy="585000"/>
-          </a:xfrm>
-          <a:prstGeom prst="wedgeRoundRectCallout">
-            <a:avLst>
-              <a:gd name="adj1" fmla="val -48930"/>
-              <a:gd name="adj2" fmla="val -125812"/>
-              <a:gd name="adj3" fmla="val 16667"/>
-            </a:avLst>
-          </a:prstGeom>
-          <a:solidFill>
-            <a:schemeClr val="tx1">
-              <a:alpha val="80000"/>
-            </a:schemeClr>
-          </a:solidFill>
-          <a:ln w="19050">
-            <a:solidFill>
-              <a:schemeClr val="tx1">
-                <a:alpha val="80000"/>
-              </a:schemeClr>
-            </a:solidFill>
-          </a:ln>
-          <a:effectLst/>
-        </p:spPr>
-        <p:style>
-          <a:lnRef idx="2">
-            <a:schemeClr val="accent1">
-              <a:shade val="50000"/>
-            </a:schemeClr>
-          </a:lnRef>
-          <a:fillRef idx="1001">
-            <a:schemeClr val="dk2"/>
-          </a:fillRef>
-          <a:effectRef idx="0">
-            <a:schemeClr val="accent1"/>
-          </a:effectRef>
-          <a:fontRef idx="minor">
-            <a:schemeClr val="lt1"/>
-          </a:fontRef>
-        </p:style>
-        <p:txBody>
-          <a:bodyPr rot="0" spcFirstLastPara="0" vertOverflow="overflow" horzOverflow="overflow" vert="horz" wrap="square" lIns="91440" tIns="45720" rIns="91440" bIns="45720" numCol="1" spcCol="0" rtlCol="0" fromWordArt="0" anchor="ctr" anchorCtr="0" forceAA="0" compatLnSpc="1">
-            <a:prstTxWarp prst="textNoShape">
-              <a:avLst/>
-            </a:prstTxWarp>
-            <a:noAutofit/>
-          </a:bodyPr>
-          <a:lstStyle/>
-          <a:p>
-            <a:pPr algn="ctr"/>
-            <a:r>
-              <a:rPr lang="bg-BG" sz="3000" b="1" dirty="0">
-                <a:solidFill>
-                  <a:srgbClr val="FFFFFF"/>
-                </a:solidFill>
-                <a:effectLst>
-                  <a:outerShdw blurRad="38100" dist="38100" dir="2700000" algn="tl">
-                    <a:srgbClr val="000000">
-                      <a:alpha val="43137"/>
-                    </a:srgbClr>
-                  </a:outerShdw>
-                </a:effectLst>
-              </a:rPr>
-              <a:t>Колони</a:t>
-            </a:r>
-          </a:p>
-        </p:txBody>
-      </p:sp>
-      <p:sp>
-        <p:nvSpPr>
-          <p:cNvPr id="21" name="AutoShape 5"/>
-          <p:cNvSpPr>
-            <a:spLocks noChangeArrowheads="1"/>
-          </p:cNvSpPr>
-          <p:nvPr/>
-        </p:nvSpPr>
-        <p:spPr bwMode="auto">
-          <a:xfrm>
-            <a:off x="4746000" y="5615620"/>
-            <a:ext cx="1845000" cy="603379"/>
-          </a:xfrm>
-          <a:prstGeom prst="wedgeRoundRectCallout">
-            <a:avLst>
-              <a:gd name="adj1" fmla="val -16533"/>
-              <a:gd name="adj2" fmla="val -207855"/>
-              <a:gd name="adj3" fmla="val 16667"/>
-            </a:avLst>
-          </a:prstGeom>
-          <a:solidFill>
-            <a:schemeClr val="tx1">
-              <a:alpha val="80000"/>
-            </a:schemeClr>
-          </a:solidFill>
-          <a:ln w="19050">
-            <a:solidFill>
-              <a:schemeClr val="tx1">
-                <a:alpha val="80000"/>
-              </a:schemeClr>
-            </a:solidFill>
-          </a:ln>
-          <a:effectLst/>
-        </p:spPr>
-        <p:style>
-          <a:lnRef idx="2">
-            <a:schemeClr val="accent1">
-              <a:shade val="50000"/>
-            </a:schemeClr>
-          </a:lnRef>
-          <a:fillRef idx="1001">
-            <a:schemeClr val="dk2"/>
-          </a:fillRef>
-          <a:effectRef idx="0">
-            <a:schemeClr val="accent1"/>
-          </a:effectRef>
-          <a:fontRef idx="minor">
-            <a:schemeClr val="lt1"/>
-          </a:fontRef>
-        </p:style>
-        <p:txBody>
-          <a:bodyPr rot="0" spcFirstLastPara="0" vertOverflow="overflow" horzOverflow="overflow" vert="horz" wrap="square" lIns="91440" tIns="45720" rIns="91440" bIns="45720" numCol="1" spcCol="0" rtlCol="0" fromWordArt="0" anchor="ctr" anchorCtr="0" forceAA="0" compatLnSpc="1">
-            <a:prstTxWarp prst="textNoShape">
-              <a:avLst/>
-            </a:prstTxWarp>
-            <a:noAutofit/>
-          </a:bodyPr>
-          <a:lstStyle/>
-          <a:p>
-            <a:pPr algn="ctr"/>
-            <a:r>
-              <a:rPr lang="bg-BG" sz="3200" b="1" dirty="0">
-                <a:solidFill>
-                  <a:srgbClr val="FFFFFF"/>
-                </a:solidFill>
-                <a:effectLst>
-                  <a:outerShdw blurRad="38100" dist="38100" dir="2700000" algn="tl">
-                    <a:srgbClr val="000000">
-                      <a:alpha val="43137"/>
-                    </a:srgbClr>
-                  </a:outerShdw>
-                </a:effectLst>
-              </a:rPr>
-              <a:t>Данни</a:t>
-            </a:r>
-          </a:p>
-        </p:txBody>
-      </p:sp>
-      <p:sp>
-        <p:nvSpPr>
-          <p:cNvPr id="24" name="Rectangle: Rounded Corners 12">
-            <a:extLst>
-              <a:ext uri="{FF2B5EF4-FFF2-40B4-BE49-F238E27FC236}">
-                <a16:creationId xmlns:a16="http://schemas.microsoft.com/office/drawing/2014/main" id="{9DA28A83-547E-448D-9FBA-384C606E5B39}"/>
-              </a:ext>
-            </a:extLst>
-          </p:cNvPr>
-          <p:cNvSpPr/>
-          <p:nvPr/>
-        </p:nvSpPr>
-        <p:spPr>
-          <a:xfrm>
-            <a:off x="3627090" y="2088728"/>
-            <a:ext cx="1508760" cy="567347"/>
-          </a:xfrm>
-          <a:prstGeom prst="roundRect">
-            <a:avLst>
-              <a:gd name="adj" fmla="val 5385"/>
-            </a:avLst>
-          </a:prstGeom>
-          <a:noFill/>
-          <a:ln w="57150">
-            <a:solidFill>
-              <a:schemeClr val="tx1"/>
-            </a:solidFill>
-            <a:prstDash val="sysDash"/>
-          </a:ln>
-        </p:spPr>
-        <p:style>
-          <a:lnRef idx="2">
-            <a:schemeClr val="accent1">
-              <a:shade val="50000"/>
-            </a:schemeClr>
-          </a:lnRef>
-          <a:fillRef idx="1">
-            <a:schemeClr val="accent1"/>
-          </a:fillRef>
-          <a:effectRef idx="0">
-            <a:schemeClr val="accent1"/>
-          </a:effectRef>
-          <a:fontRef idx="minor">
-            <a:schemeClr val="lt1"/>
-          </a:fontRef>
-        </p:style>
-        <p:txBody>
-          <a:bodyPr rtlCol="0" anchor="ctr"/>
-          <a:lstStyle/>
-          <a:p>
-            <a:pPr algn="ctr"/>
-            <a:endParaRPr lang="en-US" sz="2800" b="1" dirty="0">
-              <a:solidFill>
-                <a:srgbClr val="FBEEDC"/>
-              </a:solidFill>
-              <a:effectLst>
-                <a:outerShdw blurRad="38100" dist="38100" dir="2700000" algn="tl">
-                  <a:srgbClr val="000000">
-                    <a:alpha val="43137"/>
-                  </a:srgbClr>
-                </a:outerShdw>
-              </a:effectLst>
-              <a:latin typeface="Consolas" panose="020B0609020204030204" pitchFamily="49" charset="0"/>
-            </a:endParaRPr>
-          </a:p>
-        </p:txBody>
-      </p:sp>
-      <p:sp>
-        <p:nvSpPr>
-          <p:cNvPr id="18" name="AutoShape 5"/>
-          <p:cNvSpPr>
-            <a:spLocks noChangeArrowheads="1"/>
-          </p:cNvSpPr>
-          <p:nvPr/>
-        </p:nvSpPr>
-        <p:spPr bwMode="auto">
-          <a:xfrm>
-            <a:off x="4971000" y="1359000"/>
-            <a:ext cx="3240000" cy="585000"/>
-          </a:xfrm>
-          <a:prstGeom prst="wedgeRoundRectCallout">
-            <a:avLst>
-              <a:gd name="adj1" fmla="val -41025"/>
-              <a:gd name="adj2" fmla="val 93239"/>
-              <a:gd name="adj3" fmla="val 16667"/>
-            </a:avLst>
-          </a:prstGeom>
-          <a:solidFill>
-            <a:schemeClr val="tx1">
-              <a:alpha val="80000"/>
-            </a:schemeClr>
-          </a:solidFill>
-          <a:ln w="19050">
-            <a:solidFill>
-              <a:schemeClr val="tx1">
-                <a:alpha val="80000"/>
-              </a:schemeClr>
-            </a:solidFill>
-          </a:ln>
-          <a:effectLst/>
-        </p:spPr>
-        <p:style>
-          <a:lnRef idx="2">
-            <a:schemeClr val="accent1">
-              <a:shade val="50000"/>
-            </a:schemeClr>
-          </a:lnRef>
-          <a:fillRef idx="1001">
-            <a:schemeClr val="dk2"/>
-          </a:fillRef>
-          <a:effectRef idx="0">
-            <a:schemeClr val="accent1"/>
-          </a:effectRef>
-          <a:fontRef idx="minor">
-            <a:schemeClr val="lt1"/>
-          </a:fontRef>
-        </p:style>
-        <p:txBody>
-          <a:bodyPr rot="0" spcFirstLastPara="0" vertOverflow="overflow" horzOverflow="overflow" vert="horz" wrap="square" lIns="91440" tIns="45720" rIns="91440" bIns="45720" numCol="1" spcCol="0" rtlCol="0" fromWordArt="0" anchor="ctr" anchorCtr="0" forceAA="0" compatLnSpc="1">
-            <a:prstTxWarp prst="textNoShape">
-              <a:avLst/>
-            </a:prstTxWarp>
-            <a:noAutofit/>
-          </a:bodyPr>
-          <a:lstStyle/>
-          <a:p>
-            <a:pPr algn="ctr"/>
-            <a:r>
-              <a:rPr lang="bg-BG" sz="3000" b="1" dirty="0">
-                <a:solidFill>
-                  <a:srgbClr val="FFFFFF"/>
-                </a:solidFill>
-                <a:effectLst>
-                  <a:outerShdw blurRad="38100" dist="38100" dir="2700000" algn="tl">
-                    <a:srgbClr val="000000">
-                      <a:alpha val="43137"/>
-                    </a:srgbClr>
-                  </a:outerShdw>
-                </a:effectLst>
-              </a:rPr>
-              <a:t>Име на таблица</a:t>
-            </a:r>
-          </a:p>
-        </p:txBody>
-      </p:sp>
-      <p:sp>
-        <p:nvSpPr>
-          <p:cNvPr id="2" name="Slide Number">
-            <a:extLst>
-              <a:ext uri="{FF2B5EF4-FFF2-40B4-BE49-F238E27FC236}">
-                <a16:creationId xmlns:a16="http://schemas.microsoft.com/office/drawing/2014/main" id="{EE055C4A-1126-5B8E-3347-7A34EFDF14FA}"/>
-              </a:ext>
-            </a:extLst>
-          </p:cNvPr>
-          <p:cNvSpPr>
-            <a:spLocks noGrp="1"/>
-          </p:cNvSpPr>
-          <p:nvPr>
-            <p:ph type="sldNum" sz="quarter" idx="5"/>
-          </p:nvPr>
-        </p:nvSpPr>
-        <p:spPr>
-          <a:xfrm>
-            <a:off x="11753030" y="6507000"/>
-            <a:ext cx="367414" cy="297000"/>
-          </a:xfrm>
-          <a:prstGeom prst="rect">
-            <a:avLst/>
-          </a:prstGeom>
-        </p:spPr>
-        <p:txBody>
-          <a:bodyPr vert="horz" lIns="91440" tIns="45720" rIns="91440" bIns="45720" rtlCol="0" anchor="b"/>
-          <a:lstStyle>
-            <a:lvl1pPr algn="r">
-              <a:defRPr sz="1000"/>
-            </a:lvl1pPr>
-          </a:lstStyle>
-          <a:p>
-            <a:fld id="{2BF067CD-8E6B-4360-9AA8-C5DF2A48A6D1}" type="slidenum">
-              <a:rPr lang="en-US" noProof="0" smtClean="0"/>
-              <a:pPr/>
-              <a:t>33</a:t>
-            </a:fld>
-            <a:endParaRPr lang="en-US" noProof="0" dirty="0"/>
-          </a:p>
-        </p:txBody>
-      </p:sp>
-    </p:spTree>
-    <p:extLst>
-      <p:ext uri="{BB962C8B-B14F-4D97-AF65-F5344CB8AC3E}">
-        <p14:creationId xmlns:p14="http://schemas.microsoft.com/office/powerpoint/2010/main" val="2452943065"/>
-      </p:ext>
-    </p:extLst>
-  </p:cSld>
-  <p:clrMapOvr>
-    <a:masterClrMapping/>
-  </p:clrMapOvr>
-  <mc:AlternateContent xmlns:mc="http://schemas.openxmlformats.org/markup-compatibility/2006" xmlns:p14="http://schemas.microsoft.com/office/powerpoint/2010/main">
-    <mc:Choice Requires="p14">
-      <p:transition spd="slow" p14:dur="2000" advClick="0" advTm="5000"/>
-    </mc:Choice>
-    <mc:Fallback xmlns="">
-      <p:transition spd="slow" advClick="0" advTm="5000"/>
-    </mc:Fallback>
-  </mc:AlternateContent>
-  <p:timing>
-    <p:tnLst>
-      <p:par>
-        <p:cTn id="1" dur="indefinite" restart="never" nodeType="tmRoot">
-          <p:childTnLst>
-            <p:seq concurrent="1" nextAc="seek">
-              <p:cTn id="2" dur="indefinite" nodeType="mainSeq">
-                <p:childTnLst>
-                  <p:par>
-                    <p:cTn id="3" fill="hold">
-                      <p:stCondLst>
-                        <p:cond delay="indefinite"/>
-                      </p:stCondLst>
-                      <p:childTnLst>
-                        <p:par>
-                          <p:cTn id="4" fill="hold">
-                            <p:stCondLst>
-                              <p:cond delay="0"/>
-                            </p:stCondLst>
-                            <p:childTnLst>
-                              <p:par>
-                                <p:cTn id="5" presetID="1" presetClass="entr" presetSubtype="0" fill="hold" grpId="0" nodeType="clickEffect">
-                                  <p:stCondLst>
-                                    <p:cond delay="0"/>
-                                  </p:stCondLst>
-                                  <p:childTnLst>
-                                    <p:set>
-                                      <p:cBhvr>
-                                        <p:cTn id="6" dur="1" fill="hold">
-                                          <p:stCondLst>
-                                            <p:cond delay="0"/>
-                                          </p:stCondLst>
-                                        </p:cTn>
-                                        <p:tgtEl>
-                                          <p:spTgt spid="18"/>
-                                        </p:tgtEl>
-                                        <p:attrNameLst>
-                                          <p:attrName>style.visibility</p:attrName>
-                                        </p:attrNameLst>
-                                      </p:cBhvr>
-                                      <p:to>
-                                        <p:strVal val="visible"/>
-                                      </p:to>
-                                    </p:set>
-                                  </p:childTnLst>
-                                </p:cTn>
-                              </p:par>
-                              <p:par>
-                                <p:cTn id="7" presetID="1" presetClass="entr" presetSubtype="0" fill="hold" grpId="0" nodeType="withEffect">
-                                  <p:stCondLst>
-                                    <p:cond delay="0"/>
-                                  </p:stCondLst>
-                                  <p:childTnLst>
-                                    <p:set>
-                                      <p:cBhvr>
-                                        <p:cTn id="8" dur="1" fill="hold">
-                                          <p:stCondLst>
-                                            <p:cond delay="0"/>
-                                          </p:stCondLst>
-                                        </p:cTn>
-                                        <p:tgtEl>
-                                          <p:spTgt spid="24"/>
-                                        </p:tgtEl>
-                                        <p:attrNameLst>
-                                          <p:attrName>style.visibility</p:attrName>
-                                        </p:attrNameLst>
-                                      </p:cBhvr>
-                                      <p:to>
-                                        <p:strVal val="visible"/>
-                                      </p:to>
-                                    </p:set>
-                                  </p:childTnLst>
-                                </p:cTn>
-                              </p:par>
-                            </p:childTnLst>
-                          </p:cTn>
-                        </p:par>
-                      </p:childTnLst>
-                    </p:cTn>
-                  </p:par>
-                  <p:par>
-                    <p:cTn id="9" fill="hold">
-                      <p:stCondLst>
-                        <p:cond delay="indefinite"/>
-                      </p:stCondLst>
-                      <p:childTnLst>
-                        <p:par>
-                          <p:cTn id="10" fill="hold">
-                            <p:stCondLst>
-                              <p:cond delay="0"/>
-                            </p:stCondLst>
-                            <p:childTnLst>
-                              <p:par>
-                                <p:cTn id="11" presetID="1" presetClass="entr" presetSubtype="0" fill="hold" grpId="0" nodeType="clickEffect">
-                                  <p:stCondLst>
-                                    <p:cond delay="0"/>
-                                  </p:stCondLst>
-                                  <p:childTnLst>
-                                    <p:set>
-                                      <p:cBhvr>
-                                        <p:cTn id="12" dur="1" fill="hold">
-                                          <p:stCondLst>
-                                            <p:cond delay="0"/>
-                                          </p:stCondLst>
-                                        </p:cTn>
-                                        <p:tgtEl>
-                                          <p:spTgt spid="20"/>
-                                        </p:tgtEl>
-                                        <p:attrNameLst>
-                                          <p:attrName>style.visibility</p:attrName>
-                                        </p:attrNameLst>
-                                      </p:cBhvr>
-                                      <p:to>
-                                        <p:strVal val="visible"/>
-                                      </p:to>
-                                    </p:set>
-                                  </p:childTnLst>
-                                </p:cTn>
-                              </p:par>
-                            </p:childTnLst>
-                          </p:cTn>
-                        </p:par>
-                      </p:childTnLst>
-                    </p:cTn>
-                  </p:par>
-                  <p:par>
-                    <p:cTn id="13" fill="hold">
-                      <p:stCondLst>
-                        <p:cond delay="indefinite"/>
-                      </p:stCondLst>
-                      <p:childTnLst>
-                        <p:par>
-                          <p:cTn id="14" fill="hold">
-                            <p:stCondLst>
-                              <p:cond delay="0"/>
-                            </p:stCondLst>
-                            <p:childTnLst>
-                              <p:par>
-                                <p:cTn id="15" presetID="1" presetClass="entr" presetSubtype="0" fill="hold" nodeType="clickEffect">
-                                  <p:stCondLst>
-                                    <p:cond delay="0"/>
-                                  </p:stCondLst>
-                                  <p:childTnLst>
-                                    <p:set>
-                                      <p:cBhvr>
-                                        <p:cTn id="16" dur="1" fill="hold">
-                                          <p:stCondLst>
-                                            <p:cond delay="0"/>
-                                          </p:stCondLst>
-                                        </p:cTn>
-                                        <p:tgtEl>
-                                          <p:spTgt spid="6">
-                                            <p:txEl>
-                                              <p:pRg st="1" end="1"/>
-                                            </p:txEl>
-                                          </p:spTgt>
-                                        </p:tgtEl>
-                                        <p:attrNameLst>
-                                          <p:attrName>style.visibility</p:attrName>
-                                        </p:attrNameLst>
-                                      </p:cBhvr>
-                                      <p:to>
-                                        <p:strVal val="visible"/>
-                                      </p:to>
-                                    </p:set>
-                                  </p:childTnLst>
-                                </p:cTn>
-                              </p:par>
-                              <p:par>
-                                <p:cTn id="17" presetID="1" presetClass="entr" presetSubtype="0" fill="hold" nodeType="withEffect">
-                                  <p:stCondLst>
-                                    <p:cond delay="0"/>
-                                  </p:stCondLst>
-                                  <p:childTnLst>
-                                    <p:set>
-                                      <p:cBhvr>
-                                        <p:cTn id="18" dur="1" fill="hold">
-                                          <p:stCondLst>
-                                            <p:cond delay="0"/>
-                                          </p:stCondLst>
-                                        </p:cTn>
-                                        <p:tgtEl>
-                                          <p:spTgt spid="6">
-                                            <p:txEl>
-                                              <p:pRg st="2" end="2"/>
-                                            </p:txEl>
-                                          </p:spTgt>
-                                        </p:tgtEl>
-                                        <p:attrNameLst>
-                                          <p:attrName>style.visibility</p:attrName>
-                                        </p:attrNameLst>
-                                      </p:cBhvr>
-                                      <p:to>
-                                        <p:strVal val="visible"/>
-                                      </p:to>
-                                    </p:set>
-                                  </p:childTnLst>
-                                </p:cTn>
-                              </p:par>
-                              <p:par>
-                                <p:cTn id="19" presetID="1" presetClass="entr" presetSubtype="0" fill="hold" nodeType="withEffect">
-                                  <p:stCondLst>
-                                    <p:cond delay="0"/>
-                                  </p:stCondLst>
-                                  <p:childTnLst>
-                                    <p:set>
-                                      <p:cBhvr>
-                                        <p:cTn id="20" dur="1" fill="hold">
-                                          <p:stCondLst>
-                                            <p:cond delay="0"/>
-                                          </p:stCondLst>
-                                        </p:cTn>
-                                        <p:tgtEl>
-                                          <p:spTgt spid="6">
-                                            <p:txEl>
-                                              <p:pRg st="3" end="3"/>
-                                            </p:txEl>
-                                          </p:spTgt>
-                                        </p:tgtEl>
-                                        <p:attrNameLst>
-                                          <p:attrName>style.visibility</p:attrName>
-                                        </p:attrNameLst>
-                                      </p:cBhvr>
-                                      <p:to>
-                                        <p:strVal val="visible"/>
-                                      </p:to>
-                                    </p:set>
-                                  </p:childTnLst>
-                                </p:cTn>
-                              </p:par>
-                              <p:par>
-                                <p:cTn id="21" presetID="1" presetClass="entr" presetSubtype="0" fill="hold" nodeType="withEffect">
-                                  <p:stCondLst>
-                                    <p:cond delay="0"/>
-                                  </p:stCondLst>
-                                  <p:childTnLst>
-                                    <p:set>
-                                      <p:cBhvr>
-                                        <p:cTn id="22" dur="1" fill="hold">
-                                          <p:stCondLst>
-                                            <p:cond delay="0"/>
-                                          </p:stCondLst>
-                                        </p:cTn>
-                                        <p:tgtEl>
-                                          <p:spTgt spid="6">
-                                            <p:txEl>
-                                              <p:pRg st="4" end="4"/>
-                                            </p:txEl>
-                                          </p:spTgt>
-                                        </p:tgtEl>
-                                        <p:attrNameLst>
-                                          <p:attrName>style.visibility</p:attrName>
-                                        </p:attrNameLst>
-                                      </p:cBhvr>
-                                      <p:to>
-                                        <p:strVal val="visible"/>
-                                      </p:to>
-                                    </p:set>
-                                  </p:childTnLst>
-                                </p:cTn>
-                              </p:par>
-                            </p:childTnLst>
-                          </p:cTn>
-                        </p:par>
-                      </p:childTnLst>
-                    </p:cTn>
-                  </p:par>
-                  <p:par>
-                    <p:cTn id="23" fill="hold">
-                      <p:stCondLst>
-                        <p:cond delay="indefinite"/>
-                      </p:stCondLst>
-                      <p:childTnLst>
-                        <p:par>
-                          <p:cTn id="24" fill="hold">
-                            <p:stCondLst>
-                              <p:cond delay="0"/>
-                            </p:stCondLst>
-                            <p:childTnLst>
-                              <p:par>
-                                <p:cTn id="25" presetID="1" presetClass="entr" presetSubtype="0" fill="hold" grpId="0" nodeType="clickEffect">
-                                  <p:stCondLst>
-                                    <p:cond delay="0"/>
-                                  </p:stCondLst>
-                                  <p:childTnLst>
-                                    <p:set>
-                                      <p:cBhvr>
-                                        <p:cTn id="26" dur="1" fill="hold">
-                                          <p:stCondLst>
-                                            <p:cond delay="0"/>
-                                          </p:stCondLst>
-                                        </p:cTn>
-                                        <p:tgtEl>
-                                          <p:spTgt spid="21"/>
-                                        </p:tgtEl>
-                                        <p:attrNameLst>
-                                          <p:attrName>style.visibility</p:attrName>
-                                        </p:attrNameLst>
-                                      </p:cBhvr>
-                                      <p:to>
-                                        <p:strVal val="visible"/>
-                                      </p:to>
-                                    </p:set>
-                                  </p:childTnLst>
-                                </p:cTn>
-                              </p:par>
-                            </p:childTnLst>
-                          </p:cTn>
-                        </p:par>
-                      </p:childTnLst>
-                    </p:cTn>
-                  </p:par>
-                </p:childTnLst>
-              </p:cTn>
-              <p:prevCondLst>
-                <p:cond evt="onPrev" delay="0">
-                  <p:tgtEl>
-                    <p:sldTgt/>
-                  </p:tgtEl>
-                </p:cond>
-              </p:prevCondLst>
-              <p:nextCondLst>
-                <p:cond evt="onNext" delay="0">
-                  <p:tgtEl>
-                    <p:sldTgt/>
-                  </p:tgtEl>
-                </p:cond>
-              </p:nextCondLst>
-            </p:seq>
-          </p:childTnLst>
-        </p:cTn>
-      </p:par>
-    </p:tnLst>
-    <p:bldLst>
-      <p:bldP spid="20" grpId="0" animBg="1"/>
-      <p:bldP spid="21" grpId="0" animBg="1"/>
-      <p:bldP spid="24" grpId="0" animBg="1"/>
-      <p:bldP spid="18" grpId="0" animBg="1"/>
-    </p:bldLst>
-  </p:timing>
-</p:sld>
-</file>
-
-<file path=ppt/slides/slide34.xml><?xml version="1.0" encoding="utf-8"?>
-<p:sld xmlns:a="http://schemas.openxmlformats.org/drawingml/2006/main" xmlns:r="http://schemas.openxmlformats.org/officeDocument/2006/relationships" xmlns:p="http://schemas.openxmlformats.org/presentationml/2006/main">
-  <p:cSld>
-    <p:spTree>
-      <p:nvGrpSpPr>
-        <p:cNvPr id="1" name=""/>
-        <p:cNvGrpSpPr/>
-        <p:nvPr/>
-      </p:nvGrpSpPr>
-      <p:grpSpPr>
-        <a:xfrm>
-          <a:off x="0" y="0"/>
-          <a:ext cx="0" cy="0"/>
-          <a:chOff x="0" y="0"/>
-          <a:chExt cx="0" cy="0"/>
-        </a:xfrm>
-      </p:grpSpPr>
-      <p:sp>
-        <p:nvSpPr>
-          <p:cNvPr id="3" name="Text Placeholder 2"/>
-          <p:cNvSpPr>
-            <a:spLocks noGrp="1"/>
-          </p:cNvSpPr>
-          <p:nvPr>
-            <p:ph type="body" sz="quarter" idx="10"/>
-          </p:nvPr>
-        </p:nvSpPr>
-        <p:spPr/>
-        <p:txBody>
-          <a:bodyPr/>
-          <a:lstStyle/>
-          <a:p>
-            <a:r>
-              <a:rPr lang="ru-RU" dirty="0"/>
-              <a:t>Операторът </a:t>
-            </a:r>
-            <a:r>
-              <a:rPr lang="en-US" b="1" dirty="0">
-                <a:solidFill>
-                  <a:schemeClr val="bg1"/>
-                </a:solidFill>
-              </a:rPr>
-              <a:t>INSERT INTO </a:t>
-            </a:r>
-            <a:r>
-              <a:rPr lang="ru-RU" dirty="0"/>
-              <a:t>се използва за </a:t>
-            </a:r>
-            <a:r>
-              <a:rPr lang="bg-BG" b="1" dirty="0">
-                <a:solidFill>
-                  <a:schemeClr val="bg1"/>
-                </a:solidFill>
-              </a:rPr>
-              <a:t>добавяне </a:t>
-            </a:r>
-            <a:r>
-              <a:rPr lang="ru-RU" dirty="0"/>
-              <a:t>на нови редове в таблицата </a:t>
-            </a:r>
-            <a:r>
-              <a:rPr lang="en-US" b="1" dirty="0">
-                <a:solidFill>
-                  <a:schemeClr val="bg1"/>
-                </a:solidFill>
-              </a:rPr>
-              <a:t>People</a:t>
-            </a:r>
-            <a:endParaRPr lang="ru-RU" dirty="0"/>
-          </a:p>
-          <a:p>
-            <a:r>
-              <a:rPr lang="ru-RU" dirty="0"/>
-              <a:t>Посочваме </a:t>
-            </a:r>
-            <a:r>
-              <a:rPr lang="bg-BG" b="1" dirty="0">
-                <a:solidFill>
-                  <a:schemeClr val="bg1"/>
-                </a:solidFill>
-              </a:rPr>
-              <a:t>имената на колоните </a:t>
-            </a:r>
-            <a:r>
-              <a:rPr lang="ru-RU" dirty="0"/>
-              <a:t>след името на таблицата, за да сме сигурни, че данните ще се запишат в тях</a:t>
-            </a:r>
-          </a:p>
-          <a:p>
-            <a:r>
-              <a:rPr lang="bg-BG" dirty="0"/>
-              <a:t>Ключовата дума</a:t>
-            </a:r>
-            <a:r>
-              <a:rPr lang="en-US" dirty="0"/>
-              <a:t> </a:t>
-            </a:r>
-            <a:r>
-              <a:rPr lang="en-US" b="1" dirty="0">
-                <a:solidFill>
-                  <a:schemeClr val="bg1"/>
-                </a:solidFill>
-              </a:rPr>
-              <a:t>VALUES </a:t>
-            </a:r>
-            <a:r>
-              <a:rPr lang="bg-BG" dirty="0"/>
-              <a:t>е последвана от набор от скоби, съдържащи </a:t>
-            </a:r>
-            <a:r>
-              <a:rPr lang="bg-BG" b="1" dirty="0">
-                <a:solidFill>
-                  <a:schemeClr val="bg1"/>
-                </a:solidFill>
-              </a:rPr>
-              <a:t>стойностите за всеки ред</a:t>
-            </a:r>
-            <a:r>
-              <a:rPr lang="bg-BG" dirty="0"/>
-              <a:t>, който искаме да добавим</a:t>
-            </a:r>
-            <a:endParaRPr lang="en-US" dirty="0"/>
-          </a:p>
-          <a:p>
-            <a:r>
-              <a:rPr lang="bg-BG" dirty="0"/>
-              <a:t>Всеки набор от стойности съответства</a:t>
-            </a:r>
-            <a:r>
-              <a:rPr lang="en-US" dirty="0"/>
-              <a:t> </a:t>
-            </a:r>
-            <a:r>
-              <a:rPr lang="bg-BG" dirty="0"/>
-              <a:t>на </a:t>
-            </a:r>
-            <a:r>
-              <a:rPr lang="bg-BG" b="1" dirty="0">
-                <a:solidFill>
-                  <a:schemeClr val="bg1"/>
-                </a:solidFill>
-              </a:rPr>
-              <a:t>ред в таблицата</a:t>
-            </a:r>
-            <a:br>
-              <a:rPr lang="ru-RU" dirty="0"/>
-            </a:br>
-            <a:endParaRPr lang="en-US" dirty="0"/>
-          </a:p>
-        </p:txBody>
-      </p:sp>
-      <p:sp>
-        <p:nvSpPr>
-          <p:cNvPr id="4" name="Title 3"/>
-          <p:cNvSpPr>
-            <a:spLocks noGrp="1"/>
-          </p:cNvSpPr>
-          <p:nvPr>
-            <p:ph type="title"/>
-          </p:nvPr>
-        </p:nvSpPr>
-        <p:spPr/>
-        <p:txBody>
-          <a:bodyPr/>
-          <a:lstStyle/>
-          <a:p>
-            <a:r>
-              <a:rPr lang="bg-BG" dirty="0"/>
-              <a:t>Вмъкване на данни чрез </a:t>
-            </a:r>
-            <a:r>
-              <a:rPr lang="en-US" dirty="0"/>
-              <a:t>SQL (2)</a:t>
-            </a:r>
-          </a:p>
-        </p:txBody>
-      </p:sp>
-      <p:sp>
-        <p:nvSpPr>
-          <p:cNvPr id="5" name="Slide Number">
-            <a:extLst>
-              <a:ext uri="{FF2B5EF4-FFF2-40B4-BE49-F238E27FC236}">
-                <a16:creationId xmlns:a16="http://schemas.microsoft.com/office/drawing/2014/main" id="{1DAFA887-93DC-FE06-C7DE-B7D8871708D9}"/>
-              </a:ext>
-            </a:extLst>
-          </p:cNvPr>
-          <p:cNvSpPr>
-            <a:spLocks noGrp="1"/>
-          </p:cNvSpPr>
-          <p:nvPr>
-            <p:ph type="sldNum" sz="quarter" idx="5"/>
-          </p:nvPr>
-        </p:nvSpPr>
-        <p:spPr>
-          <a:xfrm>
-            <a:off x="11753030" y="6507000"/>
-            <a:ext cx="367414" cy="297000"/>
-          </a:xfrm>
-          <a:prstGeom prst="rect">
-            <a:avLst/>
-          </a:prstGeom>
-        </p:spPr>
-        <p:txBody>
-          <a:bodyPr vert="horz" lIns="91440" tIns="45720" rIns="91440" bIns="45720" rtlCol="0" anchor="b"/>
-          <a:lstStyle>
-            <a:lvl1pPr algn="r">
-              <a:defRPr sz="1000"/>
-            </a:lvl1pPr>
-          </a:lstStyle>
-          <a:p>
-            <a:fld id="{2BF067CD-8E6B-4360-9AA8-C5DF2A48A6D1}" type="slidenum">
-              <a:rPr lang="en-US" noProof="0" smtClean="0"/>
-              <a:pPr/>
-              <a:t>34</a:t>
-            </a:fld>
-            <a:endParaRPr lang="en-US" noProof="0" dirty="0"/>
-          </a:p>
-        </p:txBody>
-      </p:sp>
-    </p:spTree>
-    <p:extLst>
-      <p:ext uri="{BB962C8B-B14F-4D97-AF65-F5344CB8AC3E}">
-        <p14:creationId xmlns:p14="http://schemas.microsoft.com/office/powerpoint/2010/main" val="253181009"/>
-      </p:ext>
-    </p:extLst>
-  </p:cSld>
-  <p:clrMapOvr>
-    <a:masterClrMapping/>
-  </p:clrMapOvr>
-  <mc:AlternateContent xmlns:mc="http://schemas.openxmlformats.org/markup-compatibility/2006" xmlns:p14="http://schemas.microsoft.com/office/powerpoint/2010/main">
-    <mc:Choice Requires="p14">
-      <p:transition spd="slow" p14:dur="2000" advClick="0" advTm="5000"/>
-    </mc:Choice>
-    <mc:Fallback xmlns="">
-      <p:transition spd="slow" advClick="0" advTm="5000"/>
-    </mc:Fallback>
-  </mc:AlternateContent>
-  <p:timing>
-    <p:tnLst>
-      <p:par>
-        <p:cTn id="1" dur="indefinite" restart="never" nodeType="tmRoot">
-          <p:childTnLst>
-            <p:seq concurrent="1" nextAc="seek">
-              <p:cTn id="2" dur="indefinite" nodeType="mainSeq">
-                <p:childTnLst>
-                  <p:par>
-                    <p:cTn id="3" fill="hold">
-                      <p:stCondLst>
-                        <p:cond delay="indefinite"/>
-                      </p:stCondLst>
-                      <p:childTnLst>
-                        <p:par>
-                          <p:cTn id="4" fill="hold">
-                            <p:stCondLst>
-                              <p:cond delay="0"/>
-                            </p:stCondLst>
-                            <p:childTnLst>
-                              <p:par>
-                                <p:cTn id="5" presetID="1" presetClass="entr" presetSubtype="0" fill="hold" nodeType="clickEffect">
-                                  <p:stCondLst>
-                                    <p:cond delay="0"/>
-                                  </p:stCondLst>
-                                  <p:childTnLst>
-                                    <p:set>
-                                      <p:cBhvr>
-                                        <p:cTn id="6" dur="1" fill="hold">
-                                          <p:stCondLst>
-                                            <p:cond delay="0"/>
-                                          </p:stCondLst>
-                                        </p:cTn>
-                                        <p:tgtEl>
-                                          <p:spTgt spid="3">
-                                            <p:txEl>
-                                              <p:pRg st="1" end="1"/>
-                                            </p:txEl>
-                                          </p:spTgt>
-                                        </p:tgtEl>
-                                        <p:attrNameLst>
-                                          <p:attrName>style.visibility</p:attrName>
-                                        </p:attrNameLst>
-                                      </p:cBhvr>
-                                      <p:to>
-                                        <p:strVal val="visible"/>
-                                      </p:to>
-                                    </p:set>
-                                  </p:childTnLst>
-                                </p:cTn>
-                              </p:par>
-                            </p:childTnLst>
-                          </p:cTn>
-                        </p:par>
-                      </p:childTnLst>
-                    </p:cTn>
-                  </p:par>
-                  <p:par>
-                    <p:cTn id="7" fill="hold">
-                      <p:stCondLst>
-                        <p:cond delay="indefinite"/>
-                      </p:stCondLst>
-                      <p:childTnLst>
-                        <p:par>
-                          <p:cTn id="8" fill="hold">
-                            <p:stCondLst>
-                              <p:cond delay="0"/>
-                            </p:stCondLst>
-                            <p:childTnLst>
-                              <p:par>
-                                <p:cTn id="9" presetID="1" presetClass="entr" presetSubtype="0" fill="hold" nodeType="clickEffect">
-                                  <p:stCondLst>
-                                    <p:cond delay="0"/>
-                                  </p:stCondLst>
-                                  <p:childTnLst>
-                                    <p:set>
-                                      <p:cBhvr>
-                                        <p:cTn id="10" dur="1" fill="hold">
-                                          <p:stCondLst>
-                                            <p:cond delay="0"/>
-                                          </p:stCondLst>
-                                        </p:cTn>
-                                        <p:tgtEl>
-                                          <p:spTgt spid="3">
-                                            <p:txEl>
-                                              <p:pRg st="2" end="2"/>
-                                            </p:txEl>
-                                          </p:spTgt>
-                                        </p:tgtEl>
-                                        <p:attrNameLst>
-                                          <p:attrName>style.visibility</p:attrName>
-                                        </p:attrNameLst>
-                                      </p:cBhvr>
-                                      <p:to>
-                                        <p:strVal val="visible"/>
-                                      </p:to>
-                                    </p:set>
-                                  </p:childTnLst>
-                                </p:cTn>
-                              </p:par>
-                            </p:childTnLst>
-                          </p:cTn>
-                        </p:par>
-                      </p:childTnLst>
-                    </p:cTn>
-                  </p:par>
-                  <p:par>
-                    <p:cTn id="11" fill="hold">
-                      <p:stCondLst>
-                        <p:cond delay="indefinite"/>
-                      </p:stCondLst>
-                      <p:childTnLst>
-                        <p:par>
-                          <p:cTn id="12" fill="hold">
-                            <p:stCondLst>
-                              <p:cond delay="0"/>
-                            </p:stCondLst>
-                            <p:childTnLst>
-                              <p:par>
-                                <p:cTn id="13" presetID="1" presetClass="entr" presetSubtype="0" fill="hold" nodeType="clickEffect">
-                                  <p:stCondLst>
-                                    <p:cond delay="0"/>
-                                  </p:stCondLst>
-                                  <p:childTnLst>
-                                    <p:set>
-                                      <p:cBhvr>
-                                        <p:cTn id="14" dur="1" fill="hold">
-                                          <p:stCondLst>
-                                            <p:cond delay="0"/>
-                                          </p:stCondLst>
-                                        </p:cTn>
-                                        <p:tgtEl>
-                                          <p:spTgt spid="3">
-                                            <p:txEl>
-                                              <p:pRg st="3" end="3"/>
-                                            </p:txEl>
-                                          </p:spTgt>
-                                        </p:tgtEl>
-                                        <p:attrNameLst>
-                                          <p:attrName>style.visibility</p:attrName>
-                                        </p:attrNameLst>
-                                      </p:cBhvr>
-                                      <p:to>
-                                        <p:strVal val="visible"/>
-                                      </p:to>
-                                    </p:set>
-                                  </p:childTnLst>
-                                </p:cTn>
-                              </p:par>
-                            </p:childTnLst>
-                          </p:cTn>
-                        </p:par>
-                      </p:childTnLst>
-                    </p:cTn>
-                  </p:par>
-                </p:childTnLst>
-              </p:cTn>
-              <p:prevCondLst>
-                <p:cond evt="onPrev" delay="0">
-                  <p:tgtEl>
-                    <p:sldTgt/>
-                  </p:tgtEl>
-                </p:cond>
-              </p:prevCondLst>
-              <p:nextCondLst>
-                <p:cond evt="onNext" delay="0">
-                  <p:tgtEl>
-                    <p:sldTgt/>
-                  </p:tgtEl>
-                </p:cond>
-              </p:nextCondLst>
-            </p:seq>
-          </p:childTnLst>
-        </p:cTn>
-      </p:par>
-    </p:tnLst>
-  </p:timing>
-</p:sld>
-</file>
-
-<file path=ppt/slides/slide35.xml><?xml version="1.0" encoding="utf-8"?>
-<p:sld xmlns:a="http://schemas.openxmlformats.org/drawingml/2006/main" xmlns:r="http://schemas.openxmlformats.org/officeDocument/2006/relationships" xmlns:p="http://schemas.openxmlformats.org/presentationml/2006/main">
-  <p:cSld>
-    <p:spTree>
-      <p:nvGrpSpPr>
-        <p:cNvPr id="1" name=""/>
-        <p:cNvGrpSpPr/>
-        <p:nvPr/>
-      </p:nvGrpSpPr>
-      <p:grpSpPr>
-        <a:xfrm>
-          <a:off x="0" y="0"/>
-          <a:ext cx="0" cy="0"/>
-          <a:chOff x="0" y="0"/>
-          <a:chExt cx="0" cy="0"/>
-        </a:xfrm>
-      </p:grpSpPr>
-      <p:sp>
-        <p:nvSpPr>
           <p:cNvPr id="3" name="Text Placeholder 2"/>
           <p:cNvSpPr>
             <a:spLocks noGrp="1"/>
@@ -21153,7 +19774,7 @@
             <a:fld id="{2BF067CD-8E6B-4360-9AA8-C5DF2A48A6D1}" type="slidenum">
               <a:rPr lang="en-US" noProof="0" smtClean="0"/>
               <a:pPr/>
-              <a:t>35</a:t>
+              <a:t>33</a:t>
             </a:fld>
             <a:endParaRPr lang="en-US" noProof="0" dirty="0"/>
           </a:p>
@@ -21259,7 +19880,7 @@
 </p:sld>
 </file>
 
-<file path=ppt/slides/slide36.xml><?xml version="1.0" encoding="utf-8"?>
+<file path=ppt/slides/slide34.xml><?xml version="1.0" encoding="utf-8"?>
 <p:sld xmlns:a="http://schemas.openxmlformats.org/drawingml/2006/main" xmlns:r="http://schemas.openxmlformats.org/officeDocument/2006/relationships" xmlns:p="http://schemas.openxmlformats.org/presentationml/2006/main">
   <p:cSld>
     <p:spTree>
@@ -21380,7 +20001,7 @@
 </p:sld>
 </file>
 
-<file path=ppt/slides/slide37.xml><?xml version="1.0" encoding="utf-8"?>
+<file path=ppt/slides/slide35.xml><?xml version="1.0" encoding="utf-8"?>
 <p:sld xmlns:a="http://schemas.openxmlformats.org/drawingml/2006/main" xmlns:r="http://schemas.openxmlformats.org/officeDocument/2006/relationships" xmlns:p="http://schemas.openxmlformats.org/presentationml/2006/main">
   <p:cSld>
     <p:spTree>
@@ -21579,7 +20200,7 @@
             <a:fld id="{2BF067CD-8E6B-4360-9AA8-C5DF2A48A6D1}" type="slidenum">
               <a:rPr lang="en-US" noProof="0" smtClean="0"/>
               <a:pPr/>
-              <a:t>37</a:t>
+              <a:t>35</a:t>
             </a:fld>
             <a:endParaRPr lang="en-US" noProof="0" dirty="0"/>
           </a:p>
@@ -21791,7 +20412,7 @@
 </p:sld>
 </file>
 
-<file path=ppt/slides/slide38.xml><?xml version="1.0" encoding="utf-8"?>
+<file path=ppt/slides/slide36.xml><?xml version="1.0" encoding="utf-8"?>
 <p:sld xmlns:a="http://schemas.openxmlformats.org/drawingml/2006/main" xmlns:r="http://schemas.openxmlformats.org/officeDocument/2006/relationships" xmlns:p="http://schemas.openxmlformats.org/presentationml/2006/main">
   <p:cSld>
     <p:spTree>
@@ -21943,7 +20564,7 @@
             <a:fld id="{2BF067CD-8E6B-4360-9AA8-C5DF2A48A6D1}" type="slidenum">
               <a:rPr lang="en-US" noProof="0" smtClean="0"/>
               <a:pPr/>
-              <a:t>38</a:t>
+              <a:t>36</a:t>
             </a:fld>
             <a:endParaRPr lang="en-US" noProof="0" dirty="0"/>
           </a:p>
@@ -21970,7 +20591,7 @@
 </p:sld>
 </file>
 
-<file path=ppt/slides/slide39.xml><?xml version="1.0" encoding="utf-8"?>
+<file path=ppt/slides/slide37.xml><?xml version="1.0" encoding="utf-8"?>
 <p:sld xmlns:a="http://schemas.openxmlformats.org/drawingml/2006/main" xmlns:r="http://schemas.openxmlformats.org/officeDocument/2006/relationships" xmlns:p="http://schemas.openxmlformats.org/presentationml/2006/main">
   <p:cSld>
     <p:spTree>
@@ -22185,7 +20806,7 @@
             <a:fld id="{2BF067CD-8E6B-4360-9AA8-C5DF2A48A6D1}" type="slidenum">
               <a:rPr lang="en-US" noProof="0" smtClean="0"/>
               <a:pPr/>
-              <a:t>39</a:t>
+              <a:t>37</a:t>
             </a:fld>
             <a:endParaRPr lang="en-US" noProof="0" dirty="0"/>
           </a:p>
@@ -22390,6 +21011,1313 @@
 </p:sld>
 </file>
 
+<file path=ppt/slides/slide38.xml><?xml version="1.0" encoding="utf-8"?>
+<p:sld xmlns:a="http://schemas.openxmlformats.org/drawingml/2006/main" xmlns:r="http://schemas.openxmlformats.org/officeDocument/2006/relationships" xmlns:p="http://schemas.openxmlformats.org/presentationml/2006/main">
+  <p:cSld>
+    <p:spTree>
+      <p:nvGrpSpPr>
+        <p:cNvPr id="1" name=""/>
+        <p:cNvGrpSpPr/>
+        <p:nvPr/>
+      </p:nvGrpSpPr>
+      <p:grpSpPr>
+        <a:xfrm>
+          <a:off x="0" y="0"/>
+          <a:ext cx="0" cy="0"/>
+          <a:chOff x="0" y="0"/>
+          <a:chExt cx="0" cy="0"/>
+        </a:xfrm>
+      </p:grpSpPr>
+      <p:sp>
+        <p:nvSpPr>
+          <p:cNvPr id="14" name="Text Placeholder 4">
+            <a:extLst>
+              <a:ext uri="{FF2B5EF4-FFF2-40B4-BE49-F238E27FC236}">
+                <a16:creationId xmlns:a16="http://schemas.microsoft.com/office/drawing/2014/main" id="{0E49D336-45B6-44D3-97C4-E28F8DEA2022}"/>
+              </a:ext>
+            </a:extLst>
+          </p:cNvPr>
+          <p:cNvSpPr>
+            <a:spLocks noGrp="1"/>
+          </p:cNvSpPr>
+          <p:nvPr>
+            <p:ph type="body" sz="quarter" idx="10"/>
+          </p:nvPr>
+        </p:nvSpPr>
+        <p:spPr>
+          <a:xfrm>
+            <a:off x="869725" y="1656226"/>
+            <a:ext cx="7581212" cy="4772369"/>
+          </a:xfrm>
+        </p:spPr>
+        <p:txBody>
+          <a:bodyPr/>
+          <a:lstStyle>
+            <a:lvl1pPr marL="514350" indent="-514350">
+              <a:buFont typeface="Wingdings" panose="05000000000000000000" pitchFamily="2" charset="2"/>
+              <a:buChar char="§"/>
+              <a:defRPr>
+                <a:solidFill>
+                  <a:schemeClr val="bg2"/>
+                </a:solidFill>
+              </a:defRPr>
+            </a:lvl1pPr>
+            <a:lvl2pPr marL="1123935" indent="-514350">
+              <a:buFont typeface="Wingdings" panose="05000000000000000000" pitchFamily="2" charset="2"/>
+              <a:buChar char="§"/>
+              <a:defRPr>
+                <a:solidFill>
+                  <a:schemeClr val="tx1"/>
+                </a:solidFill>
+              </a:defRPr>
+            </a:lvl2pPr>
+            <a:lvl3pPr marL="1733520" indent="-514350">
+              <a:buFont typeface="Wingdings" panose="05000000000000000000" pitchFamily="2" charset="2"/>
+              <a:buChar char="§"/>
+              <a:defRPr>
+                <a:solidFill>
+                  <a:schemeClr val="tx1"/>
+                </a:solidFill>
+              </a:defRPr>
+            </a:lvl3pPr>
+            <a:lvl4pPr marL="2343105" indent="-514350">
+              <a:buFont typeface="Wingdings" panose="05000000000000000000" pitchFamily="2" charset="2"/>
+              <a:buChar char="§"/>
+              <a:defRPr>
+                <a:solidFill>
+                  <a:schemeClr val="tx1"/>
+                </a:solidFill>
+              </a:defRPr>
+            </a:lvl4pPr>
+            <a:lvl5pPr marL="2952689" indent="-514350">
+              <a:buFont typeface="Wingdings" panose="05000000000000000000" pitchFamily="2" charset="2"/>
+              <a:buChar char="§"/>
+              <a:defRPr>
+                <a:solidFill>
+                  <a:schemeClr val="tx1"/>
+                </a:solidFill>
+              </a:defRPr>
+            </a:lvl5pPr>
+          </a:lstStyle>
+          <a:p>
+            <a:pPr lvl="0"/>
+            <a:r>
+              <a:rPr lang="en-US" dirty="0"/>
+              <a:t>…</a:t>
+            </a:r>
+          </a:p>
+          <a:p>
+            <a:pPr lvl="0"/>
+            <a:r>
+              <a:rPr lang="en-GB" dirty="0"/>
+              <a:t>…</a:t>
+            </a:r>
+            <a:endParaRPr lang="en-US" dirty="0"/>
+          </a:p>
+          <a:p>
+            <a:pPr lvl="0"/>
+            <a:r>
+              <a:rPr lang="en-GB" dirty="0"/>
+              <a:t>…</a:t>
+            </a:r>
+            <a:endParaRPr lang="en-US" dirty="0"/>
+          </a:p>
+          <a:p>
+            <a:pPr lvl="0"/>
+            <a:endParaRPr lang="en-US" dirty="0"/>
+          </a:p>
+        </p:txBody>
+      </p:sp>
+      <p:sp>
+        <p:nvSpPr>
+          <p:cNvPr id="4" name="Title 3"/>
+          <p:cNvSpPr>
+            <a:spLocks noGrp="1"/>
+          </p:cNvSpPr>
+          <p:nvPr>
+            <p:ph type="title"/>
+          </p:nvPr>
+        </p:nvSpPr>
+        <p:spPr/>
+        <p:txBody>
+          <a:bodyPr>
+            <a:normAutofit/>
+          </a:bodyPr>
+          <a:lstStyle/>
+          <a:p>
+            <a:r>
+              <a:rPr lang="bg-BG" dirty="0"/>
+              <a:t>Обобщение</a:t>
+            </a:r>
+            <a:endParaRPr lang="en-US" dirty="0"/>
+          </a:p>
+        </p:txBody>
+      </p:sp>
+      <p:grpSp>
+        <p:nvGrpSpPr>
+          <p:cNvPr id="9" name="Group 8">
+            <a:extLst>
+              <a:ext uri="{FF2B5EF4-FFF2-40B4-BE49-F238E27FC236}">
+                <a16:creationId xmlns:a16="http://schemas.microsoft.com/office/drawing/2014/main" id="{EBAFE522-EB7D-4931-A015-9A7E8A98517D}"/>
+              </a:ext>
+            </a:extLst>
+          </p:cNvPr>
+          <p:cNvGrpSpPr/>
+          <p:nvPr/>
+        </p:nvGrpSpPr>
+        <p:grpSpPr>
+          <a:xfrm>
+            <a:off x="191942" y="1419750"/>
+            <a:ext cx="9302704" cy="5300339"/>
+            <a:chOff x="472011" y="1508786"/>
+            <a:chExt cx="3799787" cy="4865561"/>
+          </a:xfrm>
+        </p:grpSpPr>
+        <p:sp>
+          <p:nvSpPr>
+            <p:cNvPr id="10" name="Rounded Rectangle 10">
+              <a:extLst>
+                <a:ext uri="{FF2B5EF4-FFF2-40B4-BE49-F238E27FC236}">
+                  <a16:creationId xmlns:a16="http://schemas.microsoft.com/office/drawing/2014/main" id="{18F78F23-3D09-4B63-8DF9-D49CFBB145EE}"/>
+                </a:ext>
+              </a:extLst>
+            </p:cNvPr>
+            <p:cNvSpPr/>
+            <p:nvPr/>
+          </p:nvSpPr>
+          <p:spPr>
+            <a:xfrm>
+              <a:off x="472011" y="1508786"/>
+              <a:ext cx="3799787" cy="4865561"/>
+            </a:xfrm>
+            <a:prstGeom prst="roundRect">
+              <a:avLst>
+                <a:gd name="adj" fmla="val 3968"/>
+              </a:avLst>
+            </a:prstGeom>
+            <a:solidFill>
+              <a:schemeClr val="tx2"/>
+            </a:solidFill>
+            <a:ln>
+              <a:noFill/>
+            </a:ln>
+          </p:spPr>
+          <p:style>
+            <a:lnRef idx="2">
+              <a:schemeClr val="accent1">
+                <a:shade val="50000"/>
+              </a:schemeClr>
+            </a:lnRef>
+            <a:fillRef idx="1">
+              <a:schemeClr val="accent1"/>
+            </a:fillRef>
+            <a:effectRef idx="0">
+              <a:schemeClr val="accent1"/>
+            </a:effectRef>
+            <a:fontRef idx="minor">
+              <a:schemeClr val="lt1"/>
+            </a:fontRef>
+          </p:style>
+          <p:txBody>
+            <a:bodyPr rtlCol="0" anchor="ctr"/>
+            <a:lstStyle/>
+            <a:p>
+              <a:pPr marL="0" marR="0" lvl="0" indent="0" algn="ctr" defTabSz="914400" rtl="0" eaLnBrk="1" fontAlgn="auto" latinLnBrk="0" hangingPunct="1">
+                <a:lnSpc>
+                  <a:spcPct val="100000"/>
+                </a:lnSpc>
+                <a:spcBef>
+                  <a:spcPts val="0"/>
+                </a:spcBef>
+                <a:spcAft>
+                  <a:spcPts val="0"/>
+                </a:spcAft>
+                <a:buClrTx/>
+                <a:buSzTx/>
+                <a:buFontTx/>
+                <a:buNone/>
+                <a:tabLst/>
+                <a:defRPr/>
+              </a:pPr>
+              <a:endParaRPr kumimoji="0" lang="ko-KR" altLang="en-US" sz="2399" b="0" i="0" u="none" strike="noStrike" kern="1200" cap="none" spc="0" normalizeH="0" baseline="0" noProof="0" dirty="0">
+                <a:ln>
+                  <a:noFill/>
+                </a:ln>
+                <a:solidFill>
+                  <a:srgbClr val="FFA000"/>
+                </a:solidFill>
+                <a:effectLst/>
+                <a:uLnTx/>
+                <a:uFillTx/>
+                <a:latin typeface="Calibri" panose="020F0502020204030204"/>
+                <a:ea typeface="맑은 고딕" panose="020B0503020000020004" pitchFamily="34" charset="-127"/>
+                <a:cs typeface="+mn-cs"/>
+              </a:endParaRPr>
+            </a:p>
+          </p:txBody>
+        </p:sp>
+        <p:sp>
+          <p:nvSpPr>
+            <p:cNvPr id="11" name="Rounded Rectangle 16">
+              <a:extLst>
+                <a:ext uri="{FF2B5EF4-FFF2-40B4-BE49-F238E27FC236}">
+                  <a16:creationId xmlns:a16="http://schemas.microsoft.com/office/drawing/2014/main" id="{F12C06CE-2BBE-46C2-B718-813794C58DF9}"/>
+                </a:ext>
+              </a:extLst>
+            </p:cNvPr>
+            <p:cNvSpPr/>
+            <p:nvPr/>
+          </p:nvSpPr>
+          <p:spPr>
+            <a:xfrm>
+              <a:off x="540767" y="1781251"/>
+              <a:ext cx="85794" cy="4320631"/>
+            </a:xfrm>
+            <a:prstGeom prst="roundRect">
+              <a:avLst>
+                <a:gd name="adj" fmla="val 50000"/>
+              </a:avLst>
+            </a:prstGeom>
+            <a:solidFill>
+              <a:schemeClr val="bg2">
+                <a:alpha val="41000"/>
+              </a:schemeClr>
+            </a:solidFill>
+            <a:ln>
+              <a:noFill/>
+            </a:ln>
+          </p:spPr>
+          <p:style>
+            <a:lnRef idx="2">
+              <a:schemeClr val="accent1">
+                <a:shade val="50000"/>
+              </a:schemeClr>
+            </a:lnRef>
+            <a:fillRef idx="1">
+              <a:schemeClr val="accent1"/>
+            </a:fillRef>
+            <a:effectRef idx="0">
+              <a:schemeClr val="accent1"/>
+            </a:effectRef>
+            <a:fontRef idx="minor">
+              <a:schemeClr val="lt1"/>
+            </a:fontRef>
+          </p:style>
+          <p:txBody>
+            <a:bodyPr rtlCol="0" anchor="ctr"/>
+            <a:lstStyle/>
+            <a:p>
+              <a:pPr marL="0" marR="0" lvl="0" indent="0" algn="ctr" defTabSz="914400" rtl="0" eaLnBrk="1" fontAlgn="auto" latinLnBrk="0" hangingPunct="1">
+                <a:lnSpc>
+                  <a:spcPct val="100000"/>
+                </a:lnSpc>
+                <a:spcBef>
+                  <a:spcPts val="0"/>
+                </a:spcBef>
+                <a:spcAft>
+                  <a:spcPts val="0"/>
+                </a:spcAft>
+                <a:buClrTx/>
+                <a:buSzTx/>
+                <a:buFontTx/>
+                <a:buNone/>
+                <a:tabLst/>
+                <a:defRPr/>
+              </a:pPr>
+              <a:endParaRPr kumimoji="0" lang="ko-KR" altLang="en-US" sz="2399" b="0" i="0" u="none" strike="noStrike" kern="1200" cap="none" spc="0" normalizeH="0" baseline="0" noProof="0">
+                <a:ln>
+                  <a:noFill/>
+                </a:ln>
+                <a:solidFill>
+                  <a:srgbClr val="FFA000"/>
+                </a:solidFill>
+                <a:effectLst/>
+                <a:uLnTx/>
+                <a:uFillTx/>
+                <a:latin typeface="Calibri" panose="020F0502020204030204"/>
+                <a:ea typeface="맑은 고딕" panose="020B0503020000020004" pitchFamily="34" charset="-127"/>
+                <a:cs typeface="+mn-cs"/>
+              </a:endParaRPr>
+            </a:p>
+          </p:txBody>
+        </p:sp>
+        <p:sp>
+          <p:nvSpPr>
+            <p:cNvPr id="12" name="Half Frame 11">
+              <a:extLst>
+                <a:ext uri="{FF2B5EF4-FFF2-40B4-BE49-F238E27FC236}">
+                  <a16:creationId xmlns:a16="http://schemas.microsoft.com/office/drawing/2014/main" id="{66CDBB1E-AF3C-43FC-9F34-2DD691F81726}"/>
+                </a:ext>
+              </a:extLst>
+            </p:cNvPr>
+            <p:cNvSpPr/>
+            <p:nvPr/>
+          </p:nvSpPr>
+          <p:spPr>
+            <a:xfrm rot="5400000">
+              <a:off x="3762569" y="1912372"/>
+              <a:ext cx="669775" cy="238503"/>
+            </a:xfrm>
+            <a:prstGeom prst="halfFrame">
+              <a:avLst>
+                <a:gd name="adj1" fmla="val 23728"/>
+                <a:gd name="adj2" fmla="val 24642"/>
+              </a:avLst>
+            </a:prstGeom>
+            <a:solidFill>
+              <a:schemeClr val="bg2">
+                <a:alpha val="23000"/>
+              </a:schemeClr>
+            </a:solidFill>
+            <a:ln>
+              <a:noFill/>
+            </a:ln>
+          </p:spPr>
+          <p:style>
+            <a:lnRef idx="2">
+              <a:schemeClr val="accent1">
+                <a:shade val="50000"/>
+              </a:schemeClr>
+            </a:lnRef>
+            <a:fillRef idx="1">
+              <a:schemeClr val="accent1"/>
+            </a:fillRef>
+            <a:effectRef idx="0">
+              <a:schemeClr val="accent1"/>
+            </a:effectRef>
+            <a:fontRef idx="minor">
+              <a:schemeClr val="lt1"/>
+            </a:fontRef>
+          </p:style>
+          <p:txBody>
+            <a:bodyPr rtlCol="0" anchor="ctr"/>
+            <a:lstStyle/>
+            <a:p>
+              <a:pPr marL="0" marR="0" lvl="0" indent="0" algn="ctr" defTabSz="914400" rtl="0" eaLnBrk="1" fontAlgn="auto" latinLnBrk="0" hangingPunct="1">
+                <a:lnSpc>
+                  <a:spcPct val="100000"/>
+                </a:lnSpc>
+                <a:spcBef>
+                  <a:spcPts val="0"/>
+                </a:spcBef>
+                <a:spcAft>
+                  <a:spcPts val="0"/>
+                </a:spcAft>
+                <a:buClrTx/>
+                <a:buSzTx/>
+                <a:buFontTx/>
+                <a:buNone/>
+                <a:tabLst/>
+                <a:defRPr/>
+              </a:pPr>
+              <a:endParaRPr kumimoji="0" lang="ko-KR" altLang="en-US" sz="2399" b="0" i="0" u="none" strike="noStrike" kern="1200" cap="none" spc="0" normalizeH="0" baseline="0" noProof="0">
+                <a:ln>
+                  <a:noFill/>
+                </a:ln>
+                <a:solidFill>
+                  <a:srgbClr val="234465"/>
+                </a:solidFill>
+                <a:effectLst/>
+                <a:uLnTx/>
+                <a:uFillTx/>
+                <a:latin typeface="Calibri" panose="020F0502020204030204"/>
+                <a:ea typeface="맑은 고딕" panose="020B0503020000020004" pitchFamily="34" charset="-127"/>
+                <a:cs typeface="+mn-cs"/>
+              </a:endParaRPr>
+            </a:p>
+          </p:txBody>
+        </p:sp>
+      </p:grpSp>
+      <p:pic>
+        <p:nvPicPr>
+          <p:cNvPr id="13" name="Picture 12">
+            <a:extLst>
+              <a:ext uri="{FF2B5EF4-FFF2-40B4-BE49-F238E27FC236}">
+                <a16:creationId xmlns:a16="http://schemas.microsoft.com/office/drawing/2014/main" id="{CCC3A316-993C-4741-8826-E104F27650A3}"/>
+              </a:ext>
+            </a:extLst>
+          </p:cNvPr>
+          <p:cNvPicPr>
+            <a:picLocks noChangeAspect="1"/>
+          </p:cNvPicPr>
+          <p:nvPr/>
+        </p:nvPicPr>
+        <p:blipFill rotWithShape="1">
+          <a:blip r:embed="rId3" cstate="print">
+            <a:extLst>
+              <a:ext uri="{28A0092B-C50C-407E-A947-70E740481C1C}">
+                <a14:useLocalDpi xmlns:a14="http://schemas.microsoft.com/office/drawing/2010/main" val="0"/>
+              </a:ext>
+            </a:extLst>
+          </a:blip>
+          <a:srcRect/>
+          <a:stretch/>
+        </p:blipFill>
+        <p:spPr>
+          <a:xfrm flipH="1">
+            <a:off x="9634833" y="4105075"/>
+            <a:ext cx="2118197" cy="2292422"/>
+          </a:xfrm>
+          <a:prstGeom prst="rect">
+            <a:avLst/>
+          </a:prstGeom>
+        </p:spPr>
+      </p:pic>
+      <p:sp>
+        <p:nvSpPr>
+          <p:cNvPr id="15" name="Content Placeholder 4">
+            <a:extLst>
+              <a:ext uri="{FF2B5EF4-FFF2-40B4-BE49-F238E27FC236}">
+                <a16:creationId xmlns:a16="http://schemas.microsoft.com/office/drawing/2014/main" id="{B96A0DF8-27E7-4DC8-BBE3-7238AAAEB845}"/>
+              </a:ext>
+            </a:extLst>
+          </p:cNvPr>
+          <p:cNvSpPr txBox="1">
+            <a:spLocks/>
+          </p:cNvSpPr>
+          <p:nvPr/>
+        </p:nvSpPr>
+        <p:spPr>
+          <a:xfrm>
+            <a:off x="445613" y="1606714"/>
+            <a:ext cx="11815018" cy="5201066"/>
+          </a:xfrm>
+          <a:prstGeom prst="rect">
+            <a:avLst/>
+          </a:prstGeom>
+        </p:spPr>
+        <p:txBody>
+          <a:bodyPr vert="horz" lIns="108000" tIns="36000" rIns="108000" bIns="36000" rtlCol="0">
+            <a:normAutofit/>
+          </a:bodyPr>
+          <a:lstStyle>
+            <a:lvl1pPr marL="456915" indent="-456915" algn="l" defTabSz="1218438" rtl="0" eaLnBrk="1" latinLnBrk="1" hangingPunct="1">
+              <a:lnSpc>
+                <a:spcPct val="105000"/>
+              </a:lnSpc>
+              <a:spcBef>
+                <a:spcPts val="600"/>
+              </a:spcBef>
+              <a:spcAft>
+                <a:spcPts val="600"/>
+              </a:spcAft>
+              <a:buFont typeface="Wingdings" panose="05000000000000000000" pitchFamily="2" charset="2"/>
+              <a:buChar char="§"/>
+              <a:defRPr sz="3398" kern="1200">
+                <a:solidFill>
+                  <a:schemeClr val="tx1"/>
+                </a:solidFill>
+                <a:latin typeface="+mn-lt"/>
+                <a:ea typeface="+mn-ea"/>
+                <a:cs typeface="+mn-cs"/>
+              </a:defRPr>
+            </a:lvl1pPr>
+            <a:lvl2pPr marL="989981" indent="-380762" algn="l" defTabSz="1218438" rtl="0" eaLnBrk="1" latinLnBrk="1" hangingPunct="1">
+              <a:lnSpc>
+                <a:spcPct val="105000"/>
+              </a:lnSpc>
+              <a:spcBef>
+                <a:spcPts val="600"/>
+              </a:spcBef>
+              <a:spcAft>
+                <a:spcPts val="600"/>
+              </a:spcAft>
+              <a:buFont typeface="Wingdings" panose="05000000000000000000" pitchFamily="2" charset="2"/>
+              <a:buChar char="§"/>
+              <a:defRPr sz="3198" kern="1200">
+                <a:solidFill>
+                  <a:schemeClr val="tx1"/>
+                </a:solidFill>
+                <a:latin typeface="+mn-lt"/>
+                <a:ea typeface="+mn-ea"/>
+                <a:cs typeface="+mn-cs"/>
+              </a:defRPr>
+            </a:lvl2pPr>
+            <a:lvl3pPr marL="1523048" indent="-304610" algn="l" defTabSz="1218438" rtl="0" eaLnBrk="1" latinLnBrk="1" hangingPunct="1">
+              <a:lnSpc>
+                <a:spcPct val="105000"/>
+              </a:lnSpc>
+              <a:spcBef>
+                <a:spcPts val="600"/>
+              </a:spcBef>
+              <a:spcAft>
+                <a:spcPts val="600"/>
+              </a:spcAft>
+              <a:buFont typeface="Wingdings" panose="05000000000000000000" pitchFamily="2" charset="2"/>
+              <a:buChar char="§"/>
+              <a:defRPr sz="2998" kern="1200">
+                <a:solidFill>
+                  <a:schemeClr val="tx1"/>
+                </a:solidFill>
+                <a:latin typeface="+mn-lt"/>
+                <a:ea typeface="+mn-ea"/>
+                <a:cs typeface="+mn-cs"/>
+              </a:defRPr>
+            </a:lvl3pPr>
+            <a:lvl4pPr marL="2132267" indent="-304610" algn="l" defTabSz="1218438" rtl="0" eaLnBrk="1" latinLnBrk="1" hangingPunct="1">
+              <a:lnSpc>
+                <a:spcPct val="105000"/>
+              </a:lnSpc>
+              <a:spcBef>
+                <a:spcPts val="600"/>
+              </a:spcBef>
+              <a:spcAft>
+                <a:spcPts val="600"/>
+              </a:spcAft>
+              <a:buFont typeface="Wingdings" panose="05000000000000000000" pitchFamily="2" charset="2"/>
+              <a:buChar char="§"/>
+              <a:defRPr sz="2798" kern="1200">
+                <a:solidFill>
+                  <a:schemeClr val="tx1"/>
+                </a:solidFill>
+                <a:latin typeface="+mn-lt"/>
+                <a:ea typeface="+mn-ea"/>
+                <a:cs typeface="+mn-cs"/>
+              </a:defRPr>
+            </a:lvl4pPr>
+            <a:lvl5pPr marL="2741485" indent="-304610" algn="l" defTabSz="1218438" rtl="0" eaLnBrk="1" latinLnBrk="1" hangingPunct="1">
+              <a:lnSpc>
+                <a:spcPct val="105000"/>
+              </a:lnSpc>
+              <a:spcBef>
+                <a:spcPts val="600"/>
+              </a:spcBef>
+              <a:spcAft>
+                <a:spcPts val="600"/>
+              </a:spcAft>
+              <a:buFont typeface="Wingdings" panose="05000000000000000000" pitchFamily="2" charset="2"/>
+              <a:buChar char="§"/>
+              <a:defRPr sz="2598" kern="1200">
+                <a:solidFill>
+                  <a:schemeClr val="tx1"/>
+                </a:solidFill>
+                <a:latin typeface="+mn-lt"/>
+                <a:ea typeface="+mn-ea"/>
+                <a:cs typeface="+mn-cs"/>
+              </a:defRPr>
+            </a:lvl5pPr>
+            <a:lvl6pPr marL="3350704" indent="-304610" algn="l" defTabSz="1218438" rtl="0" eaLnBrk="1" latinLnBrk="1" hangingPunct="1">
+              <a:spcBef>
+                <a:spcPct val="20000"/>
+              </a:spcBef>
+              <a:buFont typeface="Arial" pitchFamily="34" charset="0"/>
+              <a:buChar char="•"/>
+              <a:defRPr sz="2665" kern="1200">
+                <a:solidFill>
+                  <a:schemeClr val="tx1"/>
+                </a:solidFill>
+                <a:latin typeface="+mn-lt"/>
+                <a:ea typeface="+mn-ea"/>
+                <a:cs typeface="+mn-cs"/>
+              </a:defRPr>
+            </a:lvl6pPr>
+            <a:lvl7pPr marL="3959924" indent="-304610" algn="l" defTabSz="1218438" rtl="0" eaLnBrk="1" latinLnBrk="1" hangingPunct="1">
+              <a:spcBef>
+                <a:spcPct val="20000"/>
+              </a:spcBef>
+              <a:buFont typeface="Arial" pitchFamily="34" charset="0"/>
+              <a:buChar char="•"/>
+              <a:defRPr sz="2665" kern="1200">
+                <a:solidFill>
+                  <a:schemeClr val="tx1"/>
+                </a:solidFill>
+                <a:latin typeface="+mn-lt"/>
+                <a:ea typeface="+mn-ea"/>
+                <a:cs typeface="+mn-cs"/>
+              </a:defRPr>
+            </a:lvl7pPr>
+            <a:lvl8pPr marL="4569143" indent="-304610" algn="l" defTabSz="1218438" rtl="0" eaLnBrk="1" latinLnBrk="1" hangingPunct="1">
+              <a:spcBef>
+                <a:spcPct val="20000"/>
+              </a:spcBef>
+              <a:buFont typeface="Arial" pitchFamily="34" charset="0"/>
+              <a:buChar char="•"/>
+              <a:defRPr sz="2665" kern="1200">
+                <a:solidFill>
+                  <a:schemeClr val="tx1"/>
+                </a:solidFill>
+                <a:latin typeface="+mn-lt"/>
+                <a:ea typeface="+mn-ea"/>
+                <a:cs typeface="+mn-cs"/>
+              </a:defRPr>
+            </a:lvl8pPr>
+            <a:lvl9pPr marL="5178362" indent="-304610" algn="l" defTabSz="1218438" rtl="0" eaLnBrk="1" latinLnBrk="1" hangingPunct="1">
+              <a:spcBef>
+                <a:spcPct val="20000"/>
+              </a:spcBef>
+              <a:buFont typeface="Arial" pitchFamily="34" charset="0"/>
+              <a:buChar char="•"/>
+              <a:defRPr sz="2665" kern="1200">
+                <a:solidFill>
+                  <a:schemeClr val="tx1"/>
+                </a:solidFill>
+                <a:latin typeface="+mn-lt"/>
+                <a:ea typeface="+mn-ea"/>
+                <a:cs typeface="+mn-cs"/>
+              </a:defRPr>
+            </a:lvl9pPr>
+          </a:lstStyle>
+          <a:p>
+            <a:pPr marL="456915" marR="0" lvl="0" indent="-456915" algn="l" defTabSz="1218438" rtl="0" eaLnBrk="1" fontAlgn="auto" latinLnBrk="1" hangingPunct="1">
+              <a:lnSpc>
+                <a:spcPct val="100000"/>
+              </a:lnSpc>
+              <a:spcBef>
+                <a:spcPts val="600"/>
+              </a:spcBef>
+              <a:spcAft>
+                <a:spcPts val="600"/>
+              </a:spcAft>
+              <a:buClr>
+                <a:srgbClr val="FFFFFF"/>
+              </a:buClr>
+              <a:buSzTx/>
+              <a:buFont typeface="Wingdings" panose="05000000000000000000" pitchFamily="2" charset="2"/>
+              <a:buChar char="§"/>
+              <a:tabLst/>
+              <a:defRPr/>
+            </a:pPr>
+            <a:endParaRPr kumimoji="0" lang="en-US" sz="2800" b="0" i="0" u="none" strike="noStrike" kern="1200" cap="none" spc="0" normalizeH="0" baseline="0" noProof="0" dirty="0">
+              <a:ln>
+                <a:noFill/>
+              </a:ln>
+              <a:solidFill>
+                <a:schemeClr val="bg2"/>
+              </a:solidFill>
+              <a:effectLst/>
+              <a:uLnTx/>
+              <a:uFillTx/>
+              <a:latin typeface="Calibri" panose="020F0502020204030204"/>
+              <a:ea typeface="+mn-ea"/>
+              <a:cs typeface="+mn-cs"/>
+            </a:endParaRPr>
+          </a:p>
+        </p:txBody>
+      </p:sp>
+      <p:sp>
+        <p:nvSpPr>
+          <p:cNvPr id="2" name="Rectangle 1"/>
+          <p:cNvSpPr/>
+          <p:nvPr/>
+        </p:nvSpPr>
+        <p:spPr>
+          <a:xfrm>
+            <a:off x="561000" y="1719000"/>
+            <a:ext cx="8795363" cy="4689425"/>
+          </a:xfrm>
+          <a:prstGeom prst="rect">
+            <a:avLst/>
+          </a:prstGeom>
+        </p:spPr>
+        <p:txBody>
+          <a:bodyPr wrap="square">
+            <a:spAutoFit/>
+          </a:bodyPr>
+          <a:lstStyle/>
+          <a:p>
+            <a:pPr marL="457200" indent="-457200">
+              <a:spcAft>
+                <a:spcPts val="600"/>
+              </a:spcAft>
+              <a:buClr>
+                <a:schemeClr val="bg2"/>
+              </a:buClr>
+              <a:buFont typeface="Wingdings" panose="05000000000000000000" pitchFamily="2" charset="2"/>
+              <a:buChar char="§"/>
+            </a:pPr>
+            <a:r>
+              <a:rPr lang="bg-BG" sz="3400" b="1" dirty="0">
+                <a:solidFill>
+                  <a:schemeClr val="bg1">
+                    <a:lumMod val="40000"/>
+                    <a:lumOff val="60000"/>
+                  </a:schemeClr>
+                </a:solidFill>
+              </a:rPr>
+              <a:t>M</a:t>
+            </a:r>
+            <a:r>
+              <a:rPr lang="en-US" sz="3400" b="1" dirty="0">
+                <a:solidFill>
+                  <a:schemeClr val="bg1">
+                    <a:lumMod val="40000"/>
+                    <a:lumOff val="60000"/>
+                  </a:schemeClr>
+                </a:solidFill>
+              </a:rPr>
+              <a:t>S SQL Server</a:t>
+            </a:r>
+            <a:r>
+              <a:rPr lang="en-US" sz="3400" dirty="0">
+                <a:solidFill>
+                  <a:schemeClr val="bg1">
+                    <a:lumMod val="40000"/>
+                    <a:lumOff val="60000"/>
+                  </a:schemeClr>
+                </a:solidFill>
+              </a:rPr>
+              <a:t> == </a:t>
+            </a:r>
+            <a:r>
+              <a:rPr lang="bg-BG" sz="3400" dirty="0">
+                <a:solidFill>
+                  <a:schemeClr val="bg2"/>
+                </a:solidFill>
+              </a:rPr>
+              <a:t>система за управление на големи обеми от данни</a:t>
+            </a:r>
+          </a:p>
+          <a:p>
+            <a:pPr marL="457200" indent="-457200">
+              <a:spcAft>
+                <a:spcPts val="600"/>
+              </a:spcAft>
+              <a:buClr>
+                <a:schemeClr val="bg2"/>
+              </a:buClr>
+              <a:buFont typeface="Wingdings" panose="05000000000000000000" pitchFamily="2" charset="2"/>
+              <a:buChar char="§"/>
+            </a:pPr>
+            <a:r>
+              <a:rPr lang="en-US" sz="3400" b="1" dirty="0">
+                <a:solidFill>
+                  <a:schemeClr val="bg1">
+                    <a:lumMod val="40000"/>
+                    <a:lumOff val="60000"/>
+                  </a:schemeClr>
+                </a:solidFill>
+              </a:rPr>
+              <a:t>SQL Server Express LocalDB</a:t>
+            </a:r>
+            <a:r>
+              <a:rPr lang="bg-BG" sz="3400" b="1" dirty="0">
+                <a:solidFill>
+                  <a:schemeClr val="bg1">
+                    <a:lumMod val="40000"/>
+                    <a:lumOff val="60000"/>
+                  </a:schemeClr>
+                </a:solidFill>
+              </a:rPr>
+              <a:t> == </a:t>
+            </a:r>
+            <a:r>
+              <a:rPr lang="bg-BG" sz="3400" dirty="0">
+                <a:solidFill>
+                  <a:schemeClr val="bg2"/>
+                </a:solidFill>
+              </a:rPr>
+              <a:t>опростена версия на Microsoft SQL Server</a:t>
+            </a:r>
+          </a:p>
+          <a:p>
+            <a:pPr marL="457200" indent="-457200">
+              <a:lnSpc>
+                <a:spcPct val="100000"/>
+              </a:lnSpc>
+              <a:spcAft>
+                <a:spcPts val="600"/>
+              </a:spcAft>
+              <a:buFont typeface="Wingdings" panose="05000000000000000000" pitchFamily="2" charset="2"/>
+              <a:buChar char="§"/>
+            </a:pPr>
+            <a:r>
+              <a:rPr lang="bg-BG" sz="3400" dirty="0">
+                <a:solidFill>
+                  <a:schemeClr val="bg2"/>
+                </a:solidFill>
+              </a:rPr>
+              <a:t>Чрез </a:t>
+            </a:r>
+            <a:r>
+              <a:rPr lang="en-US" sz="3400" dirty="0">
+                <a:solidFill>
+                  <a:schemeClr val="bg2"/>
+                </a:solidFill>
+              </a:rPr>
+              <a:t>SQL </a:t>
+            </a:r>
+            <a:r>
+              <a:rPr lang="bg-BG" sz="3400" dirty="0">
+                <a:solidFill>
+                  <a:schemeClr val="bg2"/>
+                </a:solidFill>
+              </a:rPr>
+              <a:t>можем да </a:t>
+            </a:r>
+            <a:r>
+              <a:rPr lang="bg-BG" sz="3400" b="1" dirty="0">
+                <a:solidFill>
+                  <a:schemeClr val="bg1">
+                    <a:lumMod val="40000"/>
+                    <a:lumOff val="60000"/>
+                  </a:schemeClr>
+                </a:solidFill>
+              </a:rPr>
+              <a:t>създаваме таблици</a:t>
+            </a:r>
+            <a:r>
+              <a:rPr lang="bg-BG" sz="3400" dirty="0">
+                <a:solidFill>
+                  <a:schemeClr val="bg2"/>
+                </a:solidFill>
+              </a:rPr>
+              <a:t>, да </a:t>
+            </a:r>
+            <a:r>
+              <a:rPr lang="bg-BG" sz="3400" b="1" dirty="0">
+                <a:solidFill>
+                  <a:schemeClr val="bg1">
+                    <a:lumMod val="40000"/>
+                    <a:lumOff val="60000"/>
+                  </a:schemeClr>
+                </a:solidFill>
+              </a:rPr>
+              <a:t>вмъкваме</a:t>
+            </a:r>
+            <a:r>
+              <a:rPr lang="bg-BG" sz="3400" dirty="0">
+                <a:solidFill>
+                  <a:schemeClr val="bg2"/>
+                </a:solidFill>
+              </a:rPr>
+              <a:t> и </a:t>
+            </a:r>
+            <a:r>
+              <a:rPr lang="bg-BG" sz="3400" b="1" dirty="0">
+                <a:solidFill>
+                  <a:schemeClr val="bg1">
+                    <a:lumMod val="40000"/>
+                    <a:lumOff val="60000"/>
+                  </a:schemeClr>
+                </a:solidFill>
+              </a:rPr>
+              <a:t>редактираме</a:t>
+            </a:r>
+            <a:r>
+              <a:rPr lang="bg-BG" sz="3400" dirty="0">
+                <a:solidFill>
+                  <a:schemeClr val="bg2"/>
+                </a:solidFill>
+              </a:rPr>
+              <a:t> данни</a:t>
+            </a:r>
+            <a:endParaRPr lang="en-US" sz="3400" dirty="0">
+              <a:solidFill>
+                <a:schemeClr val="bg2"/>
+              </a:solidFill>
+            </a:endParaRPr>
+          </a:p>
+          <a:p>
+            <a:pPr marL="457200" indent="-457200">
+              <a:lnSpc>
+                <a:spcPct val="100000"/>
+              </a:lnSpc>
+              <a:buFont typeface="Wingdings" panose="05000000000000000000" pitchFamily="2" charset="2"/>
+              <a:buChar char="§"/>
+            </a:pPr>
+            <a:endParaRPr lang="en-US" sz="3400" dirty="0">
+              <a:solidFill>
+                <a:schemeClr val="bg2"/>
+              </a:solidFill>
+            </a:endParaRPr>
+          </a:p>
+          <a:p>
+            <a:pPr marL="457200" indent="-457200">
+              <a:lnSpc>
+                <a:spcPct val="150000"/>
+              </a:lnSpc>
+              <a:buFont typeface="Wingdings" panose="05000000000000000000" pitchFamily="2" charset="2"/>
+              <a:buChar char="§"/>
+            </a:pPr>
+            <a:endParaRPr lang="en-US" sz="3400" b="1" dirty="0">
+              <a:solidFill>
+                <a:schemeClr val="bg2"/>
+              </a:solidFill>
+            </a:endParaRPr>
+          </a:p>
+        </p:txBody>
+      </p:sp>
+      <p:sp>
+        <p:nvSpPr>
+          <p:cNvPr id="3" name="Slide Number">
+            <a:extLst>
+              <a:ext uri="{FF2B5EF4-FFF2-40B4-BE49-F238E27FC236}">
+                <a16:creationId xmlns:a16="http://schemas.microsoft.com/office/drawing/2014/main" id="{D56998D3-96AE-97F0-0C9A-4B9BC889D15C}"/>
+              </a:ext>
+            </a:extLst>
+          </p:cNvPr>
+          <p:cNvSpPr>
+            <a:spLocks noGrp="1"/>
+          </p:cNvSpPr>
+          <p:nvPr>
+            <p:ph type="sldNum" sz="quarter" idx="5"/>
+          </p:nvPr>
+        </p:nvSpPr>
+        <p:spPr>
+          <a:xfrm>
+            <a:off x="11753030" y="6507000"/>
+            <a:ext cx="367414" cy="297000"/>
+          </a:xfrm>
+          <a:prstGeom prst="rect">
+            <a:avLst/>
+          </a:prstGeom>
+        </p:spPr>
+        <p:txBody>
+          <a:bodyPr vert="horz" lIns="91440" tIns="45720" rIns="91440" bIns="45720" rtlCol="0" anchor="b"/>
+          <a:lstStyle>
+            <a:lvl1pPr algn="r">
+              <a:defRPr sz="1000"/>
+            </a:lvl1pPr>
+          </a:lstStyle>
+          <a:p>
+            <a:fld id="{2BF067CD-8E6B-4360-9AA8-C5DF2A48A6D1}" type="slidenum">
+              <a:rPr lang="en-US" noProof="0" smtClean="0"/>
+              <a:pPr/>
+              <a:t>38</a:t>
+            </a:fld>
+            <a:endParaRPr lang="en-US" noProof="0" dirty="0"/>
+          </a:p>
+        </p:txBody>
+      </p:sp>
+    </p:spTree>
+    <p:extLst>
+      <p:ext uri="{BB962C8B-B14F-4D97-AF65-F5344CB8AC3E}">
+        <p14:creationId xmlns:p14="http://schemas.microsoft.com/office/powerpoint/2010/main" val="2357972623"/>
+      </p:ext>
+    </p:extLst>
+  </p:cSld>
+  <p:clrMapOvr>
+    <a:masterClrMapping/>
+  </p:clrMapOvr>
+  <mc:AlternateContent xmlns:mc="http://schemas.openxmlformats.org/markup-compatibility/2006" xmlns:p14="http://schemas.microsoft.com/office/powerpoint/2010/main">
+    <mc:Choice Requires="p14">
+      <p:transition spd="slow" p14:dur="2000" advClick="0" advTm="5000"/>
+    </mc:Choice>
+    <mc:Fallback xmlns="">
+      <p:transition spd="slow" advClick="0" advTm="5000"/>
+    </mc:Fallback>
+  </mc:AlternateContent>
+  <p:timing>
+    <p:tnLst>
+      <p:par>
+        <p:cTn id="1" dur="indefinite" restart="never" nodeType="tmRoot">
+          <p:childTnLst>
+            <p:seq concurrent="1" nextAc="seek">
+              <p:cTn id="2" dur="indefinite" nodeType="mainSeq">
+                <p:childTnLst>
+                  <p:par>
+                    <p:cTn id="3" fill="hold">
+                      <p:stCondLst>
+                        <p:cond delay="indefinite"/>
+                      </p:stCondLst>
+                      <p:childTnLst>
+                        <p:par>
+                          <p:cTn id="4" fill="hold">
+                            <p:stCondLst>
+                              <p:cond delay="0"/>
+                            </p:stCondLst>
+                            <p:childTnLst>
+                              <p:par>
+                                <p:cTn id="5" presetID="1" presetClass="entr" presetSubtype="0" fill="hold" nodeType="clickEffect">
+                                  <p:stCondLst>
+                                    <p:cond delay="0"/>
+                                  </p:stCondLst>
+                                  <p:childTnLst>
+                                    <p:set>
+                                      <p:cBhvr>
+                                        <p:cTn id="6" dur="1" fill="hold">
+                                          <p:stCondLst>
+                                            <p:cond delay="0"/>
+                                          </p:stCondLst>
+                                        </p:cTn>
+                                        <p:tgtEl>
+                                          <p:spTgt spid="2">
+                                            <p:txEl>
+                                              <p:pRg st="1" end="1"/>
+                                            </p:txEl>
+                                          </p:spTgt>
+                                        </p:tgtEl>
+                                        <p:attrNameLst>
+                                          <p:attrName>style.visibility</p:attrName>
+                                        </p:attrNameLst>
+                                      </p:cBhvr>
+                                      <p:to>
+                                        <p:strVal val="visible"/>
+                                      </p:to>
+                                    </p:set>
+                                  </p:childTnLst>
+                                </p:cTn>
+                              </p:par>
+                            </p:childTnLst>
+                          </p:cTn>
+                        </p:par>
+                      </p:childTnLst>
+                    </p:cTn>
+                  </p:par>
+                  <p:par>
+                    <p:cTn id="7" fill="hold">
+                      <p:stCondLst>
+                        <p:cond delay="indefinite"/>
+                      </p:stCondLst>
+                      <p:childTnLst>
+                        <p:par>
+                          <p:cTn id="8" fill="hold">
+                            <p:stCondLst>
+                              <p:cond delay="0"/>
+                            </p:stCondLst>
+                            <p:childTnLst>
+                              <p:par>
+                                <p:cTn id="9" presetID="1" presetClass="entr" presetSubtype="0" fill="hold" nodeType="clickEffect">
+                                  <p:stCondLst>
+                                    <p:cond delay="0"/>
+                                  </p:stCondLst>
+                                  <p:childTnLst>
+                                    <p:set>
+                                      <p:cBhvr>
+                                        <p:cTn id="10" dur="1" fill="hold">
+                                          <p:stCondLst>
+                                            <p:cond delay="0"/>
+                                          </p:stCondLst>
+                                        </p:cTn>
+                                        <p:tgtEl>
+                                          <p:spTgt spid="2">
+                                            <p:txEl>
+                                              <p:pRg st="2" end="2"/>
+                                            </p:txEl>
+                                          </p:spTgt>
+                                        </p:tgtEl>
+                                        <p:attrNameLst>
+                                          <p:attrName>style.visibility</p:attrName>
+                                        </p:attrNameLst>
+                                      </p:cBhvr>
+                                      <p:to>
+                                        <p:strVal val="visible"/>
+                                      </p:to>
+                                    </p:set>
+                                  </p:childTnLst>
+                                </p:cTn>
+                              </p:par>
+                            </p:childTnLst>
+                          </p:cTn>
+                        </p:par>
+                      </p:childTnLst>
+                    </p:cTn>
+                  </p:par>
+                </p:childTnLst>
+              </p:cTn>
+              <p:prevCondLst>
+                <p:cond evt="onPrev" delay="0">
+                  <p:tgtEl>
+                    <p:sldTgt/>
+                  </p:tgtEl>
+                </p:cond>
+              </p:prevCondLst>
+              <p:nextCondLst>
+                <p:cond evt="onNext" delay="0">
+                  <p:tgtEl>
+                    <p:sldTgt/>
+                  </p:tgtEl>
+                </p:cond>
+              </p:nextCondLst>
+            </p:seq>
+          </p:childTnLst>
+        </p:cTn>
+      </p:par>
+    </p:tnLst>
+  </p:timing>
+</p:sld>
+</file>
+
+<file path=ppt/slides/slide39.xml><?xml version="1.0" encoding="utf-8"?>
+<p:sld xmlns:a="http://schemas.openxmlformats.org/drawingml/2006/main" xmlns:r="http://schemas.openxmlformats.org/officeDocument/2006/relationships" xmlns:p="http://schemas.openxmlformats.org/presentationml/2006/main">
+  <p:cSld>
+    <p:spTree>
+      <p:nvGrpSpPr>
+        <p:cNvPr id="1" name=""/>
+        <p:cNvGrpSpPr/>
+        <p:nvPr/>
+      </p:nvGrpSpPr>
+      <p:grpSpPr>
+        <a:xfrm>
+          <a:off x="0" y="0"/>
+          <a:ext cx="0" cy="0"/>
+          <a:chOff x="0" y="0"/>
+          <a:chExt cx="0" cy="0"/>
+        </a:xfrm>
+      </p:grpSpPr>
+      <p:sp>
+        <p:nvSpPr>
+          <p:cNvPr id="5" name="Slide Title">
+            <a:extLst>
+              <a:ext uri="{FF2B5EF4-FFF2-40B4-BE49-F238E27FC236}">
+                <a16:creationId xmlns:a16="http://schemas.microsoft.com/office/drawing/2014/main" id="{FA0703FC-0F8F-4C80-A615-E4B381EC0E0C}"/>
+              </a:ext>
+            </a:extLst>
+          </p:cNvPr>
+          <p:cNvSpPr>
+            <a:spLocks noGrp="1"/>
+          </p:cNvSpPr>
+          <p:nvPr>
+            <p:ph type="title"/>
+          </p:nvPr>
+        </p:nvSpPr>
+        <p:spPr/>
+        <p:txBody>
+          <a:bodyPr/>
+          <a:lstStyle/>
+          <a:p>
+            <a:r>
+              <a:rPr lang="bg-BG" dirty="0"/>
+              <a:t>Въпроси</a:t>
+            </a:r>
+            <a:r>
+              <a:rPr lang="en-US" dirty="0"/>
+              <a:t>?</a:t>
+            </a:r>
+          </a:p>
+        </p:txBody>
+      </p:sp>
+      <p:sp>
+        <p:nvSpPr>
+          <p:cNvPr id="2" name="Rectangle Bottom Copyright">
+            <a:extLst>
+              <a:ext uri="{FF2B5EF4-FFF2-40B4-BE49-F238E27FC236}">
+                <a16:creationId xmlns:a16="http://schemas.microsoft.com/office/drawing/2014/main" id="{664812A4-2991-44D1-BFE9-32E55AADF8A5}"/>
+              </a:ext>
+            </a:extLst>
+          </p:cNvPr>
+          <p:cNvSpPr/>
+          <p:nvPr/>
+        </p:nvSpPr>
+        <p:spPr>
+          <a:xfrm>
+            <a:off x="111000" y="6454758"/>
+            <a:ext cx="11970000" cy="304242"/>
+          </a:xfrm>
+          <a:prstGeom prst="rect">
+            <a:avLst/>
+          </a:prstGeom>
+        </p:spPr>
+        <p:txBody>
+          <a:bodyPr wrap="square">
+            <a:noAutofit/>
+          </a:bodyPr>
+          <a:lstStyle/>
+          <a:p>
+            <a:pPr algn="ctr">
+              <a:lnSpc>
+                <a:spcPct val="100000"/>
+              </a:lnSpc>
+              <a:spcBef>
+                <a:spcPts val="0"/>
+              </a:spcBef>
+              <a:spcAft>
+                <a:spcPts val="0"/>
+              </a:spcAft>
+            </a:pPr>
+            <a:r>
+              <a:rPr lang="bg-BG" sz="1600" dirty="0">
+                <a:solidFill>
+                  <a:schemeClr val="bg2"/>
+                </a:solidFill>
+                <a:effectLst/>
+                <a:latin typeface="Calibri" panose="020F0502020204030204" pitchFamily="34" charset="0"/>
+                <a:ea typeface="Calibri" panose="020F0502020204030204" pitchFamily="34" charset="0"/>
+                <a:cs typeface="Arial" panose="020B0604020202020204" pitchFamily="34" charset="0"/>
+              </a:rPr>
+              <a:t>Проект "</a:t>
+            </a:r>
+            <a:r>
+              <a:rPr lang="bg-BG" sz="1600" dirty="0">
+                <a:solidFill>
+                  <a:schemeClr val="bg1">
+                    <a:lumMod val="20000"/>
+                    <a:lumOff val="80000"/>
+                  </a:schemeClr>
+                </a:solidFill>
+                <a:effectLst/>
+                <a:latin typeface="Calibri" panose="020F0502020204030204" pitchFamily="34" charset="0"/>
+                <a:ea typeface="Calibri" panose="020F0502020204030204" pitchFamily="34" charset="0"/>
+                <a:cs typeface="Arial" panose="020B0604020202020204" pitchFamily="34" charset="0"/>
+                <a:hlinkClick r:id="rId3">
+                  <a:extLst>
+                    <a:ext uri="{A12FA001-AC4F-418D-AE19-62706E023703}">
+                      <ahyp:hlinkClr xmlns:ahyp="http://schemas.microsoft.com/office/drawing/2018/hyperlinkcolor" val="tx"/>
+                    </a:ext>
+                  </a:extLst>
+                </a:hlinkClick>
+              </a:rPr>
+              <a:t>Отворено учебно съдържание по програмиране и ИТ</a:t>
+            </a:r>
+            <a:r>
+              <a:rPr lang="bg-BG" sz="1600" dirty="0">
+                <a:solidFill>
+                  <a:schemeClr val="bg2"/>
+                </a:solidFill>
+                <a:effectLst/>
+                <a:latin typeface="Calibri" panose="020F0502020204030204" pitchFamily="34" charset="0"/>
+                <a:ea typeface="Calibri" panose="020F0502020204030204" pitchFamily="34" charset="0"/>
+                <a:cs typeface="Arial" panose="020B0604020202020204" pitchFamily="34" charset="0"/>
+              </a:rPr>
+              <a:t>", СофтУни Фондация (лиценз </a:t>
+            </a:r>
+            <a:r>
+              <a:rPr lang="en-US" sz="1600" dirty="0">
+                <a:solidFill>
+                  <a:schemeClr val="bg2"/>
+                </a:solidFill>
+                <a:effectLst/>
+                <a:latin typeface="Calibri" panose="020F0502020204030204" pitchFamily="34" charset="0"/>
+                <a:ea typeface="Calibri" panose="020F0502020204030204" pitchFamily="34" charset="0"/>
+                <a:cs typeface="Arial" panose="020B0604020202020204" pitchFamily="34" charset="0"/>
+              </a:rPr>
+              <a:t>CC-BY-NC-SA</a:t>
+            </a:r>
+            <a:r>
+              <a:rPr lang="bg-BG" sz="1600" dirty="0">
+                <a:solidFill>
+                  <a:schemeClr val="bg2"/>
+                </a:solidFill>
+                <a:effectLst/>
+                <a:latin typeface="Calibri" panose="020F0502020204030204" pitchFamily="34" charset="0"/>
+                <a:ea typeface="Calibri" panose="020F0502020204030204" pitchFamily="34" charset="0"/>
+                <a:cs typeface="Arial" panose="020B0604020202020204" pitchFamily="34" charset="0"/>
+              </a:rPr>
+              <a:t>)</a:t>
+            </a:r>
+            <a:endParaRPr lang="bg-BG" sz="2400" dirty="0">
+              <a:solidFill>
+                <a:schemeClr val="bg2"/>
+              </a:solidFill>
+              <a:effectLst/>
+              <a:latin typeface="Calibri" panose="020F0502020204030204" pitchFamily="34" charset="0"/>
+              <a:ea typeface="Calibri" panose="020F0502020204030204" pitchFamily="34" charset="0"/>
+              <a:cs typeface="Arial" panose="020B0604020202020204" pitchFamily="34" charset="0"/>
+            </a:endParaRPr>
+          </a:p>
+        </p:txBody>
+      </p:sp>
+    </p:spTree>
+    <p:extLst>
+      <p:ext uri="{BB962C8B-B14F-4D97-AF65-F5344CB8AC3E}">
+        <p14:creationId xmlns:p14="http://schemas.microsoft.com/office/powerpoint/2010/main" val="3744296604"/>
+      </p:ext>
+    </p:extLst>
+  </p:cSld>
+  <p:clrMapOvr>
+    <a:masterClrMapping/>
+  </p:clrMapOvr>
+  <mc:AlternateContent xmlns:mc="http://schemas.openxmlformats.org/markup-compatibility/2006" xmlns:p14="http://schemas.microsoft.com/office/powerpoint/2010/main">
+    <mc:Choice Requires="p14">
+      <p:transition spd="slow" p14:dur="2000" advClick="0" advTm="5000"/>
+    </mc:Choice>
+    <mc:Fallback xmlns="">
+      <p:transition spd="slow" advClick="0" advTm="5000"/>
+    </mc:Fallback>
+  </mc:AlternateContent>
+</p:sld>
+</file>
+
 <file path=ppt/slides/slide4.xml><?xml version="1.0" encoding="utf-8"?>
 <p:sld xmlns:a="http://schemas.openxmlformats.org/drawingml/2006/main" xmlns:r="http://schemas.openxmlformats.org/officeDocument/2006/relationships" xmlns:p="http://schemas.openxmlformats.org/presentationml/2006/main">
   <p:cSld>
@@ -22892,1313 +22820,6 @@
 </file>
 
 <file path=ppt/slides/slide40.xml><?xml version="1.0" encoding="utf-8"?>
-<p:sld xmlns:a="http://schemas.openxmlformats.org/drawingml/2006/main" xmlns:r="http://schemas.openxmlformats.org/officeDocument/2006/relationships" xmlns:p="http://schemas.openxmlformats.org/presentationml/2006/main">
-  <p:cSld>
-    <p:spTree>
-      <p:nvGrpSpPr>
-        <p:cNvPr id="1" name=""/>
-        <p:cNvGrpSpPr/>
-        <p:nvPr/>
-      </p:nvGrpSpPr>
-      <p:grpSpPr>
-        <a:xfrm>
-          <a:off x="0" y="0"/>
-          <a:ext cx="0" cy="0"/>
-          <a:chOff x="0" y="0"/>
-          <a:chExt cx="0" cy="0"/>
-        </a:xfrm>
-      </p:grpSpPr>
-      <p:sp>
-        <p:nvSpPr>
-          <p:cNvPr id="14" name="Text Placeholder 4">
-            <a:extLst>
-              <a:ext uri="{FF2B5EF4-FFF2-40B4-BE49-F238E27FC236}">
-                <a16:creationId xmlns:a16="http://schemas.microsoft.com/office/drawing/2014/main" id="{0E49D336-45B6-44D3-97C4-E28F8DEA2022}"/>
-              </a:ext>
-            </a:extLst>
-          </p:cNvPr>
-          <p:cNvSpPr>
-            <a:spLocks noGrp="1"/>
-          </p:cNvSpPr>
-          <p:nvPr>
-            <p:ph type="body" sz="quarter" idx="10"/>
-          </p:nvPr>
-        </p:nvSpPr>
-        <p:spPr>
-          <a:xfrm>
-            <a:off x="869725" y="1656226"/>
-            <a:ext cx="7581212" cy="4772369"/>
-          </a:xfrm>
-        </p:spPr>
-        <p:txBody>
-          <a:bodyPr/>
-          <a:lstStyle>
-            <a:lvl1pPr marL="514350" indent="-514350">
-              <a:buFont typeface="Wingdings" panose="05000000000000000000" pitchFamily="2" charset="2"/>
-              <a:buChar char="§"/>
-              <a:defRPr>
-                <a:solidFill>
-                  <a:schemeClr val="bg2"/>
-                </a:solidFill>
-              </a:defRPr>
-            </a:lvl1pPr>
-            <a:lvl2pPr marL="1123935" indent="-514350">
-              <a:buFont typeface="Wingdings" panose="05000000000000000000" pitchFamily="2" charset="2"/>
-              <a:buChar char="§"/>
-              <a:defRPr>
-                <a:solidFill>
-                  <a:schemeClr val="tx1"/>
-                </a:solidFill>
-              </a:defRPr>
-            </a:lvl2pPr>
-            <a:lvl3pPr marL="1733520" indent="-514350">
-              <a:buFont typeface="Wingdings" panose="05000000000000000000" pitchFamily="2" charset="2"/>
-              <a:buChar char="§"/>
-              <a:defRPr>
-                <a:solidFill>
-                  <a:schemeClr val="tx1"/>
-                </a:solidFill>
-              </a:defRPr>
-            </a:lvl3pPr>
-            <a:lvl4pPr marL="2343105" indent="-514350">
-              <a:buFont typeface="Wingdings" panose="05000000000000000000" pitchFamily="2" charset="2"/>
-              <a:buChar char="§"/>
-              <a:defRPr>
-                <a:solidFill>
-                  <a:schemeClr val="tx1"/>
-                </a:solidFill>
-              </a:defRPr>
-            </a:lvl4pPr>
-            <a:lvl5pPr marL="2952689" indent="-514350">
-              <a:buFont typeface="Wingdings" panose="05000000000000000000" pitchFamily="2" charset="2"/>
-              <a:buChar char="§"/>
-              <a:defRPr>
-                <a:solidFill>
-                  <a:schemeClr val="tx1"/>
-                </a:solidFill>
-              </a:defRPr>
-            </a:lvl5pPr>
-          </a:lstStyle>
-          <a:p>
-            <a:pPr lvl="0"/>
-            <a:r>
-              <a:rPr lang="en-US" dirty="0"/>
-              <a:t>…</a:t>
-            </a:r>
-          </a:p>
-          <a:p>
-            <a:pPr lvl="0"/>
-            <a:r>
-              <a:rPr lang="en-GB" dirty="0"/>
-              <a:t>…</a:t>
-            </a:r>
-            <a:endParaRPr lang="en-US" dirty="0"/>
-          </a:p>
-          <a:p>
-            <a:pPr lvl="0"/>
-            <a:r>
-              <a:rPr lang="en-GB" dirty="0"/>
-              <a:t>…</a:t>
-            </a:r>
-            <a:endParaRPr lang="en-US" dirty="0"/>
-          </a:p>
-          <a:p>
-            <a:pPr lvl="0"/>
-            <a:endParaRPr lang="en-US" dirty="0"/>
-          </a:p>
-        </p:txBody>
-      </p:sp>
-      <p:sp>
-        <p:nvSpPr>
-          <p:cNvPr id="4" name="Title 3"/>
-          <p:cNvSpPr>
-            <a:spLocks noGrp="1"/>
-          </p:cNvSpPr>
-          <p:nvPr>
-            <p:ph type="title"/>
-          </p:nvPr>
-        </p:nvSpPr>
-        <p:spPr/>
-        <p:txBody>
-          <a:bodyPr>
-            <a:normAutofit/>
-          </a:bodyPr>
-          <a:lstStyle/>
-          <a:p>
-            <a:r>
-              <a:rPr lang="bg-BG" dirty="0"/>
-              <a:t>Обобщение</a:t>
-            </a:r>
-            <a:endParaRPr lang="en-US" dirty="0"/>
-          </a:p>
-        </p:txBody>
-      </p:sp>
-      <p:grpSp>
-        <p:nvGrpSpPr>
-          <p:cNvPr id="9" name="Group 8">
-            <a:extLst>
-              <a:ext uri="{FF2B5EF4-FFF2-40B4-BE49-F238E27FC236}">
-                <a16:creationId xmlns:a16="http://schemas.microsoft.com/office/drawing/2014/main" id="{EBAFE522-EB7D-4931-A015-9A7E8A98517D}"/>
-              </a:ext>
-            </a:extLst>
-          </p:cNvPr>
-          <p:cNvGrpSpPr/>
-          <p:nvPr/>
-        </p:nvGrpSpPr>
-        <p:grpSpPr>
-          <a:xfrm>
-            <a:off x="191942" y="1419750"/>
-            <a:ext cx="9302704" cy="5300339"/>
-            <a:chOff x="472011" y="1508786"/>
-            <a:chExt cx="3799787" cy="4865561"/>
-          </a:xfrm>
-        </p:grpSpPr>
-        <p:sp>
-          <p:nvSpPr>
-            <p:cNvPr id="10" name="Rounded Rectangle 10">
-              <a:extLst>
-                <a:ext uri="{FF2B5EF4-FFF2-40B4-BE49-F238E27FC236}">
-                  <a16:creationId xmlns:a16="http://schemas.microsoft.com/office/drawing/2014/main" id="{18F78F23-3D09-4B63-8DF9-D49CFBB145EE}"/>
-                </a:ext>
-              </a:extLst>
-            </p:cNvPr>
-            <p:cNvSpPr/>
-            <p:nvPr/>
-          </p:nvSpPr>
-          <p:spPr>
-            <a:xfrm>
-              <a:off x="472011" y="1508786"/>
-              <a:ext cx="3799787" cy="4865561"/>
-            </a:xfrm>
-            <a:prstGeom prst="roundRect">
-              <a:avLst>
-                <a:gd name="adj" fmla="val 3968"/>
-              </a:avLst>
-            </a:prstGeom>
-            <a:solidFill>
-              <a:schemeClr val="tx2"/>
-            </a:solidFill>
-            <a:ln>
-              <a:noFill/>
-            </a:ln>
-          </p:spPr>
-          <p:style>
-            <a:lnRef idx="2">
-              <a:schemeClr val="accent1">
-                <a:shade val="50000"/>
-              </a:schemeClr>
-            </a:lnRef>
-            <a:fillRef idx="1">
-              <a:schemeClr val="accent1"/>
-            </a:fillRef>
-            <a:effectRef idx="0">
-              <a:schemeClr val="accent1"/>
-            </a:effectRef>
-            <a:fontRef idx="minor">
-              <a:schemeClr val="lt1"/>
-            </a:fontRef>
-          </p:style>
-          <p:txBody>
-            <a:bodyPr rtlCol="0" anchor="ctr"/>
-            <a:lstStyle/>
-            <a:p>
-              <a:pPr marL="0" marR="0" lvl="0" indent="0" algn="ctr" defTabSz="914400" rtl="0" eaLnBrk="1" fontAlgn="auto" latinLnBrk="0" hangingPunct="1">
-                <a:lnSpc>
-                  <a:spcPct val="100000"/>
-                </a:lnSpc>
-                <a:spcBef>
-                  <a:spcPts val="0"/>
-                </a:spcBef>
-                <a:spcAft>
-                  <a:spcPts val="0"/>
-                </a:spcAft>
-                <a:buClrTx/>
-                <a:buSzTx/>
-                <a:buFontTx/>
-                <a:buNone/>
-                <a:tabLst/>
-                <a:defRPr/>
-              </a:pPr>
-              <a:endParaRPr kumimoji="0" lang="ko-KR" altLang="en-US" sz="2399" b="0" i="0" u="none" strike="noStrike" kern="1200" cap="none" spc="0" normalizeH="0" baseline="0" noProof="0" dirty="0">
-                <a:ln>
-                  <a:noFill/>
-                </a:ln>
-                <a:solidFill>
-                  <a:srgbClr val="FFA000"/>
-                </a:solidFill>
-                <a:effectLst/>
-                <a:uLnTx/>
-                <a:uFillTx/>
-                <a:latin typeface="Calibri" panose="020F0502020204030204"/>
-                <a:ea typeface="맑은 고딕" panose="020B0503020000020004" pitchFamily="34" charset="-127"/>
-                <a:cs typeface="+mn-cs"/>
-              </a:endParaRPr>
-            </a:p>
-          </p:txBody>
-        </p:sp>
-        <p:sp>
-          <p:nvSpPr>
-            <p:cNvPr id="11" name="Rounded Rectangle 16">
-              <a:extLst>
-                <a:ext uri="{FF2B5EF4-FFF2-40B4-BE49-F238E27FC236}">
-                  <a16:creationId xmlns:a16="http://schemas.microsoft.com/office/drawing/2014/main" id="{F12C06CE-2BBE-46C2-B718-813794C58DF9}"/>
-                </a:ext>
-              </a:extLst>
-            </p:cNvPr>
-            <p:cNvSpPr/>
-            <p:nvPr/>
-          </p:nvSpPr>
-          <p:spPr>
-            <a:xfrm>
-              <a:off x="540767" y="1781251"/>
-              <a:ext cx="85794" cy="4320631"/>
-            </a:xfrm>
-            <a:prstGeom prst="roundRect">
-              <a:avLst>
-                <a:gd name="adj" fmla="val 50000"/>
-              </a:avLst>
-            </a:prstGeom>
-            <a:solidFill>
-              <a:schemeClr val="bg2">
-                <a:alpha val="41000"/>
-              </a:schemeClr>
-            </a:solidFill>
-            <a:ln>
-              <a:noFill/>
-            </a:ln>
-          </p:spPr>
-          <p:style>
-            <a:lnRef idx="2">
-              <a:schemeClr val="accent1">
-                <a:shade val="50000"/>
-              </a:schemeClr>
-            </a:lnRef>
-            <a:fillRef idx="1">
-              <a:schemeClr val="accent1"/>
-            </a:fillRef>
-            <a:effectRef idx="0">
-              <a:schemeClr val="accent1"/>
-            </a:effectRef>
-            <a:fontRef idx="minor">
-              <a:schemeClr val="lt1"/>
-            </a:fontRef>
-          </p:style>
-          <p:txBody>
-            <a:bodyPr rtlCol="0" anchor="ctr"/>
-            <a:lstStyle/>
-            <a:p>
-              <a:pPr marL="0" marR="0" lvl="0" indent="0" algn="ctr" defTabSz="914400" rtl="0" eaLnBrk="1" fontAlgn="auto" latinLnBrk="0" hangingPunct="1">
-                <a:lnSpc>
-                  <a:spcPct val="100000"/>
-                </a:lnSpc>
-                <a:spcBef>
-                  <a:spcPts val="0"/>
-                </a:spcBef>
-                <a:spcAft>
-                  <a:spcPts val="0"/>
-                </a:spcAft>
-                <a:buClrTx/>
-                <a:buSzTx/>
-                <a:buFontTx/>
-                <a:buNone/>
-                <a:tabLst/>
-                <a:defRPr/>
-              </a:pPr>
-              <a:endParaRPr kumimoji="0" lang="ko-KR" altLang="en-US" sz="2399" b="0" i="0" u="none" strike="noStrike" kern="1200" cap="none" spc="0" normalizeH="0" baseline="0" noProof="0">
-                <a:ln>
-                  <a:noFill/>
-                </a:ln>
-                <a:solidFill>
-                  <a:srgbClr val="FFA000"/>
-                </a:solidFill>
-                <a:effectLst/>
-                <a:uLnTx/>
-                <a:uFillTx/>
-                <a:latin typeface="Calibri" panose="020F0502020204030204"/>
-                <a:ea typeface="맑은 고딕" panose="020B0503020000020004" pitchFamily="34" charset="-127"/>
-                <a:cs typeface="+mn-cs"/>
-              </a:endParaRPr>
-            </a:p>
-          </p:txBody>
-        </p:sp>
-        <p:sp>
-          <p:nvSpPr>
-            <p:cNvPr id="12" name="Half Frame 11">
-              <a:extLst>
-                <a:ext uri="{FF2B5EF4-FFF2-40B4-BE49-F238E27FC236}">
-                  <a16:creationId xmlns:a16="http://schemas.microsoft.com/office/drawing/2014/main" id="{66CDBB1E-AF3C-43FC-9F34-2DD691F81726}"/>
-                </a:ext>
-              </a:extLst>
-            </p:cNvPr>
-            <p:cNvSpPr/>
-            <p:nvPr/>
-          </p:nvSpPr>
-          <p:spPr>
-            <a:xfrm rot="5400000">
-              <a:off x="3762569" y="1912372"/>
-              <a:ext cx="669775" cy="238503"/>
-            </a:xfrm>
-            <a:prstGeom prst="halfFrame">
-              <a:avLst>
-                <a:gd name="adj1" fmla="val 23728"/>
-                <a:gd name="adj2" fmla="val 24642"/>
-              </a:avLst>
-            </a:prstGeom>
-            <a:solidFill>
-              <a:schemeClr val="bg2">
-                <a:alpha val="23000"/>
-              </a:schemeClr>
-            </a:solidFill>
-            <a:ln>
-              <a:noFill/>
-            </a:ln>
-          </p:spPr>
-          <p:style>
-            <a:lnRef idx="2">
-              <a:schemeClr val="accent1">
-                <a:shade val="50000"/>
-              </a:schemeClr>
-            </a:lnRef>
-            <a:fillRef idx="1">
-              <a:schemeClr val="accent1"/>
-            </a:fillRef>
-            <a:effectRef idx="0">
-              <a:schemeClr val="accent1"/>
-            </a:effectRef>
-            <a:fontRef idx="minor">
-              <a:schemeClr val="lt1"/>
-            </a:fontRef>
-          </p:style>
-          <p:txBody>
-            <a:bodyPr rtlCol="0" anchor="ctr"/>
-            <a:lstStyle/>
-            <a:p>
-              <a:pPr marL="0" marR="0" lvl="0" indent="0" algn="ctr" defTabSz="914400" rtl="0" eaLnBrk="1" fontAlgn="auto" latinLnBrk="0" hangingPunct="1">
-                <a:lnSpc>
-                  <a:spcPct val="100000"/>
-                </a:lnSpc>
-                <a:spcBef>
-                  <a:spcPts val="0"/>
-                </a:spcBef>
-                <a:spcAft>
-                  <a:spcPts val="0"/>
-                </a:spcAft>
-                <a:buClrTx/>
-                <a:buSzTx/>
-                <a:buFontTx/>
-                <a:buNone/>
-                <a:tabLst/>
-                <a:defRPr/>
-              </a:pPr>
-              <a:endParaRPr kumimoji="0" lang="ko-KR" altLang="en-US" sz="2399" b="0" i="0" u="none" strike="noStrike" kern="1200" cap="none" spc="0" normalizeH="0" baseline="0" noProof="0">
-                <a:ln>
-                  <a:noFill/>
-                </a:ln>
-                <a:solidFill>
-                  <a:srgbClr val="234465"/>
-                </a:solidFill>
-                <a:effectLst/>
-                <a:uLnTx/>
-                <a:uFillTx/>
-                <a:latin typeface="Calibri" panose="020F0502020204030204"/>
-                <a:ea typeface="맑은 고딕" panose="020B0503020000020004" pitchFamily="34" charset="-127"/>
-                <a:cs typeface="+mn-cs"/>
-              </a:endParaRPr>
-            </a:p>
-          </p:txBody>
-        </p:sp>
-      </p:grpSp>
-      <p:pic>
-        <p:nvPicPr>
-          <p:cNvPr id="13" name="Picture 12">
-            <a:extLst>
-              <a:ext uri="{FF2B5EF4-FFF2-40B4-BE49-F238E27FC236}">
-                <a16:creationId xmlns:a16="http://schemas.microsoft.com/office/drawing/2014/main" id="{CCC3A316-993C-4741-8826-E104F27650A3}"/>
-              </a:ext>
-            </a:extLst>
-          </p:cNvPr>
-          <p:cNvPicPr>
-            <a:picLocks noChangeAspect="1"/>
-          </p:cNvPicPr>
-          <p:nvPr/>
-        </p:nvPicPr>
-        <p:blipFill rotWithShape="1">
-          <a:blip r:embed="rId3" cstate="print">
-            <a:extLst>
-              <a:ext uri="{28A0092B-C50C-407E-A947-70E740481C1C}">
-                <a14:useLocalDpi xmlns:a14="http://schemas.microsoft.com/office/drawing/2010/main" val="0"/>
-              </a:ext>
-            </a:extLst>
-          </a:blip>
-          <a:srcRect/>
-          <a:stretch/>
-        </p:blipFill>
-        <p:spPr>
-          <a:xfrm flipH="1">
-            <a:off x="9634833" y="4105075"/>
-            <a:ext cx="2118197" cy="2292422"/>
-          </a:xfrm>
-          <a:prstGeom prst="rect">
-            <a:avLst/>
-          </a:prstGeom>
-        </p:spPr>
-      </p:pic>
-      <p:sp>
-        <p:nvSpPr>
-          <p:cNvPr id="15" name="Content Placeholder 4">
-            <a:extLst>
-              <a:ext uri="{FF2B5EF4-FFF2-40B4-BE49-F238E27FC236}">
-                <a16:creationId xmlns:a16="http://schemas.microsoft.com/office/drawing/2014/main" id="{B96A0DF8-27E7-4DC8-BBE3-7238AAAEB845}"/>
-              </a:ext>
-            </a:extLst>
-          </p:cNvPr>
-          <p:cNvSpPr txBox="1">
-            <a:spLocks/>
-          </p:cNvSpPr>
-          <p:nvPr/>
-        </p:nvSpPr>
-        <p:spPr>
-          <a:xfrm>
-            <a:off x="445613" y="1606714"/>
-            <a:ext cx="11815018" cy="5201066"/>
-          </a:xfrm>
-          <a:prstGeom prst="rect">
-            <a:avLst/>
-          </a:prstGeom>
-        </p:spPr>
-        <p:txBody>
-          <a:bodyPr vert="horz" lIns="108000" tIns="36000" rIns="108000" bIns="36000" rtlCol="0">
-            <a:normAutofit/>
-          </a:bodyPr>
-          <a:lstStyle>
-            <a:lvl1pPr marL="456915" indent="-456915" algn="l" defTabSz="1218438" rtl="0" eaLnBrk="1" latinLnBrk="1" hangingPunct="1">
-              <a:lnSpc>
-                <a:spcPct val="105000"/>
-              </a:lnSpc>
-              <a:spcBef>
-                <a:spcPts val="600"/>
-              </a:spcBef>
-              <a:spcAft>
-                <a:spcPts val="600"/>
-              </a:spcAft>
-              <a:buFont typeface="Wingdings" panose="05000000000000000000" pitchFamily="2" charset="2"/>
-              <a:buChar char="§"/>
-              <a:defRPr sz="3398" kern="1200">
-                <a:solidFill>
-                  <a:schemeClr val="tx1"/>
-                </a:solidFill>
-                <a:latin typeface="+mn-lt"/>
-                <a:ea typeface="+mn-ea"/>
-                <a:cs typeface="+mn-cs"/>
-              </a:defRPr>
-            </a:lvl1pPr>
-            <a:lvl2pPr marL="989981" indent="-380762" algn="l" defTabSz="1218438" rtl="0" eaLnBrk="1" latinLnBrk="1" hangingPunct="1">
-              <a:lnSpc>
-                <a:spcPct val="105000"/>
-              </a:lnSpc>
-              <a:spcBef>
-                <a:spcPts val="600"/>
-              </a:spcBef>
-              <a:spcAft>
-                <a:spcPts val="600"/>
-              </a:spcAft>
-              <a:buFont typeface="Wingdings" panose="05000000000000000000" pitchFamily="2" charset="2"/>
-              <a:buChar char="§"/>
-              <a:defRPr sz="3198" kern="1200">
-                <a:solidFill>
-                  <a:schemeClr val="tx1"/>
-                </a:solidFill>
-                <a:latin typeface="+mn-lt"/>
-                <a:ea typeface="+mn-ea"/>
-                <a:cs typeface="+mn-cs"/>
-              </a:defRPr>
-            </a:lvl2pPr>
-            <a:lvl3pPr marL="1523048" indent="-304610" algn="l" defTabSz="1218438" rtl="0" eaLnBrk="1" latinLnBrk="1" hangingPunct="1">
-              <a:lnSpc>
-                <a:spcPct val="105000"/>
-              </a:lnSpc>
-              <a:spcBef>
-                <a:spcPts val="600"/>
-              </a:spcBef>
-              <a:spcAft>
-                <a:spcPts val="600"/>
-              </a:spcAft>
-              <a:buFont typeface="Wingdings" panose="05000000000000000000" pitchFamily="2" charset="2"/>
-              <a:buChar char="§"/>
-              <a:defRPr sz="2998" kern="1200">
-                <a:solidFill>
-                  <a:schemeClr val="tx1"/>
-                </a:solidFill>
-                <a:latin typeface="+mn-lt"/>
-                <a:ea typeface="+mn-ea"/>
-                <a:cs typeface="+mn-cs"/>
-              </a:defRPr>
-            </a:lvl3pPr>
-            <a:lvl4pPr marL="2132267" indent="-304610" algn="l" defTabSz="1218438" rtl="0" eaLnBrk="1" latinLnBrk="1" hangingPunct="1">
-              <a:lnSpc>
-                <a:spcPct val="105000"/>
-              </a:lnSpc>
-              <a:spcBef>
-                <a:spcPts val="600"/>
-              </a:spcBef>
-              <a:spcAft>
-                <a:spcPts val="600"/>
-              </a:spcAft>
-              <a:buFont typeface="Wingdings" panose="05000000000000000000" pitchFamily="2" charset="2"/>
-              <a:buChar char="§"/>
-              <a:defRPr sz="2798" kern="1200">
-                <a:solidFill>
-                  <a:schemeClr val="tx1"/>
-                </a:solidFill>
-                <a:latin typeface="+mn-lt"/>
-                <a:ea typeface="+mn-ea"/>
-                <a:cs typeface="+mn-cs"/>
-              </a:defRPr>
-            </a:lvl4pPr>
-            <a:lvl5pPr marL="2741485" indent="-304610" algn="l" defTabSz="1218438" rtl="0" eaLnBrk="1" latinLnBrk="1" hangingPunct="1">
-              <a:lnSpc>
-                <a:spcPct val="105000"/>
-              </a:lnSpc>
-              <a:spcBef>
-                <a:spcPts val="600"/>
-              </a:spcBef>
-              <a:spcAft>
-                <a:spcPts val="600"/>
-              </a:spcAft>
-              <a:buFont typeface="Wingdings" panose="05000000000000000000" pitchFamily="2" charset="2"/>
-              <a:buChar char="§"/>
-              <a:defRPr sz="2598" kern="1200">
-                <a:solidFill>
-                  <a:schemeClr val="tx1"/>
-                </a:solidFill>
-                <a:latin typeface="+mn-lt"/>
-                <a:ea typeface="+mn-ea"/>
-                <a:cs typeface="+mn-cs"/>
-              </a:defRPr>
-            </a:lvl5pPr>
-            <a:lvl6pPr marL="3350704" indent="-304610" algn="l" defTabSz="1218438" rtl="0" eaLnBrk="1" latinLnBrk="1" hangingPunct="1">
-              <a:spcBef>
-                <a:spcPct val="20000"/>
-              </a:spcBef>
-              <a:buFont typeface="Arial" pitchFamily="34" charset="0"/>
-              <a:buChar char="•"/>
-              <a:defRPr sz="2665" kern="1200">
-                <a:solidFill>
-                  <a:schemeClr val="tx1"/>
-                </a:solidFill>
-                <a:latin typeface="+mn-lt"/>
-                <a:ea typeface="+mn-ea"/>
-                <a:cs typeface="+mn-cs"/>
-              </a:defRPr>
-            </a:lvl6pPr>
-            <a:lvl7pPr marL="3959924" indent="-304610" algn="l" defTabSz="1218438" rtl="0" eaLnBrk="1" latinLnBrk="1" hangingPunct="1">
-              <a:spcBef>
-                <a:spcPct val="20000"/>
-              </a:spcBef>
-              <a:buFont typeface="Arial" pitchFamily="34" charset="0"/>
-              <a:buChar char="•"/>
-              <a:defRPr sz="2665" kern="1200">
-                <a:solidFill>
-                  <a:schemeClr val="tx1"/>
-                </a:solidFill>
-                <a:latin typeface="+mn-lt"/>
-                <a:ea typeface="+mn-ea"/>
-                <a:cs typeface="+mn-cs"/>
-              </a:defRPr>
-            </a:lvl7pPr>
-            <a:lvl8pPr marL="4569143" indent="-304610" algn="l" defTabSz="1218438" rtl="0" eaLnBrk="1" latinLnBrk="1" hangingPunct="1">
-              <a:spcBef>
-                <a:spcPct val="20000"/>
-              </a:spcBef>
-              <a:buFont typeface="Arial" pitchFamily="34" charset="0"/>
-              <a:buChar char="•"/>
-              <a:defRPr sz="2665" kern="1200">
-                <a:solidFill>
-                  <a:schemeClr val="tx1"/>
-                </a:solidFill>
-                <a:latin typeface="+mn-lt"/>
-                <a:ea typeface="+mn-ea"/>
-                <a:cs typeface="+mn-cs"/>
-              </a:defRPr>
-            </a:lvl8pPr>
-            <a:lvl9pPr marL="5178362" indent="-304610" algn="l" defTabSz="1218438" rtl="0" eaLnBrk="1" latinLnBrk="1" hangingPunct="1">
-              <a:spcBef>
-                <a:spcPct val="20000"/>
-              </a:spcBef>
-              <a:buFont typeface="Arial" pitchFamily="34" charset="0"/>
-              <a:buChar char="•"/>
-              <a:defRPr sz="2665" kern="1200">
-                <a:solidFill>
-                  <a:schemeClr val="tx1"/>
-                </a:solidFill>
-                <a:latin typeface="+mn-lt"/>
-                <a:ea typeface="+mn-ea"/>
-                <a:cs typeface="+mn-cs"/>
-              </a:defRPr>
-            </a:lvl9pPr>
-          </a:lstStyle>
-          <a:p>
-            <a:pPr marL="456915" marR="0" lvl="0" indent="-456915" algn="l" defTabSz="1218438" rtl="0" eaLnBrk="1" fontAlgn="auto" latinLnBrk="1" hangingPunct="1">
-              <a:lnSpc>
-                <a:spcPct val="100000"/>
-              </a:lnSpc>
-              <a:spcBef>
-                <a:spcPts val="600"/>
-              </a:spcBef>
-              <a:spcAft>
-                <a:spcPts val="600"/>
-              </a:spcAft>
-              <a:buClr>
-                <a:srgbClr val="FFFFFF"/>
-              </a:buClr>
-              <a:buSzTx/>
-              <a:buFont typeface="Wingdings" panose="05000000000000000000" pitchFamily="2" charset="2"/>
-              <a:buChar char="§"/>
-              <a:tabLst/>
-              <a:defRPr/>
-            </a:pPr>
-            <a:endParaRPr kumimoji="0" lang="en-US" sz="2800" b="0" i="0" u="none" strike="noStrike" kern="1200" cap="none" spc="0" normalizeH="0" baseline="0" noProof="0" dirty="0">
-              <a:ln>
-                <a:noFill/>
-              </a:ln>
-              <a:solidFill>
-                <a:schemeClr val="bg2"/>
-              </a:solidFill>
-              <a:effectLst/>
-              <a:uLnTx/>
-              <a:uFillTx/>
-              <a:latin typeface="Calibri" panose="020F0502020204030204"/>
-              <a:ea typeface="+mn-ea"/>
-              <a:cs typeface="+mn-cs"/>
-            </a:endParaRPr>
-          </a:p>
-        </p:txBody>
-      </p:sp>
-      <p:sp>
-        <p:nvSpPr>
-          <p:cNvPr id="2" name="Rectangle 1"/>
-          <p:cNvSpPr/>
-          <p:nvPr/>
-        </p:nvSpPr>
-        <p:spPr>
-          <a:xfrm>
-            <a:off x="561000" y="1719000"/>
-            <a:ext cx="8795363" cy="4689425"/>
-          </a:xfrm>
-          <a:prstGeom prst="rect">
-            <a:avLst/>
-          </a:prstGeom>
-        </p:spPr>
-        <p:txBody>
-          <a:bodyPr wrap="square">
-            <a:spAutoFit/>
-          </a:bodyPr>
-          <a:lstStyle/>
-          <a:p>
-            <a:pPr marL="457200" indent="-457200">
-              <a:spcAft>
-                <a:spcPts val="600"/>
-              </a:spcAft>
-              <a:buClr>
-                <a:schemeClr val="bg2"/>
-              </a:buClr>
-              <a:buFont typeface="Wingdings" panose="05000000000000000000" pitchFamily="2" charset="2"/>
-              <a:buChar char="§"/>
-            </a:pPr>
-            <a:r>
-              <a:rPr lang="bg-BG" sz="3400" b="1" dirty="0">
-                <a:solidFill>
-                  <a:schemeClr val="bg1">
-                    <a:lumMod val="40000"/>
-                    <a:lumOff val="60000"/>
-                  </a:schemeClr>
-                </a:solidFill>
-              </a:rPr>
-              <a:t>M</a:t>
-            </a:r>
-            <a:r>
-              <a:rPr lang="en-US" sz="3400" b="1" dirty="0">
-                <a:solidFill>
-                  <a:schemeClr val="bg1">
-                    <a:lumMod val="40000"/>
-                    <a:lumOff val="60000"/>
-                  </a:schemeClr>
-                </a:solidFill>
-              </a:rPr>
-              <a:t>S SQL Server</a:t>
-            </a:r>
-            <a:r>
-              <a:rPr lang="en-US" sz="3400" dirty="0">
-                <a:solidFill>
-                  <a:schemeClr val="bg1">
-                    <a:lumMod val="40000"/>
-                    <a:lumOff val="60000"/>
-                  </a:schemeClr>
-                </a:solidFill>
-              </a:rPr>
-              <a:t> == </a:t>
-            </a:r>
-            <a:r>
-              <a:rPr lang="bg-BG" sz="3400" dirty="0">
-                <a:solidFill>
-                  <a:schemeClr val="bg2"/>
-                </a:solidFill>
-              </a:rPr>
-              <a:t>система за управление на големи обеми от данни</a:t>
-            </a:r>
-          </a:p>
-          <a:p>
-            <a:pPr marL="457200" indent="-457200">
-              <a:spcAft>
-                <a:spcPts val="600"/>
-              </a:spcAft>
-              <a:buClr>
-                <a:schemeClr val="bg2"/>
-              </a:buClr>
-              <a:buFont typeface="Wingdings" panose="05000000000000000000" pitchFamily="2" charset="2"/>
-              <a:buChar char="§"/>
-            </a:pPr>
-            <a:r>
-              <a:rPr lang="en-US" sz="3400" b="1" dirty="0">
-                <a:solidFill>
-                  <a:schemeClr val="bg1">
-                    <a:lumMod val="40000"/>
-                    <a:lumOff val="60000"/>
-                  </a:schemeClr>
-                </a:solidFill>
-              </a:rPr>
-              <a:t>SQL Server Express LocalDB</a:t>
-            </a:r>
-            <a:r>
-              <a:rPr lang="bg-BG" sz="3400" b="1" dirty="0">
-                <a:solidFill>
-                  <a:schemeClr val="bg1">
-                    <a:lumMod val="40000"/>
-                    <a:lumOff val="60000"/>
-                  </a:schemeClr>
-                </a:solidFill>
-              </a:rPr>
-              <a:t> == </a:t>
-            </a:r>
-            <a:r>
-              <a:rPr lang="bg-BG" sz="3400" dirty="0">
-                <a:solidFill>
-                  <a:schemeClr val="bg2"/>
-                </a:solidFill>
-              </a:rPr>
-              <a:t>опростена версия на Microsoft SQL Server</a:t>
-            </a:r>
-          </a:p>
-          <a:p>
-            <a:pPr marL="457200" indent="-457200">
-              <a:lnSpc>
-                <a:spcPct val="100000"/>
-              </a:lnSpc>
-              <a:spcAft>
-                <a:spcPts val="600"/>
-              </a:spcAft>
-              <a:buFont typeface="Wingdings" panose="05000000000000000000" pitchFamily="2" charset="2"/>
-              <a:buChar char="§"/>
-            </a:pPr>
-            <a:r>
-              <a:rPr lang="bg-BG" sz="3400" dirty="0">
-                <a:solidFill>
-                  <a:schemeClr val="bg2"/>
-                </a:solidFill>
-              </a:rPr>
-              <a:t>Чрез </a:t>
-            </a:r>
-            <a:r>
-              <a:rPr lang="en-US" sz="3400" dirty="0">
-                <a:solidFill>
-                  <a:schemeClr val="bg2"/>
-                </a:solidFill>
-              </a:rPr>
-              <a:t>SQL </a:t>
-            </a:r>
-            <a:r>
-              <a:rPr lang="bg-BG" sz="3400" dirty="0">
-                <a:solidFill>
-                  <a:schemeClr val="bg2"/>
-                </a:solidFill>
-              </a:rPr>
-              <a:t>можем да </a:t>
-            </a:r>
-            <a:r>
-              <a:rPr lang="bg-BG" sz="3400" b="1" dirty="0">
-                <a:solidFill>
-                  <a:schemeClr val="bg1">
-                    <a:lumMod val="40000"/>
-                    <a:lumOff val="60000"/>
-                  </a:schemeClr>
-                </a:solidFill>
-              </a:rPr>
-              <a:t>създаваме таблици</a:t>
-            </a:r>
-            <a:r>
-              <a:rPr lang="bg-BG" sz="3400" dirty="0">
-                <a:solidFill>
-                  <a:schemeClr val="bg2"/>
-                </a:solidFill>
-              </a:rPr>
-              <a:t>, да </a:t>
-            </a:r>
-            <a:r>
-              <a:rPr lang="bg-BG" sz="3400" b="1" dirty="0">
-                <a:solidFill>
-                  <a:schemeClr val="bg1">
-                    <a:lumMod val="40000"/>
-                    <a:lumOff val="60000"/>
-                  </a:schemeClr>
-                </a:solidFill>
-              </a:rPr>
-              <a:t>вмъкваме</a:t>
-            </a:r>
-            <a:r>
-              <a:rPr lang="bg-BG" sz="3400" dirty="0">
-                <a:solidFill>
-                  <a:schemeClr val="bg2"/>
-                </a:solidFill>
-              </a:rPr>
-              <a:t> и </a:t>
-            </a:r>
-            <a:r>
-              <a:rPr lang="bg-BG" sz="3400" b="1" dirty="0">
-                <a:solidFill>
-                  <a:schemeClr val="bg1">
-                    <a:lumMod val="40000"/>
-                    <a:lumOff val="60000"/>
-                  </a:schemeClr>
-                </a:solidFill>
-              </a:rPr>
-              <a:t>редактираме</a:t>
-            </a:r>
-            <a:r>
-              <a:rPr lang="bg-BG" sz="3400" dirty="0">
-                <a:solidFill>
-                  <a:schemeClr val="bg2"/>
-                </a:solidFill>
-              </a:rPr>
-              <a:t> данни</a:t>
-            </a:r>
-            <a:endParaRPr lang="en-US" sz="3400" dirty="0">
-              <a:solidFill>
-                <a:schemeClr val="bg2"/>
-              </a:solidFill>
-            </a:endParaRPr>
-          </a:p>
-          <a:p>
-            <a:pPr marL="457200" indent="-457200">
-              <a:lnSpc>
-                <a:spcPct val="100000"/>
-              </a:lnSpc>
-              <a:buFont typeface="Wingdings" panose="05000000000000000000" pitchFamily="2" charset="2"/>
-              <a:buChar char="§"/>
-            </a:pPr>
-            <a:endParaRPr lang="en-US" sz="3400" dirty="0">
-              <a:solidFill>
-                <a:schemeClr val="bg2"/>
-              </a:solidFill>
-            </a:endParaRPr>
-          </a:p>
-          <a:p>
-            <a:pPr marL="457200" indent="-457200">
-              <a:lnSpc>
-                <a:spcPct val="150000"/>
-              </a:lnSpc>
-              <a:buFont typeface="Wingdings" panose="05000000000000000000" pitchFamily="2" charset="2"/>
-              <a:buChar char="§"/>
-            </a:pPr>
-            <a:endParaRPr lang="en-US" sz="3400" b="1" dirty="0">
-              <a:solidFill>
-                <a:schemeClr val="bg2"/>
-              </a:solidFill>
-            </a:endParaRPr>
-          </a:p>
-        </p:txBody>
-      </p:sp>
-      <p:sp>
-        <p:nvSpPr>
-          <p:cNvPr id="3" name="Slide Number">
-            <a:extLst>
-              <a:ext uri="{FF2B5EF4-FFF2-40B4-BE49-F238E27FC236}">
-                <a16:creationId xmlns:a16="http://schemas.microsoft.com/office/drawing/2014/main" id="{D56998D3-96AE-97F0-0C9A-4B9BC889D15C}"/>
-              </a:ext>
-            </a:extLst>
-          </p:cNvPr>
-          <p:cNvSpPr>
-            <a:spLocks noGrp="1"/>
-          </p:cNvSpPr>
-          <p:nvPr>
-            <p:ph type="sldNum" sz="quarter" idx="5"/>
-          </p:nvPr>
-        </p:nvSpPr>
-        <p:spPr>
-          <a:xfrm>
-            <a:off x="11753030" y="6507000"/>
-            <a:ext cx="367414" cy="297000"/>
-          </a:xfrm>
-          <a:prstGeom prst="rect">
-            <a:avLst/>
-          </a:prstGeom>
-        </p:spPr>
-        <p:txBody>
-          <a:bodyPr vert="horz" lIns="91440" tIns="45720" rIns="91440" bIns="45720" rtlCol="0" anchor="b"/>
-          <a:lstStyle>
-            <a:lvl1pPr algn="r">
-              <a:defRPr sz="1000"/>
-            </a:lvl1pPr>
-          </a:lstStyle>
-          <a:p>
-            <a:fld id="{2BF067CD-8E6B-4360-9AA8-C5DF2A48A6D1}" type="slidenum">
-              <a:rPr lang="en-US" noProof="0" smtClean="0"/>
-              <a:pPr/>
-              <a:t>40</a:t>
-            </a:fld>
-            <a:endParaRPr lang="en-US" noProof="0" dirty="0"/>
-          </a:p>
-        </p:txBody>
-      </p:sp>
-    </p:spTree>
-    <p:extLst>
-      <p:ext uri="{BB962C8B-B14F-4D97-AF65-F5344CB8AC3E}">
-        <p14:creationId xmlns:p14="http://schemas.microsoft.com/office/powerpoint/2010/main" val="2357972623"/>
-      </p:ext>
-    </p:extLst>
-  </p:cSld>
-  <p:clrMapOvr>
-    <a:masterClrMapping/>
-  </p:clrMapOvr>
-  <mc:AlternateContent xmlns:mc="http://schemas.openxmlformats.org/markup-compatibility/2006" xmlns:p14="http://schemas.microsoft.com/office/powerpoint/2010/main">
-    <mc:Choice Requires="p14">
-      <p:transition spd="slow" p14:dur="2000" advClick="0" advTm="5000"/>
-    </mc:Choice>
-    <mc:Fallback xmlns="">
-      <p:transition spd="slow" advClick="0" advTm="5000"/>
-    </mc:Fallback>
-  </mc:AlternateContent>
-  <p:timing>
-    <p:tnLst>
-      <p:par>
-        <p:cTn id="1" dur="indefinite" restart="never" nodeType="tmRoot">
-          <p:childTnLst>
-            <p:seq concurrent="1" nextAc="seek">
-              <p:cTn id="2" dur="indefinite" nodeType="mainSeq">
-                <p:childTnLst>
-                  <p:par>
-                    <p:cTn id="3" fill="hold">
-                      <p:stCondLst>
-                        <p:cond delay="indefinite"/>
-                      </p:stCondLst>
-                      <p:childTnLst>
-                        <p:par>
-                          <p:cTn id="4" fill="hold">
-                            <p:stCondLst>
-                              <p:cond delay="0"/>
-                            </p:stCondLst>
-                            <p:childTnLst>
-                              <p:par>
-                                <p:cTn id="5" presetID="1" presetClass="entr" presetSubtype="0" fill="hold" nodeType="clickEffect">
-                                  <p:stCondLst>
-                                    <p:cond delay="0"/>
-                                  </p:stCondLst>
-                                  <p:childTnLst>
-                                    <p:set>
-                                      <p:cBhvr>
-                                        <p:cTn id="6" dur="1" fill="hold">
-                                          <p:stCondLst>
-                                            <p:cond delay="0"/>
-                                          </p:stCondLst>
-                                        </p:cTn>
-                                        <p:tgtEl>
-                                          <p:spTgt spid="2">
-                                            <p:txEl>
-                                              <p:pRg st="1" end="1"/>
-                                            </p:txEl>
-                                          </p:spTgt>
-                                        </p:tgtEl>
-                                        <p:attrNameLst>
-                                          <p:attrName>style.visibility</p:attrName>
-                                        </p:attrNameLst>
-                                      </p:cBhvr>
-                                      <p:to>
-                                        <p:strVal val="visible"/>
-                                      </p:to>
-                                    </p:set>
-                                  </p:childTnLst>
-                                </p:cTn>
-                              </p:par>
-                            </p:childTnLst>
-                          </p:cTn>
-                        </p:par>
-                      </p:childTnLst>
-                    </p:cTn>
-                  </p:par>
-                  <p:par>
-                    <p:cTn id="7" fill="hold">
-                      <p:stCondLst>
-                        <p:cond delay="indefinite"/>
-                      </p:stCondLst>
-                      <p:childTnLst>
-                        <p:par>
-                          <p:cTn id="8" fill="hold">
-                            <p:stCondLst>
-                              <p:cond delay="0"/>
-                            </p:stCondLst>
-                            <p:childTnLst>
-                              <p:par>
-                                <p:cTn id="9" presetID="1" presetClass="entr" presetSubtype="0" fill="hold" nodeType="clickEffect">
-                                  <p:stCondLst>
-                                    <p:cond delay="0"/>
-                                  </p:stCondLst>
-                                  <p:childTnLst>
-                                    <p:set>
-                                      <p:cBhvr>
-                                        <p:cTn id="10" dur="1" fill="hold">
-                                          <p:stCondLst>
-                                            <p:cond delay="0"/>
-                                          </p:stCondLst>
-                                        </p:cTn>
-                                        <p:tgtEl>
-                                          <p:spTgt spid="2">
-                                            <p:txEl>
-                                              <p:pRg st="2" end="2"/>
-                                            </p:txEl>
-                                          </p:spTgt>
-                                        </p:tgtEl>
-                                        <p:attrNameLst>
-                                          <p:attrName>style.visibility</p:attrName>
-                                        </p:attrNameLst>
-                                      </p:cBhvr>
-                                      <p:to>
-                                        <p:strVal val="visible"/>
-                                      </p:to>
-                                    </p:set>
-                                  </p:childTnLst>
-                                </p:cTn>
-                              </p:par>
-                            </p:childTnLst>
-                          </p:cTn>
-                        </p:par>
-                      </p:childTnLst>
-                    </p:cTn>
-                  </p:par>
-                </p:childTnLst>
-              </p:cTn>
-              <p:prevCondLst>
-                <p:cond evt="onPrev" delay="0">
-                  <p:tgtEl>
-                    <p:sldTgt/>
-                  </p:tgtEl>
-                </p:cond>
-              </p:prevCondLst>
-              <p:nextCondLst>
-                <p:cond evt="onNext" delay="0">
-                  <p:tgtEl>
-                    <p:sldTgt/>
-                  </p:tgtEl>
-                </p:cond>
-              </p:nextCondLst>
-            </p:seq>
-          </p:childTnLst>
-        </p:cTn>
-      </p:par>
-    </p:tnLst>
-  </p:timing>
-</p:sld>
-</file>
-
-<file path=ppt/slides/slide41.xml><?xml version="1.0" encoding="utf-8"?>
-<p:sld xmlns:a="http://schemas.openxmlformats.org/drawingml/2006/main" xmlns:r="http://schemas.openxmlformats.org/officeDocument/2006/relationships" xmlns:p="http://schemas.openxmlformats.org/presentationml/2006/main">
-  <p:cSld>
-    <p:spTree>
-      <p:nvGrpSpPr>
-        <p:cNvPr id="1" name=""/>
-        <p:cNvGrpSpPr/>
-        <p:nvPr/>
-      </p:nvGrpSpPr>
-      <p:grpSpPr>
-        <a:xfrm>
-          <a:off x="0" y="0"/>
-          <a:ext cx="0" cy="0"/>
-          <a:chOff x="0" y="0"/>
-          <a:chExt cx="0" cy="0"/>
-        </a:xfrm>
-      </p:grpSpPr>
-      <p:sp>
-        <p:nvSpPr>
-          <p:cNvPr id="5" name="Slide Title">
-            <a:extLst>
-              <a:ext uri="{FF2B5EF4-FFF2-40B4-BE49-F238E27FC236}">
-                <a16:creationId xmlns:a16="http://schemas.microsoft.com/office/drawing/2014/main" id="{FA0703FC-0F8F-4C80-A615-E4B381EC0E0C}"/>
-              </a:ext>
-            </a:extLst>
-          </p:cNvPr>
-          <p:cNvSpPr>
-            <a:spLocks noGrp="1"/>
-          </p:cNvSpPr>
-          <p:nvPr>
-            <p:ph type="title"/>
-          </p:nvPr>
-        </p:nvSpPr>
-        <p:spPr/>
-        <p:txBody>
-          <a:bodyPr/>
-          <a:lstStyle/>
-          <a:p>
-            <a:r>
-              <a:rPr lang="bg-BG" dirty="0"/>
-              <a:t>Въпроси</a:t>
-            </a:r>
-            <a:r>
-              <a:rPr lang="en-US" dirty="0"/>
-              <a:t>?</a:t>
-            </a:r>
-          </a:p>
-        </p:txBody>
-      </p:sp>
-      <p:sp>
-        <p:nvSpPr>
-          <p:cNvPr id="2" name="Rectangle Bottom Copyright">
-            <a:extLst>
-              <a:ext uri="{FF2B5EF4-FFF2-40B4-BE49-F238E27FC236}">
-                <a16:creationId xmlns:a16="http://schemas.microsoft.com/office/drawing/2014/main" id="{664812A4-2991-44D1-BFE9-32E55AADF8A5}"/>
-              </a:ext>
-            </a:extLst>
-          </p:cNvPr>
-          <p:cNvSpPr/>
-          <p:nvPr/>
-        </p:nvSpPr>
-        <p:spPr>
-          <a:xfrm>
-            <a:off x="111000" y="6454758"/>
-            <a:ext cx="11970000" cy="304242"/>
-          </a:xfrm>
-          <a:prstGeom prst="rect">
-            <a:avLst/>
-          </a:prstGeom>
-        </p:spPr>
-        <p:txBody>
-          <a:bodyPr wrap="square">
-            <a:noAutofit/>
-          </a:bodyPr>
-          <a:lstStyle/>
-          <a:p>
-            <a:pPr algn="ctr">
-              <a:lnSpc>
-                <a:spcPct val="100000"/>
-              </a:lnSpc>
-              <a:spcBef>
-                <a:spcPts val="0"/>
-              </a:spcBef>
-              <a:spcAft>
-                <a:spcPts val="0"/>
-              </a:spcAft>
-            </a:pPr>
-            <a:r>
-              <a:rPr lang="bg-BG" sz="1600" dirty="0">
-                <a:solidFill>
-                  <a:schemeClr val="bg2"/>
-                </a:solidFill>
-                <a:effectLst/>
-                <a:latin typeface="Calibri" panose="020F0502020204030204" pitchFamily="34" charset="0"/>
-                <a:ea typeface="Calibri" panose="020F0502020204030204" pitchFamily="34" charset="0"/>
-                <a:cs typeface="Arial" panose="020B0604020202020204" pitchFamily="34" charset="0"/>
-              </a:rPr>
-              <a:t>Проект "</a:t>
-            </a:r>
-            <a:r>
-              <a:rPr lang="bg-BG" sz="1600" dirty="0">
-                <a:solidFill>
-                  <a:schemeClr val="bg1">
-                    <a:lumMod val="20000"/>
-                    <a:lumOff val="80000"/>
-                  </a:schemeClr>
-                </a:solidFill>
-                <a:effectLst/>
-                <a:latin typeface="Calibri" panose="020F0502020204030204" pitchFamily="34" charset="0"/>
-                <a:ea typeface="Calibri" panose="020F0502020204030204" pitchFamily="34" charset="0"/>
-                <a:cs typeface="Arial" panose="020B0604020202020204" pitchFamily="34" charset="0"/>
-                <a:hlinkClick r:id="rId3">
-                  <a:extLst>
-                    <a:ext uri="{A12FA001-AC4F-418D-AE19-62706E023703}">
-                      <ahyp:hlinkClr xmlns:ahyp="http://schemas.microsoft.com/office/drawing/2018/hyperlinkcolor" val="tx"/>
-                    </a:ext>
-                  </a:extLst>
-                </a:hlinkClick>
-              </a:rPr>
-              <a:t>Отворено учебно съдържание по програмиране и ИТ</a:t>
-            </a:r>
-            <a:r>
-              <a:rPr lang="bg-BG" sz="1600" dirty="0">
-                <a:solidFill>
-                  <a:schemeClr val="bg2"/>
-                </a:solidFill>
-                <a:effectLst/>
-                <a:latin typeface="Calibri" panose="020F0502020204030204" pitchFamily="34" charset="0"/>
-                <a:ea typeface="Calibri" panose="020F0502020204030204" pitchFamily="34" charset="0"/>
-                <a:cs typeface="Arial" panose="020B0604020202020204" pitchFamily="34" charset="0"/>
-              </a:rPr>
-              <a:t>", СофтУни Фондация (лиценз </a:t>
-            </a:r>
-            <a:r>
-              <a:rPr lang="en-US" sz="1600" dirty="0">
-                <a:solidFill>
-                  <a:schemeClr val="bg2"/>
-                </a:solidFill>
-                <a:effectLst/>
-                <a:latin typeface="Calibri" panose="020F0502020204030204" pitchFamily="34" charset="0"/>
-                <a:ea typeface="Calibri" panose="020F0502020204030204" pitchFamily="34" charset="0"/>
-                <a:cs typeface="Arial" panose="020B0604020202020204" pitchFamily="34" charset="0"/>
-              </a:rPr>
-              <a:t>CC-BY-NC-SA</a:t>
-            </a:r>
-            <a:r>
-              <a:rPr lang="bg-BG" sz="1600" dirty="0">
-                <a:solidFill>
-                  <a:schemeClr val="bg2"/>
-                </a:solidFill>
-                <a:effectLst/>
-                <a:latin typeface="Calibri" panose="020F0502020204030204" pitchFamily="34" charset="0"/>
-                <a:ea typeface="Calibri" panose="020F0502020204030204" pitchFamily="34" charset="0"/>
-                <a:cs typeface="Arial" panose="020B0604020202020204" pitchFamily="34" charset="0"/>
-              </a:rPr>
-              <a:t>)</a:t>
-            </a:r>
-            <a:endParaRPr lang="bg-BG" sz="2400" dirty="0">
-              <a:solidFill>
-                <a:schemeClr val="bg2"/>
-              </a:solidFill>
-              <a:effectLst/>
-              <a:latin typeface="Calibri" panose="020F0502020204030204" pitchFamily="34" charset="0"/>
-              <a:ea typeface="Calibri" panose="020F0502020204030204" pitchFamily="34" charset="0"/>
-              <a:cs typeface="Arial" panose="020B0604020202020204" pitchFamily="34" charset="0"/>
-            </a:endParaRPr>
-          </a:p>
-        </p:txBody>
-      </p:sp>
-    </p:spTree>
-    <p:extLst>
-      <p:ext uri="{BB962C8B-B14F-4D97-AF65-F5344CB8AC3E}">
-        <p14:creationId xmlns:p14="http://schemas.microsoft.com/office/powerpoint/2010/main" val="3744296604"/>
-      </p:ext>
-    </p:extLst>
-  </p:cSld>
-  <p:clrMapOvr>
-    <a:masterClrMapping/>
-  </p:clrMapOvr>
-  <mc:AlternateContent xmlns:mc="http://schemas.openxmlformats.org/markup-compatibility/2006" xmlns:p14="http://schemas.microsoft.com/office/powerpoint/2010/main">
-    <mc:Choice Requires="p14">
-      <p:transition spd="slow" p14:dur="2000" advClick="0" advTm="5000"/>
-    </mc:Choice>
-    <mc:Fallback xmlns="">
-      <p:transition spd="slow" advClick="0" advTm="5000"/>
-    </mc:Fallback>
-  </mc:AlternateContent>
-</p:sld>
-</file>
-
-<file path=ppt/slides/slide42.xml><?xml version="1.0" encoding="utf-8"?>
 <p:sld xmlns:a="http://schemas.openxmlformats.org/drawingml/2006/main" xmlns:r="http://schemas.openxmlformats.org/officeDocument/2006/relationships" xmlns:p="http://schemas.openxmlformats.org/presentationml/2006/main" show="0">
   <p:cSld>
     <p:spTree>
@@ -24554,7 +23175,7 @@
             <a:fld id="{2BF067CD-8E6B-4360-9AA8-C5DF2A48A6D1}" type="slidenum">
               <a:rPr lang="en-US" noProof="0" smtClean="0"/>
               <a:pPr/>
-              <a:t>42</a:t>
+              <a:t>40</a:t>
             </a:fld>
             <a:endParaRPr lang="en-US" noProof="0" dirty="0"/>
           </a:p>

</xml_diff>